<commit_message>
Updated main and supp for author review
</commit_message>
<xml_diff>
--- a/main/ptm_fig.pptx
+++ b/main/ptm_fig.pptx
@@ -226,7 +226,7 @@
           <a:p>
             <a:fld id="{80137904-5636-B34C-A9CD-CBEBAD04BF28}" type="datetimeFigureOut">
               <a:rPr lang="en-US" smtClean="0"/>
-              <a:t>10/27/2021</a:t>
+              <a:t>11/8/2021</a:t>
             </a:fld>
             <a:endParaRPr lang="en-US"/>
           </a:p>
@@ -773,7 +773,7 @@
           <a:p>
             <a:fld id="{3C76BF9E-C1DF-AA49-BEDC-5D48F2B93EA3}" type="datetimeFigureOut">
               <a:rPr lang="en-US" smtClean="0"/>
-              <a:t>10/27/2021</a:t>
+              <a:t>11/8/2021</a:t>
             </a:fld>
             <a:endParaRPr lang="en-US"/>
           </a:p>
@@ -941,7 +941,7 @@
           <a:p>
             <a:fld id="{3C76BF9E-C1DF-AA49-BEDC-5D48F2B93EA3}" type="datetimeFigureOut">
               <a:rPr lang="en-US" smtClean="0"/>
-              <a:t>10/27/2021</a:t>
+              <a:t>11/8/2021</a:t>
             </a:fld>
             <a:endParaRPr lang="en-US"/>
           </a:p>
@@ -1119,7 +1119,7 @@
           <a:p>
             <a:fld id="{3C76BF9E-C1DF-AA49-BEDC-5D48F2B93EA3}" type="datetimeFigureOut">
               <a:rPr lang="en-US" smtClean="0"/>
-              <a:t>10/27/2021</a:t>
+              <a:t>11/8/2021</a:t>
             </a:fld>
             <a:endParaRPr lang="en-US"/>
           </a:p>
@@ -1287,7 +1287,7 @@
           <a:p>
             <a:fld id="{3C76BF9E-C1DF-AA49-BEDC-5D48F2B93EA3}" type="datetimeFigureOut">
               <a:rPr lang="en-US" smtClean="0"/>
-              <a:t>10/27/2021</a:t>
+              <a:t>11/8/2021</a:t>
             </a:fld>
             <a:endParaRPr lang="en-US"/>
           </a:p>
@@ -1532,7 +1532,7 @@
           <a:p>
             <a:fld id="{3C76BF9E-C1DF-AA49-BEDC-5D48F2B93EA3}" type="datetimeFigureOut">
               <a:rPr lang="en-US" smtClean="0"/>
-              <a:t>10/27/2021</a:t>
+              <a:t>11/8/2021</a:t>
             </a:fld>
             <a:endParaRPr lang="en-US"/>
           </a:p>
@@ -1817,7 +1817,7 @@
           <a:p>
             <a:fld id="{3C76BF9E-C1DF-AA49-BEDC-5D48F2B93EA3}" type="datetimeFigureOut">
               <a:rPr lang="en-US" smtClean="0"/>
-              <a:t>10/27/2021</a:t>
+              <a:t>11/8/2021</a:t>
             </a:fld>
             <a:endParaRPr lang="en-US"/>
           </a:p>
@@ -2236,7 +2236,7 @@
           <a:p>
             <a:fld id="{3C76BF9E-C1DF-AA49-BEDC-5D48F2B93EA3}" type="datetimeFigureOut">
               <a:rPr lang="en-US" smtClean="0"/>
-              <a:t>10/27/2021</a:t>
+              <a:t>11/8/2021</a:t>
             </a:fld>
             <a:endParaRPr lang="en-US"/>
           </a:p>
@@ -2353,7 +2353,7 @@
           <a:p>
             <a:fld id="{3C76BF9E-C1DF-AA49-BEDC-5D48F2B93EA3}" type="datetimeFigureOut">
               <a:rPr lang="en-US" smtClean="0"/>
-              <a:t>10/27/2021</a:t>
+              <a:t>11/8/2021</a:t>
             </a:fld>
             <a:endParaRPr lang="en-US"/>
           </a:p>
@@ -2448,7 +2448,7 @@
           <a:p>
             <a:fld id="{3C76BF9E-C1DF-AA49-BEDC-5D48F2B93EA3}" type="datetimeFigureOut">
               <a:rPr lang="en-US" smtClean="0"/>
-              <a:t>10/27/2021</a:t>
+              <a:t>11/8/2021</a:t>
             </a:fld>
             <a:endParaRPr lang="en-US"/>
           </a:p>
@@ -2723,7 +2723,7 @@
           <a:p>
             <a:fld id="{3C76BF9E-C1DF-AA49-BEDC-5D48F2B93EA3}" type="datetimeFigureOut">
               <a:rPr lang="en-US" smtClean="0"/>
-              <a:t>10/27/2021</a:t>
+              <a:t>11/8/2021</a:t>
             </a:fld>
             <a:endParaRPr lang="en-US"/>
           </a:p>
@@ -2975,7 +2975,7 @@
           <a:p>
             <a:fld id="{3C76BF9E-C1DF-AA49-BEDC-5D48F2B93EA3}" type="datetimeFigureOut">
               <a:rPr lang="en-US" smtClean="0"/>
-              <a:t>10/27/2021</a:t>
+              <a:t>11/8/2021</a:t>
             </a:fld>
             <a:endParaRPr lang="en-US"/>
           </a:p>
@@ -3186,7 +3186,7 @@
           <a:p>
             <a:fld id="{3C76BF9E-C1DF-AA49-BEDC-5D48F2B93EA3}" type="datetimeFigureOut">
               <a:rPr lang="en-US" smtClean="0"/>
-              <a:t>10/27/2021</a:t>
+              <a:t>11/8/2021</a:t>
             </a:fld>
             <a:endParaRPr lang="en-US"/>
           </a:p>
@@ -3675,7 +3675,7 @@
           <a:effectLst/>
           <a:extLst>
             <a:ext uri="{AF507438-7753-43e0-B8FC-AC1667EBCBE1}">
-              <a14:hiddenEffects xmlns:a14="http://schemas.microsoft.com/office/drawing/2010/main" xmlns="">
+              <a14:hiddenEffects xmlns="" xmlns:a14="http://schemas.microsoft.com/office/drawing/2010/main">
                 <a:effectLst>
                   <a:outerShdw dist="35921" dir="2700000" algn="ctr" rotWithShape="0">
                     <a:schemeClr val="bg2"/>
@@ -3836,12 +3836,12 @@
           <a:effectLst/>
           <a:extLst>
             <a:ext uri="{909E8E84-426E-40dd-AFC4-6F175D3DCCD1}">
-              <a14:hiddenFill xmlns:a14="http://schemas.microsoft.com/office/drawing/2010/main" xmlns="">
+              <a14:hiddenFill xmlns="" xmlns:a14="http://schemas.microsoft.com/office/drawing/2010/main">
                 <a:noFill/>
               </a14:hiddenFill>
             </a:ext>
             <a:ext uri="{AF507438-7753-43e0-B8FC-AC1667EBCBE1}">
-              <a14:hiddenEffects xmlns:a14="http://schemas.microsoft.com/office/drawing/2010/main" xmlns="">
+              <a14:hiddenEffects xmlns="" xmlns:a14="http://schemas.microsoft.com/office/drawing/2010/main">
                 <a:effectLst>
                   <a:outerShdw dist="35921" dir="2700000" algn="ctr" rotWithShape="0">
                     <a:schemeClr val="bg2"/>
@@ -3896,7 +3896,7 @@
           <a:effectLst/>
           <a:extLst>
             <a:ext uri="{AF507438-7753-43e0-B8FC-AC1667EBCBE1}">
-              <a14:hiddenEffects xmlns:a14="http://schemas.microsoft.com/office/drawing/2010/main" xmlns="">
+              <a14:hiddenEffects xmlns="" xmlns:a14="http://schemas.microsoft.com/office/drawing/2010/main">
                 <a:effectLst>
                   <a:outerShdw dist="35921" dir="2700000" algn="ctr" rotWithShape="0">
                     <a:schemeClr val="bg2"/>
@@ -3949,12 +3949,12 @@
           <a:effectLst/>
           <a:extLst>
             <a:ext uri="{909E8E84-426E-40dd-AFC4-6F175D3DCCD1}">
-              <a14:hiddenFill xmlns:a14="http://schemas.microsoft.com/office/drawing/2010/main" xmlns="">
+              <a14:hiddenFill xmlns="" xmlns:a14="http://schemas.microsoft.com/office/drawing/2010/main">
                 <a:noFill/>
               </a14:hiddenFill>
             </a:ext>
             <a:ext uri="{AF507438-7753-43e0-B8FC-AC1667EBCBE1}">
-              <a14:hiddenEffects xmlns:a14="http://schemas.microsoft.com/office/drawing/2010/main" xmlns="">
+              <a14:hiddenEffects xmlns="" xmlns:a14="http://schemas.microsoft.com/office/drawing/2010/main">
                 <a:effectLst>
                   <a:outerShdw dist="35921" dir="2700000" algn="ctr" rotWithShape="0">
                     <a:schemeClr val="bg2"/>
@@ -4007,12 +4007,12 @@
           <a:effectLst/>
           <a:extLst>
             <a:ext uri="{909E8E84-426E-40dd-AFC4-6F175D3DCCD1}">
-              <a14:hiddenFill xmlns:a14="http://schemas.microsoft.com/office/drawing/2010/main" xmlns="">
+              <a14:hiddenFill xmlns="" xmlns:a14="http://schemas.microsoft.com/office/drawing/2010/main">
                 <a:noFill/>
               </a14:hiddenFill>
             </a:ext>
             <a:ext uri="{AF507438-7753-43e0-B8FC-AC1667EBCBE1}">
-              <a14:hiddenEffects xmlns:a14="http://schemas.microsoft.com/office/drawing/2010/main" xmlns="">
+              <a14:hiddenEffects xmlns="" xmlns:a14="http://schemas.microsoft.com/office/drawing/2010/main">
                 <a:effectLst>
                   <a:outerShdw dist="35921" dir="2700000" algn="ctr" rotWithShape="0">
                     <a:schemeClr val="bg2"/>
@@ -4069,7 +4069,7 @@
           <a:effectLst/>
           <a:extLst>
             <a:ext uri="{AF507438-7753-43e0-B8FC-AC1667EBCBE1}">
-              <a14:hiddenEffects xmlns:a14="http://schemas.microsoft.com/office/drawing/2010/main" xmlns="">
+              <a14:hiddenEffects xmlns="" xmlns:a14="http://schemas.microsoft.com/office/drawing/2010/main">
                 <a:effectLst>
                   <a:outerShdw dist="35921" dir="2700000" algn="ctr" rotWithShape="0">
                     <a:schemeClr val="bg2"/>
@@ -4124,7 +4124,7 @@
           <a:effectLst/>
           <a:extLst>
             <a:ext uri="{AF507438-7753-43e0-B8FC-AC1667EBCBE1}">
-              <a14:hiddenEffects xmlns:a14="http://schemas.microsoft.com/office/drawing/2010/main" xmlns="">
+              <a14:hiddenEffects xmlns="" xmlns:a14="http://schemas.microsoft.com/office/drawing/2010/main">
                 <a:effectLst>
                   <a:outerShdw dist="35921" dir="2700000" algn="ctr" rotWithShape="0">
                     <a:schemeClr val="bg2"/>
@@ -4177,12 +4177,12 @@
           <a:effectLst/>
           <a:extLst>
             <a:ext uri="{909E8E84-426E-40dd-AFC4-6F175D3DCCD1}">
-              <a14:hiddenFill xmlns:a14="http://schemas.microsoft.com/office/drawing/2010/main" xmlns="">
+              <a14:hiddenFill xmlns="" xmlns:a14="http://schemas.microsoft.com/office/drawing/2010/main">
                 <a:noFill/>
               </a14:hiddenFill>
             </a:ext>
             <a:ext uri="{AF507438-7753-43e0-B8FC-AC1667EBCBE1}">
-              <a14:hiddenEffects xmlns:a14="http://schemas.microsoft.com/office/drawing/2010/main" xmlns="">
+              <a14:hiddenEffects xmlns="" xmlns:a14="http://schemas.microsoft.com/office/drawing/2010/main">
                 <a:effectLst>
                   <a:outerShdw dist="35921" dir="2700000" algn="ctr" rotWithShape="0">
                     <a:schemeClr val="bg2"/>
@@ -4235,12 +4235,12 @@
           <a:effectLst/>
           <a:extLst>
             <a:ext uri="{909E8E84-426E-40dd-AFC4-6F175D3DCCD1}">
-              <a14:hiddenFill xmlns:a14="http://schemas.microsoft.com/office/drawing/2010/main" xmlns="">
+              <a14:hiddenFill xmlns="" xmlns:a14="http://schemas.microsoft.com/office/drawing/2010/main">
                 <a:noFill/>
               </a14:hiddenFill>
             </a:ext>
             <a:ext uri="{AF507438-7753-43e0-B8FC-AC1667EBCBE1}">
-              <a14:hiddenEffects xmlns:a14="http://schemas.microsoft.com/office/drawing/2010/main" xmlns="">
+              <a14:hiddenEffects xmlns="" xmlns:a14="http://schemas.microsoft.com/office/drawing/2010/main">
                 <a:effectLst>
                   <a:outerShdw dist="35921" dir="2700000" algn="ctr" rotWithShape="0">
                     <a:schemeClr val="bg2"/>
@@ -4297,7 +4297,7 @@
           <a:effectLst/>
           <a:extLst>
             <a:ext uri="{AF507438-7753-43e0-B8FC-AC1667EBCBE1}">
-              <a14:hiddenEffects xmlns:a14="http://schemas.microsoft.com/office/drawing/2010/main" xmlns="">
+              <a14:hiddenEffects xmlns="" xmlns:a14="http://schemas.microsoft.com/office/drawing/2010/main">
                 <a:effectLst>
                   <a:outerShdw dist="35921" dir="2700000" algn="ctr" rotWithShape="0">
                     <a:schemeClr val="bg2"/>
@@ -4352,7 +4352,7 @@
           <a:effectLst/>
           <a:extLst>
             <a:ext uri="{AF507438-7753-43e0-B8FC-AC1667EBCBE1}">
-              <a14:hiddenEffects xmlns:a14="http://schemas.microsoft.com/office/drawing/2010/main" xmlns="">
+              <a14:hiddenEffects xmlns="" xmlns:a14="http://schemas.microsoft.com/office/drawing/2010/main">
                 <a:effectLst>
                   <a:outerShdw dist="35921" dir="2700000" algn="ctr" rotWithShape="0">
                     <a:schemeClr val="bg2"/>
@@ -4405,12 +4405,12 @@
           <a:effectLst/>
           <a:extLst>
             <a:ext uri="{909E8E84-426E-40dd-AFC4-6F175D3DCCD1}">
-              <a14:hiddenFill xmlns:a14="http://schemas.microsoft.com/office/drawing/2010/main" xmlns="">
+              <a14:hiddenFill xmlns="" xmlns:a14="http://schemas.microsoft.com/office/drawing/2010/main">
                 <a:noFill/>
               </a14:hiddenFill>
             </a:ext>
             <a:ext uri="{AF507438-7753-43e0-B8FC-AC1667EBCBE1}">
-              <a14:hiddenEffects xmlns:a14="http://schemas.microsoft.com/office/drawing/2010/main" xmlns="">
+              <a14:hiddenEffects xmlns="" xmlns:a14="http://schemas.microsoft.com/office/drawing/2010/main">
                 <a:effectLst>
                   <a:outerShdw dist="35921" dir="2700000" algn="ctr" rotWithShape="0">
                     <a:schemeClr val="bg2"/>
@@ -4463,12 +4463,12 @@
           <a:effectLst/>
           <a:extLst>
             <a:ext uri="{909E8E84-426E-40dd-AFC4-6F175D3DCCD1}">
-              <a14:hiddenFill xmlns:a14="http://schemas.microsoft.com/office/drawing/2010/main" xmlns="">
+              <a14:hiddenFill xmlns="" xmlns:a14="http://schemas.microsoft.com/office/drawing/2010/main">
                 <a:noFill/>
               </a14:hiddenFill>
             </a:ext>
             <a:ext uri="{AF507438-7753-43e0-B8FC-AC1667EBCBE1}">
-              <a14:hiddenEffects xmlns:a14="http://schemas.microsoft.com/office/drawing/2010/main" xmlns="">
+              <a14:hiddenEffects xmlns="" xmlns:a14="http://schemas.microsoft.com/office/drawing/2010/main">
                 <a:effectLst>
                   <a:outerShdw dist="35921" dir="2700000" algn="ctr" rotWithShape="0">
                     <a:schemeClr val="bg2"/>
@@ -4523,7 +4523,7 @@
           <a:effectLst/>
           <a:extLst>
             <a:ext uri="{AF507438-7753-43e0-B8FC-AC1667EBCBE1}">
-              <a14:hiddenEffects xmlns:a14="http://schemas.microsoft.com/office/drawing/2010/main" xmlns="">
+              <a14:hiddenEffects xmlns="" xmlns:a14="http://schemas.microsoft.com/office/drawing/2010/main">
                 <a:effectLst>
                   <a:outerShdw dist="35921" dir="2700000" algn="ctr" rotWithShape="0">
                     <a:schemeClr val="bg2"/>
@@ -4578,7 +4578,7 @@
           <a:effectLst/>
           <a:extLst>
             <a:ext uri="{AF507438-7753-43e0-B8FC-AC1667EBCBE1}">
-              <a14:hiddenEffects xmlns:a14="http://schemas.microsoft.com/office/drawing/2010/main" xmlns="">
+              <a14:hiddenEffects xmlns="" xmlns:a14="http://schemas.microsoft.com/office/drawing/2010/main">
                 <a:effectLst>
                   <a:outerShdw dist="35921" dir="2700000" algn="ctr" rotWithShape="0">
                     <a:schemeClr val="bg2"/>
@@ -4631,12 +4631,12 @@
           <a:effectLst/>
           <a:extLst>
             <a:ext uri="{909E8E84-426E-40dd-AFC4-6F175D3DCCD1}">
-              <a14:hiddenFill xmlns:a14="http://schemas.microsoft.com/office/drawing/2010/main" xmlns="">
+              <a14:hiddenFill xmlns="" xmlns:a14="http://schemas.microsoft.com/office/drawing/2010/main">
                 <a:noFill/>
               </a14:hiddenFill>
             </a:ext>
             <a:ext uri="{AF507438-7753-43e0-B8FC-AC1667EBCBE1}">
-              <a14:hiddenEffects xmlns:a14="http://schemas.microsoft.com/office/drawing/2010/main" xmlns="">
+              <a14:hiddenEffects xmlns="" xmlns:a14="http://schemas.microsoft.com/office/drawing/2010/main">
                 <a:effectLst>
                   <a:outerShdw dist="35921" dir="2700000" algn="ctr" rotWithShape="0">
                     <a:schemeClr val="bg2"/>
@@ -4689,12 +4689,12 @@
           <a:effectLst/>
           <a:extLst>
             <a:ext uri="{909E8E84-426E-40dd-AFC4-6F175D3DCCD1}">
-              <a14:hiddenFill xmlns:a14="http://schemas.microsoft.com/office/drawing/2010/main" xmlns="">
+              <a14:hiddenFill xmlns="" xmlns:a14="http://schemas.microsoft.com/office/drawing/2010/main">
                 <a:noFill/>
               </a14:hiddenFill>
             </a:ext>
             <a:ext uri="{AF507438-7753-43e0-B8FC-AC1667EBCBE1}">
-              <a14:hiddenEffects xmlns:a14="http://schemas.microsoft.com/office/drawing/2010/main" xmlns="">
+              <a14:hiddenEffects xmlns="" xmlns:a14="http://schemas.microsoft.com/office/drawing/2010/main">
                 <a:effectLst>
                   <a:outerShdw dist="35921" dir="2700000" algn="ctr" rotWithShape="0">
                     <a:schemeClr val="bg2"/>
@@ -4751,7 +4751,7 @@
           <a:effectLst/>
           <a:extLst>
             <a:ext uri="{AF507438-7753-43e0-B8FC-AC1667EBCBE1}">
-              <a14:hiddenEffects xmlns:a14="http://schemas.microsoft.com/office/drawing/2010/main" xmlns="">
+              <a14:hiddenEffects xmlns="" xmlns:a14="http://schemas.microsoft.com/office/drawing/2010/main">
                 <a:effectLst>
                   <a:outerShdw dist="35921" dir="2700000" algn="ctr" rotWithShape="0">
                     <a:schemeClr val="bg2"/>
@@ -4799,14 +4799,14 @@
           <a:effectLst/>
           <a:extLst>
             <a:ext uri="{909E8E84-426E-40dd-AFC4-6F175D3DCCD1}">
-              <a14:hiddenFill xmlns:a14="http://schemas.microsoft.com/office/drawing/2010/main" xmlns="">
+              <a14:hiddenFill xmlns="" xmlns:a14="http://schemas.microsoft.com/office/drawing/2010/main">
                 <a:solidFill>
                   <a:schemeClr val="accent1"/>
                 </a:solidFill>
               </a14:hiddenFill>
             </a:ext>
             <a:ext uri="{91240B29-F687-4f45-9708-019B960494DF}">
-              <a14:hiddenLine xmlns:a14="http://schemas.microsoft.com/office/drawing/2010/main" xmlns="" w="9525">
+              <a14:hiddenLine xmlns="" xmlns:a14="http://schemas.microsoft.com/office/drawing/2010/main" w="9525">
                 <a:solidFill>
                   <a:schemeClr val="tx1"/>
                 </a:solidFill>
@@ -4816,7 +4816,7 @@
               </a14:hiddenLine>
             </a:ext>
             <a:ext uri="{AF507438-7753-43e0-B8FC-AC1667EBCBE1}">
-              <a14:hiddenEffects xmlns:a14="http://schemas.microsoft.com/office/drawing/2010/main" xmlns="">
+              <a14:hiddenEffects xmlns="" xmlns:a14="http://schemas.microsoft.com/office/drawing/2010/main">
                 <a:effectLst>
                   <a:outerShdw dist="35921" dir="2700000" algn="ctr" rotWithShape="0">
                     <a:schemeClr val="bg2"/>
@@ -4974,14 +4974,14 @@
           <a:effectLst/>
           <a:extLst>
             <a:ext uri="{909E8E84-426E-40dd-AFC4-6F175D3DCCD1}">
-              <a14:hiddenFill xmlns:a14="http://schemas.microsoft.com/office/drawing/2010/main" xmlns="">
+              <a14:hiddenFill xmlns="" xmlns:a14="http://schemas.microsoft.com/office/drawing/2010/main">
                 <a:solidFill>
                   <a:schemeClr val="accent1"/>
                 </a:solidFill>
               </a14:hiddenFill>
             </a:ext>
             <a:ext uri="{91240B29-F687-4f45-9708-019B960494DF}">
-              <a14:hiddenLine xmlns:a14="http://schemas.microsoft.com/office/drawing/2010/main" xmlns="" w="9525">
+              <a14:hiddenLine xmlns="" xmlns:a14="http://schemas.microsoft.com/office/drawing/2010/main" w="9525">
                 <a:solidFill>
                   <a:schemeClr val="tx1"/>
                 </a:solidFill>
@@ -4991,7 +4991,7 @@
               </a14:hiddenLine>
             </a:ext>
             <a:ext uri="{AF507438-7753-43e0-B8FC-AC1667EBCBE1}">
-              <a14:hiddenEffects xmlns:a14="http://schemas.microsoft.com/office/drawing/2010/main" xmlns="">
+              <a14:hiddenEffects xmlns="" xmlns:a14="http://schemas.microsoft.com/office/drawing/2010/main">
                 <a:effectLst>
                   <a:outerShdw dist="35921" dir="2700000" algn="ctr" rotWithShape="0">
                     <a:schemeClr val="bg2"/>
@@ -5149,14 +5149,14 @@
           <a:effectLst/>
           <a:extLst>
             <a:ext uri="{909E8E84-426E-40dd-AFC4-6F175D3DCCD1}">
-              <a14:hiddenFill xmlns:a14="http://schemas.microsoft.com/office/drawing/2010/main" xmlns="">
+              <a14:hiddenFill xmlns="" xmlns:a14="http://schemas.microsoft.com/office/drawing/2010/main">
                 <a:solidFill>
                   <a:schemeClr val="accent1"/>
                 </a:solidFill>
               </a14:hiddenFill>
             </a:ext>
             <a:ext uri="{91240B29-F687-4f45-9708-019B960494DF}">
-              <a14:hiddenLine xmlns:a14="http://schemas.microsoft.com/office/drawing/2010/main" xmlns="" w="9525">
+              <a14:hiddenLine xmlns="" xmlns:a14="http://schemas.microsoft.com/office/drawing/2010/main" w="9525">
                 <a:solidFill>
                   <a:schemeClr val="tx1"/>
                 </a:solidFill>
@@ -5166,7 +5166,7 @@
               </a14:hiddenLine>
             </a:ext>
             <a:ext uri="{AF507438-7753-43e0-B8FC-AC1667EBCBE1}">
-              <a14:hiddenEffects xmlns:a14="http://schemas.microsoft.com/office/drawing/2010/main" xmlns="">
+              <a14:hiddenEffects xmlns="" xmlns:a14="http://schemas.microsoft.com/office/drawing/2010/main">
                 <a:effectLst>
                   <a:outerShdw dist="35921" dir="2700000" algn="ctr" rotWithShape="0">
                     <a:schemeClr val="bg2"/>
@@ -5324,14 +5324,14 @@
           <a:effectLst/>
           <a:extLst>
             <a:ext uri="{909E8E84-426E-40dd-AFC4-6F175D3DCCD1}">
-              <a14:hiddenFill xmlns:a14="http://schemas.microsoft.com/office/drawing/2010/main" xmlns="">
+              <a14:hiddenFill xmlns="" xmlns:a14="http://schemas.microsoft.com/office/drawing/2010/main">
                 <a:solidFill>
                   <a:schemeClr val="accent1"/>
                 </a:solidFill>
               </a14:hiddenFill>
             </a:ext>
             <a:ext uri="{91240B29-F687-4f45-9708-019B960494DF}">
-              <a14:hiddenLine xmlns:a14="http://schemas.microsoft.com/office/drawing/2010/main" xmlns="" w="9525">
+              <a14:hiddenLine xmlns="" xmlns:a14="http://schemas.microsoft.com/office/drawing/2010/main" w="9525">
                 <a:solidFill>
                   <a:schemeClr val="tx1"/>
                 </a:solidFill>
@@ -5341,7 +5341,7 @@
               </a14:hiddenLine>
             </a:ext>
             <a:ext uri="{AF507438-7753-43e0-B8FC-AC1667EBCBE1}">
-              <a14:hiddenEffects xmlns:a14="http://schemas.microsoft.com/office/drawing/2010/main" xmlns="">
+              <a14:hiddenEffects xmlns="" xmlns:a14="http://schemas.microsoft.com/office/drawing/2010/main">
                 <a:effectLst>
                   <a:outerShdw dist="35921" dir="2700000" algn="ctr" rotWithShape="0">
                     <a:schemeClr val="bg2"/>
@@ -5504,12 +5504,12 @@
           <a:effectLst/>
           <a:extLst>
             <a:ext uri="{909E8E84-426E-40dd-AFC4-6F175D3DCCD1}">
-              <a14:hiddenFill xmlns:a14="http://schemas.microsoft.com/office/drawing/2010/main" xmlns="">
+              <a14:hiddenFill xmlns="" xmlns:a14="http://schemas.microsoft.com/office/drawing/2010/main">
                 <a:noFill/>
               </a14:hiddenFill>
             </a:ext>
             <a:ext uri="{AF507438-7753-43e0-B8FC-AC1667EBCBE1}">
-              <a14:hiddenEffects xmlns:a14="http://schemas.microsoft.com/office/drawing/2010/main" xmlns="">
+              <a14:hiddenEffects xmlns="" xmlns:a14="http://schemas.microsoft.com/office/drawing/2010/main">
                 <a:effectLst>
                   <a:outerShdw dist="35921" dir="2700000" algn="ctr" rotWithShape="0">
                     <a:schemeClr val="bg2"/>
@@ -5562,12 +5562,12 @@
           <a:effectLst/>
           <a:extLst>
             <a:ext uri="{909E8E84-426E-40dd-AFC4-6F175D3DCCD1}">
-              <a14:hiddenFill xmlns:a14="http://schemas.microsoft.com/office/drawing/2010/main" xmlns="">
+              <a14:hiddenFill xmlns="" xmlns:a14="http://schemas.microsoft.com/office/drawing/2010/main">
                 <a:noFill/>
               </a14:hiddenFill>
             </a:ext>
             <a:ext uri="{AF507438-7753-43e0-B8FC-AC1667EBCBE1}">
-              <a14:hiddenEffects xmlns:a14="http://schemas.microsoft.com/office/drawing/2010/main" xmlns="">
+              <a14:hiddenEffects xmlns="" xmlns:a14="http://schemas.microsoft.com/office/drawing/2010/main">
                 <a:effectLst>
                   <a:outerShdw dist="35921" dir="2700000" algn="ctr" rotWithShape="0">
                     <a:schemeClr val="bg2"/>
@@ -5620,12 +5620,12 @@
           <a:effectLst/>
           <a:extLst>
             <a:ext uri="{909E8E84-426E-40dd-AFC4-6F175D3DCCD1}">
-              <a14:hiddenFill xmlns:a14="http://schemas.microsoft.com/office/drawing/2010/main" xmlns="">
+              <a14:hiddenFill xmlns="" xmlns:a14="http://schemas.microsoft.com/office/drawing/2010/main">
                 <a:noFill/>
               </a14:hiddenFill>
             </a:ext>
             <a:ext uri="{AF507438-7753-43e0-B8FC-AC1667EBCBE1}">
-              <a14:hiddenEffects xmlns:a14="http://schemas.microsoft.com/office/drawing/2010/main" xmlns="">
+              <a14:hiddenEffects xmlns="" xmlns:a14="http://schemas.microsoft.com/office/drawing/2010/main">
                 <a:effectLst>
                   <a:outerShdw dist="35921" dir="2700000" algn="ctr" rotWithShape="0">
                     <a:schemeClr val="bg2"/>
@@ -5678,12 +5678,12 @@
           <a:effectLst/>
           <a:extLst>
             <a:ext uri="{909E8E84-426E-40dd-AFC4-6F175D3DCCD1}">
-              <a14:hiddenFill xmlns:a14="http://schemas.microsoft.com/office/drawing/2010/main" xmlns="">
+              <a14:hiddenFill xmlns="" xmlns:a14="http://schemas.microsoft.com/office/drawing/2010/main">
                 <a:noFill/>
               </a14:hiddenFill>
             </a:ext>
             <a:ext uri="{AF507438-7753-43e0-B8FC-AC1667EBCBE1}">
-              <a14:hiddenEffects xmlns:a14="http://schemas.microsoft.com/office/drawing/2010/main" xmlns="">
+              <a14:hiddenEffects xmlns="" xmlns:a14="http://schemas.microsoft.com/office/drawing/2010/main">
                 <a:effectLst>
                   <a:outerShdw dist="35921" dir="2700000" algn="ctr" rotWithShape="0">
                     <a:schemeClr val="bg2"/>
@@ -5736,12 +5736,12 @@
           <a:effectLst/>
           <a:extLst>
             <a:ext uri="{909E8E84-426E-40dd-AFC4-6F175D3DCCD1}">
-              <a14:hiddenFill xmlns:a14="http://schemas.microsoft.com/office/drawing/2010/main" xmlns="">
+              <a14:hiddenFill xmlns="" xmlns:a14="http://schemas.microsoft.com/office/drawing/2010/main">
                 <a:noFill/>
               </a14:hiddenFill>
             </a:ext>
             <a:ext uri="{AF507438-7753-43e0-B8FC-AC1667EBCBE1}">
-              <a14:hiddenEffects xmlns:a14="http://schemas.microsoft.com/office/drawing/2010/main" xmlns="">
+              <a14:hiddenEffects xmlns="" xmlns:a14="http://schemas.microsoft.com/office/drawing/2010/main">
                 <a:effectLst>
                   <a:outerShdw dist="35921" dir="2700000" algn="ctr" rotWithShape="0">
                     <a:schemeClr val="bg2"/>
@@ -5794,12 +5794,12 @@
           <a:effectLst/>
           <a:extLst>
             <a:ext uri="{909E8E84-426E-40dd-AFC4-6F175D3DCCD1}">
-              <a14:hiddenFill xmlns:a14="http://schemas.microsoft.com/office/drawing/2010/main" xmlns="">
+              <a14:hiddenFill xmlns="" xmlns:a14="http://schemas.microsoft.com/office/drawing/2010/main">
                 <a:noFill/>
               </a14:hiddenFill>
             </a:ext>
             <a:ext uri="{AF507438-7753-43e0-B8FC-AC1667EBCBE1}">
-              <a14:hiddenEffects xmlns:a14="http://schemas.microsoft.com/office/drawing/2010/main" xmlns="">
+              <a14:hiddenEffects xmlns="" xmlns:a14="http://schemas.microsoft.com/office/drawing/2010/main">
                 <a:effectLst>
                   <a:outerShdw dist="35921" dir="2700000" algn="ctr" rotWithShape="0">
                     <a:schemeClr val="bg2"/>
@@ -5852,12 +5852,12 @@
           <a:effectLst/>
           <a:extLst>
             <a:ext uri="{909E8E84-426E-40dd-AFC4-6F175D3DCCD1}">
-              <a14:hiddenFill xmlns:a14="http://schemas.microsoft.com/office/drawing/2010/main" xmlns="">
+              <a14:hiddenFill xmlns="" xmlns:a14="http://schemas.microsoft.com/office/drawing/2010/main">
                 <a:noFill/>
               </a14:hiddenFill>
             </a:ext>
             <a:ext uri="{AF507438-7753-43e0-B8FC-AC1667EBCBE1}">
-              <a14:hiddenEffects xmlns:a14="http://schemas.microsoft.com/office/drawing/2010/main" xmlns="">
+              <a14:hiddenEffects xmlns="" xmlns:a14="http://schemas.microsoft.com/office/drawing/2010/main">
                 <a:effectLst>
                   <a:outerShdw dist="35921" dir="2700000" algn="ctr" rotWithShape="0">
                     <a:schemeClr val="bg2"/>
@@ -5910,12 +5910,12 @@
           <a:effectLst/>
           <a:extLst>
             <a:ext uri="{909E8E84-426E-40dd-AFC4-6F175D3DCCD1}">
-              <a14:hiddenFill xmlns:a14="http://schemas.microsoft.com/office/drawing/2010/main" xmlns="">
+              <a14:hiddenFill xmlns="" xmlns:a14="http://schemas.microsoft.com/office/drawing/2010/main">
                 <a:noFill/>
               </a14:hiddenFill>
             </a:ext>
             <a:ext uri="{AF507438-7753-43e0-B8FC-AC1667EBCBE1}">
-              <a14:hiddenEffects xmlns:a14="http://schemas.microsoft.com/office/drawing/2010/main" xmlns="">
+              <a14:hiddenEffects xmlns="" xmlns:a14="http://schemas.microsoft.com/office/drawing/2010/main">
                 <a:effectLst>
                   <a:outerShdw dist="35921" dir="2700000" algn="ctr" rotWithShape="0">
                     <a:schemeClr val="bg2"/>
@@ -5968,14 +5968,14 @@
           <a:effectLst/>
           <a:extLst>
             <a:ext uri="{909E8E84-426E-40dd-AFC4-6F175D3DCCD1}">
-              <a14:hiddenFill xmlns:a14="http://schemas.microsoft.com/office/drawing/2010/main" xmlns="">
+              <a14:hiddenFill xmlns="" xmlns:a14="http://schemas.microsoft.com/office/drawing/2010/main">
                 <a:solidFill>
                   <a:srgbClr val="FFFFCC"/>
                 </a:solidFill>
               </a14:hiddenFill>
             </a:ext>
             <a:ext uri="{AF507438-7753-43e0-B8FC-AC1667EBCBE1}">
-              <a14:hiddenEffects xmlns:a14="http://schemas.microsoft.com/office/drawing/2010/main" xmlns="">
+              <a14:hiddenEffects xmlns="" xmlns:a14="http://schemas.microsoft.com/office/drawing/2010/main">
                 <a:effectLst>
                   <a:outerShdw dist="35921" dir="2700000" algn="ctr" rotWithShape="0">
                     <a:schemeClr val="bg2"/>
@@ -6136,12 +6136,12 @@
           <a:effectLst/>
           <a:extLst>
             <a:ext uri="{909E8E84-426E-40dd-AFC4-6F175D3DCCD1}">
-              <a14:hiddenFill xmlns:a14="http://schemas.microsoft.com/office/drawing/2010/main" xmlns="">
+              <a14:hiddenFill xmlns="" xmlns:a14="http://schemas.microsoft.com/office/drawing/2010/main">
                 <a:noFill/>
               </a14:hiddenFill>
             </a:ext>
             <a:ext uri="{AF507438-7753-43e0-B8FC-AC1667EBCBE1}">
-              <a14:hiddenEffects xmlns:a14="http://schemas.microsoft.com/office/drawing/2010/main" xmlns="">
+              <a14:hiddenEffects xmlns="" xmlns:a14="http://schemas.microsoft.com/office/drawing/2010/main">
                 <a:effectLst>
                   <a:outerShdw dist="35921" dir="2700000" algn="ctr" rotWithShape="0">
                     <a:schemeClr val="bg2"/>
@@ -6194,12 +6194,12 @@
           <a:effectLst/>
           <a:extLst>
             <a:ext uri="{909E8E84-426E-40dd-AFC4-6F175D3DCCD1}">
-              <a14:hiddenFill xmlns:a14="http://schemas.microsoft.com/office/drawing/2010/main" xmlns="">
+              <a14:hiddenFill xmlns="" xmlns:a14="http://schemas.microsoft.com/office/drawing/2010/main">
                 <a:noFill/>
               </a14:hiddenFill>
             </a:ext>
             <a:ext uri="{AF507438-7753-43e0-B8FC-AC1667EBCBE1}">
-              <a14:hiddenEffects xmlns:a14="http://schemas.microsoft.com/office/drawing/2010/main" xmlns="">
+              <a14:hiddenEffects xmlns="" xmlns:a14="http://schemas.microsoft.com/office/drawing/2010/main">
                 <a:effectLst>
                   <a:outerShdw dist="35921" dir="2700000" algn="ctr" rotWithShape="0">
                     <a:schemeClr val="bg2"/>
@@ -6252,12 +6252,12 @@
           <a:effectLst/>
           <a:extLst>
             <a:ext uri="{909E8E84-426E-40dd-AFC4-6F175D3DCCD1}">
-              <a14:hiddenFill xmlns:a14="http://schemas.microsoft.com/office/drawing/2010/main" xmlns="">
+              <a14:hiddenFill xmlns="" xmlns:a14="http://schemas.microsoft.com/office/drawing/2010/main">
                 <a:noFill/>
               </a14:hiddenFill>
             </a:ext>
             <a:ext uri="{AF507438-7753-43e0-B8FC-AC1667EBCBE1}">
-              <a14:hiddenEffects xmlns:a14="http://schemas.microsoft.com/office/drawing/2010/main" xmlns="">
+              <a14:hiddenEffects xmlns="" xmlns:a14="http://schemas.microsoft.com/office/drawing/2010/main">
                 <a:effectLst>
                   <a:outerShdw dist="35921" dir="2700000" algn="ctr" rotWithShape="0">
                     <a:schemeClr val="bg2"/>
@@ -6310,12 +6310,12 @@
           <a:effectLst/>
           <a:extLst>
             <a:ext uri="{909E8E84-426E-40dd-AFC4-6F175D3DCCD1}">
-              <a14:hiddenFill xmlns:a14="http://schemas.microsoft.com/office/drawing/2010/main" xmlns="">
+              <a14:hiddenFill xmlns="" xmlns:a14="http://schemas.microsoft.com/office/drawing/2010/main">
                 <a:noFill/>
               </a14:hiddenFill>
             </a:ext>
             <a:ext uri="{AF507438-7753-43e0-B8FC-AC1667EBCBE1}">
-              <a14:hiddenEffects xmlns:a14="http://schemas.microsoft.com/office/drawing/2010/main" xmlns="">
+              <a14:hiddenEffects xmlns="" xmlns:a14="http://schemas.microsoft.com/office/drawing/2010/main">
                 <a:effectLst>
                   <a:outerShdw dist="35921" dir="2700000" algn="ctr" rotWithShape="0">
                     <a:schemeClr val="bg2"/>
@@ -6370,7 +6370,7 @@
           <a:effectLst/>
           <a:extLst>
             <a:ext uri="{AF507438-7753-43e0-B8FC-AC1667EBCBE1}">
-              <a14:hiddenEffects xmlns:a14="http://schemas.microsoft.com/office/drawing/2010/main" xmlns="">
+              <a14:hiddenEffects xmlns="" xmlns:a14="http://schemas.microsoft.com/office/drawing/2010/main">
                 <a:effectLst>
                   <a:outerShdw dist="35921" dir="2700000" algn="ctr" rotWithShape="0">
                     <a:schemeClr val="bg2"/>
@@ -6542,7 +6542,7 @@
           <a:effectLst/>
           <a:extLst>
             <a:ext uri="{AF507438-7753-43e0-B8FC-AC1667EBCBE1}">
-              <a14:hiddenEffects xmlns:a14="http://schemas.microsoft.com/office/drawing/2010/main" xmlns="">
+              <a14:hiddenEffects xmlns="" xmlns:a14="http://schemas.microsoft.com/office/drawing/2010/main">
                 <a:effectLst>
                   <a:outerShdw dist="35921" dir="2700000" algn="ctr" rotWithShape="0">
                     <a:schemeClr val="bg2"/>
@@ -6698,12 +6698,12 @@
           <a:effectLst/>
           <a:extLst>
             <a:ext uri="{909E8E84-426E-40dd-AFC4-6F175D3DCCD1}">
-              <a14:hiddenFill xmlns:a14="http://schemas.microsoft.com/office/drawing/2010/main" xmlns="">
+              <a14:hiddenFill xmlns="" xmlns:a14="http://schemas.microsoft.com/office/drawing/2010/main">
                 <a:noFill/>
               </a14:hiddenFill>
             </a:ext>
             <a:ext uri="{91240B29-F687-4f45-9708-019B960494DF}">
-              <a14:hiddenLine xmlns:a14="http://schemas.microsoft.com/office/drawing/2010/main" xmlns="" w="38100">
+              <a14:hiddenLine xmlns="" xmlns:a14="http://schemas.microsoft.com/office/drawing/2010/main" w="38100">
                 <a:solidFill>
                   <a:srgbClr val="000000"/>
                 </a:solidFill>
@@ -6713,7 +6713,7 @@
               </a14:hiddenLine>
             </a:ext>
             <a:ext uri="{AF507438-7753-43e0-B8FC-AC1667EBCBE1}">
-              <a14:hiddenEffects xmlns:a14="http://schemas.microsoft.com/office/drawing/2010/main" xmlns="">
+              <a14:hiddenEffects xmlns="" xmlns:a14="http://schemas.microsoft.com/office/drawing/2010/main">
                 <a:effectLst>
                   <a:outerShdw dist="35921" dir="2700000" algn="ctr" rotWithShape="0">
                     <a:schemeClr val="bg2"/>
@@ -8677,7 +8677,7 @@
           <a:graphicData uri="http://schemas.openxmlformats.org/presentationml/2006/ole">
             <mc:AlternateContent xmlns:mc="http://schemas.openxmlformats.org/markup-compatibility/2006">
               <mc:Choice xmlns:v="urn:schemas-microsoft-com:vml" Requires="v">
-                <p:oleObj spid="_x0000_s1547" name="Equation" r:id="rId4" imgW="165100" imgH="241300" progId="Equation.3">
+                <p:oleObj spid="_x0000_s1577" name="Equation" r:id="rId4" imgW="165100" imgH="241300" progId="Equation.3">
                   <p:embed/>
                 </p:oleObj>
               </mc:Choice>
@@ -8844,7 +8844,7 @@
           <a:graphicData uri="http://schemas.openxmlformats.org/presentationml/2006/ole">
             <mc:AlternateContent xmlns:mc="http://schemas.openxmlformats.org/markup-compatibility/2006">
               <mc:Choice xmlns:v="urn:schemas-microsoft-com:vml" Requires="v">
-                <p:oleObj spid="_x0000_s1548" name="Equation" r:id="rId6" imgW="1282700" imgH="254000" progId="Equation.3">
+                <p:oleObj spid="_x0000_s1578" name="Equation" r:id="rId6" imgW="1282700" imgH="254000" progId="Equation.3">
                   <p:embed/>
                 </p:oleObj>
               </mc:Choice>
@@ -9138,7 +9138,7 @@
           <a:graphicData uri="http://schemas.openxmlformats.org/presentationml/2006/ole">
             <mc:AlternateContent xmlns:mc="http://schemas.openxmlformats.org/markup-compatibility/2006">
               <mc:Choice xmlns:v="urn:schemas-microsoft-com:vml" Requires="v">
-                <p:oleObj spid="_x0000_s1549" name="Equation" r:id="rId8" imgW="190500" imgH="254000" progId="Equation.3">
+                <p:oleObj spid="_x0000_s1579" name="Equation" r:id="rId8" imgW="190500" imgH="254000" progId="Equation.3">
                   <p:embed/>
                 </p:oleObj>
               </mc:Choice>
@@ -9206,7 +9206,7 @@
           <a:graphicData uri="http://schemas.openxmlformats.org/presentationml/2006/ole">
             <mc:AlternateContent xmlns:mc="http://schemas.openxmlformats.org/markup-compatibility/2006">
               <mc:Choice xmlns:v="urn:schemas-microsoft-com:vml" Requires="v">
-                <p:oleObj spid="_x0000_s1550" name="Equation" r:id="rId10" imgW="190500" imgH="254000" progId="Equation.3">
+                <p:oleObj spid="_x0000_s1580" name="Equation" r:id="rId10" imgW="190500" imgH="254000" progId="Equation.3">
                   <p:embed/>
                 </p:oleObj>
               </mc:Choice>
@@ -9480,7 +9480,7 @@
           <a:graphicData uri="http://schemas.openxmlformats.org/presentationml/2006/ole">
             <mc:AlternateContent xmlns:mc="http://schemas.openxmlformats.org/markup-compatibility/2006">
               <mc:Choice xmlns:v="urn:schemas-microsoft-com:vml" Requires="v">
-                <p:oleObj spid="_x0000_s1551" name="Equation" r:id="rId11" imgW="685800" imgH="241300" progId="Equation.3">
+                <p:oleObj spid="_x0000_s1581" name="Equation" r:id="rId11" imgW="685800" imgH="241300" progId="Equation.3">
                   <p:embed/>
                 </p:oleObj>
               </mc:Choice>
@@ -9546,7 +9546,7 @@
           <a:graphicData uri="http://schemas.openxmlformats.org/presentationml/2006/ole">
             <mc:AlternateContent xmlns:mc="http://schemas.openxmlformats.org/markup-compatibility/2006">
               <mc:Choice xmlns:v="urn:schemas-microsoft-com:vml" Requires="v">
-                <p:oleObj spid="_x0000_s1552" name="Equation" r:id="rId13" imgW="698500" imgH="254000" progId="Equation.3">
+                <p:oleObj spid="_x0000_s1582" name="Equation" r:id="rId13" imgW="698500" imgH="254000" progId="Equation.3">
                   <p:embed/>
                 </p:oleObj>
               </mc:Choice>
@@ -10846,7 +10846,7 @@
           <a:graphicData uri="http://schemas.openxmlformats.org/presentationml/2006/ole">
             <mc:AlternateContent xmlns:mc="http://schemas.openxmlformats.org/markup-compatibility/2006">
               <mc:Choice xmlns:v="urn:schemas-microsoft-com:vml" Requires="v">
-                <p:oleObj spid="_x0000_s1553" name="Equation" r:id="rId15" imgW="165100" imgH="241300" progId="Equation.3">
+                <p:oleObj spid="_x0000_s1583" name="Equation" r:id="rId15" imgW="165100" imgH="241300" progId="Equation.3">
                   <p:embed/>
                 </p:oleObj>
               </mc:Choice>
@@ -11103,7 +11103,7 @@
           <a:graphicData uri="http://schemas.openxmlformats.org/presentationml/2006/ole">
             <mc:AlternateContent xmlns:mc="http://schemas.openxmlformats.org/markup-compatibility/2006">
               <mc:Choice xmlns:v="urn:schemas-microsoft-com:vml" Requires="v">
-                <p:oleObj spid="_x0000_s1554" name="Equation" r:id="rId16" imgW="190500" imgH="254000" progId="Equation.3">
+                <p:oleObj spid="_x0000_s1584" name="Equation" r:id="rId16" imgW="190500" imgH="254000" progId="Equation.3">
                   <p:embed/>
                 </p:oleObj>
               </mc:Choice>
@@ -11171,7 +11171,7 @@
           <a:graphicData uri="http://schemas.openxmlformats.org/presentationml/2006/ole">
             <mc:AlternateContent xmlns:mc="http://schemas.openxmlformats.org/markup-compatibility/2006">
               <mc:Choice xmlns:v="urn:schemas-microsoft-com:vml" Requires="v">
-                <p:oleObj spid="_x0000_s1555" name="Equation" r:id="rId17" imgW="190500" imgH="254000" progId="Equation.3">
+                <p:oleObj spid="_x0000_s1585" name="Equation" r:id="rId17" imgW="190500" imgH="254000" progId="Equation.3">
                   <p:embed/>
                 </p:oleObj>
               </mc:Choice>
@@ -12446,7 +12446,7 @@
           <a:graphicData uri="http://schemas.openxmlformats.org/presentationml/2006/ole">
             <mc:AlternateContent xmlns:mc="http://schemas.openxmlformats.org/markup-compatibility/2006">
               <mc:Choice xmlns:v="urn:schemas-microsoft-com:vml" Requires="v">
-                <p:oleObj spid="_x0000_s1556" name="Equation" r:id="rId18" imgW="190500" imgH="241300" progId="Equation.3">
+                <p:oleObj spid="_x0000_s1586" name="Equation" r:id="rId18" imgW="190500" imgH="241300" progId="Equation.3">
                   <p:embed/>
                 </p:oleObj>
               </mc:Choice>
@@ -12703,7 +12703,7 @@
           <a:graphicData uri="http://schemas.openxmlformats.org/presentationml/2006/ole">
             <mc:AlternateContent xmlns:mc="http://schemas.openxmlformats.org/markup-compatibility/2006">
               <mc:Choice xmlns:v="urn:schemas-microsoft-com:vml" Requires="v">
-                <p:oleObj spid="_x0000_s1557" name="Equation" r:id="rId20" imgW="190500" imgH="254000" progId="Equation.3">
+                <p:oleObj spid="_x0000_s1587" name="Equation" r:id="rId20" imgW="190500" imgH="254000" progId="Equation.3">
                   <p:embed/>
                 </p:oleObj>
               </mc:Choice>
@@ -12771,7 +12771,7 @@
           <a:graphicData uri="http://schemas.openxmlformats.org/presentationml/2006/ole">
             <mc:AlternateContent xmlns:mc="http://schemas.openxmlformats.org/markup-compatibility/2006">
               <mc:Choice xmlns:v="urn:schemas-microsoft-com:vml" Requires="v">
-                <p:oleObj spid="_x0000_s1558" name="Equation" r:id="rId22" imgW="190500" imgH="254000" progId="Equation.3">
+                <p:oleObj spid="_x0000_s1588" name="Equation" r:id="rId22" imgW="190500" imgH="254000" progId="Equation.3">
                   <p:embed/>
                 </p:oleObj>
               </mc:Choice>
@@ -14139,7 +14139,7 @@
           <a:graphicData uri="http://schemas.openxmlformats.org/presentationml/2006/ole">
             <mc:AlternateContent xmlns:mc="http://schemas.openxmlformats.org/markup-compatibility/2006">
               <mc:Choice xmlns:v="urn:schemas-microsoft-com:vml" Requires="v">
-                <p:oleObj spid="_x0000_s1559" name="Equation" r:id="rId24" imgW="190500" imgH="241300" progId="Equation.3">
+                <p:oleObj spid="_x0000_s1589" name="Equation" r:id="rId24" imgW="190500" imgH="241300" progId="Equation.3">
                   <p:embed/>
                 </p:oleObj>
               </mc:Choice>
@@ -14396,7 +14396,7 @@
           <a:graphicData uri="http://schemas.openxmlformats.org/presentationml/2006/ole">
             <mc:AlternateContent xmlns:mc="http://schemas.openxmlformats.org/markup-compatibility/2006">
               <mc:Choice xmlns:v="urn:schemas-microsoft-com:vml" Requires="v">
-                <p:oleObj spid="_x0000_s1560" name="Equation" r:id="rId26" imgW="190500" imgH="254000" progId="Equation.3">
+                <p:oleObj spid="_x0000_s1590" name="Equation" r:id="rId26" imgW="190500" imgH="254000" progId="Equation.3">
                   <p:embed/>
                 </p:oleObj>
               </mc:Choice>
@@ -14464,7 +14464,7 @@
           <a:graphicData uri="http://schemas.openxmlformats.org/presentationml/2006/ole">
             <mc:AlternateContent xmlns:mc="http://schemas.openxmlformats.org/markup-compatibility/2006">
               <mc:Choice xmlns:v="urn:schemas-microsoft-com:vml" Requires="v">
-                <p:oleObj spid="_x0000_s1561" name="Equation" r:id="rId28" imgW="190500" imgH="254000" progId="Equation.3">
+                <p:oleObj spid="_x0000_s1591" name="Equation" r:id="rId28" imgW="190500" imgH="254000" progId="Equation.3">
                   <p:embed/>
                 </p:oleObj>
               </mc:Choice>
@@ -16194,7 +16194,7 @@
           <a:graphicData uri="http://schemas.openxmlformats.org/presentationml/2006/ole">
             <mc:AlternateContent xmlns:mc="http://schemas.openxmlformats.org/markup-compatibility/2006">
               <mc:Choice xmlns:v="urn:schemas-microsoft-com:vml" Requires="v">
-                <p:oleObj spid="_x0000_s2087" name="Equation" r:id="rId4" imgW="190440" imgH="228600" progId="Equation.3">
+                <p:oleObj spid="_x0000_s2109" name="Equation" r:id="rId4" imgW="190440" imgH="228600" progId="Equation.3">
                   <p:embed/>
                 </p:oleObj>
               </mc:Choice>
@@ -16648,7 +16648,7 @@
           <p:nvPr>
             <p:extLst>
               <p:ext uri="{D42A27DB-BD31-4B8C-83A1-F6EECF244321}">
-                <p14:modId xmlns:p14="http://schemas.microsoft.com/office/powerpoint/2010/main" val="3930177916"/>
+                <p14:modId xmlns:p14="http://schemas.microsoft.com/office/powerpoint/2010/main" val="2414730595"/>
               </p:ext>
             </p:extLst>
           </p:nvPr>
@@ -16661,7 +16661,7 @@
           <a:graphicData uri="http://schemas.openxmlformats.org/presentationml/2006/ole">
             <mc:AlternateContent xmlns:mc="http://schemas.openxmlformats.org/markup-compatibility/2006">
               <mc:Choice xmlns:v="urn:schemas-microsoft-com:vml" Requires="v">
-                <p:oleObj spid="_x0000_s2088" name="Equation" r:id="rId6" imgW="660240" imgH="215640" progId="Equation.3">
+                <p:oleObj spid="_x0000_s2110" name="Equation" r:id="rId6" imgW="660240" imgH="215640" progId="Equation.3">
                   <p:embed/>
                 </p:oleObj>
               </mc:Choice>
@@ -16724,7 +16724,7 @@
           <a:graphicData uri="http://schemas.openxmlformats.org/presentationml/2006/ole">
             <mc:AlternateContent xmlns:mc="http://schemas.openxmlformats.org/markup-compatibility/2006">
               <mc:Choice xmlns:v="urn:schemas-microsoft-com:vml" Requires="v">
-                <p:oleObj spid="_x0000_s2089" name="Equation" r:id="rId8" imgW="698500" imgH="254000" progId="Equation.3">
+                <p:oleObj spid="_x0000_s2111" name="Equation" r:id="rId8" imgW="698500" imgH="254000" progId="Equation.3">
                   <p:embed/>
                 </p:oleObj>
               </mc:Choice>
@@ -18867,7 +18867,7 @@
           <a:graphicData uri="http://schemas.openxmlformats.org/presentationml/2006/ole">
             <mc:AlternateContent xmlns:mc="http://schemas.openxmlformats.org/markup-compatibility/2006">
               <mc:Choice xmlns:v="urn:schemas-microsoft-com:vml" Requires="v">
-                <p:oleObj spid="_x0000_s2090" name="Equation" r:id="rId10" imgW="190440" imgH="228600" progId="Equation.3">
+                <p:oleObj spid="_x0000_s2112" name="Equation" r:id="rId10" imgW="190440" imgH="228600" progId="Equation.3">
                   <p:embed/>
                 </p:oleObj>
               </mc:Choice>
@@ -20418,7 +20418,7 @@
           <a:graphicData uri="http://schemas.openxmlformats.org/presentationml/2006/ole">
             <mc:AlternateContent xmlns:mc="http://schemas.openxmlformats.org/markup-compatibility/2006">
               <mc:Choice xmlns:v="urn:schemas-microsoft-com:vml" Requires="v">
-                <p:oleObj spid="_x0000_s2091" name="Equation" r:id="rId13" imgW="203040" imgH="228600" progId="Equation.3">
+                <p:oleObj spid="_x0000_s2113" name="Equation" r:id="rId13" imgW="203040" imgH="228600" progId="Equation.3">
                   <p:embed/>
                 </p:oleObj>
               </mc:Choice>
@@ -20492,7 +20492,7 @@
           <a:graphicData uri="http://schemas.openxmlformats.org/presentationml/2006/ole">
             <mc:AlternateContent xmlns:mc="http://schemas.openxmlformats.org/markup-compatibility/2006">
               <mc:Choice xmlns:v="urn:schemas-microsoft-com:vml" Requires="v">
-                <p:oleObj spid="_x0000_s2092" name="Equation" r:id="rId15" imgW="203040" imgH="228600" progId="Equation.3">
+                <p:oleObj spid="_x0000_s2114" name="Equation" r:id="rId15" imgW="203040" imgH="228600" progId="Equation.3">
                   <p:embed/>
                 </p:oleObj>
               </mc:Choice>
@@ -20572,7 +20572,7 @@
           <a:graphicData uri="http://schemas.openxmlformats.org/presentationml/2006/ole">
             <mc:AlternateContent xmlns:mc="http://schemas.openxmlformats.org/markup-compatibility/2006">
               <mc:Choice xmlns:v="urn:schemas-microsoft-com:vml" Requires="v">
-                <p:oleObj spid="_x0000_s2093" name="Equation" r:id="rId16" imgW="203040" imgH="228600" progId="Equation.3">
+                <p:oleObj spid="_x0000_s2115" name="Equation" r:id="rId16" imgW="203040" imgH="228600" progId="Equation.3">
                   <p:embed/>
                 </p:oleObj>
               </mc:Choice>
@@ -20652,7 +20652,7 @@
           <a:graphicData uri="http://schemas.openxmlformats.org/presentationml/2006/ole">
             <mc:AlternateContent xmlns:mc="http://schemas.openxmlformats.org/markup-compatibility/2006">
               <mc:Choice xmlns:v="urn:schemas-microsoft-com:vml" Requires="v">
-                <p:oleObj spid="_x0000_s2094" name="Equation" r:id="rId17" imgW="203040" imgH="228600" progId="Equation.3">
+                <p:oleObj spid="_x0000_s2116" name="Equation" r:id="rId17" imgW="203040" imgH="228600" progId="Equation.3">
                   <p:embed/>
                 </p:oleObj>
               </mc:Choice>
@@ -20732,7 +20732,7 @@
           <a:graphicData uri="http://schemas.openxmlformats.org/presentationml/2006/ole">
             <mc:AlternateContent xmlns:mc="http://schemas.openxmlformats.org/markup-compatibility/2006">
               <mc:Choice xmlns:v="urn:schemas-microsoft-com:vml" Requires="v">
-                <p:oleObj spid="_x0000_s2095" name="Equation" r:id="rId19" imgW="203040" imgH="228600" progId="Equation.3">
+                <p:oleObj spid="_x0000_s2117" name="Equation" r:id="rId19" imgW="203040" imgH="228600" progId="Equation.3">
                   <p:embed/>
                 </p:oleObj>
               </mc:Choice>
@@ -20812,7 +20812,7 @@
           <a:graphicData uri="http://schemas.openxmlformats.org/presentationml/2006/ole">
             <mc:AlternateContent xmlns:mc="http://schemas.openxmlformats.org/markup-compatibility/2006">
               <mc:Choice xmlns:v="urn:schemas-microsoft-com:vml" Requires="v">
-                <p:oleObj spid="_x0000_s2096" name="Equation" r:id="rId21" imgW="203040" imgH="228600" progId="Equation.3">
+                <p:oleObj spid="_x0000_s2118" name="Equation" r:id="rId21" imgW="203040" imgH="228600" progId="Equation.3">
                   <p:embed/>
                 </p:oleObj>
               </mc:Choice>
@@ -21160,7 +21160,7 @@
           <p:nvPr>
             <p:extLst>
               <p:ext uri="{D42A27DB-BD31-4B8C-83A1-F6EECF244321}">
-                <p14:modId xmlns:p14="http://schemas.microsoft.com/office/powerpoint/2010/main" val="2599400901"/>
+                <p14:modId xmlns:p14="http://schemas.microsoft.com/office/powerpoint/2010/main" val="2925998265"/>
               </p:ext>
             </p:extLst>
           </p:nvPr>
@@ -21173,7 +21173,7 @@
           <a:graphicData uri="http://schemas.openxmlformats.org/presentationml/2006/ole">
             <mc:AlternateContent xmlns:mc="http://schemas.openxmlformats.org/markup-compatibility/2006">
               <mc:Choice xmlns:v="urn:schemas-microsoft-com:vml" Requires="v">
-                <p:oleObj spid="_x0000_s2097" name="Equation" r:id="rId23" imgW="1384200" imgH="241200" progId="Equation.3">
+                <p:oleObj spid="_x0000_s2119" name="Equation" r:id="rId23" imgW="1384200" imgH="241200" progId="Equation.3">
                   <p:embed/>
                 </p:oleObj>
               </mc:Choice>
@@ -21212,6 +21212,1333 @@
           </a:graphicData>
         </a:graphic>
       </p:graphicFrame>
+      <p:sp>
+        <p:nvSpPr>
+          <p:cNvPr id="2" name="Rectangle 1">
+            <a:extLst>
+              <a:ext uri="{FF2B5EF4-FFF2-40B4-BE49-F238E27FC236}">
+                <a16:creationId xmlns:a16="http://schemas.microsoft.com/office/drawing/2014/main" id="{F8C42682-6360-4603-9F10-62CDFE559014}"/>
+              </a:ext>
+            </a:extLst>
+          </p:cNvPr>
+          <p:cNvSpPr/>
+          <p:nvPr/>
+        </p:nvSpPr>
+        <p:spPr>
+          <a:xfrm>
+            <a:off x="6659418" y="3762229"/>
+            <a:ext cx="104503" cy="67016"/>
+          </a:xfrm>
+          <a:prstGeom prst="rect">
+            <a:avLst/>
+          </a:prstGeom>
+          <a:ln>
+            <a:solidFill>
+              <a:schemeClr val="bg1"/>
+            </a:solidFill>
+          </a:ln>
+        </p:spPr>
+        <p:style>
+          <a:lnRef idx="2">
+            <a:schemeClr val="dk1"/>
+          </a:lnRef>
+          <a:fillRef idx="1">
+            <a:schemeClr val="lt1"/>
+          </a:fillRef>
+          <a:effectRef idx="0">
+            <a:schemeClr val="dk1"/>
+          </a:effectRef>
+          <a:fontRef idx="minor">
+            <a:schemeClr val="dk1"/>
+          </a:fontRef>
+        </p:style>
+        <p:txBody>
+          <a:bodyPr rtlCol="0" anchor="ctr"/>
+          <a:lstStyle/>
+          <a:p>
+            <a:pPr algn="ctr"/>
+            <a:endParaRPr lang="en-US"/>
+          </a:p>
+        </p:txBody>
+      </p:sp>
+      <p:sp>
+        <p:nvSpPr>
+          <p:cNvPr id="142" name="Rectangle 141">
+            <a:extLst>
+              <a:ext uri="{FF2B5EF4-FFF2-40B4-BE49-F238E27FC236}">
+                <a16:creationId xmlns:a16="http://schemas.microsoft.com/office/drawing/2014/main" id="{E0E1B636-2557-4F23-93A1-54296DA6030A}"/>
+              </a:ext>
+            </a:extLst>
+          </p:cNvPr>
+          <p:cNvSpPr/>
+          <p:nvPr/>
+        </p:nvSpPr>
+        <p:spPr>
+          <a:xfrm>
+            <a:off x="7282075" y="3766584"/>
+            <a:ext cx="104503" cy="67016"/>
+          </a:xfrm>
+          <a:prstGeom prst="rect">
+            <a:avLst/>
+          </a:prstGeom>
+          <a:ln>
+            <a:solidFill>
+              <a:schemeClr val="bg1"/>
+            </a:solidFill>
+          </a:ln>
+        </p:spPr>
+        <p:style>
+          <a:lnRef idx="2">
+            <a:schemeClr val="dk1"/>
+          </a:lnRef>
+          <a:fillRef idx="1">
+            <a:schemeClr val="lt1"/>
+          </a:fillRef>
+          <a:effectRef idx="0">
+            <a:schemeClr val="dk1"/>
+          </a:effectRef>
+          <a:fontRef idx="minor">
+            <a:schemeClr val="dk1"/>
+          </a:fontRef>
+        </p:style>
+        <p:txBody>
+          <a:bodyPr rtlCol="0" anchor="ctr"/>
+          <a:lstStyle/>
+          <a:p>
+            <a:pPr algn="ctr"/>
+            <a:endParaRPr lang="en-US"/>
+          </a:p>
+        </p:txBody>
+      </p:sp>
+      <p:sp>
+        <p:nvSpPr>
+          <p:cNvPr id="143" name="Rectangle 142">
+            <a:extLst>
+              <a:ext uri="{FF2B5EF4-FFF2-40B4-BE49-F238E27FC236}">
+                <a16:creationId xmlns:a16="http://schemas.microsoft.com/office/drawing/2014/main" id="{E26B205B-EBDA-4BDF-B345-290E9B07EF85}"/>
+              </a:ext>
+            </a:extLst>
+          </p:cNvPr>
+          <p:cNvSpPr/>
+          <p:nvPr/>
+        </p:nvSpPr>
+        <p:spPr>
+          <a:xfrm>
+            <a:off x="8063031" y="3761718"/>
+            <a:ext cx="104503" cy="67016"/>
+          </a:xfrm>
+          <a:prstGeom prst="rect">
+            <a:avLst/>
+          </a:prstGeom>
+          <a:ln>
+            <a:solidFill>
+              <a:schemeClr val="bg1"/>
+            </a:solidFill>
+          </a:ln>
+        </p:spPr>
+        <p:style>
+          <a:lnRef idx="2">
+            <a:schemeClr val="dk1"/>
+          </a:lnRef>
+          <a:fillRef idx="1">
+            <a:schemeClr val="lt1"/>
+          </a:fillRef>
+          <a:effectRef idx="0">
+            <a:schemeClr val="dk1"/>
+          </a:effectRef>
+          <a:fontRef idx="minor">
+            <a:schemeClr val="dk1"/>
+          </a:fontRef>
+        </p:style>
+        <p:txBody>
+          <a:bodyPr rtlCol="0" anchor="ctr"/>
+          <a:lstStyle/>
+          <a:p>
+            <a:pPr algn="ctr"/>
+            <a:endParaRPr lang="en-US"/>
+          </a:p>
+        </p:txBody>
+      </p:sp>
+      <p:sp>
+        <p:nvSpPr>
+          <p:cNvPr id="144" name="Rectangle 143">
+            <a:extLst>
+              <a:ext uri="{FF2B5EF4-FFF2-40B4-BE49-F238E27FC236}">
+                <a16:creationId xmlns:a16="http://schemas.microsoft.com/office/drawing/2014/main" id="{C7A3A45B-394D-470A-BD52-B8616C049DA2}"/>
+              </a:ext>
+            </a:extLst>
+          </p:cNvPr>
+          <p:cNvSpPr/>
+          <p:nvPr/>
+        </p:nvSpPr>
+        <p:spPr>
+          <a:xfrm>
+            <a:off x="8666743" y="3775287"/>
+            <a:ext cx="104503" cy="67016"/>
+          </a:xfrm>
+          <a:prstGeom prst="rect">
+            <a:avLst/>
+          </a:prstGeom>
+          <a:ln>
+            <a:solidFill>
+              <a:schemeClr val="bg1"/>
+            </a:solidFill>
+          </a:ln>
+        </p:spPr>
+        <p:style>
+          <a:lnRef idx="2">
+            <a:schemeClr val="dk1"/>
+          </a:lnRef>
+          <a:fillRef idx="1">
+            <a:schemeClr val="lt1"/>
+          </a:fillRef>
+          <a:effectRef idx="0">
+            <a:schemeClr val="dk1"/>
+          </a:effectRef>
+          <a:fontRef idx="minor">
+            <a:schemeClr val="dk1"/>
+          </a:fontRef>
+        </p:style>
+        <p:txBody>
+          <a:bodyPr rtlCol="0" anchor="ctr"/>
+          <a:lstStyle/>
+          <a:p>
+            <a:pPr algn="ctr"/>
+            <a:endParaRPr lang="en-US"/>
+          </a:p>
+        </p:txBody>
+      </p:sp>
+      <p:sp>
+        <p:nvSpPr>
+          <p:cNvPr id="146" name="Rectangle 145">
+            <a:extLst>
+              <a:ext uri="{FF2B5EF4-FFF2-40B4-BE49-F238E27FC236}">
+                <a16:creationId xmlns:a16="http://schemas.microsoft.com/office/drawing/2014/main" id="{28A31DB7-3D36-4199-B944-9E59C4142DDD}"/>
+              </a:ext>
+            </a:extLst>
+          </p:cNvPr>
+          <p:cNvSpPr/>
+          <p:nvPr/>
+        </p:nvSpPr>
+        <p:spPr>
+          <a:xfrm>
+            <a:off x="6734458" y="3377522"/>
+            <a:ext cx="104503" cy="56342"/>
+          </a:xfrm>
+          <a:prstGeom prst="rect">
+            <a:avLst/>
+          </a:prstGeom>
+          <a:ln>
+            <a:solidFill>
+              <a:schemeClr val="bg1"/>
+            </a:solidFill>
+          </a:ln>
+        </p:spPr>
+        <p:style>
+          <a:lnRef idx="2">
+            <a:schemeClr val="dk1"/>
+          </a:lnRef>
+          <a:fillRef idx="1">
+            <a:schemeClr val="lt1"/>
+          </a:fillRef>
+          <a:effectRef idx="0">
+            <a:schemeClr val="dk1"/>
+          </a:effectRef>
+          <a:fontRef idx="minor">
+            <a:schemeClr val="dk1"/>
+          </a:fontRef>
+        </p:style>
+        <p:txBody>
+          <a:bodyPr rtlCol="0" anchor="ctr"/>
+          <a:lstStyle/>
+          <a:p>
+            <a:pPr algn="ctr"/>
+            <a:endParaRPr lang="en-US"/>
+          </a:p>
+        </p:txBody>
+      </p:sp>
+      <p:sp>
+        <p:nvSpPr>
+          <p:cNvPr id="148" name="Rectangle 147">
+            <a:extLst>
+              <a:ext uri="{FF2B5EF4-FFF2-40B4-BE49-F238E27FC236}">
+                <a16:creationId xmlns:a16="http://schemas.microsoft.com/office/drawing/2014/main" id="{2A1C0997-DE70-48BC-945F-8E00B79B8256}"/>
+              </a:ext>
+            </a:extLst>
+          </p:cNvPr>
+          <p:cNvSpPr/>
+          <p:nvPr/>
+        </p:nvSpPr>
+        <p:spPr>
+          <a:xfrm>
+            <a:off x="7346703" y="3366848"/>
+            <a:ext cx="104503" cy="67016"/>
+          </a:xfrm>
+          <a:prstGeom prst="rect">
+            <a:avLst/>
+          </a:prstGeom>
+          <a:ln>
+            <a:solidFill>
+              <a:schemeClr val="bg1"/>
+            </a:solidFill>
+          </a:ln>
+        </p:spPr>
+        <p:style>
+          <a:lnRef idx="2">
+            <a:schemeClr val="dk1"/>
+          </a:lnRef>
+          <a:fillRef idx="1">
+            <a:schemeClr val="lt1"/>
+          </a:fillRef>
+          <a:effectRef idx="0">
+            <a:schemeClr val="dk1"/>
+          </a:effectRef>
+          <a:fontRef idx="minor">
+            <a:schemeClr val="dk1"/>
+          </a:fontRef>
+        </p:style>
+        <p:txBody>
+          <a:bodyPr rtlCol="0" anchor="ctr"/>
+          <a:lstStyle/>
+          <a:p>
+            <a:pPr algn="ctr"/>
+            <a:endParaRPr lang="en-US"/>
+          </a:p>
+        </p:txBody>
+      </p:sp>
+      <p:sp>
+        <p:nvSpPr>
+          <p:cNvPr id="149" name="Rectangle 148">
+            <a:extLst>
+              <a:ext uri="{FF2B5EF4-FFF2-40B4-BE49-F238E27FC236}">
+                <a16:creationId xmlns:a16="http://schemas.microsoft.com/office/drawing/2014/main" id="{25B3525D-E1EE-4FC7-8280-8E1C2B6056CC}"/>
+              </a:ext>
+            </a:extLst>
+          </p:cNvPr>
+          <p:cNvSpPr/>
+          <p:nvPr/>
+        </p:nvSpPr>
+        <p:spPr>
+          <a:xfrm>
+            <a:off x="8144272" y="3389102"/>
+            <a:ext cx="104503" cy="67016"/>
+          </a:xfrm>
+          <a:prstGeom prst="rect">
+            <a:avLst/>
+          </a:prstGeom>
+          <a:ln>
+            <a:solidFill>
+              <a:schemeClr val="bg1"/>
+            </a:solidFill>
+          </a:ln>
+        </p:spPr>
+        <p:style>
+          <a:lnRef idx="2">
+            <a:schemeClr val="dk1"/>
+          </a:lnRef>
+          <a:fillRef idx="1">
+            <a:schemeClr val="lt1"/>
+          </a:fillRef>
+          <a:effectRef idx="0">
+            <a:schemeClr val="dk1"/>
+          </a:effectRef>
+          <a:fontRef idx="minor">
+            <a:schemeClr val="dk1"/>
+          </a:fontRef>
+        </p:style>
+        <p:txBody>
+          <a:bodyPr rtlCol="0" anchor="ctr"/>
+          <a:lstStyle/>
+          <a:p>
+            <a:pPr algn="ctr"/>
+            <a:endParaRPr lang="en-US"/>
+          </a:p>
+        </p:txBody>
+      </p:sp>
+      <p:sp>
+        <p:nvSpPr>
+          <p:cNvPr id="150" name="Rectangle 149">
+            <a:extLst>
+              <a:ext uri="{FF2B5EF4-FFF2-40B4-BE49-F238E27FC236}">
+                <a16:creationId xmlns:a16="http://schemas.microsoft.com/office/drawing/2014/main" id="{454DFC46-1515-4C9A-8C17-E1459B5AB442}"/>
+              </a:ext>
+            </a:extLst>
+          </p:cNvPr>
+          <p:cNvSpPr/>
+          <p:nvPr/>
+        </p:nvSpPr>
+        <p:spPr>
+          <a:xfrm>
+            <a:off x="8746228" y="3369638"/>
+            <a:ext cx="104503" cy="67016"/>
+          </a:xfrm>
+          <a:prstGeom prst="rect">
+            <a:avLst/>
+          </a:prstGeom>
+          <a:ln>
+            <a:solidFill>
+              <a:schemeClr val="bg1"/>
+            </a:solidFill>
+          </a:ln>
+        </p:spPr>
+        <p:style>
+          <a:lnRef idx="2">
+            <a:schemeClr val="dk1"/>
+          </a:lnRef>
+          <a:fillRef idx="1">
+            <a:schemeClr val="lt1"/>
+          </a:fillRef>
+          <a:effectRef idx="0">
+            <a:schemeClr val="dk1"/>
+          </a:effectRef>
+          <a:fontRef idx="minor">
+            <a:schemeClr val="dk1"/>
+          </a:fontRef>
+        </p:style>
+        <p:txBody>
+          <a:bodyPr rtlCol="0" anchor="ctr"/>
+          <a:lstStyle/>
+          <a:p>
+            <a:pPr algn="ctr"/>
+            <a:endParaRPr lang="en-US"/>
+          </a:p>
+        </p:txBody>
+      </p:sp>
+      <p:sp>
+        <p:nvSpPr>
+          <p:cNvPr id="151" name="Rectangle 150">
+            <a:extLst>
+              <a:ext uri="{FF2B5EF4-FFF2-40B4-BE49-F238E27FC236}">
+                <a16:creationId xmlns:a16="http://schemas.microsoft.com/office/drawing/2014/main" id="{E89B2715-E5EE-4100-B3F1-B1C714279957}"/>
+              </a:ext>
+            </a:extLst>
+          </p:cNvPr>
+          <p:cNvSpPr/>
+          <p:nvPr/>
+        </p:nvSpPr>
+        <p:spPr>
+          <a:xfrm>
+            <a:off x="6748543" y="3179832"/>
+            <a:ext cx="104503" cy="67016"/>
+          </a:xfrm>
+          <a:prstGeom prst="rect">
+            <a:avLst/>
+          </a:prstGeom>
+          <a:ln>
+            <a:solidFill>
+              <a:schemeClr val="bg1"/>
+            </a:solidFill>
+          </a:ln>
+        </p:spPr>
+        <p:style>
+          <a:lnRef idx="2">
+            <a:schemeClr val="dk1"/>
+          </a:lnRef>
+          <a:fillRef idx="1">
+            <a:schemeClr val="lt1"/>
+          </a:fillRef>
+          <a:effectRef idx="0">
+            <a:schemeClr val="dk1"/>
+          </a:effectRef>
+          <a:fontRef idx="minor">
+            <a:schemeClr val="dk1"/>
+          </a:fontRef>
+        </p:style>
+        <p:txBody>
+          <a:bodyPr rtlCol="0" anchor="ctr"/>
+          <a:lstStyle/>
+          <a:p>
+            <a:pPr algn="ctr"/>
+            <a:endParaRPr lang="en-US"/>
+          </a:p>
+        </p:txBody>
+      </p:sp>
+      <p:sp>
+        <p:nvSpPr>
+          <p:cNvPr id="152" name="Rectangle 151">
+            <a:extLst>
+              <a:ext uri="{FF2B5EF4-FFF2-40B4-BE49-F238E27FC236}">
+                <a16:creationId xmlns:a16="http://schemas.microsoft.com/office/drawing/2014/main" id="{D1E4ADEC-44B2-41E8-9828-07A8C1D21A0A}"/>
+              </a:ext>
+            </a:extLst>
+          </p:cNvPr>
+          <p:cNvSpPr/>
+          <p:nvPr/>
+        </p:nvSpPr>
+        <p:spPr>
+          <a:xfrm>
+            <a:off x="7352674" y="3170429"/>
+            <a:ext cx="90943" cy="76419"/>
+          </a:xfrm>
+          <a:prstGeom prst="rect">
+            <a:avLst/>
+          </a:prstGeom>
+          <a:ln>
+            <a:solidFill>
+              <a:schemeClr val="bg1"/>
+            </a:solidFill>
+          </a:ln>
+        </p:spPr>
+        <p:style>
+          <a:lnRef idx="2">
+            <a:schemeClr val="dk1"/>
+          </a:lnRef>
+          <a:fillRef idx="1">
+            <a:schemeClr val="lt1"/>
+          </a:fillRef>
+          <a:effectRef idx="0">
+            <a:schemeClr val="dk1"/>
+          </a:effectRef>
+          <a:fontRef idx="minor">
+            <a:schemeClr val="dk1"/>
+          </a:fontRef>
+        </p:style>
+        <p:txBody>
+          <a:bodyPr rtlCol="0" anchor="ctr"/>
+          <a:lstStyle/>
+          <a:p>
+            <a:pPr algn="ctr"/>
+            <a:endParaRPr lang="en-US"/>
+          </a:p>
+        </p:txBody>
+      </p:sp>
+      <p:sp>
+        <p:nvSpPr>
+          <p:cNvPr id="153" name="Rectangle 152">
+            <a:extLst>
+              <a:ext uri="{FF2B5EF4-FFF2-40B4-BE49-F238E27FC236}">
+                <a16:creationId xmlns:a16="http://schemas.microsoft.com/office/drawing/2014/main" id="{130D41B3-5734-48A0-96CE-113D4A443714}"/>
+              </a:ext>
+            </a:extLst>
+          </p:cNvPr>
+          <p:cNvSpPr/>
+          <p:nvPr/>
+        </p:nvSpPr>
+        <p:spPr>
+          <a:xfrm>
+            <a:off x="8144182" y="3177504"/>
+            <a:ext cx="104503" cy="67016"/>
+          </a:xfrm>
+          <a:prstGeom prst="rect">
+            <a:avLst/>
+          </a:prstGeom>
+          <a:ln>
+            <a:solidFill>
+              <a:schemeClr val="bg1"/>
+            </a:solidFill>
+          </a:ln>
+        </p:spPr>
+        <p:style>
+          <a:lnRef idx="2">
+            <a:schemeClr val="dk1"/>
+          </a:lnRef>
+          <a:fillRef idx="1">
+            <a:schemeClr val="lt1"/>
+          </a:fillRef>
+          <a:effectRef idx="0">
+            <a:schemeClr val="dk1"/>
+          </a:effectRef>
+          <a:fontRef idx="minor">
+            <a:schemeClr val="dk1"/>
+          </a:fontRef>
+        </p:style>
+        <p:txBody>
+          <a:bodyPr rtlCol="0" anchor="ctr"/>
+          <a:lstStyle/>
+          <a:p>
+            <a:pPr algn="ctr"/>
+            <a:endParaRPr lang="en-US"/>
+          </a:p>
+        </p:txBody>
+      </p:sp>
+      <p:sp>
+        <p:nvSpPr>
+          <p:cNvPr id="154" name="Rectangle 153">
+            <a:extLst>
+              <a:ext uri="{FF2B5EF4-FFF2-40B4-BE49-F238E27FC236}">
+                <a16:creationId xmlns:a16="http://schemas.microsoft.com/office/drawing/2014/main" id="{C2C1194B-CE3B-4EE7-B2C8-CE346FE3AF12}"/>
+              </a:ext>
+            </a:extLst>
+          </p:cNvPr>
+          <p:cNvSpPr/>
+          <p:nvPr/>
+        </p:nvSpPr>
+        <p:spPr>
+          <a:xfrm>
+            <a:off x="8746228" y="3168356"/>
+            <a:ext cx="104503" cy="67016"/>
+          </a:xfrm>
+          <a:prstGeom prst="rect">
+            <a:avLst/>
+          </a:prstGeom>
+          <a:ln>
+            <a:solidFill>
+              <a:schemeClr val="bg1"/>
+            </a:solidFill>
+          </a:ln>
+        </p:spPr>
+        <p:style>
+          <a:lnRef idx="2">
+            <a:schemeClr val="dk1"/>
+          </a:lnRef>
+          <a:fillRef idx="1">
+            <a:schemeClr val="lt1"/>
+          </a:fillRef>
+          <a:effectRef idx="0">
+            <a:schemeClr val="dk1"/>
+          </a:effectRef>
+          <a:fontRef idx="minor">
+            <a:schemeClr val="dk1"/>
+          </a:fontRef>
+        </p:style>
+        <p:txBody>
+          <a:bodyPr rtlCol="0" anchor="ctr"/>
+          <a:lstStyle/>
+          <a:p>
+            <a:pPr algn="ctr"/>
+            <a:endParaRPr lang="en-US"/>
+          </a:p>
+        </p:txBody>
+      </p:sp>
+      <p:sp>
+        <p:nvSpPr>
+          <p:cNvPr id="155" name="Rectangle 154">
+            <a:extLst>
+              <a:ext uri="{FF2B5EF4-FFF2-40B4-BE49-F238E27FC236}">
+                <a16:creationId xmlns:a16="http://schemas.microsoft.com/office/drawing/2014/main" id="{278C56D2-922D-463D-9EA0-02FD84E828BA}"/>
+              </a:ext>
+            </a:extLst>
+          </p:cNvPr>
+          <p:cNvSpPr/>
+          <p:nvPr/>
+        </p:nvSpPr>
+        <p:spPr>
+          <a:xfrm>
+            <a:off x="6734458" y="2788444"/>
+            <a:ext cx="104503" cy="67016"/>
+          </a:xfrm>
+          <a:prstGeom prst="rect">
+            <a:avLst/>
+          </a:prstGeom>
+          <a:ln>
+            <a:solidFill>
+              <a:schemeClr val="bg1"/>
+            </a:solidFill>
+          </a:ln>
+        </p:spPr>
+        <p:style>
+          <a:lnRef idx="2">
+            <a:schemeClr val="dk1"/>
+          </a:lnRef>
+          <a:fillRef idx="1">
+            <a:schemeClr val="lt1"/>
+          </a:fillRef>
+          <a:effectRef idx="0">
+            <a:schemeClr val="dk1"/>
+          </a:effectRef>
+          <a:fontRef idx="minor">
+            <a:schemeClr val="dk1"/>
+          </a:fontRef>
+        </p:style>
+        <p:txBody>
+          <a:bodyPr rtlCol="0" anchor="ctr"/>
+          <a:lstStyle/>
+          <a:p>
+            <a:pPr algn="ctr"/>
+            <a:endParaRPr lang="en-US"/>
+          </a:p>
+        </p:txBody>
+      </p:sp>
+      <p:sp>
+        <p:nvSpPr>
+          <p:cNvPr id="156" name="Rectangle 155">
+            <a:extLst>
+              <a:ext uri="{FF2B5EF4-FFF2-40B4-BE49-F238E27FC236}">
+                <a16:creationId xmlns:a16="http://schemas.microsoft.com/office/drawing/2014/main" id="{64A3F93A-5CCF-44F0-AEAC-C78383767FCA}"/>
+              </a:ext>
+            </a:extLst>
+          </p:cNvPr>
+          <p:cNvSpPr/>
+          <p:nvPr/>
+        </p:nvSpPr>
+        <p:spPr>
+          <a:xfrm>
+            <a:off x="6743589" y="2591193"/>
+            <a:ext cx="104503" cy="67016"/>
+          </a:xfrm>
+          <a:prstGeom prst="rect">
+            <a:avLst/>
+          </a:prstGeom>
+          <a:ln>
+            <a:solidFill>
+              <a:schemeClr val="bg1"/>
+            </a:solidFill>
+          </a:ln>
+        </p:spPr>
+        <p:style>
+          <a:lnRef idx="2">
+            <a:schemeClr val="dk1"/>
+          </a:lnRef>
+          <a:fillRef idx="1">
+            <a:schemeClr val="lt1"/>
+          </a:fillRef>
+          <a:effectRef idx="0">
+            <a:schemeClr val="dk1"/>
+          </a:effectRef>
+          <a:fontRef idx="minor">
+            <a:schemeClr val="dk1"/>
+          </a:fontRef>
+        </p:style>
+        <p:txBody>
+          <a:bodyPr rtlCol="0" anchor="ctr"/>
+          <a:lstStyle/>
+          <a:p>
+            <a:pPr algn="ctr"/>
+            <a:endParaRPr lang="en-US"/>
+          </a:p>
+        </p:txBody>
+      </p:sp>
+      <p:sp>
+        <p:nvSpPr>
+          <p:cNvPr id="157" name="Rectangle 156">
+            <a:extLst>
+              <a:ext uri="{FF2B5EF4-FFF2-40B4-BE49-F238E27FC236}">
+                <a16:creationId xmlns:a16="http://schemas.microsoft.com/office/drawing/2014/main" id="{C332F135-3324-4D11-A51E-3FC6D981CFE8}"/>
+              </a:ext>
+            </a:extLst>
+          </p:cNvPr>
+          <p:cNvSpPr/>
+          <p:nvPr/>
+        </p:nvSpPr>
+        <p:spPr>
+          <a:xfrm>
+            <a:off x="7352584" y="2783812"/>
+            <a:ext cx="104503" cy="67016"/>
+          </a:xfrm>
+          <a:prstGeom prst="rect">
+            <a:avLst/>
+          </a:prstGeom>
+          <a:ln>
+            <a:solidFill>
+              <a:schemeClr val="bg1"/>
+            </a:solidFill>
+          </a:ln>
+        </p:spPr>
+        <p:style>
+          <a:lnRef idx="2">
+            <a:schemeClr val="dk1"/>
+          </a:lnRef>
+          <a:fillRef idx="1">
+            <a:schemeClr val="lt1"/>
+          </a:fillRef>
+          <a:effectRef idx="0">
+            <a:schemeClr val="dk1"/>
+          </a:effectRef>
+          <a:fontRef idx="minor">
+            <a:schemeClr val="dk1"/>
+          </a:fontRef>
+        </p:style>
+        <p:txBody>
+          <a:bodyPr rtlCol="0" anchor="ctr"/>
+          <a:lstStyle/>
+          <a:p>
+            <a:pPr algn="ctr"/>
+            <a:endParaRPr lang="en-US"/>
+          </a:p>
+        </p:txBody>
+      </p:sp>
+      <p:sp>
+        <p:nvSpPr>
+          <p:cNvPr id="158" name="Rectangle 157">
+            <a:extLst>
+              <a:ext uri="{FF2B5EF4-FFF2-40B4-BE49-F238E27FC236}">
+                <a16:creationId xmlns:a16="http://schemas.microsoft.com/office/drawing/2014/main" id="{267D4554-B664-44A0-9A7F-3F3BD635018B}"/>
+              </a:ext>
+            </a:extLst>
+          </p:cNvPr>
+          <p:cNvSpPr/>
+          <p:nvPr/>
+        </p:nvSpPr>
+        <p:spPr>
+          <a:xfrm>
+            <a:off x="7346703" y="2596357"/>
+            <a:ext cx="104503" cy="67016"/>
+          </a:xfrm>
+          <a:prstGeom prst="rect">
+            <a:avLst/>
+          </a:prstGeom>
+          <a:ln>
+            <a:solidFill>
+              <a:schemeClr val="bg1"/>
+            </a:solidFill>
+          </a:ln>
+        </p:spPr>
+        <p:style>
+          <a:lnRef idx="2">
+            <a:schemeClr val="dk1"/>
+          </a:lnRef>
+          <a:fillRef idx="1">
+            <a:schemeClr val="lt1"/>
+          </a:fillRef>
+          <a:effectRef idx="0">
+            <a:schemeClr val="dk1"/>
+          </a:effectRef>
+          <a:fontRef idx="minor">
+            <a:schemeClr val="dk1"/>
+          </a:fontRef>
+        </p:style>
+        <p:txBody>
+          <a:bodyPr rtlCol="0" anchor="ctr"/>
+          <a:lstStyle/>
+          <a:p>
+            <a:pPr algn="ctr"/>
+            <a:endParaRPr lang="en-US"/>
+          </a:p>
+        </p:txBody>
+      </p:sp>
+      <p:sp>
+        <p:nvSpPr>
+          <p:cNvPr id="159" name="Rectangle 158">
+            <a:extLst>
+              <a:ext uri="{FF2B5EF4-FFF2-40B4-BE49-F238E27FC236}">
+                <a16:creationId xmlns:a16="http://schemas.microsoft.com/office/drawing/2014/main" id="{C128B391-DA0E-4947-A83E-D5ED9AC643DB}"/>
+              </a:ext>
+            </a:extLst>
+          </p:cNvPr>
+          <p:cNvSpPr/>
+          <p:nvPr/>
+        </p:nvSpPr>
+        <p:spPr>
+          <a:xfrm>
+            <a:off x="8144272" y="2601515"/>
+            <a:ext cx="104503" cy="67016"/>
+          </a:xfrm>
+          <a:prstGeom prst="rect">
+            <a:avLst/>
+          </a:prstGeom>
+          <a:ln>
+            <a:solidFill>
+              <a:schemeClr val="bg1"/>
+            </a:solidFill>
+          </a:ln>
+        </p:spPr>
+        <p:style>
+          <a:lnRef idx="2">
+            <a:schemeClr val="dk1"/>
+          </a:lnRef>
+          <a:fillRef idx="1">
+            <a:schemeClr val="lt1"/>
+          </a:fillRef>
+          <a:effectRef idx="0">
+            <a:schemeClr val="dk1"/>
+          </a:effectRef>
+          <a:fontRef idx="minor">
+            <a:schemeClr val="dk1"/>
+          </a:fontRef>
+        </p:style>
+        <p:txBody>
+          <a:bodyPr rtlCol="0" anchor="ctr"/>
+          <a:lstStyle/>
+          <a:p>
+            <a:pPr algn="ctr"/>
+            <a:endParaRPr lang="en-US"/>
+          </a:p>
+        </p:txBody>
+      </p:sp>
+      <p:sp>
+        <p:nvSpPr>
+          <p:cNvPr id="160" name="Rectangle 159">
+            <a:extLst>
+              <a:ext uri="{FF2B5EF4-FFF2-40B4-BE49-F238E27FC236}">
+                <a16:creationId xmlns:a16="http://schemas.microsoft.com/office/drawing/2014/main" id="{843A87A4-D497-404A-A9B9-2598210A9ABD}"/>
+              </a:ext>
+            </a:extLst>
+          </p:cNvPr>
+          <p:cNvSpPr/>
+          <p:nvPr/>
+        </p:nvSpPr>
+        <p:spPr>
+          <a:xfrm>
+            <a:off x="8751092" y="2783812"/>
+            <a:ext cx="104503" cy="67016"/>
+          </a:xfrm>
+          <a:prstGeom prst="rect">
+            <a:avLst/>
+          </a:prstGeom>
+          <a:ln>
+            <a:solidFill>
+              <a:schemeClr val="bg1"/>
+            </a:solidFill>
+          </a:ln>
+        </p:spPr>
+        <p:style>
+          <a:lnRef idx="2">
+            <a:schemeClr val="dk1"/>
+          </a:lnRef>
+          <a:fillRef idx="1">
+            <a:schemeClr val="lt1"/>
+          </a:fillRef>
+          <a:effectRef idx="0">
+            <a:schemeClr val="dk1"/>
+          </a:effectRef>
+          <a:fontRef idx="minor">
+            <a:schemeClr val="dk1"/>
+          </a:fontRef>
+        </p:style>
+        <p:txBody>
+          <a:bodyPr rtlCol="0" anchor="ctr"/>
+          <a:lstStyle/>
+          <a:p>
+            <a:pPr algn="ctr"/>
+            <a:endParaRPr lang="en-US"/>
+          </a:p>
+        </p:txBody>
+      </p:sp>
+      <p:sp>
+        <p:nvSpPr>
+          <p:cNvPr id="161" name="Rectangle 160">
+            <a:extLst>
+              <a:ext uri="{FF2B5EF4-FFF2-40B4-BE49-F238E27FC236}">
+                <a16:creationId xmlns:a16="http://schemas.microsoft.com/office/drawing/2014/main" id="{0EA69AFF-6F19-4DEC-A3F2-B5122701D58A}"/>
+              </a:ext>
+            </a:extLst>
+          </p:cNvPr>
+          <p:cNvSpPr/>
+          <p:nvPr/>
+        </p:nvSpPr>
+        <p:spPr>
+          <a:xfrm>
+            <a:off x="8751774" y="2596357"/>
+            <a:ext cx="104503" cy="67016"/>
+          </a:xfrm>
+          <a:prstGeom prst="rect">
+            <a:avLst/>
+          </a:prstGeom>
+          <a:ln>
+            <a:solidFill>
+              <a:schemeClr val="bg1"/>
+            </a:solidFill>
+          </a:ln>
+        </p:spPr>
+        <p:style>
+          <a:lnRef idx="2">
+            <a:schemeClr val="dk1"/>
+          </a:lnRef>
+          <a:fillRef idx="1">
+            <a:schemeClr val="lt1"/>
+          </a:fillRef>
+          <a:effectRef idx="0">
+            <a:schemeClr val="dk1"/>
+          </a:effectRef>
+          <a:fontRef idx="minor">
+            <a:schemeClr val="dk1"/>
+          </a:fontRef>
+        </p:style>
+        <p:txBody>
+          <a:bodyPr rtlCol="0" anchor="ctr"/>
+          <a:lstStyle/>
+          <a:p>
+            <a:pPr algn="ctr"/>
+            <a:endParaRPr lang="en-US"/>
+          </a:p>
+        </p:txBody>
+      </p:sp>
+      <p:sp>
+        <p:nvSpPr>
+          <p:cNvPr id="4" name="TextBox 3">
+            <a:extLst>
+              <a:ext uri="{FF2B5EF4-FFF2-40B4-BE49-F238E27FC236}">
+                <a16:creationId xmlns:a16="http://schemas.microsoft.com/office/drawing/2014/main" id="{E4D06BF3-DA31-49D2-823E-D432FD7B4783}"/>
+              </a:ext>
+            </a:extLst>
+          </p:cNvPr>
+          <p:cNvSpPr txBox="1"/>
+          <p:nvPr/>
+        </p:nvSpPr>
+        <p:spPr>
+          <a:xfrm>
+            <a:off x="6640218" y="1661015"/>
+            <a:ext cx="189015" cy="246221"/>
+          </a:xfrm>
+          <a:prstGeom prst="rect">
+            <a:avLst/>
+          </a:prstGeom>
+          <a:noFill/>
+        </p:spPr>
+        <p:txBody>
+          <a:bodyPr wrap="square" rtlCol="0">
+            <a:spAutoFit/>
+          </a:bodyPr>
+          <a:lstStyle/>
+          <a:p>
+            <a:r>
+              <a:rPr lang="en-US" sz="1000" dirty="0"/>
+              <a:t>*</a:t>
+            </a:r>
+            <a:endParaRPr lang="en-US" sz="1100" dirty="0"/>
+          </a:p>
+        </p:txBody>
+      </p:sp>
+      <p:sp>
+        <p:nvSpPr>
+          <p:cNvPr id="162" name="TextBox 161">
+            <a:extLst>
+              <a:ext uri="{FF2B5EF4-FFF2-40B4-BE49-F238E27FC236}">
+                <a16:creationId xmlns:a16="http://schemas.microsoft.com/office/drawing/2014/main" id="{9648C610-C1DC-4AD3-9EF9-EDD241D22F31}"/>
+              </a:ext>
+            </a:extLst>
+          </p:cNvPr>
+          <p:cNvSpPr txBox="1"/>
+          <p:nvPr/>
+        </p:nvSpPr>
+        <p:spPr>
+          <a:xfrm>
+            <a:off x="7239818" y="1665085"/>
+            <a:ext cx="189015" cy="246221"/>
+          </a:xfrm>
+          <a:prstGeom prst="rect">
+            <a:avLst/>
+          </a:prstGeom>
+          <a:noFill/>
+        </p:spPr>
+        <p:txBody>
+          <a:bodyPr wrap="square" rtlCol="0">
+            <a:spAutoFit/>
+          </a:bodyPr>
+          <a:lstStyle/>
+          <a:p>
+            <a:r>
+              <a:rPr lang="en-US" sz="1000" dirty="0"/>
+              <a:t>*</a:t>
+            </a:r>
+            <a:endParaRPr lang="en-US" sz="1100" dirty="0"/>
+          </a:p>
+        </p:txBody>
+      </p:sp>
+      <p:sp>
+        <p:nvSpPr>
+          <p:cNvPr id="163" name="TextBox 162">
+            <a:extLst>
+              <a:ext uri="{FF2B5EF4-FFF2-40B4-BE49-F238E27FC236}">
+                <a16:creationId xmlns:a16="http://schemas.microsoft.com/office/drawing/2014/main" id="{91BA438D-B39C-4307-A2FA-DBE7B7C70DFC}"/>
+              </a:ext>
+            </a:extLst>
+          </p:cNvPr>
+          <p:cNvSpPr txBox="1"/>
+          <p:nvPr/>
+        </p:nvSpPr>
+        <p:spPr>
+          <a:xfrm>
+            <a:off x="6677252" y="1869092"/>
+            <a:ext cx="104503" cy="246221"/>
+          </a:xfrm>
+          <a:prstGeom prst="rect">
+            <a:avLst/>
+          </a:prstGeom>
+          <a:noFill/>
+        </p:spPr>
+        <p:txBody>
+          <a:bodyPr wrap="square" rtlCol="0">
+            <a:spAutoFit/>
+          </a:bodyPr>
+          <a:lstStyle/>
+          <a:p>
+            <a:r>
+              <a:rPr lang="en-US" sz="1000" dirty="0"/>
+              <a:t>*</a:t>
+            </a:r>
+            <a:endParaRPr lang="en-US" sz="1100" dirty="0"/>
+          </a:p>
+        </p:txBody>
+      </p:sp>
+      <p:sp>
+        <p:nvSpPr>
+          <p:cNvPr id="164" name="TextBox 163">
+            <a:extLst>
+              <a:ext uri="{FF2B5EF4-FFF2-40B4-BE49-F238E27FC236}">
+                <a16:creationId xmlns:a16="http://schemas.microsoft.com/office/drawing/2014/main" id="{C4AA02A1-FBB0-4347-A37D-E4F57602DBF1}"/>
+              </a:ext>
+            </a:extLst>
+          </p:cNvPr>
+          <p:cNvSpPr txBox="1"/>
+          <p:nvPr/>
+        </p:nvSpPr>
+        <p:spPr>
+          <a:xfrm>
+            <a:off x="6634995" y="2248150"/>
+            <a:ext cx="189015" cy="246221"/>
+          </a:xfrm>
+          <a:prstGeom prst="rect">
+            <a:avLst/>
+          </a:prstGeom>
+          <a:noFill/>
+        </p:spPr>
+        <p:txBody>
+          <a:bodyPr wrap="square" rtlCol="0">
+            <a:spAutoFit/>
+          </a:bodyPr>
+          <a:lstStyle/>
+          <a:p>
+            <a:r>
+              <a:rPr lang="en-US" sz="1000" dirty="0"/>
+              <a:t>*</a:t>
+            </a:r>
+            <a:endParaRPr lang="en-US" sz="1100" dirty="0"/>
+          </a:p>
+        </p:txBody>
+      </p:sp>
+      <p:sp>
+        <p:nvSpPr>
+          <p:cNvPr id="165" name="TextBox 164">
+            <a:extLst>
+              <a:ext uri="{FF2B5EF4-FFF2-40B4-BE49-F238E27FC236}">
+                <a16:creationId xmlns:a16="http://schemas.microsoft.com/office/drawing/2014/main" id="{2635769E-D765-404A-BFF2-19C1D2194472}"/>
+              </a:ext>
+            </a:extLst>
+          </p:cNvPr>
+          <p:cNvSpPr txBox="1"/>
+          <p:nvPr/>
+        </p:nvSpPr>
+        <p:spPr>
+          <a:xfrm>
+            <a:off x="7239817" y="2240587"/>
+            <a:ext cx="189015" cy="246221"/>
+          </a:xfrm>
+          <a:prstGeom prst="rect">
+            <a:avLst/>
+          </a:prstGeom>
+          <a:noFill/>
+        </p:spPr>
+        <p:txBody>
+          <a:bodyPr wrap="square" rtlCol="0">
+            <a:spAutoFit/>
+          </a:bodyPr>
+          <a:lstStyle/>
+          <a:p>
+            <a:r>
+              <a:rPr lang="en-US" sz="1000" dirty="0"/>
+              <a:t>*</a:t>
+            </a:r>
+            <a:endParaRPr lang="en-US" sz="1100" dirty="0"/>
+          </a:p>
+        </p:txBody>
+      </p:sp>
+      <p:sp>
+        <p:nvSpPr>
+          <p:cNvPr id="166" name="TextBox 165">
+            <a:extLst>
+              <a:ext uri="{FF2B5EF4-FFF2-40B4-BE49-F238E27FC236}">
+                <a16:creationId xmlns:a16="http://schemas.microsoft.com/office/drawing/2014/main" id="{4F501CAC-D24F-456F-83BE-B3C9246A1619}"/>
+              </a:ext>
+            </a:extLst>
+          </p:cNvPr>
+          <p:cNvSpPr txBox="1"/>
+          <p:nvPr/>
+        </p:nvSpPr>
+        <p:spPr>
+          <a:xfrm>
+            <a:off x="8027675" y="2234964"/>
+            <a:ext cx="189015" cy="246221"/>
+          </a:xfrm>
+          <a:prstGeom prst="rect">
+            <a:avLst/>
+          </a:prstGeom>
+          <a:noFill/>
+        </p:spPr>
+        <p:txBody>
+          <a:bodyPr wrap="square" rtlCol="0">
+            <a:spAutoFit/>
+          </a:bodyPr>
+          <a:lstStyle/>
+          <a:p>
+            <a:r>
+              <a:rPr lang="en-US" sz="1000" dirty="0"/>
+              <a:t>*</a:t>
+            </a:r>
+            <a:endParaRPr lang="en-US" sz="1100" dirty="0"/>
+          </a:p>
+        </p:txBody>
+      </p:sp>
+      <p:sp>
+        <p:nvSpPr>
+          <p:cNvPr id="167" name="TextBox 166">
+            <a:extLst>
+              <a:ext uri="{FF2B5EF4-FFF2-40B4-BE49-F238E27FC236}">
+                <a16:creationId xmlns:a16="http://schemas.microsoft.com/office/drawing/2014/main" id="{B8CAB3A3-18D9-4468-97DA-1121317E3956}"/>
+              </a:ext>
+            </a:extLst>
+          </p:cNvPr>
+          <p:cNvSpPr txBox="1"/>
+          <p:nvPr/>
+        </p:nvSpPr>
+        <p:spPr>
+          <a:xfrm>
+            <a:off x="8029951" y="1862459"/>
+            <a:ext cx="189015" cy="246221"/>
+          </a:xfrm>
+          <a:prstGeom prst="rect">
+            <a:avLst/>
+          </a:prstGeom>
+          <a:noFill/>
+        </p:spPr>
+        <p:txBody>
+          <a:bodyPr wrap="square" rtlCol="0">
+            <a:spAutoFit/>
+          </a:bodyPr>
+          <a:lstStyle/>
+          <a:p>
+            <a:r>
+              <a:rPr lang="en-US" sz="1000" dirty="0"/>
+              <a:t>*</a:t>
+            </a:r>
+            <a:endParaRPr lang="en-US" sz="1100" dirty="0"/>
+          </a:p>
+        </p:txBody>
+      </p:sp>
+      <p:sp>
+        <p:nvSpPr>
+          <p:cNvPr id="168" name="TextBox 167">
+            <a:extLst>
+              <a:ext uri="{FF2B5EF4-FFF2-40B4-BE49-F238E27FC236}">
+                <a16:creationId xmlns:a16="http://schemas.microsoft.com/office/drawing/2014/main" id="{262DF2C5-3875-4453-B08F-59C873CFA9BF}"/>
+              </a:ext>
+            </a:extLst>
+          </p:cNvPr>
+          <p:cNvSpPr txBox="1"/>
+          <p:nvPr/>
+        </p:nvSpPr>
+        <p:spPr>
+          <a:xfrm>
+            <a:off x="8029950" y="1658873"/>
+            <a:ext cx="189015" cy="246221"/>
+          </a:xfrm>
+          <a:prstGeom prst="rect">
+            <a:avLst/>
+          </a:prstGeom>
+          <a:noFill/>
+        </p:spPr>
+        <p:txBody>
+          <a:bodyPr wrap="square" rtlCol="0">
+            <a:spAutoFit/>
+          </a:bodyPr>
+          <a:lstStyle/>
+          <a:p>
+            <a:r>
+              <a:rPr lang="en-US" sz="1000" dirty="0"/>
+              <a:t>*</a:t>
+            </a:r>
+            <a:endParaRPr lang="en-US" sz="1100" dirty="0"/>
+          </a:p>
+        </p:txBody>
+      </p:sp>
+      <p:sp>
+        <p:nvSpPr>
+          <p:cNvPr id="169" name="TextBox 168">
+            <a:extLst>
+              <a:ext uri="{FF2B5EF4-FFF2-40B4-BE49-F238E27FC236}">
+                <a16:creationId xmlns:a16="http://schemas.microsoft.com/office/drawing/2014/main" id="{45005DFE-C694-449B-991F-F0BAC6458F55}"/>
+              </a:ext>
+            </a:extLst>
+          </p:cNvPr>
+          <p:cNvSpPr txBox="1"/>
+          <p:nvPr/>
+        </p:nvSpPr>
+        <p:spPr>
+          <a:xfrm>
+            <a:off x="8643170" y="1653715"/>
+            <a:ext cx="189015" cy="246221"/>
+          </a:xfrm>
+          <a:prstGeom prst="rect">
+            <a:avLst/>
+          </a:prstGeom>
+          <a:noFill/>
+        </p:spPr>
+        <p:txBody>
+          <a:bodyPr wrap="square" rtlCol="0">
+            <a:spAutoFit/>
+          </a:bodyPr>
+          <a:lstStyle/>
+          <a:p>
+            <a:r>
+              <a:rPr lang="en-US" sz="1000" dirty="0"/>
+              <a:t>*</a:t>
+            </a:r>
+            <a:endParaRPr lang="en-US" sz="1100" dirty="0"/>
+          </a:p>
+        </p:txBody>
+      </p:sp>
+      <p:sp>
+        <p:nvSpPr>
+          <p:cNvPr id="170" name="TextBox 169">
+            <a:extLst>
+              <a:ext uri="{FF2B5EF4-FFF2-40B4-BE49-F238E27FC236}">
+                <a16:creationId xmlns:a16="http://schemas.microsoft.com/office/drawing/2014/main" id="{9947B472-FB99-431A-A4A1-5EBF9177D423}"/>
+              </a:ext>
+            </a:extLst>
+          </p:cNvPr>
+          <p:cNvSpPr txBox="1"/>
+          <p:nvPr/>
+        </p:nvSpPr>
+        <p:spPr>
+          <a:xfrm>
+            <a:off x="8651720" y="1862459"/>
+            <a:ext cx="189015" cy="246221"/>
+          </a:xfrm>
+          <a:prstGeom prst="rect">
+            <a:avLst/>
+          </a:prstGeom>
+          <a:noFill/>
+        </p:spPr>
+        <p:txBody>
+          <a:bodyPr wrap="square" rtlCol="0">
+            <a:spAutoFit/>
+          </a:bodyPr>
+          <a:lstStyle/>
+          <a:p>
+            <a:r>
+              <a:rPr lang="en-US" sz="1000" dirty="0"/>
+              <a:t>*</a:t>
+            </a:r>
+            <a:endParaRPr lang="en-US" sz="1100" dirty="0"/>
+          </a:p>
+        </p:txBody>
+      </p:sp>
+      <p:sp>
+        <p:nvSpPr>
+          <p:cNvPr id="171" name="TextBox 170">
+            <a:extLst>
+              <a:ext uri="{FF2B5EF4-FFF2-40B4-BE49-F238E27FC236}">
+                <a16:creationId xmlns:a16="http://schemas.microsoft.com/office/drawing/2014/main" id="{D364BBE4-95FD-440E-A585-8D0A98A2B929}"/>
+              </a:ext>
+            </a:extLst>
+          </p:cNvPr>
+          <p:cNvSpPr txBox="1"/>
+          <p:nvPr/>
+        </p:nvSpPr>
+        <p:spPr>
+          <a:xfrm>
+            <a:off x="8643170" y="2246273"/>
+            <a:ext cx="189015" cy="246221"/>
+          </a:xfrm>
+          <a:prstGeom prst="rect">
+            <a:avLst/>
+          </a:prstGeom>
+          <a:noFill/>
+        </p:spPr>
+        <p:txBody>
+          <a:bodyPr wrap="square" rtlCol="0">
+            <a:spAutoFit/>
+          </a:bodyPr>
+          <a:lstStyle/>
+          <a:p>
+            <a:r>
+              <a:rPr lang="en-US" sz="1000" dirty="0"/>
+              <a:t>*</a:t>
+            </a:r>
+            <a:endParaRPr lang="en-US" sz="1100" dirty="0"/>
+          </a:p>
+        </p:txBody>
+      </p:sp>
     </p:spTree>
     <p:extLst>
       <p:ext uri="{BB962C8B-B14F-4D97-AF65-F5344CB8AC3E}">

</xml_diff>

<commit_message>
Changes for internal review
</commit_message>
<xml_diff>
--- a/main/ptm_fig.pptx
+++ b/main/ptm_fig.pptx
@@ -226,7 +226,7 @@
           <a:p>
             <a:fld id="{80137904-5636-B34C-A9CD-CBEBAD04BF28}" type="datetimeFigureOut">
               <a:rPr lang="en-US" smtClean="0"/>
-              <a:t>11/8/2021</a:t>
+              <a:t>1/28/2022</a:t>
             </a:fld>
             <a:endParaRPr lang="en-US"/>
           </a:p>
@@ -773,7 +773,7 @@
           <a:p>
             <a:fld id="{3C76BF9E-C1DF-AA49-BEDC-5D48F2B93EA3}" type="datetimeFigureOut">
               <a:rPr lang="en-US" smtClean="0"/>
-              <a:t>11/8/2021</a:t>
+              <a:t>1/28/2022</a:t>
             </a:fld>
             <a:endParaRPr lang="en-US"/>
           </a:p>
@@ -941,7 +941,7 @@
           <a:p>
             <a:fld id="{3C76BF9E-C1DF-AA49-BEDC-5D48F2B93EA3}" type="datetimeFigureOut">
               <a:rPr lang="en-US" smtClean="0"/>
-              <a:t>11/8/2021</a:t>
+              <a:t>1/28/2022</a:t>
             </a:fld>
             <a:endParaRPr lang="en-US"/>
           </a:p>
@@ -1119,7 +1119,7 @@
           <a:p>
             <a:fld id="{3C76BF9E-C1DF-AA49-BEDC-5D48F2B93EA3}" type="datetimeFigureOut">
               <a:rPr lang="en-US" smtClean="0"/>
-              <a:t>11/8/2021</a:t>
+              <a:t>1/28/2022</a:t>
             </a:fld>
             <a:endParaRPr lang="en-US"/>
           </a:p>
@@ -1287,7 +1287,7 @@
           <a:p>
             <a:fld id="{3C76BF9E-C1DF-AA49-BEDC-5D48F2B93EA3}" type="datetimeFigureOut">
               <a:rPr lang="en-US" smtClean="0"/>
-              <a:t>11/8/2021</a:t>
+              <a:t>1/28/2022</a:t>
             </a:fld>
             <a:endParaRPr lang="en-US"/>
           </a:p>
@@ -1532,7 +1532,7 @@
           <a:p>
             <a:fld id="{3C76BF9E-C1DF-AA49-BEDC-5D48F2B93EA3}" type="datetimeFigureOut">
               <a:rPr lang="en-US" smtClean="0"/>
-              <a:t>11/8/2021</a:t>
+              <a:t>1/28/2022</a:t>
             </a:fld>
             <a:endParaRPr lang="en-US"/>
           </a:p>
@@ -1817,7 +1817,7 @@
           <a:p>
             <a:fld id="{3C76BF9E-C1DF-AA49-BEDC-5D48F2B93EA3}" type="datetimeFigureOut">
               <a:rPr lang="en-US" smtClean="0"/>
-              <a:t>11/8/2021</a:t>
+              <a:t>1/28/2022</a:t>
             </a:fld>
             <a:endParaRPr lang="en-US"/>
           </a:p>
@@ -2236,7 +2236,7 @@
           <a:p>
             <a:fld id="{3C76BF9E-C1DF-AA49-BEDC-5D48F2B93EA3}" type="datetimeFigureOut">
               <a:rPr lang="en-US" smtClean="0"/>
-              <a:t>11/8/2021</a:t>
+              <a:t>1/28/2022</a:t>
             </a:fld>
             <a:endParaRPr lang="en-US"/>
           </a:p>
@@ -2353,7 +2353,7 @@
           <a:p>
             <a:fld id="{3C76BF9E-C1DF-AA49-BEDC-5D48F2B93EA3}" type="datetimeFigureOut">
               <a:rPr lang="en-US" smtClean="0"/>
-              <a:t>11/8/2021</a:t>
+              <a:t>1/28/2022</a:t>
             </a:fld>
             <a:endParaRPr lang="en-US"/>
           </a:p>
@@ -2448,7 +2448,7 @@
           <a:p>
             <a:fld id="{3C76BF9E-C1DF-AA49-BEDC-5D48F2B93EA3}" type="datetimeFigureOut">
               <a:rPr lang="en-US" smtClean="0"/>
-              <a:t>11/8/2021</a:t>
+              <a:t>1/28/2022</a:t>
             </a:fld>
             <a:endParaRPr lang="en-US"/>
           </a:p>
@@ -2723,7 +2723,7 @@
           <a:p>
             <a:fld id="{3C76BF9E-C1DF-AA49-BEDC-5D48F2B93EA3}" type="datetimeFigureOut">
               <a:rPr lang="en-US" smtClean="0"/>
-              <a:t>11/8/2021</a:t>
+              <a:t>1/28/2022</a:t>
             </a:fld>
             <a:endParaRPr lang="en-US"/>
           </a:p>
@@ -2975,7 +2975,7 @@
           <a:p>
             <a:fld id="{3C76BF9E-C1DF-AA49-BEDC-5D48F2B93EA3}" type="datetimeFigureOut">
               <a:rPr lang="en-US" smtClean="0"/>
-              <a:t>11/8/2021</a:t>
+              <a:t>1/28/2022</a:t>
             </a:fld>
             <a:endParaRPr lang="en-US"/>
           </a:p>
@@ -3186,7 +3186,7 @@
           <a:p>
             <a:fld id="{3C76BF9E-C1DF-AA49-BEDC-5D48F2B93EA3}" type="datetimeFigureOut">
               <a:rPr lang="en-US" smtClean="0"/>
-              <a:t>11/8/2021</a:t>
+              <a:t>1/28/2022</a:t>
             </a:fld>
             <a:endParaRPr lang="en-US"/>
           </a:p>
@@ -3675,7 +3675,7 @@
           <a:effectLst/>
           <a:extLst>
             <a:ext uri="{AF507438-7753-43e0-B8FC-AC1667EBCBE1}">
-              <a14:hiddenEffects xmlns="" xmlns:a14="http://schemas.microsoft.com/office/drawing/2010/main">
+              <a14:hiddenEffects xmlns:a14="http://schemas.microsoft.com/office/drawing/2010/main" xmlns="">
                 <a:effectLst>
                   <a:outerShdw dist="35921" dir="2700000" algn="ctr" rotWithShape="0">
                     <a:schemeClr val="bg2"/>
@@ -3836,12 +3836,12 @@
           <a:effectLst/>
           <a:extLst>
             <a:ext uri="{909E8E84-426E-40dd-AFC4-6F175D3DCCD1}">
-              <a14:hiddenFill xmlns="" xmlns:a14="http://schemas.microsoft.com/office/drawing/2010/main">
+              <a14:hiddenFill xmlns:a14="http://schemas.microsoft.com/office/drawing/2010/main" xmlns="">
                 <a:noFill/>
               </a14:hiddenFill>
             </a:ext>
             <a:ext uri="{AF507438-7753-43e0-B8FC-AC1667EBCBE1}">
-              <a14:hiddenEffects xmlns="" xmlns:a14="http://schemas.microsoft.com/office/drawing/2010/main">
+              <a14:hiddenEffects xmlns:a14="http://schemas.microsoft.com/office/drawing/2010/main" xmlns="">
                 <a:effectLst>
                   <a:outerShdw dist="35921" dir="2700000" algn="ctr" rotWithShape="0">
                     <a:schemeClr val="bg2"/>
@@ -3896,7 +3896,7 @@
           <a:effectLst/>
           <a:extLst>
             <a:ext uri="{AF507438-7753-43e0-B8FC-AC1667EBCBE1}">
-              <a14:hiddenEffects xmlns="" xmlns:a14="http://schemas.microsoft.com/office/drawing/2010/main">
+              <a14:hiddenEffects xmlns:a14="http://schemas.microsoft.com/office/drawing/2010/main" xmlns="">
                 <a:effectLst>
                   <a:outerShdw dist="35921" dir="2700000" algn="ctr" rotWithShape="0">
                     <a:schemeClr val="bg2"/>
@@ -3949,12 +3949,12 @@
           <a:effectLst/>
           <a:extLst>
             <a:ext uri="{909E8E84-426E-40dd-AFC4-6F175D3DCCD1}">
-              <a14:hiddenFill xmlns="" xmlns:a14="http://schemas.microsoft.com/office/drawing/2010/main">
+              <a14:hiddenFill xmlns:a14="http://schemas.microsoft.com/office/drawing/2010/main" xmlns="">
                 <a:noFill/>
               </a14:hiddenFill>
             </a:ext>
             <a:ext uri="{AF507438-7753-43e0-B8FC-AC1667EBCBE1}">
-              <a14:hiddenEffects xmlns="" xmlns:a14="http://schemas.microsoft.com/office/drawing/2010/main">
+              <a14:hiddenEffects xmlns:a14="http://schemas.microsoft.com/office/drawing/2010/main" xmlns="">
                 <a:effectLst>
                   <a:outerShdw dist="35921" dir="2700000" algn="ctr" rotWithShape="0">
                     <a:schemeClr val="bg2"/>
@@ -4007,12 +4007,12 @@
           <a:effectLst/>
           <a:extLst>
             <a:ext uri="{909E8E84-426E-40dd-AFC4-6F175D3DCCD1}">
-              <a14:hiddenFill xmlns="" xmlns:a14="http://schemas.microsoft.com/office/drawing/2010/main">
+              <a14:hiddenFill xmlns:a14="http://schemas.microsoft.com/office/drawing/2010/main" xmlns="">
                 <a:noFill/>
               </a14:hiddenFill>
             </a:ext>
             <a:ext uri="{AF507438-7753-43e0-B8FC-AC1667EBCBE1}">
-              <a14:hiddenEffects xmlns="" xmlns:a14="http://schemas.microsoft.com/office/drawing/2010/main">
+              <a14:hiddenEffects xmlns:a14="http://schemas.microsoft.com/office/drawing/2010/main" xmlns="">
                 <a:effectLst>
                   <a:outerShdw dist="35921" dir="2700000" algn="ctr" rotWithShape="0">
                     <a:schemeClr val="bg2"/>
@@ -4069,7 +4069,7 @@
           <a:effectLst/>
           <a:extLst>
             <a:ext uri="{AF507438-7753-43e0-B8FC-AC1667EBCBE1}">
-              <a14:hiddenEffects xmlns="" xmlns:a14="http://schemas.microsoft.com/office/drawing/2010/main">
+              <a14:hiddenEffects xmlns:a14="http://schemas.microsoft.com/office/drawing/2010/main" xmlns="">
                 <a:effectLst>
                   <a:outerShdw dist="35921" dir="2700000" algn="ctr" rotWithShape="0">
                     <a:schemeClr val="bg2"/>
@@ -4124,7 +4124,7 @@
           <a:effectLst/>
           <a:extLst>
             <a:ext uri="{AF507438-7753-43e0-B8FC-AC1667EBCBE1}">
-              <a14:hiddenEffects xmlns="" xmlns:a14="http://schemas.microsoft.com/office/drawing/2010/main">
+              <a14:hiddenEffects xmlns:a14="http://schemas.microsoft.com/office/drawing/2010/main" xmlns="">
                 <a:effectLst>
                   <a:outerShdw dist="35921" dir="2700000" algn="ctr" rotWithShape="0">
                     <a:schemeClr val="bg2"/>
@@ -4177,12 +4177,12 @@
           <a:effectLst/>
           <a:extLst>
             <a:ext uri="{909E8E84-426E-40dd-AFC4-6F175D3DCCD1}">
-              <a14:hiddenFill xmlns="" xmlns:a14="http://schemas.microsoft.com/office/drawing/2010/main">
+              <a14:hiddenFill xmlns:a14="http://schemas.microsoft.com/office/drawing/2010/main" xmlns="">
                 <a:noFill/>
               </a14:hiddenFill>
             </a:ext>
             <a:ext uri="{AF507438-7753-43e0-B8FC-AC1667EBCBE1}">
-              <a14:hiddenEffects xmlns="" xmlns:a14="http://schemas.microsoft.com/office/drawing/2010/main">
+              <a14:hiddenEffects xmlns:a14="http://schemas.microsoft.com/office/drawing/2010/main" xmlns="">
                 <a:effectLst>
                   <a:outerShdw dist="35921" dir="2700000" algn="ctr" rotWithShape="0">
                     <a:schemeClr val="bg2"/>
@@ -4235,12 +4235,12 @@
           <a:effectLst/>
           <a:extLst>
             <a:ext uri="{909E8E84-426E-40dd-AFC4-6F175D3DCCD1}">
-              <a14:hiddenFill xmlns="" xmlns:a14="http://schemas.microsoft.com/office/drawing/2010/main">
+              <a14:hiddenFill xmlns:a14="http://schemas.microsoft.com/office/drawing/2010/main" xmlns="">
                 <a:noFill/>
               </a14:hiddenFill>
             </a:ext>
             <a:ext uri="{AF507438-7753-43e0-B8FC-AC1667EBCBE1}">
-              <a14:hiddenEffects xmlns="" xmlns:a14="http://schemas.microsoft.com/office/drawing/2010/main">
+              <a14:hiddenEffects xmlns:a14="http://schemas.microsoft.com/office/drawing/2010/main" xmlns="">
                 <a:effectLst>
                   <a:outerShdw dist="35921" dir="2700000" algn="ctr" rotWithShape="0">
                     <a:schemeClr val="bg2"/>
@@ -4297,7 +4297,7 @@
           <a:effectLst/>
           <a:extLst>
             <a:ext uri="{AF507438-7753-43e0-B8FC-AC1667EBCBE1}">
-              <a14:hiddenEffects xmlns="" xmlns:a14="http://schemas.microsoft.com/office/drawing/2010/main">
+              <a14:hiddenEffects xmlns:a14="http://schemas.microsoft.com/office/drawing/2010/main" xmlns="">
                 <a:effectLst>
                   <a:outerShdw dist="35921" dir="2700000" algn="ctr" rotWithShape="0">
                     <a:schemeClr val="bg2"/>
@@ -4352,7 +4352,7 @@
           <a:effectLst/>
           <a:extLst>
             <a:ext uri="{AF507438-7753-43e0-B8FC-AC1667EBCBE1}">
-              <a14:hiddenEffects xmlns="" xmlns:a14="http://schemas.microsoft.com/office/drawing/2010/main">
+              <a14:hiddenEffects xmlns:a14="http://schemas.microsoft.com/office/drawing/2010/main" xmlns="">
                 <a:effectLst>
                   <a:outerShdw dist="35921" dir="2700000" algn="ctr" rotWithShape="0">
                     <a:schemeClr val="bg2"/>
@@ -4405,12 +4405,12 @@
           <a:effectLst/>
           <a:extLst>
             <a:ext uri="{909E8E84-426E-40dd-AFC4-6F175D3DCCD1}">
-              <a14:hiddenFill xmlns="" xmlns:a14="http://schemas.microsoft.com/office/drawing/2010/main">
+              <a14:hiddenFill xmlns:a14="http://schemas.microsoft.com/office/drawing/2010/main" xmlns="">
                 <a:noFill/>
               </a14:hiddenFill>
             </a:ext>
             <a:ext uri="{AF507438-7753-43e0-B8FC-AC1667EBCBE1}">
-              <a14:hiddenEffects xmlns="" xmlns:a14="http://schemas.microsoft.com/office/drawing/2010/main">
+              <a14:hiddenEffects xmlns:a14="http://schemas.microsoft.com/office/drawing/2010/main" xmlns="">
                 <a:effectLst>
                   <a:outerShdw dist="35921" dir="2700000" algn="ctr" rotWithShape="0">
                     <a:schemeClr val="bg2"/>
@@ -4463,12 +4463,12 @@
           <a:effectLst/>
           <a:extLst>
             <a:ext uri="{909E8E84-426E-40dd-AFC4-6F175D3DCCD1}">
-              <a14:hiddenFill xmlns="" xmlns:a14="http://schemas.microsoft.com/office/drawing/2010/main">
+              <a14:hiddenFill xmlns:a14="http://schemas.microsoft.com/office/drawing/2010/main" xmlns="">
                 <a:noFill/>
               </a14:hiddenFill>
             </a:ext>
             <a:ext uri="{AF507438-7753-43e0-B8FC-AC1667EBCBE1}">
-              <a14:hiddenEffects xmlns="" xmlns:a14="http://schemas.microsoft.com/office/drawing/2010/main">
+              <a14:hiddenEffects xmlns:a14="http://schemas.microsoft.com/office/drawing/2010/main" xmlns="">
                 <a:effectLst>
                   <a:outerShdw dist="35921" dir="2700000" algn="ctr" rotWithShape="0">
                     <a:schemeClr val="bg2"/>
@@ -4523,7 +4523,7 @@
           <a:effectLst/>
           <a:extLst>
             <a:ext uri="{AF507438-7753-43e0-B8FC-AC1667EBCBE1}">
-              <a14:hiddenEffects xmlns="" xmlns:a14="http://schemas.microsoft.com/office/drawing/2010/main">
+              <a14:hiddenEffects xmlns:a14="http://schemas.microsoft.com/office/drawing/2010/main" xmlns="">
                 <a:effectLst>
                   <a:outerShdw dist="35921" dir="2700000" algn="ctr" rotWithShape="0">
                     <a:schemeClr val="bg2"/>
@@ -4578,7 +4578,7 @@
           <a:effectLst/>
           <a:extLst>
             <a:ext uri="{AF507438-7753-43e0-B8FC-AC1667EBCBE1}">
-              <a14:hiddenEffects xmlns="" xmlns:a14="http://schemas.microsoft.com/office/drawing/2010/main">
+              <a14:hiddenEffects xmlns:a14="http://schemas.microsoft.com/office/drawing/2010/main" xmlns="">
                 <a:effectLst>
                   <a:outerShdw dist="35921" dir="2700000" algn="ctr" rotWithShape="0">
                     <a:schemeClr val="bg2"/>
@@ -4631,12 +4631,12 @@
           <a:effectLst/>
           <a:extLst>
             <a:ext uri="{909E8E84-426E-40dd-AFC4-6F175D3DCCD1}">
-              <a14:hiddenFill xmlns="" xmlns:a14="http://schemas.microsoft.com/office/drawing/2010/main">
+              <a14:hiddenFill xmlns:a14="http://schemas.microsoft.com/office/drawing/2010/main" xmlns="">
                 <a:noFill/>
               </a14:hiddenFill>
             </a:ext>
             <a:ext uri="{AF507438-7753-43e0-B8FC-AC1667EBCBE1}">
-              <a14:hiddenEffects xmlns="" xmlns:a14="http://schemas.microsoft.com/office/drawing/2010/main">
+              <a14:hiddenEffects xmlns:a14="http://schemas.microsoft.com/office/drawing/2010/main" xmlns="">
                 <a:effectLst>
                   <a:outerShdw dist="35921" dir="2700000" algn="ctr" rotWithShape="0">
                     <a:schemeClr val="bg2"/>
@@ -4689,12 +4689,12 @@
           <a:effectLst/>
           <a:extLst>
             <a:ext uri="{909E8E84-426E-40dd-AFC4-6F175D3DCCD1}">
-              <a14:hiddenFill xmlns="" xmlns:a14="http://schemas.microsoft.com/office/drawing/2010/main">
+              <a14:hiddenFill xmlns:a14="http://schemas.microsoft.com/office/drawing/2010/main" xmlns="">
                 <a:noFill/>
               </a14:hiddenFill>
             </a:ext>
             <a:ext uri="{AF507438-7753-43e0-B8FC-AC1667EBCBE1}">
-              <a14:hiddenEffects xmlns="" xmlns:a14="http://schemas.microsoft.com/office/drawing/2010/main">
+              <a14:hiddenEffects xmlns:a14="http://schemas.microsoft.com/office/drawing/2010/main" xmlns="">
                 <a:effectLst>
                   <a:outerShdw dist="35921" dir="2700000" algn="ctr" rotWithShape="0">
                     <a:schemeClr val="bg2"/>
@@ -4751,7 +4751,7 @@
           <a:effectLst/>
           <a:extLst>
             <a:ext uri="{AF507438-7753-43e0-B8FC-AC1667EBCBE1}">
-              <a14:hiddenEffects xmlns="" xmlns:a14="http://schemas.microsoft.com/office/drawing/2010/main">
+              <a14:hiddenEffects xmlns:a14="http://schemas.microsoft.com/office/drawing/2010/main" xmlns="">
                 <a:effectLst>
                   <a:outerShdw dist="35921" dir="2700000" algn="ctr" rotWithShape="0">
                     <a:schemeClr val="bg2"/>
@@ -4799,14 +4799,14 @@
           <a:effectLst/>
           <a:extLst>
             <a:ext uri="{909E8E84-426E-40dd-AFC4-6F175D3DCCD1}">
-              <a14:hiddenFill xmlns="" xmlns:a14="http://schemas.microsoft.com/office/drawing/2010/main">
+              <a14:hiddenFill xmlns:a14="http://schemas.microsoft.com/office/drawing/2010/main" xmlns="">
                 <a:solidFill>
                   <a:schemeClr val="accent1"/>
                 </a:solidFill>
               </a14:hiddenFill>
             </a:ext>
             <a:ext uri="{91240B29-F687-4f45-9708-019B960494DF}">
-              <a14:hiddenLine xmlns="" xmlns:a14="http://schemas.microsoft.com/office/drawing/2010/main" w="9525">
+              <a14:hiddenLine xmlns:a14="http://schemas.microsoft.com/office/drawing/2010/main" xmlns="" w="9525">
                 <a:solidFill>
                   <a:schemeClr val="tx1"/>
                 </a:solidFill>
@@ -4816,7 +4816,7 @@
               </a14:hiddenLine>
             </a:ext>
             <a:ext uri="{AF507438-7753-43e0-B8FC-AC1667EBCBE1}">
-              <a14:hiddenEffects xmlns="" xmlns:a14="http://schemas.microsoft.com/office/drawing/2010/main">
+              <a14:hiddenEffects xmlns:a14="http://schemas.microsoft.com/office/drawing/2010/main" xmlns="">
                 <a:effectLst>
                   <a:outerShdw dist="35921" dir="2700000" algn="ctr" rotWithShape="0">
                     <a:schemeClr val="bg2"/>
@@ -4974,14 +4974,14 @@
           <a:effectLst/>
           <a:extLst>
             <a:ext uri="{909E8E84-426E-40dd-AFC4-6F175D3DCCD1}">
-              <a14:hiddenFill xmlns="" xmlns:a14="http://schemas.microsoft.com/office/drawing/2010/main">
+              <a14:hiddenFill xmlns:a14="http://schemas.microsoft.com/office/drawing/2010/main" xmlns="">
                 <a:solidFill>
                   <a:schemeClr val="accent1"/>
                 </a:solidFill>
               </a14:hiddenFill>
             </a:ext>
             <a:ext uri="{91240B29-F687-4f45-9708-019B960494DF}">
-              <a14:hiddenLine xmlns="" xmlns:a14="http://schemas.microsoft.com/office/drawing/2010/main" w="9525">
+              <a14:hiddenLine xmlns:a14="http://schemas.microsoft.com/office/drawing/2010/main" xmlns="" w="9525">
                 <a:solidFill>
                   <a:schemeClr val="tx1"/>
                 </a:solidFill>
@@ -4991,7 +4991,7 @@
               </a14:hiddenLine>
             </a:ext>
             <a:ext uri="{AF507438-7753-43e0-B8FC-AC1667EBCBE1}">
-              <a14:hiddenEffects xmlns="" xmlns:a14="http://schemas.microsoft.com/office/drawing/2010/main">
+              <a14:hiddenEffects xmlns:a14="http://schemas.microsoft.com/office/drawing/2010/main" xmlns="">
                 <a:effectLst>
                   <a:outerShdw dist="35921" dir="2700000" algn="ctr" rotWithShape="0">
                     <a:schemeClr val="bg2"/>
@@ -5149,14 +5149,14 @@
           <a:effectLst/>
           <a:extLst>
             <a:ext uri="{909E8E84-426E-40dd-AFC4-6F175D3DCCD1}">
-              <a14:hiddenFill xmlns="" xmlns:a14="http://schemas.microsoft.com/office/drawing/2010/main">
+              <a14:hiddenFill xmlns:a14="http://schemas.microsoft.com/office/drawing/2010/main" xmlns="">
                 <a:solidFill>
                   <a:schemeClr val="accent1"/>
                 </a:solidFill>
               </a14:hiddenFill>
             </a:ext>
             <a:ext uri="{91240B29-F687-4f45-9708-019B960494DF}">
-              <a14:hiddenLine xmlns="" xmlns:a14="http://schemas.microsoft.com/office/drawing/2010/main" w="9525">
+              <a14:hiddenLine xmlns:a14="http://schemas.microsoft.com/office/drawing/2010/main" xmlns="" w="9525">
                 <a:solidFill>
                   <a:schemeClr val="tx1"/>
                 </a:solidFill>
@@ -5166,7 +5166,7 @@
               </a14:hiddenLine>
             </a:ext>
             <a:ext uri="{AF507438-7753-43e0-B8FC-AC1667EBCBE1}">
-              <a14:hiddenEffects xmlns="" xmlns:a14="http://schemas.microsoft.com/office/drawing/2010/main">
+              <a14:hiddenEffects xmlns:a14="http://schemas.microsoft.com/office/drawing/2010/main" xmlns="">
                 <a:effectLst>
                   <a:outerShdw dist="35921" dir="2700000" algn="ctr" rotWithShape="0">
                     <a:schemeClr val="bg2"/>
@@ -5324,14 +5324,14 @@
           <a:effectLst/>
           <a:extLst>
             <a:ext uri="{909E8E84-426E-40dd-AFC4-6F175D3DCCD1}">
-              <a14:hiddenFill xmlns="" xmlns:a14="http://schemas.microsoft.com/office/drawing/2010/main">
+              <a14:hiddenFill xmlns:a14="http://schemas.microsoft.com/office/drawing/2010/main" xmlns="">
                 <a:solidFill>
                   <a:schemeClr val="accent1"/>
                 </a:solidFill>
               </a14:hiddenFill>
             </a:ext>
             <a:ext uri="{91240B29-F687-4f45-9708-019B960494DF}">
-              <a14:hiddenLine xmlns="" xmlns:a14="http://schemas.microsoft.com/office/drawing/2010/main" w="9525">
+              <a14:hiddenLine xmlns:a14="http://schemas.microsoft.com/office/drawing/2010/main" xmlns="" w="9525">
                 <a:solidFill>
                   <a:schemeClr val="tx1"/>
                 </a:solidFill>
@@ -5341,7 +5341,7 @@
               </a14:hiddenLine>
             </a:ext>
             <a:ext uri="{AF507438-7753-43e0-B8FC-AC1667EBCBE1}">
-              <a14:hiddenEffects xmlns="" xmlns:a14="http://schemas.microsoft.com/office/drawing/2010/main">
+              <a14:hiddenEffects xmlns:a14="http://schemas.microsoft.com/office/drawing/2010/main" xmlns="">
                 <a:effectLst>
                   <a:outerShdw dist="35921" dir="2700000" algn="ctr" rotWithShape="0">
                     <a:schemeClr val="bg2"/>
@@ -5504,12 +5504,12 @@
           <a:effectLst/>
           <a:extLst>
             <a:ext uri="{909E8E84-426E-40dd-AFC4-6F175D3DCCD1}">
-              <a14:hiddenFill xmlns="" xmlns:a14="http://schemas.microsoft.com/office/drawing/2010/main">
+              <a14:hiddenFill xmlns:a14="http://schemas.microsoft.com/office/drawing/2010/main" xmlns="">
                 <a:noFill/>
               </a14:hiddenFill>
             </a:ext>
             <a:ext uri="{AF507438-7753-43e0-B8FC-AC1667EBCBE1}">
-              <a14:hiddenEffects xmlns="" xmlns:a14="http://schemas.microsoft.com/office/drawing/2010/main">
+              <a14:hiddenEffects xmlns:a14="http://schemas.microsoft.com/office/drawing/2010/main" xmlns="">
                 <a:effectLst>
                   <a:outerShdw dist="35921" dir="2700000" algn="ctr" rotWithShape="0">
                     <a:schemeClr val="bg2"/>
@@ -5562,12 +5562,12 @@
           <a:effectLst/>
           <a:extLst>
             <a:ext uri="{909E8E84-426E-40dd-AFC4-6F175D3DCCD1}">
-              <a14:hiddenFill xmlns="" xmlns:a14="http://schemas.microsoft.com/office/drawing/2010/main">
+              <a14:hiddenFill xmlns:a14="http://schemas.microsoft.com/office/drawing/2010/main" xmlns="">
                 <a:noFill/>
               </a14:hiddenFill>
             </a:ext>
             <a:ext uri="{AF507438-7753-43e0-B8FC-AC1667EBCBE1}">
-              <a14:hiddenEffects xmlns="" xmlns:a14="http://schemas.microsoft.com/office/drawing/2010/main">
+              <a14:hiddenEffects xmlns:a14="http://schemas.microsoft.com/office/drawing/2010/main" xmlns="">
                 <a:effectLst>
                   <a:outerShdw dist="35921" dir="2700000" algn="ctr" rotWithShape="0">
                     <a:schemeClr val="bg2"/>
@@ -5620,12 +5620,12 @@
           <a:effectLst/>
           <a:extLst>
             <a:ext uri="{909E8E84-426E-40dd-AFC4-6F175D3DCCD1}">
-              <a14:hiddenFill xmlns="" xmlns:a14="http://schemas.microsoft.com/office/drawing/2010/main">
+              <a14:hiddenFill xmlns:a14="http://schemas.microsoft.com/office/drawing/2010/main" xmlns="">
                 <a:noFill/>
               </a14:hiddenFill>
             </a:ext>
             <a:ext uri="{AF507438-7753-43e0-B8FC-AC1667EBCBE1}">
-              <a14:hiddenEffects xmlns="" xmlns:a14="http://schemas.microsoft.com/office/drawing/2010/main">
+              <a14:hiddenEffects xmlns:a14="http://schemas.microsoft.com/office/drawing/2010/main" xmlns="">
                 <a:effectLst>
                   <a:outerShdw dist="35921" dir="2700000" algn="ctr" rotWithShape="0">
                     <a:schemeClr val="bg2"/>
@@ -5678,12 +5678,12 @@
           <a:effectLst/>
           <a:extLst>
             <a:ext uri="{909E8E84-426E-40dd-AFC4-6F175D3DCCD1}">
-              <a14:hiddenFill xmlns="" xmlns:a14="http://schemas.microsoft.com/office/drawing/2010/main">
+              <a14:hiddenFill xmlns:a14="http://schemas.microsoft.com/office/drawing/2010/main" xmlns="">
                 <a:noFill/>
               </a14:hiddenFill>
             </a:ext>
             <a:ext uri="{AF507438-7753-43e0-B8FC-AC1667EBCBE1}">
-              <a14:hiddenEffects xmlns="" xmlns:a14="http://schemas.microsoft.com/office/drawing/2010/main">
+              <a14:hiddenEffects xmlns:a14="http://schemas.microsoft.com/office/drawing/2010/main" xmlns="">
                 <a:effectLst>
                   <a:outerShdw dist="35921" dir="2700000" algn="ctr" rotWithShape="0">
                     <a:schemeClr val="bg2"/>
@@ -5736,12 +5736,12 @@
           <a:effectLst/>
           <a:extLst>
             <a:ext uri="{909E8E84-426E-40dd-AFC4-6F175D3DCCD1}">
-              <a14:hiddenFill xmlns="" xmlns:a14="http://schemas.microsoft.com/office/drawing/2010/main">
+              <a14:hiddenFill xmlns:a14="http://schemas.microsoft.com/office/drawing/2010/main" xmlns="">
                 <a:noFill/>
               </a14:hiddenFill>
             </a:ext>
             <a:ext uri="{AF507438-7753-43e0-B8FC-AC1667EBCBE1}">
-              <a14:hiddenEffects xmlns="" xmlns:a14="http://schemas.microsoft.com/office/drawing/2010/main">
+              <a14:hiddenEffects xmlns:a14="http://schemas.microsoft.com/office/drawing/2010/main" xmlns="">
                 <a:effectLst>
                   <a:outerShdw dist="35921" dir="2700000" algn="ctr" rotWithShape="0">
                     <a:schemeClr val="bg2"/>
@@ -5794,12 +5794,12 @@
           <a:effectLst/>
           <a:extLst>
             <a:ext uri="{909E8E84-426E-40dd-AFC4-6F175D3DCCD1}">
-              <a14:hiddenFill xmlns="" xmlns:a14="http://schemas.microsoft.com/office/drawing/2010/main">
+              <a14:hiddenFill xmlns:a14="http://schemas.microsoft.com/office/drawing/2010/main" xmlns="">
                 <a:noFill/>
               </a14:hiddenFill>
             </a:ext>
             <a:ext uri="{AF507438-7753-43e0-B8FC-AC1667EBCBE1}">
-              <a14:hiddenEffects xmlns="" xmlns:a14="http://schemas.microsoft.com/office/drawing/2010/main">
+              <a14:hiddenEffects xmlns:a14="http://schemas.microsoft.com/office/drawing/2010/main" xmlns="">
                 <a:effectLst>
                   <a:outerShdw dist="35921" dir="2700000" algn="ctr" rotWithShape="0">
                     <a:schemeClr val="bg2"/>
@@ -5852,12 +5852,12 @@
           <a:effectLst/>
           <a:extLst>
             <a:ext uri="{909E8E84-426E-40dd-AFC4-6F175D3DCCD1}">
-              <a14:hiddenFill xmlns="" xmlns:a14="http://schemas.microsoft.com/office/drawing/2010/main">
+              <a14:hiddenFill xmlns:a14="http://schemas.microsoft.com/office/drawing/2010/main" xmlns="">
                 <a:noFill/>
               </a14:hiddenFill>
             </a:ext>
             <a:ext uri="{AF507438-7753-43e0-B8FC-AC1667EBCBE1}">
-              <a14:hiddenEffects xmlns="" xmlns:a14="http://schemas.microsoft.com/office/drawing/2010/main">
+              <a14:hiddenEffects xmlns:a14="http://schemas.microsoft.com/office/drawing/2010/main" xmlns="">
                 <a:effectLst>
                   <a:outerShdw dist="35921" dir="2700000" algn="ctr" rotWithShape="0">
                     <a:schemeClr val="bg2"/>
@@ -5910,12 +5910,12 @@
           <a:effectLst/>
           <a:extLst>
             <a:ext uri="{909E8E84-426E-40dd-AFC4-6F175D3DCCD1}">
-              <a14:hiddenFill xmlns="" xmlns:a14="http://schemas.microsoft.com/office/drawing/2010/main">
+              <a14:hiddenFill xmlns:a14="http://schemas.microsoft.com/office/drawing/2010/main" xmlns="">
                 <a:noFill/>
               </a14:hiddenFill>
             </a:ext>
             <a:ext uri="{AF507438-7753-43e0-B8FC-AC1667EBCBE1}">
-              <a14:hiddenEffects xmlns="" xmlns:a14="http://schemas.microsoft.com/office/drawing/2010/main">
+              <a14:hiddenEffects xmlns:a14="http://schemas.microsoft.com/office/drawing/2010/main" xmlns="">
                 <a:effectLst>
                   <a:outerShdw dist="35921" dir="2700000" algn="ctr" rotWithShape="0">
                     <a:schemeClr val="bg2"/>
@@ -5968,14 +5968,14 @@
           <a:effectLst/>
           <a:extLst>
             <a:ext uri="{909E8E84-426E-40dd-AFC4-6F175D3DCCD1}">
-              <a14:hiddenFill xmlns="" xmlns:a14="http://schemas.microsoft.com/office/drawing/2010/main">
+              <a14:hiddenFill xmlns:a14="http://schemas.microsoft.com/office/drawing/2010/main" xmlns="">
                 <a:solidFill>
                   <a:srgbClr val="FFFFCC"/>
                 </a:solidFill>
               </a14:hiddenFill>
             </a:ext>
             <a:ext uri="{AF507438-7753-43e0-B8FC-AC1667EBCBE1}">
-              <a14:hiddenEffects xmlns="" xmlns:a14="http://schemas.microsoft.com/office/drawing/2010/main">
+              <a14:hiddenEffects xmlns:a14="http://schemas.microsoft.com/office/drawing/2010/main" xmlns="">
                 <a:effectLst>
                   <a:outerShdw dist="35921" dir="2700000" algn="ctr" rotWithShape="0">
                     <a:schemeClr val="bg2"/>
@@ -6136,12 +6136,12 @@
           <a:effectLst/>
           <a:extLst>
             <a:ext uri="{909E8E84-426E-40dd-AFC4-6F175D3DCCD1}">
-              <a14:hiddenFill xmlns="" xmlns:a14="http://schemas.microsoft.com/office/drawing/2010/main">
+              <a14:hiddenFill xmlns:a14="http://schemas.microsoft.com/office/drawing/2010/main" xmlns="">
                 <a:noFill/>
               </a14:hiddenFill>
             </a:ext>
             <a:ext uri="{AF507438-7753-43e0-B8FC-AC1667EBCBE1}">
-              <a14:hiddenEffects xmlns="" xmlns:a14="http://schemas.microsoft.com/office/drawing/2010/main">
+              <a14:hiddenEffects xmlns:a14="http://schemas.microsoft.com/office/drawing/2010/main" xmlns="">
                 <a:effectLst>
                   <a:outerShdw dist="35921" dir="2700000" algn="ctr" rotWithShape="0">
                     <a:schemeClr val="bg2"/>
@@ -6194,12 +6194,12 @@
           <a:effectLst/>
           <a:extLst>
             <a:ext uri="{909E8E84-426E-40dd-AFC4-6F175D3DCCD1}">
-              <a14:hiddenFill xmlns="" xmlns:a14="http://schemas.microsoft.com/office/drawing/2010/main">
+              <a14:hiddenFill xmlns:a14="http://schemas.microsoft.com/office/drawing/2010/main" xmlns="">
                 <a:noFill/>
               </a14:hiddenFill>
             </a:ext>
             <a:ext uri="{AF507438-7753-43e0-B8FC-AC1667EBCBE1}">
-              <a14:hiddenEffects xmlns="" xmlns:a14="http://schemas.microsoft.com/office/drawing/2010/main">
+              <a14:hiddenEffects xmlns:a14="http://schemas.microsoft.com/office/drawing/2010/main" xmlns="">
                 <a:effectLst>
                   <a:outerShdw dist="35921" dir="2700000" algn="ctr" rotWithShape="0">
                     <a:schemeClr val="bg2"/>
@@ -6252,12 +6252,12 @@
           <a:effectLst/>
           <a:extLst>
             <a:ext uri="{909E8E84-426E-40dd-AFC4-6F175D3DCCD1}">
-              <a14:hiddenFill xmlns="" xmlns:a14="http://schemas.microsoft.com/office/drawing/2010/main">
+              <a14:hiddenFill xmlns:a14="http://schemas.microsoft.com/office/drawing/2010/main" xmlns="">
                 <a:noFill/>
               </a14:hiddenFill>
             </a:ext>
             <a:ext uri="{AF507438-7753-43e0-B8FC-AC1667EBCBE1}">
-              <a14:hiddenEffects xmlns="" xmlns:a14="http://schemas.microsoft.com/office/drawing/2010/main">
+              <a14:hiddenEffects xmlns:a14="http://schemas.microsoft.com/office/drawing/2010/main" xmlns="">
                 <a:effectLst>
                   <a:outerShdw dist="35921" dir="2700000" algn="ctr" rotWithShape="0">
                     <a:schemeClr val="bg2"/>
@@ -6310,12 +6310,12 @@
           <a:effectLst/>
           <a:extLst>
             <a:ext uri="{909E8E84-426E-40dd-AFC4-6F175D3DCCD1}">
-              <a14:hiddenFill xmlns="" xmlns:a14="http://schemas.microsoft.com/office/drawing/2010/main">
+              <a14:hiddenFill xmlns:a14="http://schemas.microsoft.com/office/drawing/2010/main" xmlns="">
                 <a:noFill/>
               </a14:hiddenFill>
             </a:ext>
             <a:ext uri="{AF507438-7753-43e0-B8FC-AC1667EBCBE1}">
-              <a14:hiddenEffects xmlns="" xmlns:a14="http://schemas.microsoft.com/office/drawing/2010/main">
+              <a14:hiddenEffects xmlns:a14="http://schemas.microsoft.com/office/drawing/2010/main" xmlns="">
                 <a:effectLst>
                   <a:outerShdw dist="35921" dir="2700000" algn="ctr" rotWithShape="0">
                     <a:schemeClr val="bg2"/>
@@ -6370,7 +6370,7 @@
           <a:effectLst/>
           <a:extLst>
             <a:ext uri="{AF507438-7753-43e0-B8FC-AC1667EBCBE1}">
-              <a14:hiddenEffects xmlns="" xmlns:a14="http://schemas.microsoft.com/office/drawing/2010/main">
+              <a14:hiddenEffects xmlns:a14="http://schemas.microsoft.com/office/drawing/2010/main" xmlns="">
                 <a:effectLst>
                   <a:outerShdw dist="35921" dir="2700000" algn="ctr" rotWithShape="0">
                     <a:schemeClr val="bg2"/>
@@ -6542,7 +6542,7 @@
           <a:effectLst/>
           <a:extLst>
             <a:ext uri="{AF507438-7753-43e0-B8FC-AC1667EBCBE1}">
-              <a14:hiddenEffects xmlns="" xmlns:a14="http://schemas.microsoft.com/office/drawing/2010/main">
+              <a14:hiddenEffects xmlns:a14="http://schemas.microsoft.com/office/drawing/2010/main" xmlns="">
                 <a:effectLst>
                   <a:outerShdw dist="35921" dir="2700000" algn="ctr" rotWithShape="0">
                     <a:schemeClr val="bg2"/>
@@ -6698,12 +6698,12 @@
           <a:effectLst/>
           <a:extLst>
             <a:ext uri="{909E8E84-426E-40dd-AFC4-6F175D3DCCD1}">
-              <a14:hiddenFill xmlns="" xmlns:a14="http://schemas.microsoft.com/office/drawing/2010/main">
+              <a14:hiddenFill xmlns:a14="http://schemas.microsoft.com/office/drawing/2010/main" xmlns="">
                 <a:noFill/>
               </a14:hiddenFill>
             </a:ext>
             <a:ext uri="{91240B29-F687-4f45-9708-019B960494DF}">
-              <a14:hiddenLine xmlns="" xmlns:a14="http://schemas.microsoft.com/office/drawing/2010/main" w="38100">
+              <a14:hiddenLine xmlns:a14="http://schemas.microsoft.com/office/drawing/2010/main" xmlns="" w="38100">
                 <a:solidFill>
                   <a:srgbClr val="000000"/>
                 </a:solidFill>
@@ -6713,7 +6713,7 @@
               </a14:hiddenLine>
             </a:ext>
             <a:ext uri="{AF507438-7753-43e0-B8FC-AC1667EBCBE1}">
-              <a14:hiddenEffects xmlns="" xmlns:a14="http://schemas.microsoft.com/office/drawing/2010/main">
+              <a14:hiddenEffects xmlns:a14="http://schemas.microsoft.com/office/drawing/2010/main" xmlns="">
                 <a:effectLst>
                   <a:outerShdw dist="35921" dir="2700000" algn="ctr" rotWithShape="0">
                     <a:schemeClr val="bg2"/>
@@ -8677,7 +8677,7 @@
           <a:graphicData uri="http://schemas.openxmlformats.org/presentationml/2006/ole">
             <mc:AlternateContent xmlns:mc="http://schemas.openxmlformats.org/markup-compatibility/2006">
               <mc:Choice xmlns:v="urn:schemas-microsoft-com:vml" Requires="v">
-                <p:oleObj spid="_x0000_s1577" name="Equation" r:id="rId4" imgW="165100" imgH="241300" progId="Equation.3">
+                <p:oleObj spid="_x0000_s1607" name="Equation" r:id="rId4" imgW="165100" imgH="241300" progId="Equation.3">
                   <p:embed/>
                 </p:oleObj>
               </mc:Choice>
@@ -8844,7 +8844,7 @@
           <a:graphicData uri="http://schemas.openxmlformats.org/presentationml/2006/ole">
             <mc:AlternateContent xmlns:mc="http://schemas.openxmlformats.org/markup-compatibility/2006">
               <mc:Choice xmlns:v="urn:schemas-microsoft-com:vml" Requires="v">
-                <p:oleObj spid="_x0000_s1578" name="Equation" r:id="rId6" imgW="1282700" imgH="254000" progId="Equation.3">
+                <p:oleObj spid="_x0000_s1608" name="Equation" r:id="rId6" imgW="1282700" imgH="254000" progId="Equation.3">
                   <p:embed/>
                 </p:oleObj>
               </mc:Choice>
@@ -9138,7 +9138,7 @@
           <a:graphicData uri="http://schemas.openxmlformats.org/presentationml/2006/ole">
             <mc:AlternateContent xmlns:mc="http://schemas.openxmlformats.org/markup-compatibility/2006">
               <mc:Choice xmlns:v="urn:schemas-microsoft-com:vml" Requires="v">
-                <p:oleObj spid="_x0000_s1579" name="Equation" r:id="rId8" imgW="190500" imgH="254000" progId="Equation.3">
+                <p:oleObj spid="_x0000_s1609" name="Equation" r:id="rId8" imgW="190500" imgH="254000" progId="Equation.3">
                   <p:embed/>
                 </p:oleObj>
               </mc:Choice>
@@ -9206,7 +9206,7 @@
           <a:graphicData uri="http://schemas.openxmlformats.org/presentationml/2006/ole">
             <mc:AlternateContent xmlns:mc="http://schemas.openxmlformats.org/markup-compatibility/2006">
               <mc:Choice xmlns:v="urn:schemas-microsoft-com:vml" Requires="v">
-                <p:oleObj spid="_x0000_s1580" name="Equation" r:id="rId10" imgW="190500" imgH="254000" progId="Equation.3">
+                <p:oleObj spid="_x0000_s1610" name="Equation" r:id="rId10" imgW="190500" imgH="254000" progId="Equation.3">
                   <p:embed/>
                 </p:oleObj>
               </mc:Choice>
@@ -9480,7 +9480,7 @@
           <a:graphicData uri="http://schemas.openxmlformats.org/presentationml/2006/ole">
             <mc:AlternateContent xmlns:mc="http://schemas.openxmlformats.org/markup-compatibility/2006">
               <mc:Choice xmlns:v="urn:schemas-microsoft-com:vml" Requires="v">
-                <p:oleObj spid="_x0000_s1581" name="Equation" r:id="rId11" imgW="685800" imgH="241300" progId="Equation.3">
+                <p:oleObj spid="_x0000_s1611" name="Equation" r:id="rId11" imgW="685800" imgH="241300" progId="Equation.3">
                   <p:embed/>
                 </p:oleObj>
               </mc:Choice>
@@ -9546,7 +9546,7 @@
           <a:graphicData uri="http://schemas.openxmlformats.org/presentationml/2006/ole">
             <mc:AlternateContent xmlns:mc="http://schemas.openxmlformats.org/markup-compatibility/2006">
               <mc:Choice xmlns:v="urn:schemas-microsoft-com:vml" Requires="v">
-                <p:oleObj spid="_x0000_s1582" name="Equation" r:id="rId13" imgW="698500" imgH="254000" progId="Equation.3">
+                <p:oleObj spid="_x0000_s1612" name="Equation" r:id="rId13" imgW="698500" imgH="254000" progId="Equation.3">
                   <p:embed/>
                 </p:oleObj>
               </mc:Choice>
@@ -10846,7 +10846,7 @@
           <a:graphicData uri="http://schemas.openxmlformats.org/presentationml/2006/ole">
             <mc:AlternateContent xmlns:mc="http://schemas.openxmlformats.org/markup-compatibility/2006">
               <mc:Choice xmlns:v="urn:schemas-microsoft-com:vml" Requires="v">
-                <p:oleObj spid="_x0000_s1583" name="Equation" r:id="rId15" imgW="165100" imgH="241300" progId="Equation.3">
+                <p:oleObj spid="_x0000_s1613" name="Equation" r:id="rId15" imgW="165100" imgH="241300" progId="Equation.3">
                   <p:embed/>
                 </p:oleObj>
               </mc:Choice>
@@ -11103,7 +11103,7 @@
           <a:graphicData uri="http://schemas.openxmlformats.org/presentationml/2006/ole">
             <mc:AlternateContent xmlns:mc="http://schemas.openxmlformats.org/markup-compatibility/2006">
               <mc:Choice xmlns:v="urn:schemas-microsoft-com:vml" Requires="v">
-                <p:oleObj spid="_x0000_s1584" name="Equation" r:id="rId16" imgW="190500" imgH="254000" progId="Equation.3">
+                <p:oleObj spid="_x0000_s1614" name="Equation" r:id="rId16" imgW="190500" imgH="254000" progId="Equation.3">
                   <p:embed/>
                 </p:oleObj>
               </mc:Choice>
@@ -11171,7 +11171,7 @@
           <a:graphicData uri="http://schemas.openxmlformats.org/presentationml/2006/ole">
             <mc:AlternateContent xmlns:mc="http://schemas.openxmlformats.org/markup-compatibility/2006">
               <mc:Choice xmlns:v="urn:schemas-microsoft-com:vml" Requires="v">
-                <p:oleObj spid="_x0000_s1585" name="Equation" r:id="rId17" imgW="190500" imgH="254000" progId="Equation.3">
+                <p:oleObj spid="_x0000_s1615" name="Equation" r:id="rId17" imgW="190500" imgH="254000" progId="Equation.3">
                   <p:embed/>
                 </p:oleObj>
               </mc:Choice>
@@ -12446,7 +12446,7 @@
           <a:graphicData uri="http://schemas.openxmlformats.org/presentationml/2006/ole">
             <mc:AlternateContent xmlns:mc="http://schemas.openxmlformats.org/markup-compatibility/2006">
               <mc:Choice xmlns:v="urn:schemas-microsoft-com:vml" Requires="v">
-                <p:oleObj spid="_x0000_s1586" name="Equation" r:id="rId18" imgW="190500" imgH="241300" progId="Equation.3">
+                <p:oleObj spid="_x0000_s1616" name="Equation" r:id="rId18" imgW="190500" imgH="241300" progId="Equation.3">
                   <p:embed/>
                 </p:oleObj>
               </mc:Choice>
@@ -12703,7 +12703,7 @@
           <a:graphicData uri="http://schemas.openxmlformats.org/presentationml/2006/ole">
             <mc:AlternateContent xmlns:mc="http://schemas.openxmlformats.org/markup-compatibility/2006">
               <mc:Choice xmlns:v="urn:schemas-microsoft-com:vml" Requires="v">
-                <p:oleObj spid="_x0000_s1587" name="Equation" r:id="rId20" imgW="190500" imgH="254000" progId="Equation.3">
+                <p:oleObj spid="_x0000_s1617" name="Equation" r:id="rId20" imgW="190500" imgH="254000" progId="Equation.3">
                   <p:embed/>
                 </p:oleObj>
               </mc:Choice>
@@ -12771,7 +12771,7 @@
           <a:graphicData uri="http://schemas.openxmlformats.org/presentationml/2006/ole">
             <mc:AlternateContent xmlns:mc="http://schemas.openxmlformats.org/markup-compatibility/2006">
               <mc:Choice xmlns:v="urn:schemas-microsoft-com:vml" Requires="v">
-                <p:oleObj spid="_x0000_s1588" name="Equation" r:id="rId22" imgW="190500" imgH="254000" progId="Equation.3">
+                <p:oleObj spid="_x0000_s1618" name="Equation" r:id="rId22" imgW="190500" imgH="254000" progId="Equation.3">
                   <p:embed/>
                 </p:oleObj>
               </mc:Choice>
@@ -14139,7 +14139,7 @@
           <a:graphicData uri="http://schemas.openxmlformats.org/presentationml/2006/ole">
             <mc:AlternateContent xmlns:mc="http://schemas.openxmlformats.org/markup-compatibility/2006">
               <mc:Choice xmlns:v="urn:schemas-microsoft-com:vml" Requires="v">
-                <p:oleObj spid="_x0000_s1589" name="Equation" r:id="rId24" imgW="190500" imgH="241300" progId="Equation.3">
+                <p:oleObj spid="_x0000_s1619" name="Equation" r:id="rId24" imgW="190500" imgH="241300" progId="Equation.3">
                   <p:embed/>
                 </p:oleObj>
               </mc:Choice>
@@ -14396,7 +14396,7 @@
           <a:graphicData uri="http://schemas.openxmlformats.org/presentationml/2006/ole">
             <mc:AlternateContent xmlns:mc="http://schemas.openxmlformats.org/markup-compatibility/2006">
               <mc:Choice xmlns:v="urn:schemas-microsoft-com:vml" Requires="v">
-                <p:oleObj spid="_x0000_s1590" name="Equation" r:id="rId26" imgW="190500" imgH="254000" progId="Equation.3">
+                <p:oleObj spid="_x0000_s1620" name="Equation" r:id="rId26" imgW="190500" imgH="254000" progId="Equation.3">
                   <p:embed/>
                 </p:oleObj>
               </mc:Choice>
@@ -14464,7 +14464,7 @@
           <a:graphicData uri="http://schemas.openxmlformats.org/presentationml/2006/ole">
             <mc:AlternateContent xmlns:mc="http://schemas.openxmlformats.org/markup-compatibility/2006">
               <mc:Choice xmlns:v="urn:schemas-microsoft-com:vml" Requires="v">
-                <p:oleObj spid="_x0000_s1591" name="Equation" r:id="rId28" imgW="190500" imgH="254000" progId="Equation.3">
+                <p:oleObj spid="_x0000_s1621" name="Equation" r:id="rId28" imgW="190500" imgH="254000" progId="Equation.3">
                   <p:embed/>
                 </p:oleObj>
               </mc:Choice>
@@ -15135,7 +15135,7 @@
         </p:nvSpPr>
         <p:spPr>
           <a:xfrm>
-            <a:off x="5041989" y="5565398"/>
+            <a:off x="5158256" y="5565398"/>
             <a:ext cx="278586" cy="283209"/>
           </a:xfrm>
           <a:prstGeom prst="rect">
@@ -15185,7 +15185,7 @@
         </p:nvSpPr>
         <p:spPr>
           <a:xfrm>
-            <a:off x="5466484" y="5565398"/>
+            <a:off x="5614527" y="5574107"/>
             <a:ext cx="261908" cy="283209"/>
           </a:xfrm>
           <a:prstGeom prst="rect">
@@ -16194,7 +16194,7 @@
           <a:graphicData uri="http://schemas.openxmlformats.org/presentationml/2006/ole">
             <mc:AlternateContent xmlns:mc="http://schemas.openxmlformats.org/markup-compatibility/2006">
               <mc:Choice xmlns:v="urn:schemas-microsoft-com:vml" Requires="v">
-                <p:oleObj spid="_x0000_s2109" name="Equation" r:id="rId4" imgW="190440" imgH="228600" progId="Equation.3">
+                <p:oleObj spid="_x0000_s2131" name="Equation" r:id="rId4" imgW="190440" imgH="228600" progId="Equation.3">
                   <p:embed/>
                 </p:oleObj>
               </mc:Choice>
@@ -16250,7 +16250,7 @@
         </p:nvSpPr>
         <p:spPr>
           <a:xfrm>
-            <a:off x="4177216" y="5565398"/>
+            <a:off x="4053888" y="5565398"/>
             <a:ext cx="278586" cy="283209"/>
           </a:xfrm>
           <a:prstGeom prst="rect">
@@ -16300,7 +16300,7 @@
         </p:nvSpPr>
         <p:spPr>
           <a:xfrm>
-            <a:off x="4614411" y="5565398"/>
+            <a:off x="4578294" y="5565398"/>
             <a:ext cx="261908" cy="283209"/>
           </a:xfrm>
           <a:prstGeom prst="rect">
@@ -16661,7 +16661,7 @@
           <a:graphicData uri="http://schemas.openxmlformats.org/presentationml/2006/ole">
             <mc:AlternateContent xmlns:mc="http://schemas.openxmlformats.org/markup-compatibility/2006">
               <mc:Choice xmlns:v="urn:schemas-microsoft-com:vml" Requires="v">
-                <p:oleObj spid="_x0000_s2110" name="Equation" r:id="rId6" imgW="660240" imgH="215640" progId="Equation.3">
+                <p:oleObj spid="_x0000_s2132" name="Equation" r:id="rId6" imgW="660240" imgH="215640" progId="Equation.3">
                   <p:embed/>
                 </p:oleObj>
               </mc:Choice>
@@ -16724,7 +16724,7 @@
           <a:graphicData uri="http://schemas.openxmlformats.org/presentationml/2006/ole">
             <mc:AlternateContent xmlns:mc="http://schemas.openxmlformats.org/markup-compatibility/2006">
               <mc:Choice xmlns:v="urn:schemas-microsoft-com:vml" Requires="v">
-                <p:oleObj spid="_x0000_s2111" name="Equation" r:id="rId8" imgW="698500" imgH="254000" progId="Equation.3">
+                <p:oleObj spid="_x0000_s2133" name="Equation" r:id="rId8" imgW="698500" imgH="254000" progId="Equation.3">
                   <p:embed/>
                 </p:oleObj>
               </mc:Choice>
@@ -16822,7 +16822,7 @@
         </p:nvSpPr>
         <p:spPr>
           <a:xfrm>
-            <a:off x="3790246" y="6163275"/>
+            <a:off x="3877336" y="6171984"/>
             <a:ext cx="2408288" cy="523220"/>
           </a:xfrm>
           <a:prstGeom prst="rect">
@@ -16911,12 +16911,14 @@
       <p:cxnSp>
         <p:nvCxnSpPr>
           <p:cNvPr id="432" name="Straight Arrow Connector 431"/>
-          <p:cNvCxnSpPr/>
+          <p:cNvCxnSpPr>
+            <a:cxnSpLocks/>
+          </p:cNvCxnSpPr>
           <p:nvPr/>
         </p:nvCxnSpPr>
         <p:spPr>
           <a:xfrm flipV="1">
-            <a:off x="5145838" y="5874727"/>
+            <a:off x="5232928" y="5883436"/>
             <a:ext cx="377747" cy="288548"/>
           </a:xfrm>
           <a:prstGeom prst="straightConnector1">
@@ -18867,7 +18869,7 @@
           <a:graphicData uri="http://schemas.openxmlformats.org/presentationml/2006/ole">
             <mc:AlternateContent xmlns:mc="http://schemas.openxmlformats.org/markup-compatibility/2006">
               <mc:Choice xmlns:v="urn:schemas-microsoft-com:vml" Requires="v">
-                <p:oleObj spid="_x0000_s2112" name="Equation" r:id="rId10" imgW="190440" imgH="228600" progId="Equation.3">
+                <p:oleObj spid="_x0000_s2134" name="Equation" r:id="rId10" imgW="190440" imgH="228600" progId="Equation.3">
                   <p:embed/>
                 </p:oleObj>
               </mc:Choice>
@@ -20418,7 +20420,7 @@
           <a:graphicData uri="http://schemas.openxmlformats.org/presentationml/2006/ole">
             <mc:AlternateContent xmlns:mc="http://schemas.openxmlformats.org/markup-compatibility/2006">
               <mc:Choice xmlns:v="urn:schemas-microsoft-com:vml" Requires="v">
-                <p:oleObj spid="_x0000_s2113" name="Equation" r:id="rId13" imgW="203040" imgH="228600" progId="Equation.3">
+                <p:oleObj spid="_x0000_s2135" name="Equation" r:id="rId13" imgW="203040" imgH="228600" progId="Equation.3">
                   <p:embed/>
                 </p:oleObj>
               </mc:Choice>
@@ -20492,7 +20494,7 @@
           <a:graphicData uri="http://schemas.openxmlformats.org/presentationml/2006/ole">
             <mc:AlternateContent xmlns:mc="http://schemas.openxmlformats.org/markup-compatibility/2006">
               <mc:Choice xmlns:v="urn:schemas-microsoft-com:vml" Requires="v">
-                <p:oleObj spid="_x0000_s2114" name="Equation" r:id="rId15" imgW="203040" imgH="228600" progId="Equation.3">
+                <p:oleObj spid="_x0000_s2136" name="Equation" r:id="rId15" imgW="203040" imgH="228600" progId="Equation.3">
                   <p:embed/>
                 </p:oleObj>
               </mc:Choice>
@@ -20572,7 +20574,7 @@
           <a:graphicData uri="http://schemas.openxmlformats.org/presentationml/2006/ole">
             <mc:AlternateContent xmlns:mc="http://schemas.openxmlformats.org/markup-compatibility/2006">
               <mc:Choice xmlns:v="urn:schemas-microsoft-com:vml" Requires="v">
-                <p:oleObj spid="_x0000_s2115" name="Equation" r:id="rId16" imgW="203040" imgH="228600" progId="Equation.3">
+                <p:oleObj spid="_x0000_s2137" name="Equation" r:id="rId16" imgW="203040" imgH="228600" progId="Equation.3">
                   <p:embed/>
                 </p:oleObj>
               </mc:Choice>
@@ -20652,7 +20654,7 @@
           <a:graphicData uri="http://schemas.openxmlformats.org/presentationml/2006/ole">
             <mc:AlternateContent xmlns:mc="http://schemas.openxmlformats.org/markup-compatibility/2006">
               <mc:Choice xmlns:v="urn:schemas-microsoft-com:vml" Requires="v">
-                <p:oleObj spid="_x0000_s2116" name="Equation" r:id="rId17" imgW="203040" imgH="228600" progId="Equation.3">
+                <p:oleObj spid="_x0000_s2138" name="Equation" r:id="rId17" imgW="203040" imgH="228600" progId="Equation.3">
                   <p:embed/>
                 </p:oleObj>
               </mc:Choice>
@@ -20732,7 +20734,7 @@
           <a:graphicData uri="http://schemas.openxmlformats.org/presentationml/2006/ole">
             <mc:AlternateContent xmlns:mc="http://schemas.openxmlformats.org/markup-compatibility/2006">
               <mc:Choice xmlns:v="urn:schemas-microsoft-com:vml" Requires="v">
-                <p:oleObj spid="_x0000_s2117" name="Equation" r:id="rId19" imgW="203040" imgH="228600" progId="Equation.3">
+                <p:oleObj spid="_x0000_s2139" name="Equation" r:id="rId19" imgW="203040" imgH="228600" progId="Equation.3">
                   <p:embed/>
                 </p:oleObj>
               </mc:Choice>
@@ -20812,7 +20814,7 @@
           <a:graphicData uri="http://schemas.openxmlformats.org/presentationml/2006/ole">
             <mc:AlternateContent xmlns:mc="http://schemas.openxmlformats.org/markup-compatibility/2006">
               <mc:Choice xmlns:v="urn:schemas-microsoft-com:vml" Requires="v">
-                <p:oleObj spid="_x0000_s2118" name="Equation" r:id="rId21" imgW="203040" imgH="228600" progId="Equation.3">
+                <p:oleObj spid="_x0000_s2140" name="Equation" r:id="rId21" imgW="203040" imgH="228600" progId="Equation.3">
                   <p:embed/>
                 </p:oleObj>
               </mc:Choice>
@@ -21151,6 +21153,1333 @@
           </a:fontRef>
         </p:style>
       </p:cxnSp>
+      <p:sp>
+        <p:nvSpPr>
+          <p:cNvPr id="2" name="Rectangle 1">
+            <a:extLst>
+              <a:ext uri="{FF2B5EF4-FFF2-40B4-BE49-F238E27FC236}">
+                <a16:creationId xmlns:a16="http://schemas.microsoft.com/office/drawing/2014/main" id="{F8C42682-6360-4603-9F10-62CDFE559014}"/>
+              </a:ext>
+            </a:extLst>
+          </p:cNvPr>
+          <p:cNvSpPr/>
+          <p:nvPr/>
+        </p:nvSpPr>
+        <p:spPr>
+          <a:xfrm>
+            <a:off x="6659418" y="3762229"/>
+            <a:ext cx="104503" cy="67016"/>
+          </a:xfrm>
+          <a:prstGeom prst="rect">
+            <a:avLst/>
+          </a:prstGeom>
+          <a:ln>
+            <a:solidFill>
+              <a:schemeClr val="bg1"/>
+            </a:solidFill>
+          </a:ln>
+        </p:spPr>
+        <p:style>
+          <a:lnRef idx="2">
+            <a:schemeClr val="dk1"/>
+          </a:lnRef>
+          <a:fillRef idx="1">
+            <a:schemeClr val="lt1"/>
+          </a:fillRef>
+          <a:effectRef idx="0">
+            <a:schemeClr val="dk1"/>
+          </a:effectRef>
+          <a:fontRef idx="minor">
+            <a:schemeClr val="dk1"/>
+          </a:fontRef>
+        </p:style>
+        <p:txBody>
+          <a:bodyPr rtlCol="0" anchor="ctr"/>
+          <a:lstStyle/>
+          <a:p>
+            <a:pPr algn="ctr"/>
+            <a:endParaRPr lang="en-US"/>
+          </a:p>
+        </p:txBody>
+      </p:sp>
+      <p:sp>
+        <p:nvSpPr>
+          <p:cNvPr id="142" name="Rectangle 141">
+            <a:extLst>
+              <a:ext uri="{FF2B5EF4-FFF2-40B4-BE49-F238E27FC236}">
+                <a16:creationId xmlns:a16="http://schemas.microsoft.com/office/drawing/2014/main" id="{E0E1B636-2557-4F23-93A1-54296DA6030A}"/>
+              </a:ext>
+            </a:extLst>
+          </p:cNvPr>
+          <p:cNvSpPr/>
+          <p:nvPr/>
+        </p:nvSpPr>
+        <p:spPr>
+          <a:xfrm>
+            <a:off x="7282075" y="3766584"/>
+            <a:ext cx="104503" cy="67016"/>
+          </a:xfrm>
+          <a:prstGeom prst="rect">
+            <a:avLst/>
+          </a:prstGeom>
+          <a:ln>
+            <a:solidFill>
+              <a:schemeClr val="bg1"/>
+            </a:solidFill>
+          </a:ln>
+        </p:spPr>
+        <p:style>
+          <a:lnRef idx="2">
+            <a:schemeClr val="dk1"/>
+          </a:lnRef>
+          <a:fillRef idx="1">
+            <a:schemeClr val="lt1"/>
+          </a:fillRef>
+          <a:effectRef idx="0">
+            <a:schemeClr val="dk1"/>
+          </a:effectRef>
+          <a:fontRef idx="minor">
+            <a:schemeClr val="dk1"/>
+          </a:fontRef>
+        </p:style>
+        <p:txBody>
+          <a:bodyPr rtlCol="0" anchor="ctr"/>
+          <a:lstStyle/>
+          <a:p>
+            <a:pPr algn="ctr"/>
+            <a:endParaRPr lang="en-US"/>
+          </a:p>
+        </p:txBody>
+      </p:sp>
+      <p:sp>
+        <p:nvSpPr>
+          <p:cNvPr id="143" name="Rectangle 142">
+            <a:extLst>
+              <a:ext uri="{FF2B5EF4-FFF2-40B4-BE49-F238E27FC236}">
+                <a16:creationId xmlns:a16="http://schemas.microsoft.com/office/drawing/2014/main" id="{E26B205B-EBDA-4BDF-B345-290E9B07EF85}"/>
+              </a:ext>
+            </a:extLst>
+          </p:cNvPr>
+          <p:cNvSpPr/>
+          <p:nvPr/>
+        </p:nvSpPr>
+        <p:spPr>
+          <a:xfrm>
+            <a:off x="8063031" y="3761718"/>
+            <a:ext cx="104503" cy="67016"/>
+          </a:xfrm>
+          <a:prstGeom prst="rect">
+            <a:avLst/>
+          </a:prstGeom>
+          <a:ln>
+            <a:solidFill>
+              <a:schemeClr val="bg1"/>
+            </a:solidFill>
+          </a:ln>
+        </p:spPr>
+        <p:style>
+          <a:lnRef idx="2">
+            <a:schemeClr val="dk1"/>
+          </a:lnRef>
+          <a:fillRef idx="1">
+            <a:schemeClr val="lt1"/>
+          </a:fillRef>
+          <a:effectRef idx="0">
+            <a:schemeClr val="dk1"/>
+          </a:effectRef>
+          <a:fontRef idx="minor">
+            <a:schemeClr val="dk1"/>
+          </a:fontRef>
+        </p:style>
+        <p:txBody>
+          <a:bodyPr rtlCol="0" anchor="ctr"/>
+          <a:lstStyle/>
+          <a:p>
+            <a:pPr algn="ctr"/>
+            <a:endParaRPr lang="en-US"/>
+          </a:p>
+        </p:txBody>
+      </p:sp>
+      <p:sp>
+        <p:nvSpPr>
+          <p:cNvPr id="144" name="Rectangle 143">
+            <a:extLst>
+              <a:ext uri="{FF2B5EF4-FFF2-40B4-BE49-F238E27FC236}">
+                <a16:creationId xmlns:a16="http://schemas.microsoft.com/office/drawing/2014/main" id="{C7A3A45B-394D-470A-BD52-B8616C049DA2}"/>
+              </a:ext>
+            </a:extLst>
+          </p:cNvPr>
+          <p:cNvSpPr/>
+          <p:nvPr/>
+        </p:nvSpPr>
+        <p:spPr>
+          <a:xfrm>
+            <a:off x="8666743" y="3775287"/>
+            <a:ext cx="104503" cy="67016"/>
+          </a:xfrm>
+          <a:prstGeom prst="rect">
+            <a:avLst/>
+          </a:prstGeom>
+          <a:ln>
+            <a:solidFill>
+              <a:schemeClr val="bg1"/>
+            </a:solidFill>
+          </a:ln>
+        </p:spPr>
+        <p:style>
+          <a:lnRef idx="2">
+            <a:schemeClr val="dk1"/>
+          </a:lnRef>
+          <a:fillRef idx="1">
+            <a:schemeClr val="lt1"/>
+          </a:fillRef>
+          <a:effectRef idx="0">
+            <a:schemeClr val="dk1"/>
+          </a:effectRef>
+          <a:fontRef idx="minor">
+            <a:schemeClr val="dk1"/>
+          </a:fontRef>
+        </p:style>
+        <p:txBody>
+          <a:bodyPr rtlCol="0" anchor="ctr"/>
+          <a:lstStyle/>
+          <a:p>
+            <a:pPr algn="ctr"/>
+            <a:endParaRPr lang="en-US"/>
+          </a:p>
+        </p:txBody>
+      </p:sp>
+      <p:sp>
+        <p:nvSpPr>
+          <p:cNvPr id="146" name="Rectangle 145">
+            <a:extLst>
+              <a:ext uri="{FF2B5EF4-FFF2-40B4-BE49-F238E27FC236}">
+                <a16:creationId xmlns:a16="http://schemas.microsoft.com/office/drawing/2014/main" id="{28A31DB7-3D36-4199-B944-9E59C4142DDD}"/>
+              </a:ext>
+            </a:extLst>
+          </p:cNvPr>
+          <p:cNvSpPr/>
+          <p:nvPr/>
+        </p:nvSpPr>
+        <p:spPr>
+          <a:xfrm>
+            <a:off x="6734458" y="3377522"/>
+            <a:ext cx="104503" cy="56342"/>
+          </a:xfrm>
+          <a:prstGeom prst="rect">
+            <a:avLst/>
+          </a:prstGeom>
+          <a:ln>
+            <a:solidFill>
+              <a:schemeClr val="bg1"/>
+            </a:solidFill>
+          </a:ln>
+        </p:spPr>
+        <p:style>
+          <a:lnRef idx="2">
+            <a:schemeClr val="dk1"/>
+          </a:lnRef>
+          <a:fillRef idx="1">
+            <a:schemeClr val="lt1"/>
+          </a:fillRef>
+          <a:effectRef idx="0">
+            <a:schemeClr val="dk1"/>
+          </a:effectRef>
+          <a:fontRef idx="minor">
+            <a:schemeClr val="dk1"/>
+          </a:fontRef>
+        </p:style>
+        <p:txBody>
+          <a:bodyPr rtlCol="0" anchor="ctr"/>
+          <a:lstStyle/>
+          <a:p>
+            <a:pPr algn="ctr"/>
+            <a:endParaRPr lang="en-US"/>
+          </a:p>
+        </p:txBody>
+      </p:sp>
+      <p:sp>
+        <p:nvSpPr>
+          <p:cNvPr id="148" name="Rectangle 147">
+            <a:extLst>
+              <a:ext uri="{FF2B5EF4-FFF2-40B4-BE49-F238E27FC236}">
+                <a16:creationId xmlns:a16="http://schemas.microsoft.com/office/drawing/2014/main" id="{2A1C0997-DE70-48BC-945F-8E00B79B8256}"/>
+              </a:ext>
+            </a:extLst>
+          </p:cNvPr>
+          <p:cNvSpPr/>
+          <p:nvPr/>
+        </p:nvSpPr>
+        <p:spPr>
+          <a:xfrm>
+            <a:off x="7346703" y="3366848"/>
+            <a:ext cx="104503" cy="67016"/>
+          </a:xfrm>
+          <a:prstGeom prst="rect">
+            <a:avLst/>
+          </a:prstGeom>
+          <a:ln>
+            <a:solidFill>
+              <a:schemeClr val="bg1"/>
+            </a:solidFill>
+          </a:ln>
+        </p:spPr>
+        <p:style>
+          <a:lnRef idx="2">
+            <a:schemeClr val="dk1"/>
+          </a:lnRef>
+          <a:fillRef idx="1">
+            <a:schemeClr val="lt1"/>
+          </a:fillRef>
+          <a:effectRef idx="0">
+            <a:schemeClr val="dk1"/>
+          </a:effectRef>
+          <a:fontRef idx="minor">
+            <a:schemeClr val="dk1"/>
+          </a:fontRef>
+        </p:style>
+        <p:txBody>
+          <a:bodyPr rtlCol="0" anchor="ctr"/>
+          <a:lstStyle/>
+          <a:p>
+            <a:pPr algn="ctr"/>
+            <a:endParaRPr lang="en-US"/>
+          </a:p>
+        </p:txBody>
+      </p:sp>
+      <p:sp>
+        <p:nvSpPr>
+          <p:cNvPr id="149" name="Rectangle 148">
+            <a:extLst>
+              <a:ext uri="{FF2B5EF4-FFF2-40B4-BE49-F238E27FC236}">
+                <a16:creationId xmlns:a16="http://schemas.microsoft.com/office/drawing/2014/main" id="{25B3525D-E1EE-4FC7-8280-8E1C2B6056CC}"/>
+              </a:ext>
+            </a:extLst>
+          </p:cNvPr>
+          <p:cNvSpPr/>
+          <p:nvPr/>
+        </p:nvSpPr>
+        <p:spPr>
+          <a:xfrm>
+            <a:off x="8144272" y="3389102"/>
+            <a:ext cx="104503" cy="67016"/>
+          </a:xfrm>
+          <a:prstGeom prst="rect">
+            <a:avLst/>
+          </a:prstGeom>
+          <a:ln>
+            <a:solidFill>
+              <a:schemeClr val="bg1"/>
+            </a:solidFill>
+          </a:ln>
+        </p:spPr>
+        <p:style>
+          <a:lnRef idx="2">
+            <a:schemeClr val="dk1"/>
+          </a:lnRef>
+          <a:fillRef idx="1">
+            <a:schemeClr val="lt1"/>
+          </a:fillRef>
+          <a:effectRef idx="0">
+            <a:schemeClr val="dk1"/>
+          </a:effectRef>
+          <a:fontRef idx="minor">
+            <a:schemeClr val="dk1"/>
+          </a:fontRef>
+        </p:style>
+        <p:txBody>
+          <a:bodyPr rtlCol="0" anchor="ctr"/>
+          <a:lstStyle/>
+          <a:p>
+            <a:pPr algn="ctr"/>
+            <a:endParaRPr lang="en-US"/>
+          </a:p>
+        </p:txBody>
+      </p:sp>
+      <p:sp>
+        <p:nvSpPr>
+          <p:cNvPr id="150" name="Rectangle 149">
+            <a:extLst>
+              <a:ext uri="{FF2B5EF4-FFF2-40B4-BE49-F238E27FC236}">
+                <a16:creationId xmlns:a16="http://schemas.microsoft.com/office/drawing/2014/main" id="{454DFC46-1515-4C9A-8C17-E1459B5AB442}"/>
+              </a:ext>
+            </a:extLst>
+          </p:cNvPr>
+          <p:cNvSpPr/>
+          <p:nvPr/>
+        </p:nvSpPr>
+        <p:spPr>
+          <a:xfrm>
+            <a:off x="8746228" y="3369638"/>
+            <a:ext cx="104503" cy="67016"/>
+          </a:xfrm>
+          <a:prstGeom prst="rect">
+            <a:avLst/>
+          </a:prstGeom>
+          <a:ln>
+            <a:solidFill>
+              <a:schemeClr val="bg1"/>
+            </a:solidFill>
+          </a:ln>
+        </p:spPr>
+        <p:style>
+          <a:lnRef idx="2">
+            <a:schemeClr val="dk1"/>
+          </a:lnRef>
+          <a:fillRef idx="1">
+            <a:schemeClr val="lt1"/>
+          </a:fillRef>
+          <a:effectRef idx="0">
+            <a:schemeClr val="dk1"/>
+          </a:effectRef>
+          <a:fontRef idx="minor">
+            <a:schemeClr val="dk1"/>
+          </a:fontRef>
+        </p:style>
+        <p:txBody>
+          <a:bodyPr rtlCol="0" anchor="ctr"/>
+          <a:lstStyle/>
+          <a:p>
+            <a:pPr algn="ctr"/>
+            <a:endParaRPr lang="en-US"/>
+          </a:p>
+        </p:txBody>
+      </p:sp>
+      <p:sp>
+        <p:nvSpPr>
+          <p:cNvPr id="151" name="Rectangle 150">
+            <a:extLst>
+              <a:ext uri="{FF2B5EF4-FFF2-40B4-BE49-F238E27FC236}">
+                <a16:creationId xmlns:a16="http://schemas.microsoft.com/office/drawing/2014/main" id="{E89B2715-E5EE-4100-B3F1-B1C714279957}"/>
+              </a:ext>
+            </a:extLst>
+          </p:cNvPr>
+          <p:cNvSpPr/>
+          <p:nvPr/>
+        </p:nvSpPr>
+        <p:spPr>
+          <a:xfrm>
+            <a:off x="6748543" y="3179832"/>
+            <a:ext cx="104503" cy="67016"/>
+          </a:xfrm>
+          <a:prstGeom prst="rect">
+            <a:avLst/>
+          </a:prstGeom>
+          <a:ln>
+            <a:solidFill>
+              <a:schemeClr val="bg1"/>
+            </a:solidFill>
+          </a:ln>
+        </p:spPr>
+        <p:style>
+          <a:lnRef idx="2">
+            <a:schemeClr val="dk1"/>
+          </a:lnRef>
+          <a:fillRef idx="1">
+            <a:schemeClr val="lt1"/>
+          </a:fillRef>
+          <a:effectRef idx="0">
+            <a:schemeClr val="dk1"/>
+          </a:effectRef>
+          <a:fontRef idx="minor">
+            <a:schemeClr val="dk1"/>
+          </a:fontRef>
+        </p:style>
+        <p:txBody>
+          <a:bodyPr rtlCol="0" anchor="ctr"/>
+          <a:lstStyle/>
+          <a:p>
+            <a:pPr algn="ctr"/>
+            <a:endParaRPr lang="en-US"/>
+          </a:p>
+        </p:txBody>
+      </p:sp>
+      <p:sp>
+        <p:nvSpPr>
+          <p:cNvPr id="152" name="Rectangle 151">
+            <a:extLst>
+              <a:ext uri="{FF2B5EF4-FFF2-40B4-BE49-F238E27FC236}">
+                <a16:creationId xmlns:a16="http://schemas.microsoft.com/office/drawing/2014/main" id="{D1E4ADEC-44B2-41E8-9828-07A8C1D21A0A}"/>
+              </a:ext>
+            </a:extLst>
+          </p:cNvPr>
+          <p:cNvSpPr/>
+          <p:nvPr/>
+        </p:nvSpPr>
+        <p:spPr>
+          <a:xfrm>
+            <a:off x="7352674" y="3170429"/>
+            <a:ext cx="90943" cy="76419"/>
+          </a:xfrm>
+          <a:prstGeom prst="rect">
+            <a:avLst/>
+          </a:prstGeom>
+          <a:ln>
+            <a:solidFill>
+              <a:schemeClr val="bg1"/>
+            </a:solidFill>
+          </a:ln>
+        </p:spPr>
+        <p:style>
+          <a:lnRef idx="2">
+            <a:schemeClr val="dk1"/>
+          </a:lnRef>
+          <a:fillRef idx="1">
+            <a:schemeClr val="lt1"/>
+          </a:fillRef>
+          <a:effectRef idx="0">
+            <a:schemeClr val="dk1"/>
+          </a:effectRef>
+          <a:fontRef idx="minor">
+            <a:schemeClr val="dk1"/>
+          </a:fontRef>
+        </p:style>
+        <p:txBody>
+          <a:bodyPr rtlCol="0" anchor="ctr"/>
+          <a:lstStyle/>
+          <a:p>
+            <a:pPr algn="ctr"/>
+            <a:endParaRPr lang="en-US"/>
+          </a:p>
+        </p:txBody>
+      </p:sp>
+      <p:sp>
+        <p:nvSpPr>
+          <p:cNvPr id="153" name="Rectangle 152">
+            <a:extLst>
+              <a:ext uri="{FF2B5EF4-FFF2-40B4-BE49-F238E27FC236}">
+                <a16:creationId xmlns:a16="http://schemas.microsoft.com/office/drawing/2014/main" id="{130D41B3-5734-48A0-96CE-113D4A443714}"/>
+              </a:ext>
+            </a:extLst>
+          </p:cNvPr>
+          <p:cNvSpPr/>
+          <p:nvPr/>
+        </p:nvSpPr>
+        <p:spPr>
+          <a:xfrm>
+            <a:off x="8144182" y="3177504"/>
+            <a:ext cx="104503" cy="67016"/>
+          </a:xfrm>
+          <a:prstGeom prst="rect">
+            <a:avLst/>
+          </a:prstGeom>
+          <a:ln>
+            <a:solidFill>
+              <a:schemeClr val="bg1"/>
+            </a:solidFill>
+          </a:ln>
+        </p:spPr>
+        <p:style>
+          <a:lnRef idx="2">
+            <a:schemeClr val="dk1"/>
+          </a:lnRef>
+          <a:fillRef idx="1">
+            <a:schemeClr val="lt1"/>
+          </a:fillRef>
+          <a:effectRef idx="0">
+            <a:schemeClr val="dk1"/>
+          </a:effectRef>
+          <a:fontRef idx="minor">
+            <a:schemeClr val="dk1"/>
+          </a:fontRef>
+        </p:style>
+        <p:txBody>
+          <a:bodyPr rtlCol="0" anchor="ctr"/>
+          <a:lstStyle/>
+          <a:p>
+            <a:pPr algn="ctr"/>
+            <a:endParaRPr lang="en-US"/>
+          </a:p>
+        </p:txBody>
+      </p:sp>
+      <p:sp>
+        <p:nvSpPr>
+          <p:cNvPr id="154" name="Rectangle 153">
+            <a:extLst>
+              <a:ext uri="{FF2B5EF4-FFF2-40B4-BE49-F238E27FC236}">
+                <a16:creationId xmlns:a16="http://schemas.microsoft.com/office/drawing/2014/main" id="{C2C1194B-CE3B-4EE7-B2C8-CE346FE3AF12}"/>
+              </a:ext>
+            </a:extLst>
+          </p:cNvPr>
+          <p:cNvSpPr/>
+          <p:nvPr/>
+        </p:nvSpPr>
+        <p:spPr>
+          <a:xfrm>
+            <a:off x="8746228" y="3168356"/>
+            <a:ext cx="104503" cy="67016"/>
+          </a:xfrm>
+          <a:prstGeom prst="rect">
+            <a:avLst/>
+          </a:prstGeom>
+          <a:ln>
+            <a:solidFill>
+              <a:schemeClr val="bg1"/>
+            </a:solidFill>
+          </a:ln>
+        </p:spPr>
+        <p:style>
+          <a:lnRef idx="2">
+            <a:schemeClr val="dk1"/>
+          </a:lnRef>
+          <a:fillRef idx="1">
+            <a:schemeClr val="lt1"/>
+          </a:fillRef>
+          <a:effectRef idx="0">
+            <a:schemeClr val="dk1"/>
+          </a:effectRef>
+          <a:fontRef idx="minor">
+            <a:schemeClr val="dk1"/>
+          </a:fontRef>
+        </p:style>
+        <p:txBody>
+          <a:bodyPr rtlCol="0" anchor="ctr"/>
+          <a:lstStyle/>
+          <a:p>
+            <a:pPr algn="ctr"/>
+            <a:endParaRPr lang="en-US"/>
+          </a:p>
+        </p:txBody>
+      </p:sp>
+      <p:sp>
+        <p:nvSpPr>
+          <p:cNvPr id="155" name="Rectangle 154">
+            <a:extLst>
+              <a:ext uri="{FF2B5EF4-FFF2-40B4-BE49-F238E27FC236}">
+                <a16:creationId xmlns:a16="http://schemas.microsoft.com/office/drawing/2014/main" id="{278C56D2-922D-463D-9EA0-02FD84E828BA}"/>
+              </a:ext>
+            </a:extLst>
+          </p:cNvPr>
+          <p:cNvSpPr/>
+          <p:nvPr/>
+        </p:nvSpPr>
+        <p:spPr>
+          <a:xfrm>
+            <a:off x="6734458" y="2788444"/>
+            <a:ext cx="104503" cy="67016"/>
+          </a:xfrm>
+          <a:prstGeom prst="rect">
+            <a:avLst/>
+          </a:prstGeom>
+          <a:ln>
+            <a:solidFill>
+              <a:schemeClr val="bg1"/>
+            </a:solidFill>
+          </a:ln>
+        </p:spPr>
+        <p:style>
+          <a:lnRef idx="2">
+            <a:schemeClr val="dk1"/>
+          </a:lnRef>
+          <a:fillRef idx="1">
+            <a:schemeClr val="lt1"/>
+          </a:fillRef>
+          <a:effectRef idx="0">
+            <a:schemeClr val="dk1"/>
+          </a:effectRef>
+          <a:fontRef idx="minor">
+            <a:schemeClr val="dk1"/>
+          </a:fontRef>
+        </p:style>
+        <p:txBody>
+          <a:bodyPr rtlCol="0" anchor="ctr"/>
+          <a:lstStyle/>
+          <a:p>
+            <a:pPr algn="ctr"/>
+            <a:endParaRPr lang="en-US"/>
+          </a:p>
+        </p:txBody>
+      </p:sp>
+      <p:sp>
+        <p:nvSpPr>
+          <p:cNvPr id="156" name="Rectangle 155">
+            <a:extLst>
+              <a:ext uri="{FF2B5EF4-FFF2-40B4-BE49-F238E27FC236}">
+                <a16:creationId xmlns:a16="http://schemas.microsoft.com/office/drawing/2014/main" id="{64A3F93A-5CCF-44F0-AEAC-C78383767FCA}"/>
+              </a:ext>
+            </a:extLst>
+          </p:cNvPr>
+          <p:cNvSpPr/>
+          <p:nvPr/>
+        </p:nvSpPr>
+        <p:spPr>
+          <a:xfrm>
+            <a:off x="6743589" y="2591193"/>
+            <a:ext cx="104503" cy="67016"/>
+          </a:xfrm>
+          <a:prstGeom prst="rect">
+            <a:avLst/>
+          </a:prstGeom>
+          <a:ln>
+            <a:solidFill>
+              <a:schemeClr val="bg1"/>
+            </a:solidFill>
+          </a:ln>
+        </p:spPr>
+        <p:style>
+          <a:lnRef idx="2">
+            <a:schemeClr val="dk1"/>
+          </a:lnRef>
+          <a:fillRef idx="1">
+            <a:schemeClr val="lt1"/>
+          </a:fillRef>
+          <a:effectRef idx="0">
+            <a:schemeClr val="dk1"/>
+          </a:effectRef>
+          <a:fontRef idx="minor">
+            <a:schemeClr val="dk1"/>
+          </a:fontRef>
+        </p:style>
+        <p:txBody>
+          <a:bodyPr rtlCol="0" anchor="ctr"/>
+          <a:lstStyle/>
+          <a:p>
+            <a:pPr algn="ctr"/>
+            <a:endParaRPr lang="en-US"/>
+          </a:p>
+        </p:txBody>
+      </p:sp>
+      <p:sp>
+        <p:nvSpPr>
+          <p:cNvPr id="157" name="Rectangle 156">
+            <a:extLst>
+              <a:ext uri="{FF2B5EF4-FFF2-40B4-BE49-F238E27FC236}">
+                <a16:creationId xmlns:a16="http://schemas.microsoft.com/office/drawing/2014/main" id="{C332F135-3324-4D11-A51E-3FC6D981CFE8}"/>
+              </a:ext>
+            </a:extLst>
+          </p:cNvPr>
+          <p:cNvSpPr/>
+          <p:nvPr/>
+        </p:nvSpPr>
+        <p:spPr>
+          <a:xfrm>
+            <a:off x="7352584" y="2783812"/>
+            <a:ext cx="104503" cy="67016"/>
+          </a:xfrm>
+          <a:prstGeom prst="rect">
+            <a:avLst/>
+          </a:prstGeom>
+          <a:ln>
+            <a:solidFill>
+              <a:schemeClr val="bg1"/>
+            </a:solidFill>
+          </a:ln>
+        </p:spPr>
+        <p:style>
+          <a:lnRef idx="2">
+            <a:schemeClr val="dk1"/>
+          </a:lnRef>
+          <a:fillRef idx="1">
+            <a:schemeClr val="lt1"/>
+          </a:fillRef>
+          <a:effectRef idx="0">
+            <a:schemeClr val="dk1"/>
+          </a:effectRef>
+          <a:fontRef idx="minor">
+            <a:schemeClr val="dk1"/>
+          </a:fontRef>
+        </p:style>
+        <p:txBody>
+          <a:bodyPr rtlCol="0" anchor="ctr"/>
+          <a:lstStyle/>
+          <a:p>
+            <a:pPr algn="ctr"/>
+            <a:endParaRPr lang="en-US"/>
+          </a:p>
+        </p:txBody>
+      </p:sp>
+      <p:sp>
+        <p:nvSpPr>
+          <p:cNvPr id="158" name="Rectangle 157">
+            <a:extLst>
+              <a:ext uri="{FF2B5EF4-FFF2-40B4-BE49-F238E27FC236}">
+                <a16:creationId xmlns:a16="http://schemas.microsoft.com/office/drawing/2014/main" id="{267D4554-B664-44A0-9A7F-3F3BD635018B}"/>
+              </a:ext>
+            </a:extLst>
+          </p:cNvPr>
+          <p:cNvSpPr/>
+          <p:nvPr/>
+        </p:nvSpPr>
+        <p:spPr>
+          <a:xfrm>
+            <a:off x="7346703" y="2596357"/>
+            <a:ext cx="104503" cy="67016"/>
+          </a:xfrm>
+          <a:prstGeom prst="rect">
+            <a:avLst/>
+          </a:prstGeom>
+          <a:ln>
+            <a:solidFill>
+              <a:schemeClr val="bg1"/>
+            </a:solidFill>
+          </a:ln>
+        </p:spPr>
+        <p:style>
+          <a:lnRef idx="2">
+            <a:schemeClr val="dk1"/>
+          </a:lnRef>
+          <a:fillRef idx="1">
+            <a:schemeClr val="lt1"/>
+          </a:fillRef>
+          <a:effectRef idx="0">
+            <a:schemeClr val="dk1"/>
+          </a:effectRef>
+          <a:fontRef idx="minor">
+            <a:schemeClr val="dk1"/>
+          </a:fontRef>
+        </p:style>
+        <p:txBody>
+          <a:bodyPr rtlCol="0" anchor="ctr"/>
+          <a:lstStyle/>
+          <a:p>
+            <a:pPr algn="ctr"/>
+            <a:endParaRPr lang="en-US"/>
+          </a:p>
+        </p:txBody>
+      </p:sp>
+      <p:sp>
+        <p:nvSpPr>
+          <p:cNvPr id="159" name="Rectangle 158">
+            <a:extLst>
+              <a:ext uri="{FF2B5EF4-FFF2-40B4-BE49-F238E27FC236}">
+                <a16:creationId xmlns:a16="http://schemas.microsoft.com/office/drawing/2014/main" id="{C128B391-DA0E-4947-A83E-D5ED9AC643DB}"/>
+              </a:ext>
+            </a:extLst>
+          </p:cNvPr>
+          <p:cNvSpPr/>
+          <p:nvPr/>
+        </p:nvSpPr>
+        <p:spPr>
+          <a:xfrm>
+            <a:off x="8144272" y="2601515"/>
+            <a:ext cx="104503" cy="67016"/>
+          </a:xfrm>
+          <a:prstGeom prst="rect">
+            <a:avLst/>
+          </a:prstGeom>
+          <a:ln>
+            <a:solidFill>
+              <a:schemeClr val="bg1"/>
+            </a:solidFill>
+          </a:ln>
+        </p:spPr>
+        <p:style>
+          <a:lnRef idx="2">
+            <a:schemeClr val="dk1"/>
+          </a:lnRef>
+          <a:fillRef idx="1">
+            <a:schemeClr val="lt1"/>
+          </a:fillRef>
+          <a:effectRef idx="0">
+            <a:schemeClr val="dk1"/>
+          </a:effectRef>
+          <a:fontRef idx="minor">
+            <a:schemeClr val="dk1"/>
+          </a:fontRef>
+        </p:style>
+        <p:txBody>
+          <a:bodyPr rtlCol="0" anchor="ctr"/>
+          <a:lstStyle/>
+          <a:p>
+            <a:pPr algn="ctr"/>
+            <a:endParaRPr lang="en-US"/>
+          </a:p>
+        </p:txBody>
+      </p:sp>
+      <p:sp>
+        <p:nvSpPr>
+          <p:cNvPr id="160" name="Rectangle 159">
+            <a:extLst>
+              <a:ext uri="{FF2B5EF4-FFF2-40B4-BE49-F238E27FC236}">
+                <a16:creationId xmlns:a16="http://schemas.microsoft.com/office/drawing/2014/main" id="{843A87A4-D497-404A-A9B9-2598210A9ABD}"/>
+              </a:ext>
+            </a:extLst>
+          </p:cNvPr>
+          <p:cNvSpPr/>
+          <p:nvPr/>
+        </p:nvSpPr>
+        <p:spPr>
+          <a:xfrm>
+            <a:off x="8751092" y="2783812"/>
+            <a:ext cx="104503" cy="67016"/>
+          </a:xfrm>
+          <a:prstGeom prst="rect">
+            <a:avLst/>
+          </a:prstGeom>
+          <a:ln>
+            <a:solidFill>
+              <a:schemeClr val="bg1"/>
+            </a:solidFill>
+          </a:ln>
+        </p:spPr>
+        <p:style>
+          <a:lnRef idx="2">
+            <a:schemeClr val="dk1"/>
+          </a:lnRef>
+          <a:fillRef idx="1">
+            <a:schemeClr val="lt1"/>
+          </a:fillRef>
+          <a:effectRef idx="0">
+            <a:schemeClr val="dk1"/>
+          </a:effectRef>
+          <a:fontRef idx="minor">
+            <a:schemeClr val="dk1"/>
+          </a:fontRef>
+        </p:style>
+        <p:txBody>
+          <a:bodyPr rtlCol="0" anchor="ctr"/>
+          <a:lstStyle/>
+          <a:p>
+            <a:pPr algn="ctr"/>
+            <a:endParaRPr lang="en-US"/>
+          </a:p>
+        </p:txBody>
+      </p:sp>
+      <p:sp>
+        <p:nvSpPr>
+          <p:cNvPr id="161" name="Rectangle 160">
+            <a:extLst>
+              <a:ext uri="{FF2B5EF4-FFF2-40B4-BE49-F238E27FC236}">
+                <a16:creationId xmlns:a16="http://schemas.microsoft.com/office/drawing/2014/main" id="{0EA69AFF-6F19-4DEC-A3F2-B5122701D58A}"/>
+              </a:ext>
+            </a:extLst>
+          </p:cNvPr>
+          <p:cNvSpPr/>
+          <p:nvPr/>
+        </p:nvSpPr>
+        <p:spPr>
+          <a:xfrm>
+            <a:off x="8751774" y="2596357"/>
+            <a:ext cx="104503" cy="67016"/>
+          </a:xfrm>
+          <a:prstGeom prst="rect">
+            <a:avLst/>
+          </a:prstGeom>
+          <a:ln>
+            <a:solidFill>
+              <a:schemeClr val="bg1"/>
+            </a:solidFill>
+          </a:ln>
+        </p:spPr>
+        <p:style>
+          <a:lnRef idx="2">
+            <a:schemeClr val="dk1"/>
+          </a:lnRef>
+          <a:fillRef idx="1">
+            <a:schemeClr val="lt1"/>
+          </a:fillRef>
+          <a:effectRef idx="0">
+            <a:schemeClr val="dk1"/>
+          </a:effectRef>
+          <a:fontRef idx="minor">
+            <a:schemeClr val="dk1"/>
+          </a:fontRef>
+        </p:style>
+        <p:txBody>
+          <a:bodyPr rtlCol="0" anchor="ctr"/>
+          <a:lstStyle/>
+          <a:p>
+            <a:pPr algn="ctr"/>
+            <a:endParaRPr lang="en-US"/>
+          </a:p>
+        </p:txBody>
+      </p:sp>
+      <p:sp>
+        <p:nvSpPr>
+          <p:cNvPr id="4" name="TextBox 3">
+            <a:extLst>
+              <a:ext uri="{FF2B5EF4-FFF2-40B4-BE49-F238E27FC236}">
+                <a16:creationId xmlns:a16="http://schemas.microsoft.com/office/drawing/2014/main" id="{E4D06BF3-DA31-49D2-823E-D432FD7B4783}"/>
+              </a:ext>
+            </a:extLst>
+          </p:cNvPr>
+          <p:cNvSpPr txBox="1"/>
+          <p:nvPr/>
+        </p:nvSpPr>
+        <p:spPr>
+          <a:xfrm>
+            <a:off x="6640218" y="1661015"/>
+            <a:ext cx="189015" cy="246221"/>
+          </a:xfrm>
+          <a:prstGeom prst="rect">
+            <a:avLst/>
+          </a:prstGeom>
+          <a:noFill/>
+        </p:spPr>
+        <p:txBody>
+          <a:bodyPr wrap="square" rtlCol="0">
+            <a:spAutoFit/>
+          </a:bodyPr>
+          <a:lstStyle/>
+          <a:p>
+            <a:r>
+              <a:rPr lang="en-US" sz="1000" dirty="0"/>
+              <a:t>*</a:t>
+            </a:r>
+            <a:endParaRPr lang="en-US" sz="1100" dirty="0"/>
+          </a:p>
+        </p:txBody>
+      </p:sp>
+      <p:sp>
+        <p:nvSpPr>
+          <p:cNvPr id="162" name="TextBox 161">
+            <a:extLst>
+              <a:ext uri="{FF2B5EF4-FFF2-40B4-BE49-F238E27FC236}">
+                <a16:creationId xmlns:a16="http://schemas.microsoft.com/office/drawing/2014/main" id="{9648C610-C1DC-4AD3-9EF9-EDD241D22F31}"/>
+              </a:ext>
+            </a:extLst>
+          </p:cNvPr>
+          <p:cNvSpPr txBox="1"/>
+          <p:nvPr/>
+        </p:nvSpPr>
+        <p:spPr>
+          <a:xfrm>
+            <a:off x="7239818" y="1665085"/>
+            <a:ext cx="189015" cy="246221"/>
+          </a:xfrm>
+          <a:prstGeom prst="rect">
+            <a:avLst/>
+          </a:prstGeom>
+          <a:noFill/>
+        </p:spPr>
+        <p:txBody>
+          <a:bodyPr wrap="square" rtlCol="0">
+            <a:spAutoFit/>
+          </a:bodyPr>
+          <a:lstStyle/>
+          <a:p>
+            <a:r>
+              <a:rPr lang="en-US" sz="1000" dirty="0"/>
+              <a:t>*</a:t>
+            </a:r>
+            <a:endParaRPr lang="en-US" sz="1100" dirty="0"/>
+          </a:p>
+        </p:txBody>
+      </p:sp>
+      <p:sp>
+        <p:nvSpPr>
+          <p:cNvPr id="163" name="TextBox 162">
+            <a:extLst>
+              <a:ext uri="{FF2B5EF4-FFF2-40B4-BE49-F238E27FC236}">
+                <a16:creationId xmlns:a16="http://schemas.microsoft.com/office/drawing/2014/main" id="{91BA438D-B39C-4307-A2FA-DBE7B7C70DFC}"/>
+              </a:ext>
+            </a:extLst>
+          </p:cNvPr>
+          <p:cNvSpPr txBox="1"/>
+          <p:nvPr/>
+        </p:nvSpPr>
+        <p:spPr>
+          <a:xfrm>
+            <a:off x="6677252" y="1869092"/>
+            <a:ext cx="104503" cy="246221"/>
+          </a:xfrm>
+          <a:prstGeom prst="rect">
+            <a:avLst/>
+          </a:prstGeom>
+          <a:noFill/>
+        </p:spPr>
+        <p:txBody>
+          <a:bodyPr wrap="square" rtlCol="0">
+            <a:spAutoFit/>
+          </a:bodyPr>
+          <a:lstStyle/>
+          <a:p>
+            <a:r>
+              <a:rPr lang="en-US" sz="1000" dirty="0"/>
+              <a:t>*</a:t>
+            </a:r>
+            <a:endParaRPr lang="en-US" sz="1100" dirty="0"/>
+          </a:p>
+        </p:txBody>
+      </p:sp>
+      <p:sp>
+        <p:nvSpPr>
+          <p:cNvPr id="164" name="TextBox 163">
+            <a:extLst>
+              <a:ext uri="{FF2B5EF4-FFF2-40B4-BE49-F238E27FC236}">
+                <a16:creationId xmlns:a16="http://schemas.microsoft.com/office/drawing/2014/main" id="{C4AA02A1-FBB0-4347-A37D-E4F57602DBF1}"/>
+              </a:ext>
+            </a:extLst>
+          </p:cNvPr>
+          <p:cNvSpPr txBox="1"/>
+          <p:nvPr/>
+        </p:nvSpPr>
+        <p:spPr>
+          <a:xfrm>
+            <a:off x="6634995" y="2248150"/>
+            <a:ext cx="189015" cy="246221"/>
+          </a:xfrm>
+          <a:prstGeom prst="rect">
+            <a:avLst/>
+          </a:prstGeom>
+          <a:noFill/>
+        </p:spPr>
+        <p:txBody>
+          <a:bodyPr wrap="square" rtlCol="0">
+            <a:spAutoFit/>
+          </a:bodyPr>
+          <a:lstStyle/>
+          <a:p>
+            <a:r>
+              <a:rPr lang="en-US" sz="1000" dirty="0"/>
+              <a:t>*</a:t>
+            </a:r>
+            <a:endParaRPr lang="en-US" sz="1100" dirty="0"/>
+          </a:p>
+        </p:txBody>
+      </p:sp>
+      <p:sp>
+        <p:nvSpPr>
+          <p:cNvPr id="165" name="TextBox 164">
+            <a:extLst>
+              <a:ext uri="{FF2B5EF4-FFF2-40B4-BE49-F238E27FC236}">
+                <a16:creationId xmlns:a16="http://schemas.microsoft.com/office/drawing/2014/main" id="{2635769E-D765-404A-BFF2-19C1D2194472}"/>
+              </a:ext>
+            </a:extLst>
+          </p:cNvPr>
+          <p:cNvSpPr txBox="1"/>
+          <p:nvPr/>
+        </p:nvSpPr>
+        <p:spPr>
+          <a:xfrm>
+            <a:off x="7239817" y="2240587"/>
+            <a:ext cx="189015" cy="246221"/>
+          </a:xfrm>
+          <a:prstGeom prst="rect">
+            <a:avLst/>
+          </a:prstGeom>
+          <a:noFill/>
+        </p:spPr>
+        <p:txBody>
+          <a:bodyPr wrap="square" rtlCol="0">
+            <a:spAutoFit/>
+          </a:bodyPr>
+          <a:lstStyle/>
+          <a:p>
+            <a:r>
+              <a:rPr lang="en-US" sz="1000" dirty="0"/>
+              <a:t>*</a:t>
+            </a:r>
+            <a:endParaRPr lang="en-US" sz="1100" dirty="0"/>
+          </a:p>
+        </p:txBody>
+      </p:sp>
+      <p:sp>
+        <p:nvSpPr>
+          <p:cNvPr id="166" name="TextBox 165">
+            <a:extLst>
+              <a:ext uri="{FF2B5EF4-FFF2-40B4-BE49-F238E27FC236}">
+                <a16:creationId xmlns:a16="http://schemas.microsoft.com/office/drawing/2014/main" id="{4F501CAC-D24F-456F-83BE-B3C9246A1619}"/>
+              </a:ext>
+            </a:extLst>
+          </p:cNvPr>
+          <p:cNvSpPr txBox="1"/>
+          <p:nvPr/>
+        </p:nvSpPr>
+        <p:spPr>
+          <a:xfrm>
+            <a:off x="8027675" y="2234964"/>
+            <a:ext cx="189015" cy="246221"/>
+          </a:xfrm>
+          <a:prstGeom prst="rect">
+            <a:avLst/>
+          </a:prstGeom>
+          <a:noFill/>
+        </p:spPr>
+        <p:txBody>
+          <a:bodyPr wrap="square" rtlCol="0">
+            <a:spAutoFit/>
+          </a:bodyPr>
+          <a:lstStyle/>
+          <a:p>
+            <a:r>
+              <a:rPr lang="en-US" sz="1000" dirty="0"/>
+              <a:t>*</a:t>
+            </a:r>
+            <a:endParaRPr lang="en-US" sz="1100" dirty="0"/>
+          </a:p>
+        </p:txBody>
+      </p:sp>
+      <p:sp>
+        <p:nvSpPr>
+          <p:cNvPr id="167" name="TextBox 166">
+            <a:extLst>
+              <a:ext uri="{FF2B5EF4-FFF2-40B4-BE49-F238E27FC236}">
+                <a16:creationId xmlns:a16="http://schemas.microsoft.com/office/drawing/2014/main" id="{B8CAB3A3-18D9-4468-97DA-1121317E3956}"/>
+              </a:ext>
+            </a:extLst>
+          </p:cNvPr>
+          <p:cNvSpPr txBox="1"/>
+          <p:nvPr/>
+        </p:nvSpPr>
+        <p:spPr>
+          <a:xfrm>
+            <a:off x="8029951" y="1862459"/>
+            <a:ext cx="189015" cy="246221"/>
+          </a:xfrm>
+          <a:prstGeom prst="rect">
+            <a:avLst/>
+          </a:prstGeom>
+          <a:noFill/>
+        </p:spPr>
+        <p:txBody>
+          <a:bodyPr wrap="square" rtlCol="0">
+            <a:spAutoFit/>
+          </a:bodyPr>
+          <a:lstStyle/>
+          <a:p>
+            <a:r>
+              <a:rPr lang="en-US" sz="1000" dirty="0"/>
+              <a:t>*</a:t>
+            </a:r>
+            <a:endParaRPr lang="en-US" sz="1100" dirty="0"/>
+          </a:p>
+        </p:txBody>
+      </p:sp>
+      <p:sp>
+        <p:nvSpPr>
+          <p:cNvPr id="168" name="TextBox 167">
+            <a:extLst>
+              <a:ext uri="{FF2B5EF4-FFF2-40B4-BE49-F238E27FC236}">
+                <a16:creationId xmlns:a16="http://schemas.microsoft.com/office/drawing/2014/main" id="{262DF2C5-3875-4453-B08F-59C873CFA9BF}"/>
+              </a:ext>
+            </a:extLst>
+          </p:cNvPr>
+          <p:cNvSpPr txBox="1"/>
+          <p:nvPr/>
+        </p:nvSpPr>
+        <p:spPr>
+          <a:xfrm>
+            <a:off x="8029950" y="1658873"/>
+            <a:ext cx="189015" cy="246221"/>
+          </a:xfrm>
+          <a:prstGeom prst="rect">
+            <a:avLst/>
+          </a:prstGeom>
+          <a:noFill/>
+        </p:spPr>
+        <p:txBody>
+          <a:bodyPr wrap="square" rtlCol="0">
+            <a:spAutoFit/>
+          </a:bodyPr>
+          <a:lstStyle/>
+          <a:p>
+            <a:r>
+              <a:rPr lang="en-US" sz="1000" dirty="0"/>
+              <a:t>*</a:t>
+            </a:r>
+            <a:endParaRPr lang="en-US" sz="1100" dirty="0"/>
+          </a:p>
+        </p:txBody>
+      </p:sp>
+      <p:sp>
+        <p:nvSpPr>
+          <p:cNvPr id="169" name="TextBox 168">
+            <a:extLst>
+              <a:ext uri="{FF2B5EF4-FFF2-40B4-BE49-F238E27FC236}">
+                <a16:creationId xmlns:a16="http://schemas.microsoft.com/office/drawing/2014/main" id="{45005DFE-C694-449B-991F-F0BAC6458F55}"/>
+              </a:ext>
+            </a:extLst>
+          </p:cNvPr>
+          <p:cNvSpPr txBox="1"/>
+          <p:nvPr/>
+        </p:nvSpPr>
+        <p:spPr>
+          <a:xfrm>
+            <a:off x="8643170" y="1653715"/>
+            <a:ext cx="189015" cy="246221"/>
+          </a:xfrm>
+          <a:prstGeom prst="rect">
+            <a:avLst/>
+          </a:prstGeom>
+          <a:noFill/>
+        </p:spPr>
+        <p:txBody>
+          <a:bodyPr wrap="square" rtlCol="0">
+            <a:spAutoFit/>
+          </a:bodyPr>
+          <a:lstStyle/>
+          <a:p>
+            <a:r>
+              <a:rPr lang="en-US" sz="1000" dirty="0"/>
+              <a:t>*</a:t>
+            </a:r>
+            <a:endParaRPr lang="en-US" sz="1100" dirty="0"/>
+          </a:p>
+        </p:txBody>
+      </p:sp>
+      <p:sp>
+        <p:nvSpPr>
+          <p:cNvPr id="170" name="TextBox 169">
+            <a:extLst>
+              <a:ext uri="{FF2B5EF4-FFF2-40B4-BE49-F238E27FC236}">
+                <a16:creationId xmlns:a16="http://schemas.microsoft.com/office/drawing/2014/main" id="{9947B472-FB99-431A-A4A1-5EBF9177D423}"/>
+              </a:ext>
+            </a:extLst>
+          </p:cNvPr>
+          <p:cNvSpPr txBox="1"/>
+          <p:nvPr/>
+        </p:nvSpPr>
+        <p:spPr>
+          <a:xfrm>
+            <a:off x="8651720" y="1862459"/>
+            <a:ext cx="189015" cy="246221"/>
+          </a:xfrm>
+          <a:prstGeom prst="rect">
+            <a:avLst/>
+          </a:prstGeom>
+          <a:noFill/>
+        </p:spPr>
+        <p:txBody>
+          <a:bodyPr wrap="square" rtlCol="0">
+            <a:spAutoFit/>
+          </a:bodyPr>
+          <a:lstStyle/>
+          <a:p>
+            <a:r>
+              <a:rPr lang="en-US" sz="1000" dirty="0"/>
+              <a:t>*</a:t>
+            </a:r>
+            <a:endParaRPr lang="en-US" sz="1100" dirty="0"/>
+          </a:p>
+        </p:txBody>
+      </p:sp>
+      <p:sp>
+        <p:nvSpPr>
+          <p:cNvPr id="171" name="TextBox 170">
+            <a:extLst>
+              <a:ext uri="{FF2B5EF4-FFF2-40B4-BE49-F238E27FC236}">
+                <a16:creationId xmlns:a16="http://schemas.microsoft.com/office/drawing/2014/main" id="{D364BBE4-95FD-440E-A585-8D0A98A2B929}"/>
+              </a:ext>
+            </a:extLst>
+          </p:cNvPr>
+          <p:cNvSpPr txBox="1"/>
+          <p:nvPr/>
+        </p:nvSpPr>
+        <p:spPr>
+          <a:xfrm>
+            <a:off x="8643170" y="2246273"/>
+            <a:ext cx="189015" cy="246221"/>
+          </a:xfrm>
+          <a:prstGeom prst="rect">
+            <a:avLst/>
+          </a:prstGeom>
+          <a:noFill/>
+        </p:spPr>
+        <p:txBody>
+          <a:bodyPr wrap="square" rtlCol="0">
+            <a:spAutoFit/>
+          </a:bodyPr>
+          <a:lstStyle/>
+          <a:p>
+            <a:r>
+              <a:rPr lang="en-US" sz="1000" dirty="0"/>
+              <a:t>*</a:t>
+            </a:r>
+            <a:endParaRPr lang="en-US" sz="1100" dirty="0"/>
+          </a:p>
+        </p:txBody>
+      </p:sp>
       <p:graphicFrame>
         <p:nvGraphicFramePr>
           <p:cNvPr id="258" name="Object 257"/>
@@ -21160,25 +22489,25 @@
           <p:nvPr>
             <p:extLst>
               <p:ext uri="{D42A27DB-BD31-4B8C-83A1-F6EECF244321}">
-                <p14:modId xmlns:p14="http://schemas.microsoft.com/office/powerpoint/2010/main" val="2925998265"/>
+                <p14:modId xmlns:p14="http://schemas.microsoft.com/office/powerpoint/2010/main" val="1338490424"/>
               </p:ext>
             </p:extLst>
           </p:nvPr>
         </p:nvGraphicFramePr>
         <p:xfrm>
-          <a:off x="3719513" y="5503863"/>
-          <a:ext cx="2076450" cy="361950"/>
+          <a:off x="3605162" y="5529945"/>
+          <a:ext cx="2724150" cy="361950"/>
         </p:xfrm>
         <a:graphic>
           <a:graphicData uri="http://schemas.openxmlformats.org/presentationml/2006/ole">
             <mc:AlternateContent xmlns:mc="http://schemas.openxmlformats.org/markup-compatibility/2006">
               <mc:Choice xmlns:v="urn:schemas-microsoft-com:vml" Requires="v">
-                <p:oleObj spid="_x0000_s2119" name="Equation" r:id="rId23" imgW="1384200" imgH="241200" progId="Equation.3">
+                <p:oleObj spid="_x0000_s2141" name="Equation" r:id="rId23" imgW="1815840" imgH="241200" progId="Equation.3">
                   <p:embed/>
                 </p:oleObj>
               </mc:Choice>
               <mc:Fallback>
-                <p:oleObj name="Equation" r:id="rId23" imgW="1384200" imgH="241200" progId="Equation.3">
+                <p:oleObj name="Equation" r:id="rId23" imgW="1815840" imgH="241200" progId="Equation.3">
                   <p:embed/>
                   <p:pic>
                     <p:nvPicPr>
@@ -21194,8 +22523,8 @@
                     </p:blipFill>
                     <p:spPr>
                       <a:xfrm>
-                        <a:off x="3719513" y="5503863"/>
-                        <a:ext cx="2076450" cy="361950"/>
+                        <a:off x="3605162" y="5529945"/>
+                        <a:ext cx="2724150" cy="361950"/>
                       </a:xfrm>
                       <a:prstGeom prst="rect">
                         <a:avLst/>
@@ -21212,1333 +22541,6 @@
           </a:graphicData>
         </a:graphic>
       </p:graphicFrame>
-      <p:sp>
-        <p:nvSpPr>
-          <p:cNvPr id="2" name="Rectangle 1">
-            <a:extLst>
-              <a:ext uri="{FF2B5EF4-FFF2-40B4-BE49-F238E27FC236}">
-                <a16:creationId xmlns:a16="http://schemas.microsoft.com/office/drawing/2014/main" id="{F8C42682-6360-4603-9F10-62CDFE559014}"/>
-              </a:ext>
-            </a:extLst>
-          </p:cNvPr>
-          <p:cNvSpPr/>
-          <p:nvPr/>
-        </p:nvSpPr>
-        <p:spPr>
-          <a:xfrm>
-            <a:off x="6659418" y="3762229"/>
-            <a:ext cx="104503" cy="67016"/>
-          </a:xfrm>
-          <a:prstGeom prst="rect">
-            <a:avLst/>
-          </a:prstGeom>
-          <a:ln>
-            <a:solidFill>
-              <a:schemeClr val="bg1"/>
-            </a:solidFill>
-          </a:ln>
-        </p:spPr>
-        <p:style>
-          <a:lnRef idx="2">
-            <a:schemeClr val="dk1"/>
-          </a:lnRef>
-          <a:fillRef idx="1">
-            <a:schemeClr val="lt1"/>
-          </a:fillRef>
-          <a:effectRef idx="0">
-            <a:schemeClr val="dk1"/>
-          </a:effectRef>
-          <a:fontRef idx="minor">
-            <a:schemeClr val="dk1"/>
-          </a:fontRef>
-        </p:style>
-        <p:txBody>
-          <a:bodyPr rtlCol="0" anchor="ctr"/>
-          <a:lstStyle/>
-          <a:p>
-            <a:pPr algn="ctr"/>
-            <a:endParaRPr lang="en-US"/>
-          </a:p>
-        </p:txBody>
-      </p:sp>
-      <p:sp>
-        <p:nvSpPr>
-          <p:cNvPr id="142" name="Rectangle 141">
-            <a:extLst>
-              <a:ext uri="{FF2B5EF4-FFF2-40B4-BE49-F238E27FC236}">
-                <a16:creationId xmlns:a16="http://schemas.microsoft.com/office/drawing/2014/main" id="{E0E1B636-2557-4F23-93A1-54296DA6030A}"/>
-              </a:ext>
-            </a:extLst>
-          </p:cNvPr>
-          <p:cNvSpPr/>
-          <p:nvPr/>
-        </p:nvSpPr>
-        <p:spPr>
-          <a:xfrm>
-            <a:off x="7282075" y="3766584"/>
-            <a:ext cx="104503" cy="67016"/>
-          </a:xfrm>
-          <a:prstGeom prst="rect">
-            <a:avLst/>
-          </a:prstGeom>
-          <a:ln>
-            <a:solidFill>
-              <a:schemeClr val="bg1"/>
-            </a:solidFill>
-          </a:ln>
-        </p:spPr>
-        <p:style>
-          <a:lnRef idx="2">
-            <a:schemeClr val="dk1"/>
-          </a:lnRef>
-          <a:fillRef idx="1">
-            <a:schemeClr val="lt1"/>
-          </a:fillRef>
-          <a:effectRef idx="0">
-            <a:schemeClr val="dk1"/>
-          </a:effectRef>
-          <a:fontRef idx="minor">
-            <a:schemeClr val="dk1"/>
-          </a:fontRef>
-        </p:style>
-        <p:txBody>
-          <a:bodyPr rtlCol="0" anchor="ctr"/>
-          <a:lstStyle/>
-          <a:p>
-            <a:pPr algn="ctr"/>
-            <a:endParaRPr lang="en-US"/>
-          </a:p>
-        </p:txBody>
-      </p:sp>
-      <p:sp>
-        <p:nvSpPr>
-          <p:cNvPr id="143" name="Rectangle 142">
-            <a:extLst>
-              <a:ext uri="{FF2B5EF4-FFF2-40B4-BE49-F238E27FC236}">
-                <a16:creationId xmlns:a16="http://schemas.microsoft.com/office/drawing/2014/main" id="{E26B205B-EBDA-4BDF-B345-290E9B07EF85}"/>
-              </a:ext>
-            </a:extLst>
-          </p:cNvPr>
-          <p:cNvSpPr/>
-          <p:nvPr/>
-        </p:nvSpPr>
-        <p:spPr>
-          <a:xfrm>
-            <a:off x="8063031" y="3761718"/>
-            <a:ext cx="104503" cy="67016"/>
-          </a:xfrm>
-          <a:prstGeom prst="rect">
-            <a:avLst/>
-          </a:prstGeom>
-          <a:ln>
-            <a:solidFill>
-              <a:schemeClr val="bg1"/>
-            </a:solidFill>
-          </a:ln>
-        </p:spPr>
-        <p:style>
-          <a:lnRef idx="2">
-            <a:schemeClr val="dk1"/>
-          </a:lnRef>
-          <a:fillRef idx="1">
-            <a:schemeClr val="lt1"/>
-          </a:fillRef>
-          <a:effectRef idx="0">
-            <a:schemeClr val="dk1"/>
-          </a:effectRef>
-          <a:fontRef idx="minor">
-            <a:schemeClr val="dk1"/>
-          </a:fontRef>
-        </p:style>
-        <p:txBody>
-          <a:bodyPr rtlCol="0" anchor="ctr"/>
-          <a:lstStyle/>
-          <a:p>
-            <a:pPr algn="ctr"/>
-            <a:endParaRPr lang="en-US"/>
-          </a:p>
-        </p:txBody>
-      </p:sp>
-      <p:sp>
-        <p:nvSpPr>
-          <p:cNvPr id="144" name="Rectangle 143">
-            <a:extLst>
-              <a:ext uri="{FF2B5EF4-FFF2-40B4-BE49-F238E27FC236}">
-                <a16:creationId xmlns:a16="http://schemas.microsoft.com/office/drawing/2014/main" id="{C7A3A45B-394D-470A-BD52-B8616C049DA2}"/>
-              </a:ext>
-            </a:extLst>
-          </p:cNvPr>
-          <p:cNvSpPr/>
-          <p:nvPr/>
-        </p:nvSpPr>
-        <p:spPr>
-          <a:xfrm>
-            <a:off x="8666743" y="3775287"/>
-            <a:ext cx="104503" cy="67016"/>
-          </a:xfrm>
-          <a:prstGeom prst="rect">
-            <a:avLst/>
-          </a:prstGeom>
-          <a:ln>
-            <a:solidFill>
-              <a:schemeClr val="bg1"/>
-            </a:solidFill>
-          </a:ln>
-        </p:spPr>
-        <p:style>
-          <a:lnRef idx="2">
-            <a:schemeClr val="dk1"/>
-          </a:lnRef>
-          <a:fillRef idx="1">
-            <a:schemeClr val="lt1"/>
-          </a:fillRef>
-          <a:effectRef idx="0">
-            <a:schemeClr val="dk1"/>
-          </a:effectRef>
-          <a:fontRef idx="minor">
-            <a:schemeClr val="dk1"/>
-          </a:fontRef>
-        </p:style>
-        <p:txBody>
-          <a:bodyPr rtlCol="0" anchor="ctr"/>
-          <a:lstStyle/>
-          <a:p>
-            <a:pPr algn="ctr"/>
-            <a:endParaRPr lang="en-US"/>
-          </a:p>
-        </p:txBody>
-      </p:sp>
-      <p:sp>
-        <p:nvSpPr>
-          <p:cNvPr id="146" name="Rectangle 145">
-            <a:extLst>
-              <a:ext uri="{FF2B5EF4-FFF2-40B4-BE49-F238E27FC236}">
-                <a16:creationId xmlns:a16="http://schemas.microsoft.com/office/drawing/2014/main" id="{28A31DB7-3D36-4199-B944-9E59C4142DDD}"/>
-              </a:ext>
-            </a:extLst>
-          </p:cNvPr>
-          <p:cNvSpPr/>
-          <p:nvPr/>
-        </p:nvSpPr>
-        <p:spPr>
-          <a:xfrm>
-            <a:off x="6734458" y="3377522"/>
-            <a:ext cx="104503" cy="56342"/>
-          </a:xfrm>
-          <a:prstGeom prst="rect">
-            <a:avLst/>
-          </a:prstGeom>
-          <a:ln>
-            <a:solidFill>
-              <a:schemeClr val="bg1"/>
-            </a:solidFill>
-          </a:ln>
-        </p:spPr>
-        <p:style>
-          <a:lnRef idx="2">
-            <a:schemeClr val="dk1"/>
-          </a:lnRef>
-          <a:fillRef idx="1">
-            <a:schemeClr val="lt1"/>
-          </a:fillRef>
-          <a:effectRef idx="0">
-            <a:schemeClr val="dk1"/>
-          </a:effectRef>
-          <a:fontRef idx="minor">
-            <a:schemeClr val="dk1"/>
-          </a:fontRef>
-        </p:style>
-        <p:txBody>
-          <a:bodyPr rtlCol="0" anchor="ctr"/>
-          <a:lstStyle/>
-          <a:p>
-            <a:pPr algn="ctr"/>
-            <a:endParaRPr lang="en-US"/>
-          </a:p>
-        </p:txBody>
-      </p:sp>
-      <p:sp>
-        <p:nvSpPr>
-          <p:cNvPr id="148" name="Rectangle 147">
-            <a:extLst>
-              <a:ext uri="{FF2B5EF4-FFF2-40B4-BE49-F238E27FC236}">
-                <a16:creationId xmlns:a16="http://schemas.microsoft.com/office/drawing/2014/main" id="{2A1C0997-DE70-48BC-945F-8E00B79B8256}"/>
-              </a:ext>
-            </a:extLst>
-          </p:cNvPr>
-          <p:cNvSpPr/>
-          <p:nvPr/>
-        </p:nvSpPr>
-        <p:spPr>
-          <a:xfrm>
-            <a:off x="7346703" y="3366848"/>
-            <a:ext cx="104503" cy="67016"/>
-          </a:xfrm>
-          <a:prstGeom prst="rect">
-            <a:avLst/>
-          </a:prstGeom>
-          <a:ln>
-            <a:solidFill>
-              <a:schemeClr val="bg1"/>
-            </a:solidFill>
-          </a:ln>
-        </p:spPr>
-        <p:style>
-          <a:lnRef idx="2">
-            <a:schemeClr val="dk1"/>
-          </a:lnRef>
-          <a:fillRef idx="1">
-            <a:schemeClr val="lt1"/>
-          </a:fillRef>
-          <a:effectRef idx="0">
-            <a:schemeClr val="dk1"/>
-          </a:effectRef>
-          <a:fontRef idx="minor">
-            <a:schemeClr val="dk1"/>
-          </a:fontRef>
-        </p:style>
-        <p:txBody>
-          <a:bodyPr rtlCol="0" anchor="ctr"/>
-          <a:lstStyle/>
-          <a:p>
-            <a:pPr algn="ctr"/>
-            <a:endParaRPr lang="en-US"/>
-          </a:p>
-        </p:txBody>
-      </p:sp>
-      <p:sp>
-        <p:nvSpPr>
-          <p:cNvPr id="149" name="Rectangle 148">
-            <a:extLst>
-              <a:ext uri="{FF2B5EF4-FFF2-40B4-BE49-F238E27FC236}">
-                <a16:creationId xmlns:a16="http://schemas.microsoft.com/office/drawing/2014/main" id="{25B3525D-E1EE-4FC7-8280-8E1C2B6056CC}"/>
-              </a:ext>
-            </a:extLst>
-          </p:cNvPr>
-          <p:cNvSpPr/>
-          <p:nvPr/>
-        </p:nvSpPr>
-        <p:spPr>
-          <a:xfrm>
-            <a:off x="8144272" y="3389102"/>
-            <a:ext cx="104503" cy="67016"/>
-          </a:xfrm>
-          <a:prstGeom prst="rect">
-            <a:avLst/>
-          </a:prstGeom>
-          <a:ln>
-            <a:solidFill>
-              <a:schemeClr val="bg1"/>
-            </a:solidFill>
-          </a:ln>
-        </p:spPr>
-        <p:style>
-          <a:lnRef idx="2">
-            <a:schemeClr val="dk1"/>
-          </a:lnRef>
-          <a:fillRef idx="1">
-            <a:schemeClr val="lt1"/>
-          </a:fillRef>
-          <a:effectRef idx="0">
-            <a:schemeClr val="dk1"/>
-          </a:effectRef>
-          <a:fontRef idx="minor">
-            <a:schemeClr val="dk1"/>
-          </a:fontRef>
-        </p:style>
-        <p:txBody>
-          <a:bodyPr rtlCol="0" anchor="ctr"/>
-          <a:lstStyle/>
-          <a:p>
-            <a:pPr algn="ctr"/>
-            <a:endParaRPr lang="en-US"/>
-          </a:p>
-        </p:txBody>
-      </p:sp>
-      <p:sp>
-        <p:nvSpPr>
-          <p:cNvPr id="150" name="Rectangle 149">
-            <a:extLst>
-              <a:ext uri="{FF2B5EF4-FFF2-40B4-BE49-F238E27FC236}">
-                <a16:creationId xmlns:a16="http://schemas.microsoft.com/office/drawing/2014/main" id="{454DFC46-1515-4C9A-8C17-E1459B5AB442}"/>
-              </a:ext>
-            </a:extLst>
-          </p:cNvPr>
-          <p:cNvSpPr/>
-          <p:nvPr/>
-        </p:nvSpPr>
-        <p:spPr>
-          <a:xfrm>
-            <a:off x="8746228" y="3369638"/>
-            <a:ext cx="104503" cy="67016"/>
-          </a:xfrm>
-          <a:prstGeom prst="rect">
-            <a:avLst/>
-          </a:prstGeom>
-          <a:ln>
-            <a:solidFill>
-              <a:schemeClr val="bg1"/>
-            </a:solidFill>
-          </a:ln>
-        </p:spPr>
-        <p:style>
-          <a:lnRef idx="2">
-            <a:schemeClr val="dk1"/>
-          </a:lnRef>
-          <a:fillRef idx="1">
-            <a:schemeClr val="lt1"/>
-          </a:fillRef>
-          <a:effectRef idx="0">
-            <a:schemeClr val="dk1"/>
-          </a:effectRef>
-          <a:fontRef idx="minor">
-            <a:schemeClr val="dk1"/>
-          </a:fontRef>
-        </p:style>
-        <p:txBody>
-          <a:bodyPr rtlCol="0" anchor="ctr"/>
-          <a:lstStyle/>
-          <a:p>
-            <a:pPr algn="ctr"/>
-            <a:endParaRPr lang="en-US"/>
-          </a:p>
-        </p:txBody>
-      </p:sp>
-      <p:sp>
-        <p:nvSpPr>
-          <p:cNvPr id="151" name="Rectangle 150">
-            <a:extLst>
-              <a:ext uri="{FF2B5EF4-FFF2-40B4-BE49-F238E27FC236}">
-                <a16:creationId xmlns:a16="http://schemas.microsoft.com/office/drawing/2014/main" id="{E89B2715-E5EE-4100-B3F1-B1C714279957}"/>
-              </a:ext>
-            </a:extLst>
-          </p:cNvPr>
-          <p:cNvSpPr/>
-          <p:nvPr/>
-        </p:nvSpPr>
-        <p:spPr>
-          <a:xfrm>
-            <a:off x="6748543" y="3179832"/>
-            <a:ext cx="104503" cy="67016"/>
-          </a:xfrm>
-          <a:prstGeom prst="rect">
-            <a:avLst/>
-          </a:prstGeom>
-          <a:ln>
-            <a:solidFill>
-              <a:schemeClr val="bg1"/>
-            </a:solidFill>
-          </a:ln>
-        </p:spPr>
-        <p:style>
-          <a:lnRef idx="2">
-            <a:schemeClr val="dk1"/>
-          </a:lnRef>
-          <a:fillRef idx="1">
-            <a:schemeClr val="lt1"/>
-          </a:fillRef>
-          <a:effectRef idx="0">
-            <a:schemeClr val="dk1"/>
-          </a:effectRef>
-          <a:fontRef idx="minor">
-            <a:schemeClr val="dk1"/>
-          </a:fontRef>
-        </p:style>
-        <p:txBody>
-          <a:bodyPr rtlCol="0" anchor="ctr"/>
-          <a:lstStyle/>
-          <a:p>
-            <a:pPr algn="ctr"/>
-            <a:endParaRPr lang="en-US"/>
-          </a:p>
-        </p:txBody>
-      </p:sp>
-      <p:sp>
-        <p:nvSpPr>
-          <p:cNvPr id="152" name="Rectangle 151">
-            <a:extLst>
-              <a:ext uri="{FF2B5EF4-FFF2-40B4-BE49-F238E27FC236}">
-                <a16:creationId xmlns:a16="http://schemas.microsoft.com/office/drawing/2014/main" id="{D1E4ADEC-44B2-41E8-9828-07A8C1D21A0A}"/>
-              </a:ext>
-            </a:extLst>
-          </p:cNvPr>
-          <p:cNvSpPr/>
-          <p:nvPr/>
-        </p:nvSpPr>
-        <p:spPr>
-          <a:xfrm>
-            <a:off x="7352674" y="3170429"/>
-            <a:ext cx="90943" cy="76419"/>
-          </a:xfrm>
-          <a:prstGeom prst="rect">
-            <a:avLst/>
-          </a:prstGeom>
-          <a:ln>
-            <a:solidFill>
-              <a:schemeClr val="bg1"/>
-            </a:solidFill>
-          </a:ln>
-        </p:spPr>
-        <p:style>
-          <a:lnRef idx="2">
-            <a:schemeClr val="dk1"/>
-          </a:lnRef>
-          <a:fillRef idx="1">
-            <a:schemeClr val="lt1"/>
-          </a:fillRef>
-          <a:effectRef idx="0">
-            <a:schemeClr val="dk1"/>
-          </a:effectRef>
-          <a:fontRef idx="minor">
-            <a:schemeClr val="dk1"/>
-          </a:fontRef>
-        </p:style>
-        <p:txBody>
-          <a:bodyPr rtlCol="0" anchor="ctr"/>
-          <a:lstStyle/>
-          <a:p>
-            <a:pPr algn="ctr"/>
-            <a:endParaRPr lang="en-US"/>
-          </a:p>
-        </p:txBody>
-      </p:sp>
-      <p:sp>
-        <p:nvSpPr>
-          <p:cNvPr id="153" name="Rectangle 152">
-            <a:extLst>
-              <a:ext uri="{FF2B5EF4-FFF2-40B4-BE49-F238E27FC236}">
-                <a16:creationId xmlns:a16="http://schemas.microsoft.com/office/drawing/2014/main" id="{130D41B3-5734-48A0-96CE-113D4A443714}"/>
-              </a:ext>
-            </a:extLst>
-          </p:cNvPr>
-          <p:cNvSpPr/>
-          <p:nvPr/>
-        </p:nvSpPr>
-        <p:spPr>
-          <a:xfrm>
-            <a:off x="8144182" y="3177504"/>
-            <a:ext cx="104503" cy="67016"/>
-          </a:xfrm>
-          <a:prstGeom prst="rect">
-            <a:avLst/>
-          </a:prstGeom>
-          <a:ln>
-            <a:solidFill>
-              <a:schemeClr val="bg1"/>
-            </a:solidFill>
-          </a:ln>
-        </p:spPr>
-        <p:style>
-          <a:lnRef idx="2">
-            <a:schemeClr val="dk1"/>
-          </a:lnRef>
-          <a:fillRef idx="1">
-            <a:schemeClr val="lt1"/>
-          </a:fillRef>
-          <a:effectRef idx="0">
-            <a:schemeClr val="dk1"/>
-          </a:effectRef>
-          <a:fontRef idx="minor">
-            <a:schemeClr val="dk1"/>
-          </a:fontRef>
-        </p:style>
-        <p:txBody>
-          <a:bodyPr rtlCol="0" anchor="ctr"/>
-          <a:lstStyle/>
-          <a:p>
-            <a:pPr algn="ctr"/>
-            <a:endParaRPr lang="en-US"/>
-          </a:p>
-        </p:txBody>
-      </p:sp>
-      <p:sp>
-        <p:nvSpPr>
-          <p:cNvPr id="154" name="Rectangle 153">
-            <a:extLst>
-              <a:ext uri="{FF2B5EF4-FFF2-40B4-BE49-F238E27FC236}">
-                <a16:creationId xmlns:a16="http://schemas.microsoft.com/office/drawing/2014/main" id="{C2C1194B-CE3B-4EE7-B2C8-CE346FE3AF12}"/>
-              </a:ext>
-            </a:extLst>
-          </p:cNvPr>
-          <p:cNvSpPr/>
-          <p:nvPr/>
-        </p:nvSpPr>
-        <p:spPr>
-          <a:xfrm>
-            <a:off x="8746228" y="3168356"/>
-            <a:ext cx="104503" cy="67016"/>
-          </a:xfrm>
-          <a:prstGeom prst="rect">
-            <a:avLst/>
-          </a:prstGeom>
-          <a:ln>
-            <a:solidFill>
-              <a:schemeClr val="bg1"/>
-            </a:solidFill>
-          </a:ln>
-        </p:spPr>
-        <p:style>
-          <a:lnRef idx="2">
-            <a:schemeClr val="dk1"/>
-          </a:lnRef>
-          <a:fillRef idx="1">
-            <a:schemeClr val="lt1"/>
-          </a:fillRef>
-          <a:effectRef idx="0">
-            <a:schemeClr val="dk1"/>
-          </a:effectRef>
-          <a:fontRef idx="minor">
-            <a:schemeClr val="dk1"/>
-          </a:fontRef>
-        </p:style>
-        <p:txBody>
-          <a:bodyPr rtlCol="0" anchor="ctr"/>
-          <a:lstStyle/>
-          <a:p>
-            <a:pPr algn="ctr"/>
-            <a:endParaRPr lang="en-US"/>
-          </a:p>
-        </p:txBody>
-      </p:sp>
-      <p:sp>
-        <p:nvSpPr>
-          <p:cNvPr id="155" name="Rectangle 154">
-            <a:extLst>
-              <a:ext uri="{FF2B5EF4-FFF2-40B4-BE49-F238E27FC236}">
-                <a16:creationId xmlns:a16="http://schemas.microsoft.com/office/drawing/2014/main" id="{278C56D2-922D-463D-9EA0-02FD84E828BA}"/>
-              </a:ext>
-            </a:extLst>
-          </p:cNvPr>
-          <p:cNvSpPr/>
-          <p:nvPr/>
-        </p:nvSpPr>
-        <p:spPr>
-          <a:xfrm>
-            <a:off x="6734458" y="2788444"/>
-            <a:ext cx="104503" cy="67016"/>
-          </a:xfrm>
-          <a:prstGeom prst="rect">
-            <a:avLst/>
-          </a:prstGeom>
-          <a:ln>
-            <a:solidFill>
-              <a:schemeClr val="bg1"/>
-            </a:solidFill>
-          </a:ln>
-        </p:spPr>
-        <p:style>
-          <a:lnRef idx="2">
-            <a:schemeClr val="dk1"/>
-          </a:lnRef>
-          <a:fillRef idx="1">
-            <a:schemeClr val="lt1"/>
-          </a:fillRef>
-          <a:effectRef idx="0">
-            <a:schemeClr val="dk1"/>
-          </a:effectRef>
-          <a:fontRef idx="minor">
-            <a:schemeClr val="dk1"/>
-          </a:fontRef>
-        </p:style>
-        <p:txBody>
-          <a:bodyPr rtlCol="0" anchor="ctr"/>
-          <a:lstStyle/>
-          <a:p>
-            <a:pPr algn="ctr"/>
-            <a:endParaRPr lang="en-US"/>
-          </a:p>
-        </p:txBody>
-      </p:sp>
-      <p:sp>
-        <p:nvSpPr>
-          <p:cNvPr id="156" name="Rectangle 155">
-            <a:extLst>
-              <a:ext uri="{FF2B5EF4-FFF2-40B4-BE49-F238E27FC236}">
-                <a16:creationId xmlns:a16="http://schemas.microsoft.com/office/drawing/2014/main" id="{64A3F93A-5CCF-44F0-AEAC-C78383767FCA}"/>
-              </a:ext>
-            </a:extLst>
-          </p:cNvPr>
-          <p:cNvSpPr/>
-          <p:nvPr/>
-        </p:nvSpPr>
-        <p:spPr>
-          <a:xfrm>
-            <a:off x="6743589" y="2591193"/>
-            <a:ext cx="104503" cy="67016"/>
-          </a:xfrm>
-          <a:prstGeom prst="rect">
-            <a:avLst/>
-          </a:prstGeom>
-          <a:ln>
-            <a:solidFill>
-              <a:schemeClr val="bg1"/>
-            </a:solidFill>
-          </a:ln>
-        </p:spPr>
-        <p:style>
-          <a:lnRef idx="2">
-            <a:schemeClr val="dk1"/>
-          </a:lnRef>
-          <a:fillRef idx="1">
-            <a:schemeClr val="lt1"/>
-          </a:fillRef>
-          <a:effectRef idx="0">
-            <a:schemeClr val="dk1"/>
-          </a:effectRef>
-          <a:fontRef idx="minor">
-            <a:schemeClr val="dk1"/>
-          </a:fontRef>
-        </p:style>
-        <p:txBody>
-          <a:bodyPr rtlCol="0" anchor="ctr"/>
-          <a:lstStyle/>
-          <a:p>
-            <a:pPr algn="ctr"/>
-            <a:endParaRPr lang="en-US"/>
-          </a:p>
-        </p:txBody>
-      </p:sp>
-      <p:sp>
-        <p:nvSpPr>
-          <p:cNvPr id="157" name="Rectangle 156">
-            <a:extLst>
-              <a:ext uri="{FF2B5EF4-FFF2-40B4-BE49-F238E27FC236}">
-                <a16:creationId xmlns:a16="http://schemas.microsoft.com/office/drawing/2014/main" id="{C332F135-3324-4D11-A51E-3FC6D981CFE8}"/>
-              </a:ext>
-            </a:extLst>
-          </p:cNvPr>
-          <p:cNvSpPr/>
-          <p:nvPr/>
-        </p:nvSpPr>
-        <p:spPr>
-          <a:xfrm>
-            <a:off x="7352584" y="2783812"/>
-            <a:ext cx="104503" cy="67016"/>
-          </a:xfrm>
-          <a:prstGeom prst="rect">
-            <a:avLst/>
-          </a:prstGeom>
-          <a:ln>
-            <a:solidFill>
-              <a:schemeClr val="bg1"/>
-            </a:solidFill>
-          </a:ln>
-        </p:spPr>
-        <p:style>
-          <a:lnRef idx="2">
-            <a:schemeClr val="dk1"/>
-          </a:lnRef>
-          <a:fillRef idx="1">
-            <a:schemeClr val="lt1"/>
-          </a:fillRef>
-          <a:effectRef idx="0">
-            <a:schemeClr val="dk1"/>
-          </a:effectRef>
-          <a:fontRef idx="minor">
-            <a:schemeClr val="dk1"/>
-          </a:fontRef>
-        </p:style>
-        <p:txBody>
-          <a:bodyPr rtlCol="0" anchor="ctr"/>
-          <a:lstStyle/>
-          <a:p>
-            <a:pPr algn="ctr"/>
-            <a:endParaRPr lang="en-US"/>
-          </a:p>
-        </p:txBody>
-      </p:sp>
-      <p:sp>
-        <p:nvSpPr>
-          <p:cNvPr id="158" name="Rectangle 157">
-            <a:extLst>
-              <a:ext uri="{FF2B5EF4-FFF2-40B4-BE49-F238E27FC236}">
-                <a16:creationId xmlns:a16="http://schemas.microsoft.com/office/drawing/2014/main" id="{267D4554-B664-44A0-9A7F-3F3BD635018B}"/>
-              </a:ext>
-            </a:extLst>
-          </p:cNvPr>
-          <p:cNvSpPr/>
-          <p:nvPr/>
-        </p:nvSpPr>
-        <p:spPr>
-          <a:xfrm>
-            <a:off x="7346703" y="2596357"/>
-            <a:ext cx="104503" cy="67016"/>
-          </a:xfrm>
-          <a:prstGeom prst="rect">
-            <a:avLst/>
-          </a:prstGeom>
-          <a:ln>
-            <a:solidFill>
-              <a:schemeClr val="bg1"/>
-            </a:solidFill>
-          </a:ln>
-        </p:spPr>
-        <p:style>
-          <a:lnRef idx="2">
-            <a:schemeClr val="dk1"/>
-          </a:lnRef>
-          <a:fillRef idx="1">
-            <a:schemeClr val="lt1"/>
-          </a:fillRef>
-          <a:effectRef idx="0">
-            <a:schemeClr val="dk1"/>
-          </a:effectRef>
-          <a:fontRef idx="minor">
-            <a:schemeClr val="dk1"/>
-          </a:fontRef>
-        </p:style>
-        <p:txBody>
-          <a:bodyPr rtlCol="0" anchor="ctr"/>
-          <a:lstStyle/>
-          <a:p>
-            <a:pPr algn="ctr"/>
-            <a:endParaRPr lang="en-US"/>
-          </a:p>
-        </p:txBody>
-      </p:sp>
-      <p:sp>
-        <p:nvSpPr>
-          <p:cNvPr id="159" name="Rectangle 158">
-            <a:extLst>
-              <a:ext uri="{FF2B5EF4-FFF2-40B4-BE49-F238E27FC236}">
-                <a16:creationId xmlns:a16="http://schemas.microsoft.com/office/drawing/2014/main" id="{C128B391-DA0E-4947-A83E-D5ED9AC643DB}"/>
-              </a:ext>
-            </a:extLst>
-          </p:cNvPr>
-          <p:cNvSpPr/>
-          <p:nvPr/>
-        </p:nvSpPr>
-        <p:spPr>
-          <a:xfrm>
-            <a:off x="8144272" y="2601515"/>
-            <a:ext cx="104503" cy="67016"/>
-          </a:xfrm>
-          <a:prstGeom prst="rect">
-            <a:avLst/>
-          </a:prstGeom>
-          <a:ln>
-            <a:solidFill>
-              <a:schemeClr val="bg1"/>
-            </a:solidFill>
-          </a:ln>
-        </p:spPr>
-        <p:style>
-          <a:lnRef idx="2">
-            <a:schemeClr val="dk1"/>
-          </a:lnRef>
-          <a:fillRef idx="1">
-            <a:schemeClr val="lt1"/>
-          </a:fillRef>
-          <a:effectRef idx="0">
-            <a:schemeClr val="dk1"/>
-          </a:effectRef>
-          <a:fontRef idx="minor">
-            <a:schemeClr val="dk1"/>
-          </a:fontRef>
-        </p:style>
-        <p:txBody>
-          <a:bodyPr rtlCol="0" anchor="ctr"/>
-          <a:lstStyle/>
-          <a:p>
-            <a:pPr algn="ctr"/>
-            <a:endParaRPr lang="en-US"/>
-          </a:p>
-        </p:txBody>
-      </p:sp>
-      <p:sp>
-        <p:nvSpPr>
-          <p:cNvPr id="160" name="Rectangle 159">
-            <a:extLst>
-              <a:ext uri="{FF2B5EF4-FFF2-40B4-BE49-F238E27FC236}">
-                <a16:creationId xmlns:a16="http://schemas.microsoft.com/office/drawing/2014/main" id="{843A87A4-D497-404A-A9B9-2598210A9ABD}"/>
-              </a:ext>
-            </a:extLst>
-          </p:cNvPr>
-          <p:cNvSpPr/>
-          <p:nvPr/>
-        </p:nvSpPr>
-        <p:spPr>
-          <a:xfrm>
-            <a:off x="8751092" y="2783812"/>
-            <a:ext cx="104503" cy="67016"/>
-          </a:xfrm>
-          <a:prstGeom prst="rect">
-            <a:avLst/>
-          </a:prstGeom>
-          <a:ln>
-            <a:solidFill>
-              <a:schemeClr val="bg1"/>
-            </a:solidFill>
-          </a:ln>
-        </p:spPr>
-        <p:style>
-          <a:lnRef idx="2">
-            <a:schemeClr val="dk1"/>
-          </a:lnRef>
-          <a:fillRef idx="1">
-            <a:schemeClr val="lt1"/>
-          </a:fillRef>
-          <a:effectRef idx="0">
-            <a:schemeClr val="dk1"/>
-          </a:effectRef>
-          <a:fontRef idx="minor">
-            <a:schemeClr val="dk1"/>
-          </a:fontRef>
-        </p:style>
-        <p:txBody>
-          <a:bodyPr rtlCol="0" anchor="ctr"/>
-          <a:lstStyle/>
-          <a:p>
-            <a:pPr algn="ctr"/>
-            <a:endParaRPr lang="en-US"/>
-          </a:p>
-        </p:txBody>
-      </p:sp>
-      <p:sp>
-        <p:nvSpPr>
-          <p:cNvPr id="161" name="Rectangle 160">
-            <a:extLst>
-              <a:ext uri="{FF2B5EF4-FFF2-40B4-BE49-F238E27FC236}">
-                <a16:creationId xmlns:a16="http://schemas.microsoft.com/office/drawing/2014/main" id="{0EA69AFF-6F19-4DEC-A3F2-B5122701D58A}"/>
-              </a:ext>
-            </a:extLst>
-          </p:cNvPr>
-          <p:cNvSpPr/>
-          <p:nvPr/>
-        </p:nvSpPr>
-        <p:spPr>
-          <a:xfrm>
-            <a:off x="8751774" y="2596357"/>
-            <a:ext cx="104503" cy="67016"/>
-          </a:xfrm>
-          <a:prstGeom prst="rect">
-            <a:avLst/>
-          </a:prstGeom>
-          <a:ln>
-            <a:solidFill>
-              <a:schemeClr val="bg1"/>
-            </a:solidFill>
-          </a:ln>
-        </p:spPr>
-        <p:style>
-          <a:lnRef idx="2">
-            <a:schemeClr val="dk1"/>
-          </a:lnRef>
-          <a:fillRef idx="1">
-            <a:schemeClr val="lt1"/>
-          </a:fillRef>
-          <a:effectRef idx="0">
-            <a:schemeClr val="dk1"/>
-          </a:effectRef>
-          <a:fontRef idx="minor">
-            <a:schemeClr val="dk1"/>
-          </a:fontRef>
-        </p:style>
-        <p:txBody>
-          <a:bodyPr rtlCol="0" anchor="ctr"/>
-          <a:lstStyle/>
-          <a:p>
-            <a:pPr algn="ctr"/>
-            <a:endParaRPr lang="en-US"/>
-          </a:p>
-        </p:txBody>
-      </p:sp>
-      <p:sp>
-        <p:nvSpPr>
-          <p:cNvPr id="4" name="TextBox 3">
-            <a:extLst>
-              <a:ext uri="{FF2B5EF4-FFF2-40B4-BE49-F238E27FC236}">
-                <a16:creationId xmlns:a16="http://schemas.microsoft.com/office/drawing/2014/main" id="{E4D06BF3-DA31-49D2-823E-D432FD7B4783}"/>
-              </a:ext>
-            </a:extLst>
-          </p:cNvPr>
-          <p:cNvSpPr txBox="1"/>
-          <p:nvPr/>
-        </p:nvSpPr>
-        <p:spPr>
-          <a:xfrm>
-            <a:off x="6640218" y="1661015"/>
-            <a:ext cx="189015" cy="246221"/>
-          </a:xfrm>
-          <a:prstGeom prst="rect">
-            <a:avLst/>
-          </a:prstGeom>
-          <a:noFill/>
-        </p:spPr>
-        <p:txBody>
-          <a:bodyPr wrap="square" rtlCol="0">
-            <a:spAutoFit/>
-          </a:bodyPr>
-          <a:lstStyle/>
-          <a:p>
-            <a:r>
-              <a:rPr lang="en-US" sz="1000" dirty="0"/>
-              <a:t>*</a:t>
-            </a:r>
-            <a:endParaRPr lang="en-US" sz="1100" dirty="0"/>
-          </a:p>
-        </p:txBody>
-      </p:sp>
-      <p:sp>
-        <p:nvSpPr>
-          <p:cNvPr id="162" name="TextBox 161">
-            <a:extLst>
-              <a:ext uri="{FF2B5EF4-FFF2-40B4-BE49-F238E27FC236}">
-                <a16:creationId xmlns:a16="http://schemas.microsoft.com/office/drawing/2014/main" id="{9648C610-C1DC-4AD3-9EF9-EDD241D22F31}"/>
-              </a:ext>
-            </a:extLst>
-          </p:cNvPr>
-          <p:cNvSpPr txBox="1"/>
-          <p:nvPr/>
-        </p:nvSpPr>
-        <p:spPr>
-          <a:xfrm>
-            <a:off x="7239818" y="1665085"/>
-            <a:ext cx="189015" cy="246221"/>
-          </a:xfrm>
-          <a:prstGeom prst="rect">
-            <a:avLst/>
-          </a:prstGeom>
-          <a:noFill/>
-        </p:spPr>
-        <p:txBody>
-          <a:bodyPr wrap="square" rtlCol="0">
-            <a:spAutoFit/>
-          </a:bodyPr>
-          <a:lstStyle/>
-          <a:p>
-            <a:r>
-              <a:rPr lang="en-US" sz="1000" dirty="0"/>
-              <a:t>*</a:t>
-            </a:r>
-            <a:endParaRPr lang="en-US" sz="1100" dirty="0"/>
-          </a:p>
-        </p:txBody>
-      </p:sp>
-      <p:sp>
-        <p:nvSpPr>
-          <p:cNvPr id="163" name="TextBox 162">
-            <a:extLst>
-              <a:ext uri="{FF2B5EF4-FFF2-40B4-BE49-F238E27FC236}">
-                <a16:creationId xmlns:a16="http://schemas.microsoft.com/office/drawing/2014/main" id="{91BA438D-B39C-4307-A2FA-DBE7B7C70DFC}"/>
-              </a:ext>
-            </a:extLst>
-          </p:cNvPr>
-          <p:cNvSpPr txBox="1"/>
-          <p:nvPr/>
-        </p:nvSpPr>
-        <p:spPr>
-          <a:xfrm>
-            <a:off x="6677252" y="1869092"/>
-            <a:ext cx="104503" cy="246221"/>
-          </a:xfrm>
-          <a:prstGeom prst="rect">
-            <a:avLst/>
-          </a:prstGeom>
-          <a:noFill/>
-        </p:spPr>
-        <p:txBody>
-          <a:bodyPr wrap="square" rtlCol="0">
-            <a:spAutoFit/>
-          </a:bodyPr>
-          <a:lstStyle/>
-          <a:p>
-            <a:r>
-              <a:rPr lang="en-US" sz="1000" dirty="0"/>
-              <a:t>*</a:t>
-            </a:r>
-            <a:endParaRPr lang="en-US" sz="1100" dirty="0"/>
-          </a:p>
-        </p:txBody>
-      </p:sp>
-      <p:sp>
-        <p:nvSpPr>
-          <p:cNvPr id="164" name="TextBox 163">
-            <a:extLst>
-              <a:ext uri="{FF2B5EF4-FFF2-40B4-BE49-F238E27FC236}">
-                <a16:creationId xmlns:a16="http://schemas.microsoft.com/office/drawing/2014/main" id="{C4AA02A1-FBB0-4347-A37D-E4F57602DBF1}"/>
-              </a:ext>
-            </a:extLst>
-          </p:cNvPr>
-          <p:cNvSpPr txBox="1"/>
-          <p:nvPr/>
-        </p:nvSpPr>
-        <p:spPr>
-          <a:xfrm>
-            <a:off x="6634995" y="2248150"/>
-            <a:ext cx="189015" cy="246221"/>
-          </a:xfrm>
-          <a:prstGeom prst="rect">
-            <a:avLst/>
-          </a:prstGeom>
-          <a:noFill/>
-        </p:spPr>
-        <p:txBody>
-          <a:bodyPr wrap="square" rtlCol="0">
-            <a:spAutoFit/>
-          </a:bodyPr>
-          <a:lstStyle/>
-          <a:p>
-            <a:r>
-              <a:rPr lang="en-US" sz="1000" dirty="0"/>
-              <a:t>*</a:t>
-            </a:r>
-            <a:endParaRPr lang="en-US" sz="1100" dirty="0"/>
-          </a:p>
-        </p:txBody>
-      </p:sp>
-      <p:sp>
-        <p:nvSpPr>
-          <p:cNvPr id="165" name="TextBox 164">
-            <a:extLst>
-              <a:ext uri="{FF2B5EF4-FFF2-40B4-BE49-F238E27FC236}">
-                <a16:creationId xmlns:a16="http://schemas.microsoft.com/office/drawing/2014/main" id="{2635769E-D765-404A-BFF2-19C1D2194472}"/>
-              </a:ext>
-            </a:extLst>
-          </p:cNvPr>
-          <p:cNvSpPr txBox="1"/>
-          <p:nvPr/>
-        </p:nvSpPr>
-        <p:spPr>
-          <a:xfrm>
-            <a:off x="7239817" y="2240587"/>
-            <a:ext cx="189015" cy="246221"/>
-          </a:xfrm>
-          <a:prstGeom prst="rect">
-            <a:avLst/>
-          </a:prstGeom>
-          <a:noFill/>
-        </p:spPr>
-        <p:txBody>
-          <a:bodyPr wrap="square" rtlCol="0">
-            <a:spAutoFit/>
-          </a:bodyPr>
-          <a:lstStyle/>
-          <a:p>
-            <a:r>
-              <a:rPr lang="en-US" sz="1000" dirty="0"/>
-              <a:t>*</a:t>
-            </a:r>
-            <a:endParaRPr lang="en-US" sz="1100" dirty="0"/>
-          </a:p>
-        </p:txBody>
-      </p:sp>
-      <p:sp>
-        <p:nvSpPr>
-          <p:cNvPr id="166" name="TextBox 165">
-            <a:extLst>
-              <a:ext uri="{FF2B5EF4-FFF2-40B4-BE49-F238E27FC236}">
-                <a16:creationId xmlns:a16="http://schemas.microsoft.com/office/drawing/2014/main" id="{4F501CAC-D24F-456F-83BE-B3C9246A1619}"/>
-              </a:ext>
-            </a:extLst>
-          </p:cNvPr>
-          <p:cNvSpPr txBox="1"/>
-          <p:nvPr/>
-        </p:nvSpPr>
-        <p:spPr>
-          <a:xfrm>
-            <a:off x="8027675" y="2234964"/>
-            <a:ext cx="189015" cy="246221"/>
-          </a:xfrm>
-          <a:prstGeom prst="rect">
-            <a:avLst/>
-          </a:prstGeom>
-          <a:noFill/>
-        </p:spPr>
-        <p:txBody>
-          <a:bodyPr wrap="square" rtlCol="0">
-            <a:spAutoFit/>
-          </a:bodyPr>
-          <a:lstStyle/>
-          <a:p>
-            <a:r>
-              <a:rPr lang="en-US" sz="1000" dirty="0"/>
-              <a:t>*</a:t>
-            </a:r>
-            <a:endParaRPr lang="en-US" sz="1100" dirty="0"/>
-          </a:p>
-        </p:txBody>
-      </p:sp>
-      <p:sp>
-        <p:nvSpPr>
-          <p:cNvPr id="167" name="TextBox 166">
-            <a:extLst>
-              <a:ext uri="{FF2B5EF4-FFF2-40B4-BE49-F238E27FC236}">
-                <a16:creationId xmlns:a16="http://schemas.microsoft.com/office/drawing/2014/main" id="{B8CAB3A3-18D9-4468-97DA-1121317E3956}"/>
-              </a:ext>
-            </a:extLst>
-          </p:cNvPr>
-          <p:cNvSpPr txBox="1"/>
-          <p:nvPr/>
-        </p:nvSpPr>
-        <p:spPr>
-          <a:xfrm>
-            <a:off x="8029951" y="1862459"/>
-            <a:ext cx="189015" cy="246221"/>
-          </a:xfrm>
-          <a:prstGeom prst="rect">
-            <a:avLst/>
-          </a:prstGeom>
-          <a:noFill/>
-        </p:spPr>
-        <p:txBody>
-          <a:bodyPr wrap="square" rtlCol="0">
-            <a:spAutoFit/>
-          </a:bodyPr>
-          <a:lstStyle/>
-          <a:p>
-            <a:r>
-              <a:rPr lang="en-US" sz="1000" dirty="0"/>
-              <a:t>*</a:t>
-            </a:r>
-            <a:endParaRPr lang="en-US" sz="1100" dirty="0"/>
-          </a:p>
-        </p:txBody>
-      </p:sp>
-      <p:sp>
-        <p:nvSpPr>
-          <p:cNvPr id="168" name="TextBox 167">
-            <a:extLst>
-              <a:ext uri="{FF2B5EF4-FFF2-40B4-BE49-F238E27FC236}">
-                <a16:creationId xmlns:a16="http://schemas.microsoft.com/office/drawing/2014/main" id="{262DF2C5-3875-4453-B08F-59C873CFA9BF}"/>
-              </a:ext>
-            </a:extLst>
-          </p:cNvPr>
-          <p:cNvSpPr txBox="1"/>
-          <p:nvPr/>
-        </p:nvSpPr>
-        <p:spPr>
-          <a:xfrm>
-            <a:off x="8029950" y="1658873"/>
-            <a:ext cx="189015" cy="246221"/>
-          </a:xfrm>
-          <a:prstGeom prst="rect">
-            <a:avLst/>
-          </a:prstGeom>
-          <a:noFill/>
-        </p:spPr>
-        <p:txBody>
-          <a:bodyPr wrap="square" rtlCol="0">
-            <a:spAutoFit/>
-          </a:bodyPr>
-          <a:lstStyle/>
-          <a:p>
-            <a:r>
-              <a:rPr lang="en-US" sz="1000" dirty="0"/>
-              <a:t>*</a:t>
-            </a:r>
-            <a:endParaRPr lang="en-US" sz="1100" dirty="0"/>
-          </a:p>
-        </p:txBody>
-      </p:sp>
-      <p:sp>
-        <p:nvSpPr>
-          <p:cNvPr id="169" name="TextBox 168">
-            <a:extLst>
-              <a:ext uri="{FF2B5EF4-FFF2-40B4-BE49-F238E27FC236}">
-                <a16:creationId xmlns:a16="http://schemas.microsoft.com/office/drawing/2014/main" id="{45005DFE-C694-449B-991F-F0BAC6458F55}"/>
-              </a:ext>
-            </a:extLst>
-          </p:cNvPr>
-          <p:cNvSpPr txBox="1"/>
-          <p:nvPr/>
-        </p:nvSpPr>
-        <p:spPr>
-          <a:xfrm>
-            <a:off x="8643170" y="1653715"/>
-            <a:ext cx="189015" cy="246221"/>
-          </a:xfrm>
-          <a:prstGeom prst="rect">
-            <a:avLst/>
-          </a:prstGeom>
-          <a:noFill/>
-        </p:spPr>
-        <p:txBody>
-          <a:bodyPr wrap="square" rtlCol="0">
-            <a:spAutoFit/>
-          </a:bodyPr>
-          <a:lstStyle/>
-          <a:p>
-            <a:r>
-              <a:rPr lang="en-US" sz="1000" dirty="0"/>
-              <a:t>*</a:t>
-            </a:r>
-            <a:endParaRPr lang="en-US" sz="1100" dirty="0"/>
-          </a:p>
-        </p:txBody>
-      </p:sp>
-      <p:sp>
-        <p:nvSpPr>
-          <p:cNvPr id="170" name="TextBox 169">
-            <a:extLst>
-              <a:ext uri="{FF2B5EF4-FFF2-40B4-BE49-F238E27FC236}">
-                <a16:creationId xmlns:a16="http://schemas.microsoft.com/office/drawing/2014/main" id="{9947B472-FB99-431A-A4A1-5EBF9177D423}"/>
-              </a:ext>
-            </a:extLst>
-          </p:cNvPr>
-          <p:cNvSpPr txBox="1"/>
-          <p:nvPr/>
-        </p:nvSpPr>
-        <p:spPr>
-          <a:xfrm>
-            <a:off x="8651720" y="1862459"/>
-            <a:ext cx="189015" cy="246221"/>
-          </a:xfrm>
-          <a:prstGeom prst="rect">
-            <a:avLst/>
-          </a:prstGeom>
-          <a:noFill/>
-        </p:spPr>
-        <p:txBody>
-          <a:bodyPr wrap="square" rtlCol="0">
-            <a:spAutoFit/>
-          </a:bodyPr>
-          <a:lstStyle/>
-          <a:p>
-            <a:r>
-              <a:rPr lang="en-US" sz="1000" dirty="0"/>
-              <a:t>*</a:t>
-            </a:r>
-            <a:endParaRPr lang="en-US" sz="1100" dirty="0"/>
-          </a:p>
-        </p:txBody>
-      </p:sp>
-      <p:sp>
-        <p:nvSpPr>
-          <p:cNvPr id="171" name="TextBox 170">
-            <a:extLst>
-              <a:ext uri="{FF2B5EF4-FFF2-40B4-BE49-F238E27FC236}">
-                <a16:creationId xmlns:a16="http://schemas.microsoft.com/office/drawing/2014/main" id="{D364BBE4-95FD-440E-A585-8D0A98A2B929}"/>
-              </a:ext>
-            </a:extLst>
-          </p:cNvPr>
-          <p:cNvSpPr txBox="1"/>
-          <p:nvPr/>
-        </p:nvSpPr>
-        <p:spPr>
-          <a:xfrm>
-            <a:off x="8643170" y="2246273"/>
-            <a:ext cx="189015" cy="246221"/>
-          </a:xfrm>
-          <a:prstGeom prst="rect">
-            <a:avLst/>
-          </a:prstGeom>
-          <a:noFill/>
-        </p:spPr>
-        <p:txBody>
-          <a:bodyPr wrap="square" rtlCol="0">
-            <a:spAutoFit/>
-          </a:bodyPr>
-          <a:lstStyle/>
-          <a:p>
-            <a:r>
-              <a:rPr lang="en-US" sz="1000" dirty="0"/>
-              <a:t>*</a:t>
-            </a:r>
-            <a:endParaRPr lang="en-US" sz="1100" dirty="0"/>
-          </a:p>
-        </p:txBody>
-      </p:sp>
     </p:spTree>
     <p:extLst>
       <p:ext uri="{BB962C8B-B14F-4D97-AF65-F5344CB8AC3E}">

</xml_diff>

<commit_message>
updated main background sec
</commit_message>
<xml_diff>
--- a/main/ptm_fig.pptx
+++ b/main/ptm_fig.pptx
@@ -226,7 +226,7 @@
           <a:p>
             <a:fld id="{80137904-5636-B34C-A9CD-CBEBAD04BF28}" type="datetimeFigureOut">
               <a:rPr lang="en-US" smtClean="0"/>
-              <a:t>1/28/2022</a:t>
+              <a:t>3/31/2022</a:t>
             </a:fld>
             <a:endParaRPr lang="en-US"/>
           </a:p>
@@ -773,7 +773,7 @@
           <a:p>
             <a:fld id="{3C76BF9E-C1DF-AA49-BEDC-5D48F2B93EA3}" type="datetimeFigureOut">
               <a:rPr lang="en-US" smtClean="0"/>
-              <a:t>1/28/2022</a:t>
+              <a:t>3/31/2022</a:t>
             </a:fld>
             <a:endParaRPr lang="en-US"/>
           </a:p>
@@ -941,7 +941,7 @@
           <a:p>
             <a:fld id="{3C76BF9E-C1DF-AA49-BEDC-5D48F2B93EA3}" type="datetimeFigureOut">
               <a:rPr lang="en-US" smtClean="0"/>
-              <a:t>1/28/2022</a:t>
+              <a:t>3/31/2022</a:t>
             </a:fld>
             <a:endParaRPr lang="en-US"/>
           </a:p>
@@ -1119,7 +1119,7 @@
           <a:p>
             <a:fld id="{3C76BF9E-C1DF-AA49-BEDC-5D48F2B93EA3}" type="datetimeFigureOut">
               <a:rPr lang="en-US" smtClean="0"/>
-              <a:t>1/28/2022</a:t>
+              <a:t>3/31/2022</a:t>
             </a:fld>
             <a:endParaRPr lang="en-US"/>
           </a:p>
@@ -1287,7 +1287,7 @@
           <a:p>
             <a:fld id="{3C76BF9E-C1DF-AA49-BEDC-5D48F2B93EA3}" type="datetimeFigureOut">
               <a:rPr lang="en-US" smtClean="0"/>
-              <a:t>1/28/2022</a:t>
+              <a:t>3/31/2022</a:t>
             </a:fld>
             <a:endParaRPr lang="en-US"/>
           </a:p>
@@ -1532,7 +1532,7 @@
           <a:p>
             <a:fld id="{3C76BF9E-C1DF-AA49-BEDC-5D48F2B93EA3}" type="datetimeFigureOut">
               <a:rPr lang="en-US" smtClean="0"/>
-              <a:t>1/28/2022</a:t>
+              <a:t>3/31/2022</a:t>
             </a:fld>
             <a:endParaRPr lang="en-US"/>
           </a:p>
@@ -1817,7 +1817,7 @@
           <a:p>
             <a:fld id="{3C76BF9E-C1DF-AA49-BEDC-5D48F2B93EA3}" type="datetimeFigureOut">
               <a:rPr lang="en-US" smtClean="0"/>
-              <a:t>1/28/2022</a:t>
+              <a:t>3/31/2022</a:t>
             </a:fld>
             <a:endParaRPr lang="en-US"/>
           </a:p>
@@ -2236,7 +2236,7 @@
           <a:p>
             <a:fld id="{3C76BF9E-C1DF-AA49-BEDC-5D48F2B93EA3}" type="datetimeFigureOut">
               <a:rPr lang="en-US" smtClean="0"/>
-              <a:t>1/28/2022</a:t>
+              <a:t>3/31/2022</a:t>
             </a:fld>
             <a:endParaRPr lang="en-US"/>
           </a:p>
@@ -2353,7 +2353,7 @@
           <a:p>
             <a:fld id="{3C76BF9E-C1DF-AA49-BEDC-5D48F2B93EA3}" type="datetimeFigureOut">
               <a:rPr lang="en-US" smtClean="0"/>
-              <a:t>1/28/2022</a:t>
+              <a:t>3/31/2022</a:t>
             </a:fld>
             <a:endParaRPr lang="en-US"/>
           </a:p>
@@ -2448,7 +2448,7 @@
           <a:p>
             <a:fld id="{3C76BF9E-C1DF-AA49-BEDC-5D48F2B93EA3}" type="datetimeFigureOut">
               <a:rPr lang="en-US" smtClean="0"/>
-              <a:t>1/28/2022</a:t>
+              <a:t>3/31/2022</a:t>
             </a:fld>
             <a:endParaRPr lang="en-US"/>
           </a:p>
@@ -2723,7 +2723,7 @@
           <a:p>
             <a:fld id="{3C76BF9E-C1DF-AA49-BEDC-5D48F2B93EA3}" type="datetimeFigureOut">
               <a:rPr lang="en-US" smtClean="0"/>
-              <a:t>1/28/2022</a:t>
+              <a:t>3/31/2022</a:t>
             </a:fld>
             <a:endParaRPr lang="en-US"/>
           </a:p>
@@ -2975,7 +2975,7 @@
           <a:p>
             <a:fld id="{3C76BF9E-C1DF-AA49-BEDC-5D48F2B93EA3}" type="datetimeFigureOut">
               <a:rPr lang="en-US" smtClean="0"/>
-              <a:t>1/28/2022</a:t>
+              <a:t>3/31/2022</a:t>
             </a:fld>
             <a:endParaRPr lang="en-US"/>
           </a:p>
@@ -3186,7 +3186,7 @@
           <a:p>
             <a:fld id="{3C76BF9E-C1DF-AA49-BEDC-5D48F2B93EA3}" type="datetimeFigureOut">
               <a:rPr lang="en-US" smtClean="0"/>
-              <a:t>1/28/2022</a:t>
+              <a:t>3/31/2022</a:t>
             </a:fld>
             <a:endParaRPr lang="en-US"/>
           </a:p>
@@ -3675,7 +3675,7 @@
           <a:effectLst/>
           <a:extLst>
             <a:ext uri="{AF507438-7753-43e0-B8FC-AC1667EBCBE1}">
-              <a14:hiddenEffects xmlns:a14="http://schemas.microsoft.com/office/drawing/2010/main" xmlns="">
+              <a14:hiddenEffects xmlns="" xmlns:a14="http://schemas.microsoft.com/office/drawing/2010/main">
                 <a:effectLst>
                   <a:outerShdw dist="35921" dir="2700000" algn="ctr" rotWithShape="0">
                     <a:schemeClr val="bg2"/>
@@ -3836,12 +3836,12 @@
           <a:effectLst/>
           <a:extLst>
             <a:ext uri="{909E8E84-426E-40dd-AFC4-6F175D3DCCD1}">
-              <a14:hiddenFill xmlns:a14="http://schemas.microsoft.com/office/drawing/2010/main" xmlns="">
+              <a14:hiddenFill xmlns="" xmlns:a14="http://schemas.microsoft.com/office/drawing/2010/main">
                 <a:noFill/>
               </a14:hiddenFill>
             </a:ext>
             <a:ext uri="{AF507438-7753-43e0-B8FC-AC1667EBCBE1}">
-              <a14:hiddenEffects xmlns:a14="http://schemas.microsoft.com/office/drawing/2010/main" xmlns="">
+              <a14:hiddenEffects xmlns="" xmlns:a14="http://schemas.microsoft.com/office/drawing/2010/main">
                 <a:effectLst>
                   <a:outerShdw dist="35921" dir="2700000" algn="ctr" rotWithShape="0">
                     <a:schemeClr val="bg2"/>
@@ -3896,7 +3896,7 @@
           <a:effectLst/>
           <a:extLst>
             <a:ext uri="{AF507438-7753-43e0-B8FC-AC1667EBCBE1}">
-              <a14:hiddenEffects xmlns:a14="http://schemas.microsoft.com/office/drawing/2010/main" xmlns="">
+              <a14:hiddenEffects xmlns="" xmlns:a14="http://schemas.microsoft.com/office/drawing/2010/main">
                 <a:effectLst>
                   <a:outerShdw dist="35921" dir="2700000" algn="ctr" rotWithShape="0">
                     <a:schemeClr val="bg2"/>
@@ -3949,12 +3949,12 @@
           <a:effectLst/>
           <a:extLst>
             <a:ext uri="{909E8E84-426E-40dd-AFC4-6F175D3DCCD1}">
-              <a14:hiddenFill xmlns:a14="http://schemas.microsoft.com/office/drawing/2010/main" xmlns="">
+              <a14:hiddenFill xmlns="" xmlns:a14="http://schemas.microsoft.com/office/drawing/2010/main">
                 <a:noFill/>
               </a14:hiddenFill>
             </a:ext>
             <a:ext uri="{AF507438-7753-43e0-B8FC-AC1667EBCBE1}">
-              <a14:hiddenEffects xmlns:a14="http://schemas.microsoft.com/office/drawing/2010/main" xmlns="">
+              <a14:hiddenEffects xmlns="" xmlns:a14="http://schemas.microsoft.com/office/drawing/2010/main">
                 <a:effectLst>
                   <a:outerShdw dist="35921" dir="2700000" algn="ctr" rotWithShape="0">
                     <a:schemeClr val="bg2"/>
@@ -4007,12 +4007,12 @@
           <a:effectLst/>
           <a:extLst>
             <a:ext uri="{909E8E84-426E-40dd-AFC4-6F175D3DCCD1}">
-              <a14:hiddenFill xmlns:a14="http://schemas.microsoft.com/office/drawing/2010/main" xmlns="">
+              <a14:hiddenFill xmlns="" xmlns:a14="http://schemas.microsoft.com/office/drawing/2010/main">
                 <a:noFill/>
               </a14:hiddenFill>
             </a:ext>
             <a:ext uri="{AF507438-7753-43e0-B8FC-AC1667EBCBE1}">
-              <a14:hiddenEffects xmlns:a14="http://schemas.microsoft.com/office/drawing/2010/main" xmlns="">
+              <a14:hiddenEffects xmlns="" xmlns:a14="http://schemas.microsoft.com/office/drawing/2010/main">
                 <a:effectLst>
                   <a:outerShdw dist="35921" dir="2700000" algn="ctr" rotWithShape="0">
                     <a:schemeClr val="bg2"/>
@@ -4069,7 +4069,7 @@
           <a:effectLst/>
           <a:extLst>
             <a:ext uri="{AF507438-7753-43e0-B8FC-AC1667EBCBE1}">
-              <a14:hiddenEffects xmlns:a14="http://schemas.microsoft.com/office/drawing/2010/main" xmlns="">
+              <a14:hiddenEffects xmlns="" xmlns:a14="http://schemas.microsoft.com/office/drawing/2010/main">
                 <a:effectLst>
                   <a:outerShdw dist="35921" dir="2700000" algn="ctr" rotWithShape="0">
                     <a:schemeClr val="bg2"/>
@@ -4124,7 +4124,7 @@
           <a:effectLst/>
           <a:extLst>
             <a:ext uri="{AF507438-7753-43e0-B8FC-AC1667EBCBE1}">
-              <a14:hiddenEffects xmlns:a14="http://schemas.microsoft.com/office/drawing/2010/main" xmlns="">
+              <a14:hiddenEffects xmlns="" xmlns:a14="http://schemas.microsoft.com/office/drawing/2010/main">
                 <a:effectLst>
                   <a:outerShdw dist="35921" dir="2700000" algn="ctr" rotWithShape="0">
                     <a:schemeClr val="bg2"/>
@@ -4177,12 +4177,12 @@
           <a:effectLst/>
           <a:extLst>
             <a:ext uri="{909E8E84-426E-40dd-AFC4-6F175D3DCCD1}">
-              <a14:hiddenFill xmlns:a14="http://schemas.microsoft.com/office/drawing/2010/main" xmlns="">
+              <a14:hiddenFill xmlns="" xmlns:a14="http://schemas.microsoft.com/office/drawing/2010/main">
                 <a:noFill/>
               </a14:hiddenFill>
             </a:ext>
             <a:ext uri="{AF507438-7753-43e0-B8FC-AC1667EBCBE1}">
-              <a14:hiddenEffects xmlns:a14="http://schemas.microsoft.com/office/drawing/2010/main" xmlns="">
+              <a14:hiddenEffects xmlns="" xmlns:a14="http://schemas.microsoft.com/office/drawing/2010/main">
                 <a:effectLst>
                   <a:outerShdw dist="35921" dir="2700000" algn="ctr" rotWithShape="0">
                     <a:schemeClr val="bg2"/>
@@ -4235,12 +4235,12 @@
           <a:effectLst/>
           <a:extLst>
             <a:ext uri="{909E8E84-426E-40dd-AFC4-6F175D3DCCD1}">
-              <a14:hiddenFill xmlns:a14="http://schemas.microsoft.com/office/drawing/2010/main" xmlns="">
+              <a14:hiddenFill xmlns="" xmlns:a14="http://schemas.microsoft.com/office/drawing/2010/main">
                 <a:noFill/>
               </a14:hiddenFill>
             </a:ext>
             <a:ext uri="{AF507438-7753-43e0-B8FC-AC1667EBCBE1}">
-              <a14:hiddenEffects xmlns:a14="http://schemas.microsoft.com/office/drawing/2010/main" xmlns="">
+              <a14:hiddenEffects xmlns="" xmlns:a14="http://schemas.microsoft.com/office/drawing/2010/main">
                 <a:effectLst>
                   <a:outerShdw dist="35921" dir="2700000" algn="ctr" rotWithShape="0">
                     <a:schemeClr val="bg2"/>
@@ -4297,7 +4297,7 @@
           <a:effectLst/>
           <a:extLst>
             <a:ext uri="{AF507438-7753-43e0-B8FC-AC1667EBCBE1}">
-              <a14:hiddenEffects xmlns:a14="http://schemas.microsoft.com/office/drawing/2010/main" xmlns="">
+              <a14:hiddenEffects xmlns="" xmlns:a14="http://schemas.microsoft.com/office/drawing/2010/main">
                 <a:effectLst>
                   <a:outerShdw dist="35921" dir="2700000" algn="ctr" rotWithShape="0">
                     <a:schemeClr val="bg2"/>
@@ -4352,7 +4352,7 @@
           <a:effectLst/>
           <a:extLst>
             <a:ext uri="{AF507438-7753-43e0-B8FC-AC1667EBCBE1}">
-              <a14:hiddenEffects xmlns:a14="http://schemas.microsoft.com/office/drawing/2010/main" xmlns="">
+              <a14:hiddenEffects xmlns="" xmlns:a14="http://schemas.microsoft.com/office/drawing/2010/main">
                 <a:effectLst>
                   <a:outerShdw dist="35921" dir="2700000" algn="ctr" rotWithShape="0">
                     <a:schemeClr val="bg2"/>
@@ -4405,12 +4405,12 @@
           <a:effectLst/>
           <a:extLst>
             <a:ext uri="{909E8E84-426E-40dd-AFC4-6F175D3DCCD1}">
-              <a14:hiddenFill xmlns:a14="http://schemas.microsoft.com/office/drawing/2010/main" xmlns="">
+              <a14:hiddenFill xmlns="" xmlns:a14="http://schemas.microsoft.com/office/drawing/2010/main">
                 <a:noFill/>
               </a14:hiddenFill>
             </a:ext>
             <a:ext uri="{AF507438-7753-43e0-B8FC-AC1667EBCBE1}">
-              <a14:hiddenEffects xmlns:a14="http://schemas.microsoft.com/office/drawing/2010/main" xmlns="">
+              <a14:hiddenEffects xmlns="" xmlns:a14="http://schemas.microsoft.com/office/drawing/2010/main">
                 <a:effectLst>
                   <a:outerShdw dist="35921" dir="2700000" algn="ctr" rotWithShape="0">
                     <a:schemeClr val="bg2"/>
@@ -4463,12 +4463,12 @@
           <a:effectLst/>
           <a:extLst>
             <a:ext uri="{909E8E84-426E-40dd-AFC4-6F175D3DCCD1}">
-              <a14:hiddenFill xmlns:a14="http://schemas.microsoft.com/office/drawing/2010/main" xmlns="">
+              <a14:hiddenFill xmlns="" xmlns:a14="http://schemas.microsoft.com/office/drawing/2010/main">
                 <a:noFill/>
               </a14:hiddenFill>
             </a:ext>
             <a:ext uri="{AF507438-7753-43e0-B8FC-AC1667EBCBE1}">
-              <a14:hiddenEffects xmlns:a14="http://schemas.microsoft.com/office/drawing/2010/main" xmlns="">
+              <a14:hiddenEffects xmlns="" xmlns:a14="http://schemas.microsoft.com/office/drawing/2010/main">
                 <a:effectLst>
                   <a:outerShdw dist="35921" dir="2700000" algn="ctr" rotWithShape="0">
                     <a:schemeClr val="bg2"/>
@@ -4523,7 +4523,7 @@
           <a:effectLst/>
           <a:extLst>
             <a:ext uri="{AF507438-7753-43e0-B8FC-AC1667EBCBE1}">
-              <a14:hiddenEffects xmlns:a14="http://schemas.microsoft.com/office/drawing/2010/main" xmlns="">
+              <a14:hiddenEffects xmlns="" xmlns:a14="http://schemas.microsoft.com/office/drawing/2010/main">
                 <a:effectLst>
                   <a:outerShdw dist="35921" dir="2700000" algn="ctr" rotWithShape="0">
                     <a:schemeClr val="bg2"/>
@@ -4578,7 +4578,7 @@
           <a:effectLst/>
           <a:extLst>
             <a:ext uri="{AF507438-7753-43e0-B8FC-AC1667EBCBE1}">
-              <a14:hiddenEffects xmlns:a14="http://schemas.microsoft.com/office/drawing/2010/main" xmlns="">
+              <a14:hiddenEffects xmlns="" xmlns:a14="http://schemas.microsoft.com/office/drawing/2010/main">
                 <a:effectLst>
                   <a:outerShdw dist="35921" dir="2700000" algn="ctr" rotWithShape="0">
                     <a:schemeClr val="bg2"/>
@@ -4631,12 +4631,12 @@
           <a:effectLst/>
           <a:extLst>
             <a:ext uri="{909E8E84-426E-40dd-AFC4-6F175D3DCCD1}">
-              <a14:hiddenFill xmlns:a14="http://schemas.microsoft.com/office/drawing/2010/main" xmlns="">
+              <a14:hiddenFill xmlns="" xmlns:a14="http://schemas.microsoft.com/office/drawing/2010/main">
                 <a:noFill/>
               </a14:hiddenFill>
             </a:ext>
             <a:ext uri="{AF507438-7753-43e0-B8FC-AC1667EBCBE1}">
-              <a14:hiddenEffects xmlns:a14="http://schemas.microsoft.com/office/drawing/2010/main" xmlns="">
+              <a14:hiddenEffects xmlns="" xmlns:a14="http://schemas.microsoft.com/office/drawing/2010/main">
                 <a:effectLst>
                   <a:outerShdw dist="35921" dir="2700000" algn="ctr" rotWithShape="0">
                     <a:schemeClr val="bg2"/>
@@ -4689,12 +4689,12 @@
           <a:effectLst/>
           <a:extLst>
             <a:ext uri="{909E8E84-426E-40dd-AFC4-6F175D3DCCD1}">
-              <a14:hiddenFill xmlns:a14="http://schemas.microsoft.com/office/drawing/2010/main" xmlns="">
+              <a14:hiddenFill xmlns="" xmlns:a14="http://schemas.microsoft.com/office/drawing/2010/main">
                 <a:noFill/>
               </a14:hiddenFill>
             </a:ext>
             <a:ext uri="{AF507438-7753-43e0-B8FC-AC1667EBCBE1}">
-              <a14:hiddenEffects xmlns:a14="http://schemas.microsoft.com/office/drawing/2010/main" xmlns="">
+              <a14:hiddenEffects xmlns="" xmlns:a14="http://schemas.microsoft.com/office/drawing/2010/main">
                 <a:effectLst>
                   <a:outerShdw dist="35921" dir="2700000" algn="ctr" rotWithShape="0">
                     <a:schemeClr val="bg2"/>
@@ -4751,7 +4751,7 @@
           <a:effectLst/>
           <a:extLst>
             <a:ext uri="{AF507438-7753-43e0-B8FC-AC1667EBCBE1}">
-              <a14:hiddenEffects xmlns:a14="http://schemas.microsoft.com/office/drawing/2010/main" xmlns="">
+              <a14:hiddenEffects xmlns="" xmlns:a14="http://schemas.microsoft.com/office/drawing/2010/main">
                 <a:effectLst>
                   <a:outerShdw dist="35921" dir="2700000" algn="ctr" rotWithShape="0">
                     <a:schemeClr val="bg2"/>
@@ -4799,14 +4799,14 @@
           <a:effectLst/>
           <a:extLst>
             <a:ext uri="{909E8E84-426E-40dd-AFC4-6F175D3DCCD1}">
-              <a14:hiddenFill xmlns:a14="http://schemas.microsoft.com/office/drawing/2010/main" xmlns="">
+              <a14:hiddenFill xmlns="" xmlns:a14="http://schemas.microsoft.com/office/drawing/2010/main">
                 <a:solidFill>
                   <a:schemeClr val="accent1"/>
                 </a:solidFill>
               </a14:hiddenFill>
             </a:ext>
             <a:ext uri="{91240B29-F687-4f45-9708-019B960494DF}">
-              <a14:hiddenLine xmlns:a14="http://schemas.microsoft.com/office/drawing/2010/main" xmlns="" w="9525">
+              <a14:hiddenLine xmlns="" xmlns:a14="http://schemas.microsoft.com/office/drawing/2010/main" w="9525">
                 <a:solidFill>
                   <a:schemeClr val="tx1"/>
                 </a:solidFill>
@@ -4816,7 +4816,7 @@
               </a14:hiddenLine>
             </a:ext>
             <a:ext uri="{AF507438-7753-43e0-B8FC-AC1667EBCBE1}">
-              <a14:hiddenEffects xmlns:a14="http://schemas.microsoft.com/office/drawing/2010/main" xmlns="">
+              <a14:hiddenEffects xmlns="" xmlns:a14="http://schemas.microsoft.com/office/drawing/2010/main">
                 <a:effectLst>
                   <a:outerShdw dist="35921" dir="2700000" algn="ctr" rotWithShape="0">
                     <a:schemeClr val="bg2"/>
@@ -4974,14 +4974,14 @@
           <a:effectLst/>
           <a:extLst>
             <a:ext uri="{909E8E84-426E-40dd-AFC4-6F175D3DCCD1}">
-              <a14:hiddenFill xmlns:a14="http://schemas.microsoft.com/office/drawing/2010/main" xmlns="">
+              <a14:hiddenFill xmlns="" xmlns:a14="http://schemas.microsoft.com/office/drawing/2010/main">
                 <a:solidFill>
                   <a:schemeClr val="accent1"/>
                 </a:solidFill>
               </a14:hiddenFill>
             </a:ext>
             <a:ext uri="{91240B29-F687-4f45-9708-019B960494DF}">
-              <a14:hiddenLine xmlns:a14="http://schemas.microsoft.com/office/drawing/2010/main" xmlns="" w="9525">
+              <a14:hiddenLine xmlns="" xmlns:a14="http://schemas.microsoft.com/office/drawing/2010/main" w="9525">
                 <a:solidFill>
                   <a:schemeClr val="tx1"/>
                 </a:solidFill>
@@ -4991,7 +4991,7 @@
               </a14:hiddenLine>
             </a:ext>
             <a:ext uri="{AF507438-7753-43e0-B8FC-AC1667EBCBE1}">
-              <a14:hiddenEffects xmlns:a14="http://schemas.microsoft.com/office/drawing/2010/main" xmlns="">
+              <a14:hiddenEffects xmlns="" xmlns:a14="http://schemas.microsoft.com/office/drawing/2010/main">
                 <a:effectLst>
                   <a:outerShdw dist="35921" dir="2700000" algn="ctr" rotWithShape="0">
                     <a:schemeClr val="bg2"/>
@@ -5149,14 +5149,14 @@
           <a:effectLst/>
           <a:extLst>
             <a:ext uri="{909E8E84-426E-40dd-AFC4-6F175D3DCCD1}">
-              <a14:hiddenFill xmlns:a14="http://schemas.microsoft.com/office/drawing/2010/main" xmlns="">
+              <a14:hiddenFill xmlns="" xmlns:a14="http://schemas.microsoft.com/office/drawing/2010/main">
                 <a:solidFill>
                   <a:schemeClr val="accent1"/>
                 </a:solidFill>
               </a14:hiddenFill>
             </a:ext>
             <a:ext uri="{91240B29-F687-4f45-9708-019B960494DF}">
-              <a14:hiddenLine xmlns:a14="http://schemas.microsoft.com/office/drawing/2010/main" xmlns="" w="9525">
+              <a14:hiddenLine xmlns="" xmlns:a14="http://schemas.microsoft.com/office/drawing/2010/main" w="9525">
                 <a:solidFill>
                   <a:schemeClr val="tx1"/>
                 </a:solidFill>
@@ -5166,7 +5166,7 @@
               </a14:hiddenLine>
             </a:ext>
             <a:ext uri="{AF507438-7753-43e0-B8FC-AC1667EBCBE1}">
-              <a14:hiddenEffects xmlns:a14="http://schemas.microsoft.com/office/drawing/2010/main" xmlns="">
+              <a14:hiddenEffects xmlns="" xmlns:a14="http://schemas.microsoft.com/office/drawing/2010/main">
                 <a:effectLst>
                   <a:outerShdw dist="35921" dir="2700000" algn="ctr" rotWithShape="0">
                     <a:schemeClr val="bg2"/>
@@ -5324,14 +5324,14 @@
           <a:effectLst/>
           <a:extLst>
             <a:ext uri="{909E8E84-426E-40dd-AFC4-6F175D3DCCD1}">
-              <a14:hiddenFill xmlns:a14="http://schemas.microsoft.com/office/drawing/2010/main" xmlns="">
+              <a14:hiddenFill xmlns="" xmlns:a14="http://schemas.microsoft.com/office/drawing/2010/main">
                 <a:solidFill>
                   <a:schemeClr val="accent1"/>
                 </a:solidFill>
               </a14:hiddenFill>
             </a:ext>
             <a:ext uri="{91240B29-F687-4f45-9708-019B960494DF}">
-              <a14:hiddenLine xmlns:a14="http://schemas.microsoft.com/office/drawing/2010/main" xmlns="" w="9525">
+              <a14:hiddenLine xmlns="" xmlns:a14="http://schemas.microsoft.com/office/drawing/2010/main" w="9525">
                 <a:solidFill>
                   <a:schemeClr val="tx1"/>
                 </a:solidFill>
@@ -5341,7 +5341,7 @@
               </a14:hiddenLine>
             </a:ext>
             <a:ext uri="{AF507438-7753-43e0-B8FC-AC1667EBCBE1}">
-              <a14:hiddenEffects xmlns:a14="http://schemas.microsoft.com/office/drawing/2010/main" xmlns="">
+              <a14:hiddenEffects xmlns="" xmlns:a14="http://schemas.microsoft.com/office/drawing/2010/main">
                 <a:effectLst>
                   <a:outerShdw dist="35921" dir="2700000" algn="ctr" rotWithShape="0">
                     <a:schemeClr val="bg2"/>
@@ -5504,12 +5504,12 @@
           <a:effectLst/>
           <a:extLst>
             <a:ext uri="{909E8E84-426E-40dd-AFC4-6F175D3DCCD1}">
-              <a14:hiddenFill xmlns:a14="http://schemas.microsoft.com/office/drawing/2010/main" xmlns="">
+              <a14:hiddenFill xmlns="" xmlns:a14="http://schemas.microsoft.com/office/drawing/2010/main">
                 <a:noFill/>
               </a14:hiddenFill>
             </a:ext>
             <a:ext uri="{AF507438-7753-43e0-B8FC-AC1667EBCBE1}">
-              <a14:hiddenEffects xmlns:a14="http://schemas.microsoft.com/office/drawing/2010/main" xmlns="">
+              <a14:hiddenEffects xmlns="" xmlns:a14="http://schemas.microsoft.com/office/drawing/2010/main">
                 <a:effectLst>
                   <a:outerShdw dist="35921" dir="2700000" algn="ctr" rotWithShape="0">
                     <a:schemeClr val="bg2"/>
@@ -5562,12 +5562,12 @@
           <a:effectLst/>
           <a:extLst>
             <a:ext uri="{909E8E84-426E-40dd-AFC4-6F175D3DCCD1}">
-              <a14:hiddenFill xmlns:a14="http://schemas.microsoft.com/office/drawing/2010/main" xmlns="">
+              <a14:hiddenFill xmlns="" xmlns:a14="http://schemas.microsoft.com/office/drawing/2010/main">
                 <a:noFill/>
               </a14:hiddenFill>
             </a:ext>
             <a:ext uri="{AF507438-7753-43e0-B8FC-AC1667EBCBE1}">
-              <a14:hiddenEffects xmlns:a14="http://schemas.microsoft.com/office/drawing/2010/main" xmlns="">
+              <a14:hiddenEffects xmlns="" xmlns:a14="http://schemas.microsoft.com/office/drawing/2010/main">
                 <a:effectLst>
                   <a:outerShdw dist="35921" dir="2700000" algn="ctr" rotWithShape="0">
                     <a:schemeClr val="bg2"/>
@@ -5620,12 +5620,12 @@
           <a:effectLst/>
           <a:extLst>
             <a:ext uri="{909E8E84-426E-40dd-AFC4-6F175D3DCCD1}">
-              <a14:hiddenFill xmlns:a14="http://schemas.microsoft.com/office/drawing/2010/main" xmlns="">
+              <a14:hiddenFill xmlns="" xmlns:a14="http://schemas.microsoft.com/office/drawing/2010/main">
                 <a:noFill/>
               </a14:hiddenFill>
             </a:ext>
             <a:ext uri="{AF507438-7753-43e0-B8FC-AC1667EBCBE1}">
-              <a14:hiddenEffects xmlns:a14="http://schemas.microsoft.com/office/drawing/2010/main" xmlns="">
+              <a14:hiddenEffects xmlns="" xmlns:a14="http://schemas.microsoft.com/office/drawing/2010/main">
                 <a:effectLst>
                   <a:outerShdw dist="35921" dir="2700000" algn="ctr" rotWithShape="0">
                     <a:schemeClr val="bg2"/>
@@ -5678,12 +5678,12 @@
           <a:effectLst/>
           <a:extLst>
             <a:ext uri="{909E8E84-426E-40dd-AFC4-6F175D3DCCD1}">
-              <a14:hiddenFill xmlns:a14="http://schemas.microsoft.com/office/drawing/2010/main" xmlns="">
+              <a14:hiddenFill xmlns="" xmlns:a14="http://schemas.microsoft.com/office/drawing/2010/main">
                 <a:noFill/>
               </a14:hiddenFill>
             </a:ext>
             <a:ext uri="{AF507438-7753-43e0-B8FC-AC1667EBCBE1}">
-              <a14:hiddenEffects xmlns:a14="http://schemas.microsoft.com/office/drawing/2010/main" xmlns="">
+              <a14:hiddenEffects xmlns="" xmlns:a14="http://schemas.microsoft.com/office/drawing/2010/main">
                 <a:effectLst>
                   <a:outerShdw dist="35921" dir="2700000" algn="ctr" rotWithShape="0">
                     <a:schemeClr val="bg2"/>
@@ -5736,12 +5736,12 @@
           <a:effectLst/>
           <a:extLst>
             <a:ext uri="{909E8E84-426E-40dd-AFC4-6F175D3DCCD1}">
-              <a14:hiddenFill xmlns:a14="http://schemas.microsoft.com/office/drawing/2010/main" xmlns="">
+              <a14:hiddenFill xmlns="" xmlns:a14="http://schemas.microsoft.com/office/drawing/2010/main">
                 <a:noFill/>
               </a14:hiddenFill>
             </a:ext>
             <a:ext uri="{AF507438-7753-43e0-B8FC-AC1667EBCBE1}">
-              <a14:hiddenEffects xmlns:a14="http://schemas.microsoft.com/office/drawing/2010/main" xmlns="">
+              <a14:hiddenEffects xmlns="" xmlns:a14="http://schemas.microsoft.com/office/drawing/2010/main">
                 <a:effectLst>
                   <a:outerShdw dist="35921" dir="2700000" algn="ctr" rotWithShape="0">
                     <a:schemeClr val="bg2"/>
@@ -5794,12 +5794,12 @@
           <a:effectLst/>
           <a:extLst>
             <a:ext uri="{909E8E84-426E-40dd-AFC4-6F175D3DCCD1}">
-              <a14:hiddenFill xmlns:a14="http://schemas.microsoft.com/office/drawing/2010/main" xmlns="">
+              <a14:hiddenFill xmlns="" xmlns:a14="http://schemas.microsoft.com/office/drawing/2010/main">
                 <a:noFill/>
               </a14:hiddenFill>
             </a:ext>
             <a:ext uri="{AF507438-7753-43e0-B8FC-AC1667EBCBE1}">
-              <a14:hiddenEffects xmlns:a14="http://schemas.microsoft.com/office/drawing/2010/main" xmlns="">
+              <a14:hiddenEffects xmlns="" xmlns:a14="http://schemas.microsoft.com/office/drawing/2010/main">
                 <a:effectLst>
                   <a:outerShdw dist="35921" dir="2700000" algn="ctr" rotWithShape="0">
                     <a:schemeClr val="bg2"/>
@@ -5852,12 +5852,12 @@
           <a:effectLst/>
           <a:extLst>
             <a:ext uri="{909E8E84-426E-40dd-AFC4-6F175D3DCCD1}">
-              <a14:hiddenFill xmlns:a14="http://schemas.microsoft.com/office/drawing/2010/main" xmlns="">
+              <a14:hiddenFill xmlns="" xmlns:a14="http://schemas.microsoft.com/office/drawing/2010/main">
                 <a:noFill/>
               </a14:hiddenFill>
             </a:ext>
             <a:ext uri="{AF507438-7753-43e0-B8FC-AC1667EBCBE1}">
-              <a14:hiddenEffects xmlns:a14="http://schemas.microsoft.com/office/drawing/2010/main" xmlns="">
+              <a14:hiddenEffects xmlns="" xmlns:a14="http://schemas.microsoft.com/office/drawing/2010/main">
                 <a:effectLst>
                   <a:outerShdw dist="35921" dir="2700000" algn="ctr" rotWithShape="0">
                     <a:schemeClr val="bg2"/>
@@ -5910,12 +5910,12 @@
           <a:effectLst/>
           <a:extLst>
             <a:ext uri="{909E8E84-426E-40dd-AFC4-6F175D3DCCD1}">
-              <a14:hiddenFill xmlns:a14="http://schemas.microsoft.com/office/drawing/2010/main" xmlns="">
+              <a14:hiddenFill xmlns="" xmlns:a14="http://schemas.microsoft.com/office/drawing/2010/main">
                 <a:noFill/>
               </a14:hiddenFill>
             </a:ext>
             <a:ext uri="{AF507438-7753-43e0-B8FC-AC1667EBCBE1}">
-              <a14:hiddenEffects xmlns:a14="http://schemas.microsoft.com/office/drawing/2010/main" xmlns="">
+              <a14:hiddenEffects xmlns="" xmlns:a14="http://schemas.microsoft.com/office/drawing/2010/main">
                 <a:effectLst>
                   <a:outerShdw dist="35921" dir="2700000" algn="ctr" rotWithShape="0">
                     <a:schemeClr val="bg2"/>
@@ -5968,14 +5968,14 @@
           <a:effectLst/>
           <a:extLst>
             <a:ext uri="{909E8E84-426E-40dd-AFC4-6F175D3DCCD1}">
-              <a14:hiddenFill xmlns:a14="http://schemas.microsoft.com/office/drawing/2010/main" xmlns="">
+              <a14:hiddenFill xmlns="" xmlns:a14="http://schemas.microsoft.com/office/drawing/2010/main">
                 <a:solidFill>
                   <a:srgbClr val="FFFFCC"/>
                 </a:solidFill>
               </a14:hiddenFill>
             </a:ext>
             <a:ext uri="{AF507438-7753-43e0-B8FC-AC1667EBCBE1}">
-              <a14:hiddenEffects xmlns:a14="http://schemas.microsoft.com/office/drawing/2010/main" xmlns="">
+              <a14:hiddenEffects xmlns="" xmlns:a14="http://schemas.microsoft.com/office/drawing/2010/main">
                 <a:effectLst>
                   <a:outerShdw dist="35921" dir="2700000" algn="ctr" rotWithShape="0">
                     <a:schemeClr val="bg2"/>
@@ -6136,12 +6136,12 @@
           <a:effectLst/>
           <a:extLst>
             <a:ext uri="{909E8E84-426E-40dd-AFC4-6F175D3DCCD1}">
-              <a14:hiddenFill xmlns:a14="http://schemas.microsoft.com/office/drawing/2010/main" xmlns="">
+              <a14:hiddenFill xmlns="" xmlns:a14="http://schemas.microsoft.com/office/drawing/2010/main">
                 <a:noFill/>
               </a14:hiddenFill>
             </a:ext>
             <a:ext uri="{AF507438-7753-43e0-B8FC-AC1667EBCBE1}">
-              <a14:hiddenEffects xmlns:a14="http://schemas.microsoft.com/office/drawing/2010/main" xmlns="">
+              <a14:hiddenEffects xmlns="" xmlns:a14="http://schemas.microsoft.com/office/drawing/2010/main">
                 <a:effectLst>
                   <a:outerShdw dist="35921" dir="2700000" algn="ctr" rotWithShape="0">
                     <a:schemeClr val="bg2"/>
@@ -6194,12 +6194,12 @@
           <a:effectLst/>
           <a:extLst>
             <a:ext uri="{909E8E84-426E-40dd-AFC4-6F175D3DCCD1}">
-              <a14:hiddenFill xmlns:a14="http://schemas.microsoft.com/office/drawing/2010/main" xmlns="">
+              <a14:hiddenFill xmlns="" xmlns:a14="http://schemas.microsoft.com/office/drawing/2010/main">
                 <a:noFill/>
               </a14:hiddenFill>
             </a:ext>
             <a:ext uri="{AF507438-7753-43e0-B8FC-AC1667EBCBE1}">
-              <a14:hiddenEffects xmlns:a14="http://schemas.microsoft.com/office/drawing/2010/main" xmlns="">
+              <a14:hiddenEffects xmlns="" xmlns:a14="http://schemas.microsoft.com/office/drawing/2010/main">
                 <a:effectLst>
                   <a:outerShdw dist="35921" dir="2700000" algn="ctr" rotWithShape="0">
                     <a:schemeClr val="bg2"/>
@@ -6252,12 +6252,12 @@
           <a:effectLst/>
           <a:extLst>
             <a:ext uri="{909E8E84-426E-40dd-AFC4-6F175D3DCCD1}">
-              <a14:hiddenFill xmlns:a14="http://schemas.microsoft.com/office/drawing/2010/main" xmlns="">
+              <a14:hiddenFill xmlns="" xmlns:a14="http://schemas.microsoft.com/office/drawing/2010/main">
                 <a:noFill/>
               </a14:hiddenFill>
             </a:ext>
             <a:ext uri="{AF507438-7753-43e0-B8FC-AC1667EBCBE1}">
-              <a14:hiddenEffects xmlns:a14="http://schemas.microsoft.com/office/drawing/2010/main" xmlns="">
+              <a14:hiddenEffects xmlns="" xmlns:a14="http://schemas.microsoft.com/office/drawing/2010/main">
                 <a:effectLst>
                   <a:outerShdw dist="35921" dir="2700000" algn="ctr" rotWithShape="0">
                     <a:schemeClr val="bg2"/>
@@ -6310,12 +6310,12 @@
           <a:effectLst/>
           <a:extLst>
             <a:ext uri="{909E8E84-426E-40dd-AFC4-6F175D3DCCD1}">
-              <a14:hiddenFill xmlns:a14="http://schemas.microsoft.com/office/drawing/2010/main" xmlns="">
+              <a14:hiddenFill xmlns="" xmlns:a14="http://schemas.microsoft.com/office/drawing/2010/main">
                 <a:noFill/>
               </a14:hiddenFill>
             </a:ext>
             <a:ext uri="{AF507438-7753-43e0-B8FC-AC1667EBCBE1}">
-              <a14:hiddenEffects xmlns:a14="http://schemas.microsoft.com/office/drawing/2010/main" xmlns="">
+              <a14:hiddenEffects xmlns="" xmlns:a14="http://schemas.microsoft.com/office/drawing/2010/main">
                 <a:effectLst>
                   <a:outerShdw dist="35921" dir="2700000" algn="ctr" rotWithShape="0">
                     <a:schemeClr val="bg2"/>
@@ -6370,7 +6370,7 @@
           <a:effectLst/>
           <a:extLst>
             <a:ext uri="{AF507438-7753-43e0-B8FC-AC1667EBCBE1}">
-              <a14:hiddenEffects xmlns:a14="http://schemas.microsoft.com/office/drawing/2010/main" xmlns="">
+              <a14:hiddenEffects xmlns="" xmlns:a14="http://schemas.microsoft.com/office/drawing/2010/main">
                 <a:effectLst>
                   <a:outerShdw dist="35921" dir="2700000" algn="ctr" rotWithShape="0">
                     <a:schemeClr val="bg2"/>
@@ -6542,7 +6542,7 @@
           <a:effectLst/>
           <a:extLst>
             <a:ext uri="{AF507438-7753-43e0-B8FC-AC1667EBCBE1}">
-              <a14:hiddenEffects xmlns:a14="http://schemas.microsoft.com/office/drawing/2010/main" xmlns="">
+              <a14:hiddenEffects xmlns="" xmlns:a14="http://schemas.microsoft.com/office/drawing/2010/main">
                 <a:effectLst>
                   <a:outerShdw dist="35921" dir="2700000" algn="ctr" rotWithShape="0">
                     <a:schemeClr val="bg2"/>
@@ -6698,12 +6698,12 @@
           <a:effectLst/>
           <a:extLst>
             <a:ext uri="{909E8E84-426E-40dd-AFC4-6F175D3DCCD1}">
-              <a14:hiddenFill xmlns:a14="http://schemas.microsoft.com/office/drawing/2010/main" xmlns="">
+              <a14:hiddenFill xmlns="" xmlns:a14="http://schemas.microsoft.com/office/drawing/2010/main">
                 <a:noFill/>
               </a14:hiddenFill>
             </a:ext>
             <a:ext uri="{91240B29-F687-4f45-9708-019B960494DF}">
-              <a14:hiddenLine xmlns:a14="http://schemas.microsoft.com/office/drawing/2010/main" xmlns="" w="38100">
+              <a14:hiddenLine xmlns="" xmlns:a14="http://schemas.microsoft.com/office/drawing/2010/main" w="38100">
                 <a:solidFill>
                   <a:srgbClr val="000000"/>
                 </a:solidFill>
@@ -6713,7 +6713,7 @@
               </a14:hiddenLine>
             </a:ext>
             <a:ext uri="{AF507438-7753-43e0-B8FC-AC1667EBCBE1}">
-              <a14:hiddenEffects xmlns:a14="http://schemas.microsoft.com/office/drawing/2010/main" xmlns="">
+              <a14:hiddenEffects xmlns="" xmlns:a14="http://schemas.microsoft.com/office/drawing/2010/main">
                 <a:effectLst>
                   <a:outerShdw dist="35921" dir="2700000" algn="ctr" rotWithShape="0">
                     <a:schemeClr val="bg2"/>
@@ -8677,7 +8677,7 @@
           <a:graphicData uri="http://schemas.openxmlformats.org/presentationml/2006/ole">
             <mc:AlternateContent xmlns:mc="http://schemas.openxmlformats.org/markup-compatibility/2006">
               <mc:Choice xmlns:v="urn:schemas-microsoft-com:vml" Requires="v">
-                <p:oleObj spid="_x0000_s1607" name="Equation" r:id="rId4" imgW="165100" imgH="241300" progId="Equation.3">
+                <p:oleObj spid="_x0000_s1622" name="Equation" r:id="rId4" imgW="165100" imgH="241300" progId="Equation.3">
                   <p:embed/>
                 </p:oleObj>
               </mc:Choice>
@@ -8844,7 +8844,7 @@
           <a:graphicData uri="http://schemas.openxmlformats.org/presentationml/2006/ole">
             <mc:AlternateContent xmlns:mc="http://schemas.openxmlformats.org/markup-compatibility/2006">
               <mc:Choice xmlns:v="urn:schemas-microsoft-com:vml" Requires="v">
-                <p:oleObj spid="_x0000_s1608" name="Equation" r:id="rId6" imgW="1282700" imgH="254000" progId="Equation.3">
+                <p:oleObj spid="_x0000_s1623" name="Equation" r:id="rId6" imgW="1282700" imgH="254000" progId="Equation.3">
                   <p:embed/>
                 </p:oleObj>
               </mc:Choice>
@@ -9138,7 +9138,7 @@
           <a:graphicData uri="http://schemas.openxmlformats.org/presentationml/2006/ole">
             <mc:AlternateContent xmlns:mc="http://schemas.openxmlformats.org/markup-compatibility/2006">
               <mc:Choice xmlns:v="urn:schemas-microsoft-com:vml" Requires="v">
-                <p:oleObj spid="_x0000_s1609" name="Equation" r:id="rId8" imgW="190500" imgH="254000" progId="Equation.3">
+                <p:oleObj spid="_x0000_s1624" name="Equation" r:id="rId8" imgW="190500" imgH="254000" progId="Equation.3">
                   <p:embed/>
                 </p:oleObj>
               </mc:Choice>
@@ -9206,7 +9206,7 @@
           <a:graphicData uri="http://schemas.openxmlformats.org/presentationml/2006/ole">
             <mc:AlternateContent xmlns:mc="http://schemas.openxmlformats.org/markup-compatibility/2006">
               <mc:Choice xmlns:v="urn:schemas-microsoft-com:vml" Requires="v">
-                <p:oleObj spid="_x0000_s1610" name="Equation" r:id="rId10" imgW="190500" imgH="254000" progId="Equation.3">
+                <p:oleObj spid="_x0000_s1625" name="Equation" r:id="rId10" imgW="190500" imgH="254000" progId="Equation.3">
                   <p:embed/>
                 </p:oleObj>
               </mc:Choice>
@@ -9480,7 +9480,7 @@
           <a:graphicData uri="http://schemas.openxmlformats.org/presentationml/2006/ole">
             <mc:AlternateContent xmlns:mc="http://schemas.openxmlformats.org/markup-compatibility/2006">
               <mc:Choice xmlns:v="urn:schemas-microsoft-com:vml" Requires="v">
-                <p:oleObj spid="_x0000_s1611" name="Equation" r:id="rId11" imgW="685800" imgH="241300" progId="Equation.3">
+                <p:oleObj spid="_x0000_s1626" name="Equation" r:id="rId11" imgW="685800" imgH="241300" progId="Equation.3">
                   <p:embed/>
                 </p:oleObj>
               </mc:Choice>
@@ -9546,7 +9546,7 @@
           <a:graphicData uri="http://schemas.openxmlformats.org/presentationml/2006/ole">
             <mc:AlternateContent xmlns:mc="http://schemas.openxmlformats.org/markup-compatibility/2006">
               <mc:Choice xmlns:v="urn:schemas-microsoft-com:vml" Requires="v">
-                <p:oleObj spid="_x0000_s1612" name="Equation" r:id="rId13" imgW="698500" imgH="254000" progId="Equation.3">
+                <p:oleObj spid="_x0000_s1627" name="Equation" r:id="rId13" imgW="698500" imgH="254000" progId="Equation.3">
                   <p:embed/>
                 </p:oleObj>
               </mc:Choice>
@@ -10846,7 +10846,7 @@
           <a:graphicData uri="http://schemas.openxmlformats.org/presentationml/2006/ole">
             <mc:AlternateContent xmlns:mc="http://schemas.openxmlformats.org/markup-compatibility/2006">
               <mc:Choice xmlns:v="urn:schemas-microsoft-com:vml" Requires="v">
-                <p:oleObj spid="_x0000_s1613" name="Equation" r:id="rId15" imgW="165100" imgH="241300" progId="Equation.3">
+                <p:oleObj spid="_x0000_s1628" name="Equation" r:id="rId15" imgW="165100" imgH="241300" progId="Equation.3">
                   <p:embed/>
                 </p:oleObj>
               </mc:Choice>
@@ -11103,7 +11103,7 @@
           <a:graphicData uri="http://schemas.openxmlformats.org/presentationml/2006/ole">
             <mc:AlternateContent xmlns:mc="http://schemas.openxmlformats.org/markup-compatibility/2006">
               <mc:Choice xmlns:v="urn:schemas-microsoft-com:vml" Requires="v">
-                <p:oleObj spid="_x0000_s1614" name="Equation" r:id="rId16" imgW="190500" imgH="254000" progId="Equation.3">
+                <p:oleObj spid="_x0000_s1629" name="Equation" r:id="rId16" imgW="190500" imgH="254000" progId="Equation.3">
                   <p:embed/>
                 </p:oleObj>
               </mc:Choice>
@@ -11171,7 +11171,7 @@
           <a:graphicData uri="http://schemas.openxmlformats.org/presentationml/2006/ole">
             <mc:AlternateContent xmlns:mc="http://schemas.openxmlformats.org/markup-compatibility/2006">
               <mc:Choice xmlns:v="urn:schemas-microsoft-com:vml" Requires="v">
-                <p:oleObj spid="_x0000_s1615" name="Equation" r:id="rId17" imgW="190500" imgH="254000" progId="Equation.3">
+                <p:oleObj spid="_x0000_s1630" name="Equation" r:id="rId17" imgW="190500" imgH="254000" progId="Equation.3">
                   <p:embed/>
                 </p:oleObj>
               </mc:Choice>
@@ -12446,7 +12446,7 @@
           <a:graphicData uri="http://schemas.openxmlformats.org/presentationml/2006/ole">
             <mc:AlternateContent xmlns:mc="http://schemas.openxmlformats.org/markup-compatibility/2006">
               <mc:Choice xmlns:v="urn:schemas-microsoft-com:vml" Requires="v">
-                <p:oleObj spid="_x0000_s1616" name="Equation" r:id="rId18" imgW="190500" imgH="241300" progId="Equation.3">
+                <p:oleObj spid="_x0000_s1631" name="Equation" r:id="rId18" imgW="190500" imgH="241300" progId="Equation.3">
                   <p:embed/>
                 </p:oleObj>
               </mc:Choice>
@@ -12703,7 +12703,7 @@
           <a:graphicData uri="http://schemas.openxmlformats.org/presentationml/2006/ole">
             <mc:AlternateContent xmlns:mc="http://schemas.openxmlformats.org/markup-compatibility/2006">
               <mc:Choice xmlns:v="urn:schemas-microsoft-com:vml" Requires="v">
-                <p:oleObj spid="_x0000_s1617" name="Equation" r:id="rId20" imgW="190500" imgH="254000" progId="Equation.3">
+                <p:oleObj spid="_x0000_s1632" name="Equation" r:id="rId20" imgW="190500" imgH="254000" progId="Equation.3">
                   <p:embed/>
                 </p:oleObj>
               </mc:Choice>
@@ -12771,7 +12771,7 @@
           <a:graphicData uri="http://schemas.openxmlformats.org/presentationml/2006/ole">
             <mc:AlternateContent xmlns:mc="http://schemas.openxmlformats.org/markup-compatibility/2006">
               <mc:Choice xmlns:v="urn:schemas-microsoft-com:vml" Requires="v">
-                <p:oleObj spid="_x0000_s1618" name="Equation" r:id="rId22" imgW="190500" imgH="254000" progId="Equation.3">
+                <p:oleObj spid="_x0000_s1633" name="Equation" r:id="rId22" imgW="190500" imgH="254000" progId="Equation.3">
                   <p:embed/>
                 </p:oleObj>
               </mc:Choice>
@@ -14139,7 +14139,7 @@
           <a:graphicData uri="http://schemas.openxmlformats.org/presentationml/2006/ole">
             <mc:AlternateContent xmlns:mc="http://schemas.openxmlformats.org/markup-compatibility/2006">
               <mc:Choice xmlns:v="urn:schemas-microsoft-com:vml" Requires="v">
-                <p:oleObj spid="_x0000_s1619" name="Equation" r:id="rId24" imgW="190500" imgH="241300" progId="Equation.3">
+                <p:oleObj spid="_x0000_s1634" name="Equation" r:id="rId24" imgW="190500" imgH="241300" progId="Equation.3">
                   <p:embed/>
                 </p:oleObj>
               </mc:Choice>
@@ -14396,7 +14396,7 @@
           <a:graphicData uri="http://schemas.openxmlformats.org/presentationml/2006/ole">
             <mc:AlternateContent xmlns:mc="http://schemas.openxmlformats.org/markup-compatibility/2006">
               <mc:Choice xmlns:v="urn:schemas-microsoft-com:vml" Requires="v">
-                <p:oleObj spid="_x0000_s1620" name="Equation" r:id="rId26" imgW="190500" imgH="254000" progId="Equation.3">
+                <p:oleObj spid="_x0000_s1635" name="Equation" r:id="rId26" imgW="190500" imgH="254000" progId="Equation.3">
                   <p:embed/>
                 </p:oleObj>
               </mc:Choice>
@@ -14464,7 +14464,7 @@
           <a:graphicData uri="http://schemas.openxmlformats.org/presentationml/2006/ole">
             <mc:AlternateContent xmlns:mc="http://schemas.openxmlformats.org/markup-compatibility/2006">
               <mc:Choice xmlns:v="urn:schemas-microsoft-com:vml" Requires="v">
-                <p:oleObj spid="_x0000_s1621" name="Equation" r:id="rId28" imgW="190500" imgH="254000" progId="Equation.3">
+                <p:oleObj spid="_x0000_s1636" name="Equation" r:id="rId28" imgW="190500" imgH="254000" progId="Equation.3">
                   <p:embed/>
                 </p:oleObj>
               </mc:Choice>
@@ -16194,7 +16194,7 @@
           <a:graphicData uri="http://schemas.openxmlformats.org/presentationml/2006/ole">
             <mc:AlternateContent xmlns:mc="http://schemas.openxmlformats.org/markup-compatibility/2006">
               <mc:Choice xmlns:v="urn:schemas-microsoft-com:vml" Requires="v">
-                <p:oleObj spid="_x0000_s2131" name="Equation" r:id="rId4" imgW="190440" imgH="228600" progId="Equation.3">
+                <p:oleObj spid="_x0000_s2142" name="Equation" r:id="rId4" imgW="190440" imgH="228600" progId="Equation.3">
                   <p:embed/>
                 </p:oleObj>
               </mc:Choice>
@@ -16661,7 +16661,7 @@
           <a:graphicData uri="http://schemas.openxmlformats.org/presentationml/2006/ole">
             <mc:AlternateContent xmlns:mc="http://schemas.openxmlformats.org/markup-compatibility/2006">
               <mc:Choice xmlns:v="urn:schemas-microsoft-com:vml" Requires="v">
-                <p:oleObj spid="_x0000_s2132" name="Equation" r:id="rId6" imgW="660240" imgH="215640" progId="Equation.3">
+                <p:oleObj spid="_x0000_s2143" name="Equation" r:id="rId6" imgW="660240" imgH="215640" progId="Equation.3">
                   <p:embed/>
                 </p:oleObj>
               </mc:Choice>
@@ -16724,7 +16724,7 @@
           <a:graphicData uri="http://schemas.openxmlformats.org/presentationml/2006/ole">
             <mc:AlternateContent xmlns:mc="http://schemas.openxmlformats.org/markup-compatibility/2006">
               <mc:Choice xmlns:v="urn:schemas-microsoft-com:vml" Requires="v">
-                <p:oleObj spid="_x0000_s2133" name="Equation" r:id="rId8" imgW="698500" imgH="254000" progId="Equation.3">
+                <p:oleObj spid="_x0000_s2144" name="Equation" r:id="rId8" imgW="698500" imgH="254000" progId="Equation.3">
                   <p:embed/>
                 </p:oleObj>
               </mc:Choice>
@@ -18869,7 +18869,7 @@
           <a:graphicData uri="http://schemas.openxmlformats.org/presentationml/2006/ole">
             <mc:AlternateContent xmlns:mc="http://schemas.openxmlformats.org/markup-compatibility/2006">
               <mc:Choice xmlns:v="urn:schemas-microsoft-com:vml" Requires="v">
-                <p:oleObj spid="_x0000_s2134" name="Equation" r:id="rId10" imgW="190440" imgH="228600" progId="Equation.3">
+                <p:oleObj spid="_x0000_s2145" name="Equation" r:id="rId10" imgW="190440" imgH="228600" progId="Equation.3">
                   <p:embed/>
                 </p:oleObj>
               </mc:Choice>
@@ -20420,7 +20420,7 @@
           <a:graphicData uri="http://schemas.openxmlformats.org/presentationml/2006/ole">
             <mc:AlternateContent xmlns:mc="http://schemas.openxmlformats.org/markup-compatibility/2006">
               <mc:Choice xmlns:v="urn:schemas-microsoft-com:vml" Requires="v">
-                <p:oleObj spid="_x0000_s2135" name="Equation" r:id="rId13" imgW="203040" imgH="228600" progId="Equation.3">
+                <p:oleObj spid="_x0000_s2146" name="Equation" r:id="rId13" imgW="203040" imgH="228600" progId="Equation.3">
                   <p:embed/>
                 </p:oleObj>
               </mc:Choice>
@@ -20494,7 +20494,7 @@
           <a:graphicData uri="http://schemas.openxmlformats.org/presentationml/2006/ole">
             <mc:AlternateContent xmlns:mc="http://schemas.openxmlformats.org/markup-compatibility/2006">
               <mc:Choice xmlns:v="urn:schemas-microsoft-com:vml" Requires="v">
-                <p:oleObj spid="_x0000_s2136" name="Equation" r:id="rId15" imgW="203040" imgH="228600" progId="Equation.3">
+                <p:oleObj spid="_x0000_s2147" name="Equation" r:id="rId15" imgW="203040" imgH="228600" progId="Equation.3">
                   <p:embed/>
                 </p:oleObj>
               </mc:Choice>
@@ -20574,7 +20574,7 @@
           <a:graphicData uri="http://schemas.openxmlformats.org/presentationml/2006/ole">
             <mc:AlternateContent xmlns:mc="http://schemas.openxmlformats.org/markup-compatibility/2006">
               <mc:Choice xmlns:v="urn:schemas-microsoft-com:vml" Requires="v">
-                <p:oleObj spid="_x0000_s2137" name="Equation" r:id="rId16" imgW="203040" imgH="228600" progId="Equation.3">
+                <p:oleObj spid="_x0000_s2148" name="Equation" r:id="rId16" imgW="203040" imgH="228600" progId="Equation.3">
                   <p:embed/>
                 </p:oleObj>
               </mc:Choice>
@@ -20654,7 +20654,7 @@
           <a:graphicData uri="http://schemas.openxmlformats.org/presentationml/2006/ole">
             <mc:AlternateContent xmlns:mc="http://schemas.openxmlformats.org/markup-compatibility/2006">
               <mc:Choice xmlns:v="urn:schemas-microsoft-com:vml" Requires="v">
-                <p:oleObj spid="_x0000_s2138" name="Equation" r:id="rId17" imgW="203040" imgH="228600" progId="Equation.3">
+                <p:oleObj spid="_x0000_s2149" name="Equation" r:id="rId17" imgW="203040" imgH="228600" progId="Equation.3">
                   <p:embed/>
                 </p:oleObj>
               </mc:Choice>
@@ -20734,7 +20734,7 @@
           <a:graphicData uri="http://schemas.openxmlformats.org/presentationml/2006/ole">
             <mc:AlternateContent xmlns:mc="http://schemas.openxmlformats.org/markup-compatibility/2006">
               <mc:Choice xmlns:v="urn:schemas-microsoft-com:vml" Requires="v">
-                <p:oleObj spid="_x0000_s2139" name="Equation" r:id="rId19" imgW="203040" imgH="228600" progId="Equation.3">
+                <p:oleObj spid="_x0000_s2150" name="Equation" r:id="rId19" imgW="203040" imgH="228600" progId="Equation.3">
                   <p:embed/>
                 </p:oleObj>
               </mc:Choice>
@@ -20814,7 +20814,7 @@
           <a:graphicData uri="http://schemas.openxmlformats.org/presentationml/2006/ole">
             <mc:AlternateContent xmlns:mc="http://schemas.openxmlformats.org/markup-compatibility/2006">
               <mc:Choice xmlns:v="urn:schemas-microsoft-com:vml" Requires="v">
-                <p:oleObj spid="_x0000_s2140" name="Equation" r:id="rId21" imgW="203040" imgH="228600" progId="Equation.3">
+                <p:oleObj spid="_x0000_s2151" name="Equation" r:id="rId21" imgW="203040" imgH="228600" progId="Equation.3">
                   <p:embed/>
                 </p:oleObj>
               </mc:Choice>
@@ -21049,6 +21049,7 @@
             </a:solidFill>
             <a:prstDash val="sysDash"/>
           </a:ln>
+          <a:effectLst/>
         </p:spPr>
         <p:style>
           <a:lnRef idx="2">
@@ -21093,6 +21094,7 @@
             </a:solidFill>
             <a:prstDash val="sysDash"/>
           </a:ln>
+          <a:effectLst/>
         </p:spPr>
         <p:style>
           <a:lnRef idx="2">
@@ -21137,6 +21139,7 @@
             </a:solidFill>
             <a:prstDash val="sysDash"/>
           </a:ln>
+          <a:effectLst/>
         </p:spPr>
         <p:style>
           <a:lnRef idx="2">
@@ -22502,7 +22505,7 @@
           <a:graphicData uri="http://schemas.openxmlformats.org/presentationml/2006/ole">
             <mc:AlternateContent xmlns:mc="http://schemas.openxmlformats.org/markup-compatibility/2006">
               <mc:Choice xmlns:v="urn:schemas-microsoft-com:vml" Requires="v">
-                <p:oleObj spid="_x0000_s2141" name="Equation" r:id="rId23" imgW="1815840" imgH="241200" progId="Equation.3">
+                <p:oleObj spid="_x0000_s2152" name="Equation" r:id="rId23" imgW="1815840" imgH="241200" progId="Equation.3">
                   <p:embed/>
                 </p:oleObj>
               </mc:Choice>

</xml_diff>

<commit_message>
changes to spike in sections
</commit_message>
<xml_diff>
--- a/main/ptm_fig.pptx
+++ b/main/ptm_fig.pptx
@@ -5,18 +5,20 @@
     <p:sldMasterId id="2147483648" r:id="rId1"/>
   </p:sldMasterIdLst>
   <p:notesMasterIdLst>
-    <p:notesMasterId r:id="rId6"/>
+    <p:notesMasterId r:id="rId8"/>
   </p:notesMasterIdLst>
   <p:sldIdLst>
     <p:sldId id="297" r:id="rId2"/>
     <p:sldId id="294" r:id="rId3"/>
     <p:sldId id="327" r:id="rId4"/>
     <p:sldId id="328" r:id="rId5"/>
+    <p:sldId id="330" r:id="rId6"/>
+    <p:sldId id="331" r:id="rId7"/>
   </p:sldIdLst>
   <p:sldSz cx="9144000" cy="6858000" type="screen4x3"/>
   <p:notesSz cx="6858000" cy="9144000"/>
   <p:custDataLst>
-    <p:tags r:id="rId7"/>
+    <p:tags r:id="rId9"/>
   </p:custDataLst>
   <p:defaultTextStyle>
     <a:defPPr>
@@ -226,7 +228,7 @@
           <a:p>
             <a:fld id="{80137904-5636-B34C-A9CD-CBEBAD04BF28}" type="datetimeFigureOut">
               <a:rPr lang="en-US" smtClean="0"/>
-              <a:t>3/31/2022</a:t>
+              <a:t>5/4/2022</a:t>
             </a:fld>
             <a:endParaRPr lang="en-US"/>
           </a:p>
@@ -773,7 +775,7 @@
           <a:p>
             <a:fld id="{3C76BF9E-C1DF-AA49-BEDC-5D48F2B93EA3}" type="datetimeFigureOut">
               <a:rPr lang="en-US" smtClean="0"/>
-              <a:t>3/31/2022</a:t>
+              <a:t>5/4/2022</a:t>
             </a:fld>
             <a:endParaRPr lang="en-US"/>
           </a:p>
@@ -941,7 +943,7 @@
           <a:p>
             <a:fld id="{3C76BF9E-C1DF-AA49-BEDC-5D48F2B93EA3}" type="datetimeFigureOut">
               <a:rPr lang="en-US" smtClean="0"/>
-              <a:t>3/31/2022</a:t>
+              <a:t>5/4/2022</a:t>
             </a:fld>
             <a:endParaRPr lang="en-US"/>
           </a:p>
@@ -1119,7 +1121,7 @@
           <a:p>
             <a:fld id="{3C76BF9E-C1DF-AA49-BEDC-5D48F2B93EA3}" type="datetimeFigureOut">
               <a:rPr lang="en-US" smtClean="0"/>
-              <a:t>3/31/2022</a:t>
+              <a:t>5/4/2022</a:t>
             </a:fld>
             <a:endParaRPr lang="en-US"/>
           </a:p>
@@ -1287,7 +1289,7 @@
           <a:p>
             <a:fld id="{3C76BF9E-C1DF-AA49-BEDC-5D48F2B93EA3}" type="datetimeFigureOut">
               <a:rPr lang="en-US" smtClean="0"/>
-              <a:t>3/31/2022</a:t>
+              <a:t>5/4/2022</a:t>
             </a:fld>
             <a:endParaRPr lang="en-US"/>
           </a:p>
@@ -1532,7 +1534,7 @@
           <a:p>
             <a:fld id="{3C76BF9E-C1DF-AA49-BEDC-5D48F2B93EA3}" type="datetimeFigureOut">
               <a:rPr lang="en-US" smtClean="0"/>
-              <a:t>3/31/2022</a:t>
+              <a:t>5/4/2022</a:t>
             </a:fld>
             <a:endParaRPr lang="en-US"/>
           </a:p>
@@ -1817,7 +1819,7 @@
           <a:p>
             <a:fld id="{3C76BF9E-C1DF-AA49-BEDC-5D48F2B93EA3}" type="datetimeFigureOut">
               <a:rPr lang="en-US" smtClean="0"/>
-              <a:t>3/31/2022</a:t>
+              <a:t>5/4/2022</a:t>
             </a:fld>
             <a:endParaRPr lang="en-US"/>
           </a:p>
@@ -2236,7 +2238,7 @@
           <a:p>
             <a:fld id="{3C76BF9E-C1DF-AA49-BEDC-5D48F2B93EA3}" type="datetimeFigureOut">
               <a:rPr lang="en-US" smtClean="0"/>
-              <a:t>3/31/2022</a:t>
+              <a:t>5/4/2022</a:t>
             </a:fld>
             <a:endParaRPr lang="en-US"/>
           </a:p>
@@ -2353,7 +2355,7 @@
           <a:p>
             <a:fld id="{3C76BF9E-C1DF-AA49-BEDC-5D48F2B93EA3}" type="datetimeFigureOut">
               <a:rPr lang="en-US" smtClean="0"/>
-              <a:t>3/31/2022</a:t>
+              <a:t>5/4/2022</a:t>
             </a:fld>
             <a:endParaRPr lang="en-US"/>
           </a:p>
@@ -2448,7 +2450,7 @@
           <a:p>
             <a:fld id="{3C76BF9E-C1DF-AA49-BEDC-5D48F2B93EA3}" type="datetimeFigureOut">
               <a:rPr lang="en-US" smtClean="0"/>
-              <a:t>3/31/2022</a:t>
+              <a:t>5/4/2022</a:t>
             </a:fld>
             <a:endParaRPr lang="en-US"/>
           </a:p>
@@ -2723,7 +2725,7 @@
           <a:p>
             <a:fld id="{3C76BF9E-C1DF-AA49-BEDC-5D48F2B93EA3}" type="datetimeFigureOut">
               <a:rPr lang="en-US" smtClean="0"/>
-              <a:t>3/31/2022</a:t>
+              <a:t>5/4/2022</a:t>
             </a:fld>
             <a:endParaRPr lang="en-US"/>
           </a:p>
@@ -2975,7 +2977,7 @@
           <a:p>
             <a:fld id="{3C76BF9E-C1DF-AA49-BEDC-5D48F2B93EA3}" type="datetimeFigureOut">
               <a:rPr lang="en-US" smtClean="0"/>
-              <a:t>3/31/2022</a:t>
+              <a:t>5/4/2022</a:t>
             </a:fld>
             <a:endParaRPr lang="en-US"/>
           </a:p>
@@ -3186,7 +3188,7 @@
           <a:p>
             <a:fld id="{3C76BF9E-C1DF-AA49-BEDC-5D48F2B93EA3}" type="datetimeFigureOut">
               <a:rPr lang="en-US" smtClean="0"/>
-              <a:t>3/31/2022</a:t>
+              <a:t>5/4/2022</a:t>
             </a:fld>
             <a:endParaRPr lang="en-US"/>
           </a:p>
@@ -3675,7 +3677,7 @@
           <a:effectLst/>
           <a:extLst>
             <a:ext uri="{AF507438-7753-43e0-B8FC-AC1667EBCBE1}">
-              <a14:hiddenEffects xmlns="" xmlns:a14="http://schemas.microsoft.com/office/drawing/2010/main">
+              <a14:hiddenEffects xmlns:a14="http://schemas.microsoft.com/office/drawing/2010/main" xmlns="">
                 <a:effectLst>
                   <a:outerShdw dist="35921" dir="2700000" algn="ctr" rotWithShape="0">
                     <a:schemeClr val="bg2"/>
@@ -3836,12 +3838,12 @@
           <a:effectLst/>
           <a:extLst>
             <a:ext uri="{909E8E84-426E-40dd-AFC4-6F175D3DCCD1}">
-              <a14:hiddenFill xmlns="" xmlns:a14="http://schemas.microsoft.com/office/drawing/2010/main">
+              <a14:hiddenFill xmlns:a14="http://schemas.microsoft.com/office/drawing/2010/main" xmlns="">
                 <a:noFill/>
               </a14:hiddenFill>
             </a:ext>
             <a:ext uri="{AF507438-7753-43e0-B8FC-AC1667EBCBE1}">
-              <a14:hiddenEffects xmlns="" xmlns:a14="http://schemas.microsoft.com/office/drawing/2010/main">
+              <a14:hiddenEffects xmlns:a14="http://schemas.microsoft.com/office/drawing/2010/main" xmlns="">
                 <a:effectLst>
                   <a:outerShdw dist="35921" dir="2700000" algn="ctr" rotWithShape="0">
                     <a:schemeClr val="bg2"/>
@@ -3896,7 +3898,7 @@
           <a:effectLst/>
           <a:extLst>
             <a:ext uri="{AF507438-7753-43e0-B8FC-AC1667EBCBE1}">
-              <a14:hiddenEffects xmlns="" xmlns:a14="http://schemas.microsoft.com/office/drawing/2010/main">
+              <a14:hiddenEffects xmlns:a14="http://schemas.microsoft.com/office/drawing/2010/main" xmlns="">
                 <a:effectLst>
                   <a:outerShdw dist="35921" dir="2700000" algn="ctr" rotWithShape="0">
                     <a:schemeClr val="bg2"/>
@@ -3949,12 +3951,12 @@
           <a:effectLst/>
           <a:extLst>
             <a:ext uri="{909E8E84-426E-40dd-AFC4-6F175D3DCCD1}">
-              <a14:hiddenFill xmlns="" xmlns:a14="http://schemas.microsoft.com/office/drawing/2010/main">
+              <a14:hiddenFill xmlns:a14="http://schemas.microsoft.com/office/drawing/2010/main" xmlns="">
                 <a:noFill/>
               </a14:hiddenFill>
             </a:ext>
             <a:ext uri="{AF507438-7753-43e0-B8FC-AC1667EBCBE1}">
-              <a14:hiddenEffects xmlns="" xmlns:a14="http://schemas.microsoft.com/office/drawing/2010/main">
+              <a14:hiddenEffects xmlns:a14="http://schemas.microsoft.com/office/drawing/2010/main" xmlns="">
                 <a:effectLst>
                   <a:outerShdw dist="35921" dir="2700000" algn="ctr" rotWithShape="0">
                     <a:schemeClr val="bg2"/>
@@ -4007,12 +4009,12 @@
           <a:effectLst/>
           <a:extLst>
             <a:ext uri="{909E8E84-426E-40dd-AFC4-6F175D3DCCD1}">
-              <a14:hiddenFill xmlns="" xmlns:a14="http://schemas.microsoft.com/office/drawing/2010/main">
+              <a14:hiddenFill xmlns:a14="http://schemas.microsoft.com/office/drawing/2010/main" xmlns="">
                 <a:noFill/>
               </a14:hiddenFill>
             </a:ext>
             <a:ext uri="{AF507438-7753-43e0-B8FC-AC1667EBCBE1}">
-              <a14:hiddenEffects xmlns="" xmlns:a14="http://schemas.microsoft.com/office/drawing/2010/main">
+              <a14:hiddenEffects xmlns:a14="http://schemas.microsoft.com/office/drawing/2010/main" xmlns="">
                 <a:effectLst>
                   <a:outerShdw dist="35921" dir="2700000" algn="ctr" rotWithShape="0">
                     <a:schemeClr val="bg2"/>
@@ -4069,7 +4071,7 @@
           <a:effectLst/>
           <a:extLst>
             <a:ext uri="{AF507438-7753-43e0-B8FC-AC1667EBCBE1}">
-              <a14:hiddenEffects xmlns="" xmlns:a14="http://schemas.microsoft.com/office/drawing/2010/main">
+              <a14:hiddenEffects xmlns:a14="http://schemas.microsoft.com/office/drawing/2010/main" xmlns="">
                 <a:effectLst>
                   <a:outerShdw dist="35921" dir="2700000" algn="ctr" rotWithShape="0">
                     <a:schemeClr val="bg2"/>
@@ -4124,7 +4126,7 @@
           <a:effectLst/>
           <a:extLst>
             <a:ext uri="{AF507438-7753-43e0-B8FC-AC1667EBCBE1}">
-              <a14:hiddenEffects xmlns="" xmlns:a14="http://schemas.microsoft.com/office/drawing/2010/main">
+              <a14:hiddenEffects xmlns:a14="http://schemas.microsoft.com/office/drawing/2010/main" xmlns="">
                 <a:effectLst>
                   <a:outerShdw dist="35921" dir="2700000" algn="ctr" rotWithShape="0">
                     <a:schemeClr val="bg2"/>
@@ -4177,12 +4179,12 @@
           <a:effectLst/>
           <a:extLst>
             <a:ext uri="{909E8E84-426E-40dd-AFC4-6F175D3DCCD1}">
-              <a14:hiddenFill xmlns="" xmlns:a14="http://schemas.microsoft.com/office/drawing/2010/main">
+              <a14:hiddenFill xmlns:a14="http://schemas.microsoft.com/office/drawing/2010/main" xmlns="">
                 <a:noFill/>
               </a14:hiddenFill>
             </a:ext>
             <a:ext uri="{AF507438-7753-43e0-B8FC-AC1667EBCBE1}">
-              <a14:hiddenEffects xmlns="" xmlns:a14="http://schemas.microsoft.com/office/drawing/2010/main">
+              <a14:hiddenEffects xmlns:a14="http://schemas.microsoft.com/office/drawing/2010/main" xmlns="">
                 <a:effectLst>
                   <a:outerShdw dist="35921" dir="2700000" algn="ctr" rotWithShape="0">
                     <a:schemeClr val="bg2"/>
@@ -4235,12 +4237,12 @@
           <a:effectLst/>
           <a:extLst>
             <a:ext uri="{909E8E84-426E-40dd-AFC4-6F175D3DCCD1}">
-              <a14:hiddenFill xmlns="" xmlns:a14="http://schemas.microsoft.com/office/drawing/2010/main">
+              <a14:hiddenFill xmlns:a14="http://schemas.microsoft.com/office/drawing/2010/main" xmlns="">
                 <a:noFill/>
               </a14:hiddenFill>
             </a:ext>
             <a:ext uri="{AF507438-7753-43e0-B8FC-AC1667EBCBE1}">
-              <a14:hiddenEffects xmlns="" xmlns:a14="http://schemas.microsoft.com/office/drawing/2010/main">
+              <a14:hiddenEffects xmlns:a14="http://schemas.microsoft.com/office/drawing/2010/main" xmlns="">
                 <a:effectLst>
                   <a:outerShdw dist="35921" dir="2700000" algn="ctr" rotWithShape="0">
                     <a:schemeClr val="bg2"/>
@@ -4297,7 +4299,7 @@
           <a:effectLst/>
           <a:extLst>
             <a:ext uri="{AF507438-7753-43e0-B8FC-AC1667EBCBE1}">
-              <a14:hiddenEffects xmlns="" xmlns:a14="http://schemas.microsoft.com/office/drawing/2010/main">
+              <a14:hiddenEffects xmlns:a14="http://schemas.microsoft.com/office/drawing/2010/main" xmlns="">
                 <a:effectLst>
                   <a:outerShdw dist="35921" dir="2700000" algn="ctr" rotWithShape="0">
                     <a:schemeClr val="bg2"/>
@@ -4352,7 +4354,7 @@
           <a:effectLst/>
           <a:extLst>
             <a:ext uri="{AF507438-7753-43e0-B8FC-AC1667EBCBE1}">
-              <a14:hiddenEffects xmlns="" xmlns:a14="http://schemas.microsoft.com/office/drawing/2010/main">
+              <a14:hiddenEffects xmlns:a14="http://schemas.microsoft.com/office/drawing/2010/main" xmlns="">
                 <a:effectLst>
                   <a:outerShdw dist="35921" dir="2700000" algn="ctr" rotWithShape="0">
                     <a:schemeClr val="bg2"/>
@@ -4405,12 +4407,12 @@
           <a:effectLst/>
           <a:extLst>
             <a:ext uri="{909E8E84-426E-40dd-AFC4-6F175D3DCCD1}">
-              <a14:hiddenFill xmlns="" xmlns:a14="http://schemas.microsoft.com/office/drawing/2010/main">
+              <a14:hiddenFill xmlns:a14="http://schemas.microsoft.com/office/drawing/2010/main" xmlns="">
                 <a:noFill/>
               </a14:hiddenFill>
             </a:ext>
             <a:ext uri="{AF507438-7753-43e0-B8FC-AC1667EBCBE1}">
-              <a14:hiddenEffects xmlns="" xmlns:a14="http://schemas.microsoft.com/office/drawing/2010/main">
+              <a14:hiddenEffects xmlns:a14="http://schemas.microsoft.com/office/drawing/2010/main" xmlns="">
                 <a:effectLst>
                   <a:outerShdw dist="35921" dir="2700000" algn="ctr" rotWithShape="0">
                     <a:schemeClr val="bg2"/>
@@ -4463,12 +4465,12 @@
           <a:effectLst/>
           <a:extLst>
             <a:ext uri="{909E8E84-426E-40dd-AFC4-6F175D3DCCD1}">
-              <a14:hiddenFill xmlns="" xmlns:a14="http://schemas.microsoft.com/office/drawing/2010/main">
+              <a14:hiddenFill xmlns:a14="http://schemas.microsoft.com/office/drawing/2010/main" xmlns="">
                 <a:noFill/>
               </a14:hiddenFill>
             </a:ext>
             <a:ext uri="{AF507438-7753-43e0-B8FC-AC1667EBCBE1}">
-              <a14:hiddenEffects xmlns="" xmlns:a14="http://schemas.microsoft.com/office/drawing/2010/main">
+              <a14:hiddenEffects xmlns:a14="http://schemas.microsoft.com/office/drawing/2010/main" xmlns="">
                 <a:effectLst>
                   <a:outerShdw dist="35921" dir="2700000" algn="ctr" rotWithShape="0">
                     <a:schemeClr val="bg2"/>
@@ -4523,7 +4525,7 @@
           <a:effectLst/>
           <a:extLst>
             <a:ext uri="{AF507438-7753-43e0-B8FC-AC1667EBCBE1}">
-              <a14:hiddenEffects xmlns="" xmlns:a14="http://schemas.microsoft.com/office/drawing/2010/main">
+              <a14:hiddenEffects xmlns:a14="http://schemas.microsoft.com/office/drawing/2010/main" xmlns="">
                 <a:effectLst>
                   <a:outerShdw dist="35921" dir="2700000" algn="ctr" rotWithShape="0">
                     <a:schemeClr val="bg2"/>
@@ -4578,7 +4580,7 @@
           <a:effectLst/>
           <a:extLst>
             <a:ext uri="{AF507438-7753-43e0-B8FC-AC1667EBCBE1}">
-              <a14:hiddenEffects xmlns="" xmlns:a14="http://schemas.microsoft.com/office/drawing/2010/main">
+              <a14:hiddenEffects xmlns:a14="http://schemas.microsoft.com/office/drawing/2010/main" xmlns="">
                 <a:effectLst>
                   <a:outerShdw dist="35921" dir="2700000" algn="ctr" rotWithShape="0">
                     <a:schemeClr val="bg2"/>
@@ -4631,12 +4633,12 @@
           <a:effectLst/>
           <a:extLst>
             <a:ext uri="{909E8E84-426E-40dd-AFC4-6F175D3DCCD1}">
-              <a14:hiddenFill xmlns="" xmlns:a14="http://schemas.microsoft.com/office/drawing/2010/main">
+              <a14:hiddenFill xmlns:a14="http://schemas.microsoft.com/office/drawing/2010/main" xmlns="">
                 <a:noFill/>
               </a14:hiddenFill>
             </a:ext>
             <a:ext uri="{AF507438-7753-43e0-B8FC-AC1667EBCBE1}">
-              <a14:hiddenEffects xmlns="" xmlns:a14="http://schemas.microsoft.com/office/drawing/2010/main">
+              <a14:hiddenEffects xmlns:a14="http://schemas.microsoft.com/office/drawing/2010/main" xmlns="">
                 <a:effectLst>
                   <a:outerShdw dist="35921" dir="2700000" algn="ctr" rotWithShape="0">
                     <a:schemeClr val="bg2"/>
@@ -4689,12 +4691,12 @@
           <a:effectLst/>
           <a:extLst>
             <a:ext uri="{909E8E84-426E-40dd-AFC4-6F175D3DCCD1}">
-              <a14:hiddenFill xmlns="" xmlns:a14="http://schemas.microsoft.com/office/drawing/2010/main">
+              <a14:hiddenFill xmlns:a14="http://schemas.microsoft.com/office/drawing/2010/main" xmlns="">
                 <a:noFill/>
               </a14:hiddenFill>
             </a:ext>
             <a:ext uri="{AF507438-7753-43e0-B8FC-AC1667EBCBE1}">
-              <a14:hiddenEffects xmlns="" xmlns:a14="http://schemas.microsoft.com/office/drawing/2010/main">
+              <a14:hiddenEffects xmlns:a14="http://schemas.microsoft.com/office/drawing/2010/main" xmlns="">
                 <a:effectLst>
                   <a:outerShdw dist="35921" dir="2700000" algn="ctr" rotWithShape="0">
                     <a:schemeClr val="bg2"/>
@@ -4751,7 +4753,7 @@
           <a:effectLst/>
           <a:extLst>
             <a:ext uri="{AF507438-7753-43e0-B8FC-AC1667EBCBE1}">
-              <a14:hiddenEffects xmlns="" xmlns:a14="http://schemas.microsoft.com/office/drawing/2010/main">
+              <a14:hiddenEffects xmlns:a14="http://schemas.microsoft.com/office/drawing/2010/main" xmlns="">
                 <a:effectLst>
                   <a:outerShdw dist="35921" dir="2700000" algn="ctr" rotWithShape="0">
                     <a:schemeClr val="bg2"/>
@@ -4799,14 +4801,14 @@
           <a:effectLst/>
           <a:extLst>
             <a:ext uri="{909E8E84-426E-40dd-AFC4-6F175D3DCCD1}">
-              <a14:hiddenFill xmlns="" xmlns:a14="http://schemas.microsoft.com/office/drawing/2010/main">
+              <a14:hiddenFill xmlns:a14="http://schemas.microsoft.com/office/drawing/2010/main" xmlns="">
                 <a:solidFill>
                   <a:schemeClr val="accent1"/>
                 </a:solidFill>
               </a14:hiddenFill>
             </a:ext>
             <a:ext uri="{91240B29-F687-4f45-9708-019B960494DF}">
-              <a14:hiddenLine xmlns="" xmlns:a14="http://schemas.microsoft.com/office/drawing/2010/main" w="9525">
+              <a14:hiddenLine xmlns:a14="http://schemas.microsoft.com/office/drawing/2010/main" xmlns="" w="9525">
                 <a:solidFill>
                   <a:schemeClr val="tx1"/>
                 </a:solidFill>
@@ -4816,7 +4818,7 @@
               </a14:hiddenLine>
             </a:ext>
             <a:ext uri="{AF507438-7753-43e0-B8FC-AC1667EBCBE1}">
-              <a14:hiddenEffects xmlns="" xmlns:a14="http://schemas.microsoft.com/office/drawing/2010/main">
+              <a14:hiddenEffects xmlns:a14="http://schemas.microsoft.com/office/drawing/2010/main" xmlns="">
                 <a:effectLst>
                   <a:outerShdw dist="35921" dir="2700000" algn="ctr" rotWithShape="0">
                     <a:schemeClr val="bg2"/>
@@ -4974,14 +4976,14 @@
           <a:effectLst/>
           <a:extLst>
             <a:ext uri="{909E8E84-426E-40dd-AFC4-6F175D3DCCD1}">
-              <a14:hiddenFill xmlns="" xmlns:a14="http://schemas.microsoft.com/office/drawing/2010/main">
+              <a14:hiddenFill xmlns:a14="http://schemas.microsoft.com/office/drawing/2010/main" xmlns="">
                 <a:solidFill>
                   <a:schemeClr val="accent1"/>
                 </a:solidFill>
               </a14:hiddenFill>
             </a:ext>
             <a:ext uri="{91240B29-F687-4f45-9708-019B960494DF}">
-              <a14:hiddenLine xmlns="" xmlns:a14="http://schemas.microsoft.com/office/drawing/2010/main" w="9525">
+              <a14:hiddenLine xmlns:a14="http://schemas.microsoft.com/office/drawing/2010/main" xmlns="" w="9525">
                 <a:solidFill>
                   <a:schemeClr val="tx1"/>
                 </a:solidFill>
@@ -4991,7 +4993,7 @@
               </a14:hiddenLine>
             </a:ext>
             <a:ext uri="{AF507438-7753-43e0-B8FC-AC1667EBCBE1}">
-              <a14:hiddenEffects xmlns="" xmlns:a14="http://schemas.microsoft.com/office/drawing/2010/main">
+              <a14:hiddenEffects xmlns:a14="http://schemas.microsoft.com/office/drawing/2010/main" xmlns="">
                 <a:effectLst>
                   <a:outerShdw dist="35921" dir="2700000" algn="ctr" rotWithShape="0">
                     <a:schemeClr val="bg2"/>
@@ -5149,14 +5151,14 @@
           <a:effectLst/>
           <a:extLst>
             <a:ext uri="{909E8E84-426E-40dd-AFC4-6F175D3DCCD1}">
-              <a14:hiddenFill xmlns="" xmlns:a14="http://schemas.microsoft.com/office/drawing/2010/main">
+              <a14:hiddenFill xmlns:a14="http://schemas.microsoft.com/office/drawing/2010/main" xmlns="">
                 <a:solidFill>
                   <a:schemeClr val="accent1"/>
                 </a:solidFill>
               </a14:hiddenFill>
             </a:ext>
             <a:ext uri="{91240B29-F687-4f45-9708-019B960494DF}">
-              <a14:hiddenLine xmlns="" xmlns:a14="http://schemas.microsoft.com/office/drawing/2010/main" w="9525">
+              <a14:hiddenLine xmlns:a14="http://schemas.microsoft.com/office/drawing/2010/main" xmlns="" w="9525">
                 <a:solidFill>
                   <a:schemeClr val="tx1"/>
                 </a:solidFill>
@@ -5166,7 +5168,7 @@
               </a14:hiddenLine>
             </a:ext>
             <a:ext uri="{AF507438-7753-43e0-B8FC-AC1667EBCBE1}">
-              <a14:hiddenEffects xmlns="" xmlns:a14="http://schemas.microsoft.com/office/drawing/2010/main">
+              <a14:hiddenEffects xmlns:a14="http://schemas.microsoft.com/office/drawing/2010/main" xmlns="">
                 <a:effectLst>
                   <a:outerShdw dist="35921" dir="2700000" algn="ctr" rotWithShape="0">
                     <a:schemeClr val="bg2"/>
@@ -5324,14 +5326,14 @@
           <a:effectLst/>
           <a:extLst>
             <a:ext uri="{909E8E84-426E-40dd-AFC4-6F175D3DCCD1}">
-              <a14:hiddenFill xmlns="" xmlns:a14="http://schemas.microsoft.com/office/drawing/2010/main">
+              <a14:hiddenFill xmlns:a14="http://schemas.microsoft.com/office/drawing/2010/main" xmlns="">
                 <a:solidFill>
                   <a:schemeClr val="accent1"/>
                 </a:solidFill>
               </a14:hiddenFill>
             </a:ext>
             <a:ext uri="{91240B29-F687-4f45-9708-019B960494DF}">
-              <a14:hiddenLine xmlns="" xmlns:a14="http://schemas.microsoft.com/office/drawing/2010/main" w="9525">
+              <a14:hiddenLine xmlns:a14="http://schemas.microsoft.com/office/drawing/2010/main" xmlns="" w="9525">
                 <a:solidFill>
                   <a:schemeClr val="tx1"/>
                 </a:solidFill>
@@ -5341,7 +5343,7 @@
               </a14:hiddenLine>
             </a:ext>
             <a:ext uri="{AF507438-7753-43e0-B8FC-AC1667EBCBE1}">
-              <a14:hiddenEffects xmlns="" xmlns:a14="http://schemas.microsoft.com/office/drawing/2010/main">
+              <a14:hiddenEffects xmlns:a14="http://schemas.microsoft.com/office/drawing/2010/main" xmlns="">
                 <a:effectLst>
                   <a:outerShdw dist="35921" dir="2700000" algn="ctr" rotWithShape="0">
                     <a:schemeClr val="bg2"/>
@@ -5504,12 +5506,12 @@
           <a:effectLst/>
           <a:extLst>
             <a:ext uri="{909E8E84-426E-40dd-AFC4-6F175D3DCCD1}">
-              <a14:hiddenFill xmlns="" xmlns:a14="http://schemas.microsoft.com/office/drawing/2010/main">
+              <a14:hiddenFill xmlns:a14="http://schemas.microsoft.com/office/drawing/2010/main" xmlns="">
                 <a:noFill/>
               </a14:hiddenFill>
             </a:ext>
             <a:ext uri="{AF507438-7753-43e0-B8FC-AC1667EBCBE1}">
-              <a14:hiddenEffects xmlns="" xmlns:a14="http://schemas.microsoft.com/office/drawing/2010/main">
+              <a14:hiddenEffects xmlns:a14="http://schemas.microsoft.com/office/drawing/2010/main" xmlns="">
                 <a:effectLst>
                   <a:outerShdw dist="35921" dir="2700000" algn="ctr" rotWithShape="0">
                     <a:schemeClr val="bg2"/>
@@ -5562,12 +5564,12 @@
           <a:effectLst/>
           <a:extLst>
             <a:ext uri="{909E8E84-426E-40dd-AFC4-6F175D3DCCD1}">
-              <a14:hiddenFill xmlns="" xmlns:a14="http://schemas.microsoft.com/office/drawing/2010/main">
+              <a14:hiddenFill xmlns:a14="http://schemas.microsoft.com/office/drawing/2010/main" xmlns="">
                 <a:noFill/>
               </a14:hiddenFill>
             </a:ext>
             <a:ext uri="{AF507438-7753-43e0-B8FC-AC1667EBCBE1}">
-              <a14:hiddenEffects xmlns="" xmlns:a14="http://schemas.microsoft.com/office/drawing/2010/main">
+              <a14:hiddenEffects xmlns:a14="http://schemas.microsoft.com/office/drawing/2010/main" xmlns="">
                 <a:effectLst>
                   <a:outerShdw dist="35921" dir="2700000" algn="ctr" rotWithShape="0">
                     <a:schemeClr val="bg2"/>
@@ -5620,12 +5622,12 @@
           <a:effectLst/>
           <a:extLst>
             <a:ext uri="{909E8E84-426E-40dd-AFC4-6F175D3DCCD1}">
-              <a14:hiddenFill xmlns="" xmlns:a14="http://schemas.microsoft.com/office/drawing/2010/main">
+              <a14:hiddenFill xmlns:a14="http://schemas.microsoft.com/office/drawing/2010/main" xmlns="">
                 <a:noFill/>
               </a14:hiddenFill>
             </a:ext>
             <a:ext uri="{AF507438-7753-43e0-B8FC-AC1667EBCBE1}">
-              <a14:hiddenEffects xmlns="" xmlns:a14="http://schemas.microsoft.com/office/drawing/2010/main">
+              <a14:hiddenEffects xmlns:a14="http://schemas.microsoft.com/office/drawing/2010/main" xmlns="">
                 <a:effectLst>
                   <a:outerShdw dist="35921" dir="2700000" algn="ctr" rotWithShape="0">
                     <a:schemeClr val="bg2"/>
@@ -5678,12 +5680,12 @@
           <a:effectLst/>
           <a:extLst>
             <a:ext uri="{909E8E84-426E-40dd-AFC4-6F175D3DCCD1}">
-              <a14:hiddenFill xmlns="" xmlns:a14="http://schemas.microsoft.com/office/drawing/2010/main">
+              <a14:hiddenFill xmlns:a14="http://schemas.microsoft.com/office/drawing/2010/main" xmlns="">
                 <a:noFill/>
               </a14:hiddenFill>
             </a:ext>
             <a:ext uri="{AF507438-7753-43e0-B8FC-AC1667EBCBE1}">
-              <a14:hiddenEffects xmlns="" xmlns:a14="http://schemas.microsoft.com/office/drawing/2010/main">
+              <a14:hiddenEffects xmlns:a14="http://schemas.microsoft.com/office/drawing/2010/main" xmlns="">
                 <a:effectLst>
                   <a:outerShdw dist="35921" dir="2700000" algn="ctr" rotWithShape="0">
                     <a:schemeClr val="bg2"/>
@@ -5736,12 +5738,12 @@
           <a:effectLst/>
           <a:extLst>
             <a:ext uri="{909E8E84-426E-40dd-AFC4-6F175D3DCCD1}">
-              <a14:hiddenFill xmlns="" xmlns:a14="http://schemas.microsoft.com/office/drawing/2010/main">
+              <a14:hiddenFill xmlns:a14="http://schemas.microsoft.com/office/drawing/2010/main" xmlns="">
                 <a:noFill/>
               </a14:hiddenFill>
             </a:ext>
             <a:ext uri="{AF507438-7753-43e0-B8FC-AC1667EBCBE1}">
-              <a14:hiddenEffects xmlns="" xmlns:a14="http://schemas.microsoft.com/office/drawing/2010/main">
+              <a14:hiddenEffects xmlns:a14="http://schemas.microsoft.com/office/drawing/2010/main" xmlns="">
                 <a:effectLst>
                   <a:outerShdw dist="35921" dir="2700000" algn="ctr" rotWithShape="0">
                     <a:schemeClr val="bg2"/>
@@ -5794,12 +5796,12 @@
           <a:effectLst/>
           <a:extLst>
             <a:ext uri="{909E8E84-426E-40dd-AFC4-6F175D3DCCD1}">
-              <a14:hiddenFill xmlns="" xmlns:a14="http://schemas.microsoft.com/office/drawing/2010/main">
+              <a14:hiddenFill xmlns:a14="http://schemas.microsoft.com/office/drawing/2010/main" xmlns="">
                 <a:noFill/>
               </a14:hiddenFill>
             </a:ext>
             <a:ext uri="{AF507438-7753-43e0-B8FC-AC1667EBCBE1}">
-              <a14:hiddenEffects xmlns="" xmlns:a14="http://schemas.microsoft.com/office/drawing/2010/main">
+              <a14:hiddenEffects xmlns:a14="http://schemas.microsoft.com/office/drawing/2010/main" xmlns="">
                 <a:effectLst>
                   <a:outerShdw dist="35921" dir="2700000" algn="ctr" rotWithShape="0">
                     <a:schemeClr val="bg2"/>
@@ -5852,12 +5854,12 @@
           <a:effectLst/>
           <a:extLst>
             <a:ext uri="{909E8E84-426E-40dd-AFC4-6F175D3DCCD1}">
-              <a14:hiddenFill xmlns="" xmlns:a14="http://schemas.microsoft.com/office/drawing/2010/main">
+              <a14:hiddenFill xmlns:a14="http://schemas.microsoft.com/office/drawing/2010/main" xmlns="">
                 <a:noFill/>
               </a14:hiddenFill>
             </a:ext>
             <a:ext uri="{AF507438-7753-43e0-B8FC-AC1667EBCBE1}">
-              <a14:hiddenEffects xmlns="" xmlns:a14="http://schemas.microsoft.com/office/drawing/2010/main">
+              <a14:hiddenEffects xmlns:a14="http://schemas.microsoft.com/office/drawing/2010/main" xmlns="">
                 <a:effectLst>
                   <a:outerShdw dist="35921" dir="2700000" algn="ctr" rotWithShape="0">
                     <a:schemeClr val="bg2"/>
@@ -5910,12 +5912,12 @@
           <a:effectLst/>
           <a:extLst>
             <a:ext uri="{909E8E84-426E-40dd-AFC4-6F175D3DCCD1}">
-              <a14:hiddenFill xmlns="" xmlns:a14="http://schemas.microsoft.com/office/drawing/2010/main">
+              <a14:hiddenFill xmlns:a14="http://schemas.microsoft.com/office/drawing/2010/main" xmlns="">
                 <a:noFill/>
               </a14:hiddenFill>
             </a:ext>
             <a:ext uri="{AF507438-7753-43e0-B8FC-AC1667EBCBE1}">
-              <a14:hiddenEffects xmlns="" xmlns:a14="http://schemas.microsoft.com/office/drawing/2010/main">
+              <a14:hiddenEffects xmlns:a14="http://schemas.microsoft.com/office/drawing/2010/main" xmlns="">
                 <a:effectLst>
                   <a:outerShdw dist="35921" dir="2700000" algn="ctr" rotWithShape="0">
                     <a:schemeClr val="bg2"/>
@@ -5968,14 +5970,14 @@
           <a:effectLst/>
           <a:extLst>
             <a:ext uri="{909E8E84-426E-40dd-AFC4-6F175D3DCCD1}">
-              <a14:hiddenFill xmlns="" xmlns:a14="http://schemas.microsoft.com/office/drawing/2010/main">
+              <a14:hiddenFill xmlns:a14="http://schemas.microsoft.com/office/drawing/2010/main" xmlns="">
                 <a:solidFill>
                   <a:srgbClr val="FFFFCC"/>
                 </a:solidFill>
               </a14:hiddenFill>
             </a:ext>
             <a:ext uri="{AF507438-7753-43e0-B8FC-AC1667EBCBE1}">
-              <a14:hiddenEffects xmlns="" xmlns:a14="http://schemas.microsoft.com/office/drawing/2010/main">
+              <a14:hiddenEffects xmlns:a14="http://schemas.microsoft.com/office/drawing/2010/main" xmlns="">
                 <a:effectLst>
                   <a:outerShdw dist="35921" dir="2700000" algn="ctr" rotWithShape="0">
                     <a:schemeClr val="bg2"/>
@@ -6136,12 +6138,12 @@
           <a:effectLst/>
           <a:extLst>
             <a:ext uri="{909E8E84-426E-40dd-AFC4-6F175D3DCCD1}">
-              <a14:hiddenFill xmlns="" xmlns:a14="http://schemas.microsoft.com/office/drawing/2010/main">
+              <a14:hiddenFill xmlns:a14="http://schemas.microsoft.com/office/drawing/2010/main" xmlns="">
                 <a:noFill/>
               </a14:hiddenFill>
             </a:ext>
             <a:ext uri="{AF507438-7753-43e0-B8FC-AC1667EBCBE1}">
-              <a14:hiddenEffects xmlns="" xmlns:a14="http://schemas.microsoft.com/office/drawing/2010/main">
+              <a14:hiddenEffects xmlns:a14="http://schemas.microsoft.com/office/drawing/2010/main" xmlns="">
                 <a:effectLst>
                   <a:outerShdw dist="35921" dir="2700000" algn="ctr" rotWithShape="0">
                     <a:schemeClr val="bg2"/>
@@ -6194,12 +6196,12 @@
           <a:effectLst/>
           <a:extLst>
             <a:ext uri="{909E8E84-426E-40dd-AFC4-6F175D3DCCD1}">
-              <a14:hiddenFill xmlns="" xmlns:a14="http://schemas.microsoft.com/office/drawing/2010/main">
+              <a14:hiddenFill xmlns:a14="http://schemas.microsoft.com/office/drawing/2010/main" xmlns="">
                 <a:noFill/>
               </a14:hiddenFill>
             </a:ext>
             <a:ext uri="{AF507438-7753-43e0-B8FC-AC1667EBCBE1}">
-              <a14:hiddenEffects xmlns="" xmlns:a14="http://schemas.microsoft.com/office/drawing/2010/main">
+              <a14:hiddenEffects xmlns:a14="http://schemas.microsoft.com/office/drawing/2010/main" xmlns="">
                 <a:effectLst>
                   <a:outerShdw dist="35921" dir="2700000" algn="ctr" rotWithShape="0">
                     <a:schemeClr val="bg2"/>
@@ -6252,12 +6254,12 @@
           <a:effectLst/>
           <a:extLst>
             <a:ext uri="{909E8E84-426E-40dd-AFC4-6F175D3DCCD1}">
-              <a14:hiddenFill xmlns="" xmlns:a14="http://schemas.microsoft.com/office/drawing/2010/main">
+              <a14:hiddenFill xmlns:a14="http://schemas.microsoft.com/office/drawing/2010/main" xmlns="">
                 <a:noFill/>
               </a14:hiddenFill>
             </a:ext>
             <a:ext uri="{AF507438-7753-43e0-B8FC-AC1667EBCBE1}">
-              <a14:hiddenEffects xmlns="" xmlns:a14="http://schemas.microsoft.com/office/drawing/2010/main">
+              <a14:hiddenEffects xmlns:a14="http://schemas.microsoft.com/office/drawing/2010/main" xmlns="">
                 <a:effectLst>
                   <a:outerShdw dist="35921" dir="2700000" algn="ctr" rotWithShape="0">
                     <a:schemeClr val="bg2"/>
@@ -6310,12 +6312,12 @@
           <a:effectLst/>
           <a:extLst>
             <a:ext uri="{909E8E84-426E-40dd-AFC4-6F175D3DCCD1}">
-              <a14:hiddenFill xmlns="" xmlns:a14="http://schemas.microsoft.com/office/drawing/2010/main">
+              <a14:hiddenFill xmlns:a14="http://schemas.microsoft.com/office/drawing/2010/main" xmlns="">
                 <a:noFill/>
               </a14:hiddenFill>
             </a:ext>
             <a:ext uri="{AF507438-7753-43e0-B8FC-AC1667EBCBE1}">
-              <a14:hiddenEffects xmlns="" xmlns:a14="http://schemas.microsoft.com/office/drawing/2010/main">
+              <a14:hiddenEffects xmlns:a14="http://schemas.microsoft.com/office/drawing/2010/main" xmlns="">
                 <a:effectLst>
                   <a:outerShdw dist="35921" dir="2700000" algn="ctr" rotWithShape="0">
                     <a:schemeClr val="bg2"/>
@@ -6370,7 +6372,7 @@
           <a:effectLst/>
           <a:extLst>
             <a:ext uri="{AF507438-7753-43e0-B8FC-AC1667EBCBE1}">
-              <a14:hiddenEffects xmlns="" xmlns:a14="http://schemas.microsoft.com/office/drawing/2010/main">
+              <a14:hiddenEffects xmlns:a14="http://schemas.microsoft.com/office/drawing/2010/main" xmlns="">
                 <a:effectLst>
                   <a:outerShdw dist="35921" dir="2700000" algn="ctr" rotWithShape="0">
                     <a:schemeClr val="bg2"/>
@@ -6542,7 +6544,7 @@
           <a:effectLst/>
           <a:extLst>
             <a:ext uri="{AF507438-7753-43e0-B8FC-AC1667EBCBE1}">
-              <a14:hiddenEffects xmlns="" xmlns:a14="http://schemas.microsoft.com/office/drawing/2010/main">
+              <a14:hiddenEffects xmlns:a14="http://schemas.microsoft.com/office/drawing/2010/main" xmlns="">
                 <a:effectLst>
                   <a:outerShdw dist="35921" dir="2700000" algn="ctr" rotWithShape="0">
                     <a:schemeClr val="bg2"/>
@@ -6698,12 +6700,12 @@
           <a:effectLst/>
           <a:extLst>
             <a:ext uri="{909E8E84-426E-40dd-AFC4-6F175D3DCCD1}">
-              <a14:hiddenFill xmlns="" xmlns:a14="http://schemas.microsoft.com/office/drawing/2010/main">
+              <a14:hiddenFill xmlns:a14="http://schemas.microsoft.com/office/drawing/2010/main" xmlns="">
                 <a:noFill/>
               </a14:hiddenFill>
             </a:ext>
             <a:ext uri="{91240B29-F687-4f45-9708-019B960494DF}">
-              <a14:hiddenLine xmlns="" xmlns:a14="http://schemas.microsoft.com/office/drawing/2010/main" w="38100">
+              <a14:hiddenLine xmlns:a14="http://schemas.microsoft.com/office/drawing/2010/main" xmlns="" w="38100">
                 <a:solidFill>
                   <a:srgbClr val="000000"/>
                 </a:solidFill>
@@ -6713,7 +6715,7 @@
               </a14:hiddenLine>
             </a:ext>
             <a:ext uri="{AF507438-7753-43e0-B8FC-AC1667EBCBE1}">
-              <a14:hiddenEffects xmlns="" xmlns:a14="http://schemas.microsoft.com/office/drawing/2010/main">
+              <a14:hiddenEffects xmlns:a14="http://schemas.microsoft.com/office/drawing/2010/main" xmlns="">
                 <a:effectLst>
                   <a:outerShdw dist="35921" dir="2700000" algn="ctr" rotWithShape="0">
                     <a:schemeClr val="bg2"/>
@@ -8677,7 +8679,7 @@
           <a:graphicData uri="http://schemas.openxmlformats.org/presentationml/2006/ole">
             <mc:AlternateContent xmlns:mc="http://schemas.openxmlformats.org/markup-compatibility/2006">
               <mc:Choice xmlns:v="urn:schemas-microsoft-com:vml" Requires="v">
-                <p:oleObj spid="_x0000_s1622" name="Equation" r:id="rId4" imgW="165100" imgH="241300" progId="Equation.3">
+                <p:oleObj spid="_x0000_s1667" name="Equation" r:id="rId4" imgW="165100" imgH="241300" progId="Equation.3">
                   <p:embed/>
                 </p:oleObj>
               </mc:Choice>
@@ -8844,7 +8846,7 @@
           <a:graphicData uri="http://schemas.openxmlformats.org/presentationml/2006/ole">
             <mc:AlternateContent xmlns:mc="http://schemas.openxmlformats.org/markup-compatibility/2006">
               <mc:Choice xmlns:v="urn:schemas-microsoft-com:vml" Requires="v">
-                <p:oleObj spid="_x0000_s1623" name="Equation" r:id="rId6" imgW="1282700" imgH="254000" progId="Equation.3">
+                <p:oleObj spid="_x0000_s1668" name="Equation" r:id="rId6" imgW="1282700" imgH="254000" progId="Equation.3">
                   <p:embed/>
                 </p:oleObj>
               </mc:Choice>
@@ -9138,7 +9140,7 @@
           <a:graphicData uri="http://schemas.openxmlformats.org/presentationml/2006/ole">
             <mc:AlternateContent xmlns:mc="http://schemas.openxmlformats.org/markup-compatibility/2006">
               <mc:Choice xmlns:v="urn:schemas-microsoft-com:vml" Requires="v">
-                <p:oleObj spid="_x0000_s1624" name="Equation" r:id="rId8" imgW="190500" imgH="254000" progId="Equation.3">
+                <p:oleObj spid="_x0000_s1669" name="Equation" r:id="rId8" imgW="190500" imgH="254000" progId="Equation.3">
                   <p:embed/>
                 </p:oleObj>
               </mc:Choice>
@@ -9206,7 +9208,7 @@
           <a:graphicData uri="http://schemas.openxmlformats.org/presentationml/2006/ole">
             <mc:AlternateContent xmlns:mc="http://schemas.openxmlformats.org/markup-compatibility/2006">
               <mc:Choice xmlns:v="urn:schemas-microsoft-com:vml" Requires="v">
-                <p:oleObj spid="_x0000_s1625" name="Equation" r:id="rId10" imgW="190500" imgH="254000" progId="Equation.3">
+                <p:oleObj spid="_x0000_s1670" name="Equation" r:id="rId10" imgW="190500" imgH="254000" progId="Equation.3">
                   <p:embed/>
                 </p:oleObj>
               </mc:Choice>
@@ -9480,7 +9482,7 @@
           <a:graphicData uri="http://schemas.openxmlformats.org/presentationml/2006/ole">
             <mc:AlternateContent xmlns:mc="http://schemas.openxmlformats.org/markup-compatibility/2006">
               <mc:Choice xmlns:v="urn:schemas-microsoft-com:vml" Requires="v">
-                <p:oleObj spid="_x0000_s1626" name="Equation" r:id="rId11" imgW="685800" imgH="241300" progId="Equation.3">
+                <p:oleObj spid="_x0000_s1671" name="Equation" r:id="rId11" imgW="685800" imgH="241300" progId="Equation.3">
                   <p:embed/>
                 </p:oleObj>
               </mc:Choice>
@@ -9546,7 +9548,7 @@
           <a:graphicData uri="http://schemas.openxmlformats.org/presentationml/2006/ole">
             <mc:AlternateContent xmlns:mc="http://schemas.openxmlformats.org/markup-compatibility/2006">
               <mc:Choice xmlns:v="urn:schemas-microsoft-com:vml" Requires="v">
-                <p:oleObj spid="_x0000_s1627" name="Equation" r:id="rId13" imgW="698500" imgH="254000" progId="Equation.3">
+                <p:oleObj spid="_x0000_s1672" name="Equation" r:id="rId13" imgW="698500" imgH="254000" progId="Equation.3">
                   <p:embed/>
                 </p:oleObj>
               </mc:Choice>
@@ -10846,7 +10848,7 @@
           <a:graphicData uri="http://schemas.openxmlformats.org/presentationml/2006/ole">
             <mc:AlternateContent xmlns:mc="http://schemas.openxmlformats.org/markup-compatibility/2006">
               <mc:Choice xmlns:v="urn:schemas-microsoft-com:vml" Requires="v">
-                <p:oleObj spid="_x0000_s1628" name="Equation" r:id="rId15" imgW="165100" imgH="241300" progId="Equation.3">
+                <p:oleObj spid="_x0000_s1673" name="Equation" r:id="rId15" imgW="165100" imgH="241300" progId="Equation.3">
                   <p:embed/>
                 </p:oleObj>
               </mc:Choice>
@@ -11103,7 +11105,7 @@
           <a:graphicData uri="http://schemas.openxmlformats.org/presentationml/2006/ole">
             <mc:AlternateContent xmlns:mc="http://schemas.openxmlformats.org/markup-compatibility/2006">
               <mc:Choice xmlns:v="urn:schemas-microsoft-com:vml" Requires="v">
-                <p:oleObj spid="_x0000_s1629" name="Equation" r:id="rId16" imgW="190500" imgH="254000" progId="Equation.3">
+                <p:oleObj spid="_x0000_s1674" name="Equation" r:id="rId16" imgW="190500" imgH="254000" progId="Equation.3">
                   <p:embed/>
                 </p:oleObj>
               </mc:Choice>
@@ -11171,7 +11173,7 @@
           <a:graphicData uri="http://schemas.openxmlformats.org/presentationml/2006/ole">
             <mc:AlternateContent xmlns:mc="http://schemas.openxmlformats.org/markup-compatibility/2006">
               <mc:Choice xmlns:v="urn:schemas-microsoft-com:vml" Requires="v">
-                <p:oleObj spid="_x0000_s1630" name="Equation" r:id="rId17" imgW="190500" imgH="254000" progId="Equation.3">
+                <p:oleObj spid="_x0000_s1675" name="Equation" r:id="rId17" imgW="190500" imgH="254000" progId="Equation.3">
                   <p:embed/>
                 </p:oleObj>
               </mc:Choice>
@@ -12446,7 +12448,7 @@
           <a:graphicData uri="http://schemas.openxmlformats.org/presentationml/2006/ole">
             <mc:AlternateContent xmlns:mc="http://schemas.openxmlformats.org/markup-compatibility/2006">
               <mc:Choice xmlns:v="urn:schemas-microsoft-com:vml" Requires="v">
-                <p:oleObj spid="_x0000_s1631" name="Equation" r:id="rId18" imgW="190500" imgH="241300" progId="Equation.3">
+                <p:oleObj spid="_x0000_s1676" name="Equation" r:id="rId18" imgW="190500" imgH="241300" progId="Equation.3">
                   <p:embed/>
                 </p:oleObj>
               </mc:Choice>
@@ -12703,7 +12705,7 @@
           <a:graphicData uri="http://schemas.openxmlformats.org/presentationml/2006/ole">
             <mc:AlternateContent xmlns:mc="http://schemas.openxmlformats.org/markup-compatibility/2006">
               <mc:Choice xmlns:v="urn:schemas-microsoft-com:vml" Requires="v">
-                <p:oleObj spid="_x0000_s1632" name="Equation" r:id="rId20" imgW="190500" imgH="254000" progId="Equation.3">
+                <p:oleObj spid="_x0000_s1677" name="Equation" r:id="rId20" imgW="190500" imgH="254000" progId="Equation.3">
                   <p:embed/>
                 </p:oleObj>
               </mc:Choice>
@@ -12771,7 +12773,7 @@
           <a:graphicData uri="http://schemas.openxmlformats.org/presentationml/2006/ole">
             <mc:AlternateContent xmlns:mc="http://schemas.openxmlformats.org/markup-compatibility/2006">
               <mc:Choice xmlns:v="urn:schemas-microsoft-com:vml" Requires="v">
-                <p:oleObj spid="_x0000_s1633" name="Equation" r:id="rId22" imgW="190500" imgH="254000" progId="Equation.3">
+                <p:oleObj spid="_x0000_s1678" name="Equation" r:id="rId22" imgW="190500" imgH="254000" progId="Equation.3">
                   <p:embed/>
                 </p:oleObj>
               </mc:Choice>
@@ -14139,7 +14141,7 @@
           <a:graphicData uri="http://schemas.openxmlformats.org/presentationml/2006/ole">
             <mc:AlternateContent xmlns:mc="http://schemas.openxmlformats.org/markup-compatibility/2006">
               <mc:Choice xmlns:v="urn:schemas-microsoft-com:vml" Requires="v">
-                <p:oleObj spid="_x0000_s1634" name="Equation" r:id="rId24" imgW="190500" imgH="241300" progId="Equation.3">
+                <p:oleObj spid="_x0000_s1679" name="Equation" r:id="rId24" imgW="190500" imgH="241300" progId="Equation.3">
                   <p:embed/>
                 </p:oleObj>
               </mc:Choice>
@@ -14396,7 +14398,7 @@
           <a:graphicData uri="http://schemas.openxmlformats.org/presentationml/2006/ole">
             <mc:AlternateContent xmlns:mc="http://schemas.openxmlformats.org/markup-compatibility/2006">
               <mc:Choice xmlns:v="urn:schemas-microsoft-com:vml" Requires="v">
-                <p:oleObj spid="_x0000_s1635" name="Equation" r:id="rId26" imgW="190500" imgH="254000" progId="Equation.3">
+                <p:oleObj spid="_x0000_s1680" name="Equation" r:id="rId26" imgW="190500" imgH="254000" progId="Equation.3">
                   <p:embed/>
                 </p:oleObj>
               </mc:Choice>
@@ -14464,7 +14466,7 @@
           <a:graphicData uri="http://schemas.openxmlformats.org/presentationml/2006/ole">
             <mc:AlternateContent xmlns:mc="http://schemas.openxmlformats.org/markup-compatibility/2006">
               <mc:Choice xmlns:v="urn:schemas-microsoft-com:vml" Requires="v">
-                <p:oleObj spid="_x0000_s1636" name="Equation" r:id="rId28" imgW="190500" imgH="254000" progId="Equation.3">
+                <p:oleObj spid="_x0000_s1681" name="Equation" r:id="rId28" imgW="190500" imgH="254000" progId="Equation.3">
                   <p:embed/>
                 </p:oleObj>
               </mc:Choice>
@@ -16194,7 +16196,7 @@
           <a:graphicData uri="http://schemas.openxmlformats.org/presentationml/2006/ole">
             <mc:AlternateContent xmlns:mc="http://schemas.openxmlformats.org/markup-compatibility/2006">
               <mc:Choice xmlns:v="urn:schemas-microsoft-com:vml" Requires="v">
-                <p:oleObj spid="_x0000_s2142" name="Equation" r:id="rId4" imgW="190440" imgH="228600" progId="Equation.3">
+                <p:oleObj spid="_x0000_s2175" name="Equation" r:id="rId4" imgW="190440" imgH="228600" progId="Equation.3">
                   <p:embed/>
                 </p:oleObj>
               </mc:Choice>
@@ -16661,7 +16663,7 @@
           <a:graphicData uri="http://schemas.openxmlformats.org/presentationml/2006/ole">
             <mc:AlternateContent xmlns:mc="http://schemas.openxmlformats.org/markup-compatibility/2006">
               <mc:Choice xmlns:v="urn:schemas-microsoft-com:vml" Requires="v">
-                <p:oleObj spid="_x0000_s2143" name="Equation" r:id="rId6" imgW="660240" imgH="215640" progId="Equation.3">
+                <p:oleObj spid="_x0000_s2176" name="Equation" r:id="rId6" imgW="660240" imgH="215640" progId="Equation.3">
                   <p:embed/>
                 </p:oleObj>
               </mc:Choice>
@@ -16724,7 +16726,7 @@
           <a:graphicData uri="http://schemas.openxmlformats.org/presentationml/2006/ole">
             <mc:AlternateContent xmlns:mc="http://schemas.openxmlformats.org/markup-compatibility/2006">
               <mc:Choice xmlns:v="urn:schemas-microsoft-com:vml" Requires="v">
-                <p:oleObj spid="_x0000_s2144" name="Equation" r:id="rId8" imgW="698500" imgH="254000" progId="Equation.3">
+                <p:oleObj spid="_x0000_s2177" name="Equation" r:id="rId8" imgW="698500" imgH="254000" progId="Equation.3">
                   <p:embed/>
                 </p:oleObj>
               </mc:Choice>
@@ -18869,7 +18871,7 @@
           <a:graphicData uri="http://schemas.openxmlformats.org/presentationml/2006/ole">
             <mc:AlternateContent xmlns:mc="http://schemas.openxmlformats.org/markup-compatibility/2006">
               <mc:Choice xmlns:v="urn:schemas-microsoft-com:vml" Requires="v">
-                <p:oleObj spid="_x0000_s2145" name="Equation" r:id="rId10" imgW="190440" imgH="228600" progId="Equation.3">
+                <p:oleObj spid="_x0000_s2178" name="Equation" r:id="rId10" imgW="190440" imgH="228600" progId="Equation.3">
                   <p:embed/>
                 </p:oleObj>
               </mc:Choice>
@@ -20420,7 +20422,7 @@
           <a:graphicData uri="http://schemas.openxmlformats.org/presentationml/2006/ole">
             <mc:AlternateContent xmlns:mc="http://schemas.openxmlformats.org/markup-compatibility/2006">
               <mc:Choice xmlns:v="urn:schemas-microsoft-com:vml" Requires="v">
-                <p:oleObj spid="_x0000_s2146" name="Equation" r:id="rId13" imgW="203040" imgH="228600" progId="Equation.3">
+                <p:oleObj spid="_x0000_s2179" name="Equation" r:id="rId13" imgW="203040" imgH="228600" progId="Equation.3">
                   <p:embed/>
                 </p:oleObj>
               </mc:Choice>
@@ -20494,7 +20496,7 @@
           <a:graphicData uri="http://schemas.openxmlformats.org/presentationml/2006/ole">
             <mc:AlternateContent xmlns:mc="http://schemas.openxmlformats.org/markup-compatibility/2006">
               <mc:Choice xmlns:v="urn:schemas-microsoft-com:vml" Requires="v">
-                <p:oleObj spid="_x0000_s2147" name="Equation" r:id="rId15" imgW="203040" imgH="228600" progId="Equation.3">
+                <p:oleObj spid="_x0000_s2180" name="Equation" r:id="rId15" imgW="203040" imgH="228600" progId="Equation.3">
                   <p:embed/>
                 </p:oleObj>
               </mc:Choice>
@@ -20574,7 +20576,7 @@
           <a:graphicData uri="http://schemas.openxmlformats.org/presentationml/2006/ole">
             <mc:AlternateContent xmlns:mc="http://schemas.openxmlformats.org/markup-compatibility/2006">
               <mc:Choice xmlns:v="urn:schemas-microsoft-com:vml" Requires="v">
-                <p:oleObj spid="_x0000_s2148" name="Equation" r:id="rId16" imgW="203040" imgH="228600" progId="Equation.3">
+                <p:oleObj spid="_x0000_s2181" name="Equation" r:id="rId16" imgW="203040" imgH="228600" progId="Equation.3">
                   <p:embed/>
                 </p:oleObj>
               </mc:Choice>
@@ -20654,7 +20656,7 @@
           <a:graphicData uri="http://schemas.openxmlformats.org/presentationml/2006/ole">
             <mc:AlternateContent xmlns:mc="http://schemas.openxmlformats.org/markup-compatibility/2006">
               <mc:Choice xmlns:v="urn:schemas-microsoft-com:vml" Requires="v">
-                <p:oleObj spid="_x0000_s2149" name="Equation" r:id="rId17" imgW="203040" imgH="228600" progId="Equation.3">
+                <p:oleObj spid="_x0000_s2182" name="Equation" r:id="rId17" imgW="203040" imgH="228600" progId="Equation.3">
                   <p:embed/>
                 </p:oleObj>
               </mc:Choice>
@@ -20734,7 +20736,7 @@
           <a:graphicData uri="http://schemas.openxmlformats.org/presentationml/2006/ole">
             <mc:AlternateContent xmlns:mc="http://schemas.openxmlformats.org/markup-compatibility/2006">
               <mc:Choice xmlns:v="urn:schemas-microsoft-com:vml" Requires="v">
-                <p:oleObj spid="_x0000_s2150" name="Equation" r:id="rId19" imgW="203040" imgH="228600" progId="Equation.3">
+                <p:oleObj spid="_x0000_s2183" name="Equation" r:id="rId19" imgW="203040" imgH="228600" progId="Equation.3">
                   <p:embed/>
                 </p:oleObj>
               </mc:Choice>
@@ -20814,7 +20816,7 @@
           <a:graphicData uri="http://schemas.openxmlformats.org/presentationml/2006/ole">
             <mc:AlternateContent xmlns:mc="http://schemas.openxmlformats.org/markup-compatibility/2006">
               <mc:Choice xmlns:v="urn:schemas-microsoft-com:vml" Requires="v">
-                <p:oleObj spid="_x0000_s2151" name="Equation" r:id="rId21" imgW="203040" imgH="228600" progId="Equation.3">
+                <p:oleObj spid="_x0000_s2184" name="Equation" r:id="rId21" imgW="203040" imgH="228600" progId="Equation.3">
                   <p:embed/>
                 </p:oleObj>
               </mc:Choice>
@@ -22505,7 +22507,7 @@
           <a:graphicData uri="http://schemas.openxmlformats.org/presentationml/2006/ole">
             <mc:AlternateContent xmlns:mc="http://schemas.openxmlformats.org/markup-compatibility/2006">
               <mc:Choice xmlns:v="urn:schemas-microsoft-com:vml" Requires="v">
-                <p:oleObj spid="_x0000_s2152" name="Equation" r:id="rId23" imgW="1815840" imgH="241200" progId="Equation.3">
+                <p:oleObj spid="_x0000_s2185" name="Equation" r:id="rId23" imgW="1815840" imgH="241200" progId="Equation.3">
                   <p:embed/>
                 </p:oleObj>
               </mc:Choice>
@@ -22548,6 +22550,3457 @@
     <p:extLst>
       <p:ext uri="{BB962C8B-B14F-4D97-AF65-F5344CB8AC3E}">
         <p14:creationId xmlns:p14="http://schemas.microsoft.com/office/powerpoint/2010/main" val="300412567"/>
+      </p:ext>
+    </p:extLst>
+  </p:cSld>
+  <p:clrMapOvr>
+    <a:masterClrMapping/>
+  </p:clrMapOvr>
+</p:sld>
+</file>
+
+<file path=ppt/slides/slide5.xml><?xml version="1.0" encoding="utf-8"?>
+<p:sld xmlns:a="http://schemas.openxmlformats.org/drawingml/2006/main" xmlns:r="http://schemas.openxmlformats.org/officeDocument/2006/relationships" xmlns:p="http://schemas.openxmlformats.org/presentationml/2006/main">
+  <p:cSld>
+    <p:spTree>
+      <p:nvGrpSpPr>
+        <p:cNvPr id="1" name=""/>
+        <p:cNvGrpSpPr/>
+        <p:nvPr/>
+      </p:nvGrpSpPr>
+      <p:grpSpPr>
+        <a:xfrm>
+          <a:off x="0" y="0"/>
+          <a:ext cx="0" cy="0"/>
+          <a:chOff x="0" y="0"/>
+          <a:chExt cx="0" cy="0"/>
+        </a:xfrm>
+      </p:grpSpPr>
+      <p:sp>
+        <p:nvSpPr>
+          <p:cNvPr id="17" name="Rectangle 16">
+            <a:extLst>
+              <a:ext uri="{FF2B5EF4-FFF2-40B4-BE49-F238E27FC236}">
+                <a16:creationId xmlns:a16="http://schemas.microsoft.com/office/drawing/2014/main" id="{17C9A399-B02C-25B7-84AE-21280C34C9CB}"/>
+              </a:ext>
+            </a:extLst>
+          </p:cNvPr>
+          <p:cNvSpPr/>
+          <p:nvPr/>
+        </p:nvSpPr>
+        <p:spPr>
+          <a:xfrm>
+            <a:off x="0" y="17048"/>
+            <a:ext cx="9144000" cy="2700022"/>
+          </a:xfrm>
+          <a:prstGeom prst="rect">
+            <a:avLst/>
+          </a:prstGeom>
+          <a:noFill/>
+          <a:ln/>
+        </p:spPr>
+        <p:style>
+          <a:lnRef idx="2">
+            <a:schemeClr val="dk1"/>
+          </a:lnRef>
+          <a:fillRef idx="1">
+            <a:schemeClr val="lt1"/>
+          </a:fillRef>
+          <a:effectRef idx="0">
+            <a:schemeClr val="dk1"/>
+          </a:effectRef>
+          <a:fontRef idx="minor">
+            <a:schemeClr val="dk1"/>
+          </a:fontRef>
+        </p:style>
+        <p:txBody>
+          <a:bodyPr rtlCol="0" anchor="ctr"/>
+          <a:lstStyle/>
+          <a:p>
+            <a:pPr algn="ctr"/>
+            <a:endParaRPr lang="en-US"/>
+          </a:p>
+        </p:txBody>
+      </p:sp>
+      <p:sp>
+        <p:nvSpPr>
+          <p:cNvPr id="3" name="Cube 2">
+            <a:extLst>
+              <a:ext uri="{FF2B5EF4-FFF2-40B4-BE49-F238E27FC236}">
+                <a16:creationId xmlns:a16="http://schemas.microsoft.com/office/drawing/2014/main" id="{210012AB-A175-BC77-5C17-E85D40E00515}"/>
+              </a:ext>
+            </a:extLst>
+          </p:cNvPr>
+          <p:cNvSpPr/>
+          <p:nvPr/>
+        </p:nvSpPr>
+        <p:spPr>
+          <a:xfrm>
+            <a:off x="3010040" y="990385"/>
+            <a:ext cx="1107512" cy="931680"/>
+          </a:xfrm>
+          <a:prstGeom prst="cube">
+            <a:avLst/>
+          </a:prstGeom>
+          <a:solidFill>
+            <a:schemeClr val="accent1">
+              <a:lumMod val="40000"/>
+              <a:lumOff val="60000"/>
+            </a:schemeClr>
+          </a:solidFill>
+        </p:spPr>
+        <p:style>
+          <a:lnRef idx="1">
+            <a:schemeClr val="accent1"/>
+          </a:lnRef>
+          <a:fillRef idx="3">
+            <a:schemeClr val="accent1"/>
+          </a:fillRef>
+          <a:effectRef idx="2">
+            <a:schemeClr val="accent1"/>
+          </a:effectRef>
+          <a:fontRef idx="minor">
+            <a:schemeClr val="lt1"/>
+          </a:fontRef>
+        </p:style>
+        <p:txBody>
+          <a:bodyPr rtlCol="0" anchor="ctr"/>
+          <a:lstStyle/>
+          <a:p>
+            <a:pPr algn="ctr"/>
+            <a:endParaRPr lang="en-US"/>
+          </a:p>
+        </p:txBody>
+      </p:sp>
+      <p:sp>
+        <p:nvSpPr>
+          <p:cNvPr id="4" name="Rectangle 3">
+            <a:extLst>
+              <a:ext uri="{FF2B5EF4-FFF2-40B4-BE49-F238E27FC236}">
+                <a16:creationId xmlns:a16="http://schemas.microsoft.com/office/drawing/2014/main" id="{97A8C8C0-FF81-F95D-C932-1E058B8F96C6}"/>
+              </a:ext>
+            </a:extLst>
+          </p:cNvPr>
+          <p:cNvSpPr/>
+          <p:nvPr/>
+        </p:nvSpPr>
+        <p:spPr>
+          <a:xfrm>
+            <a:off x="376918" y="1375425"/>
+            <a:ext cx="1903247" cy="304784"/>
+          </a:xfrm>
+          <a:prstGeom prst="rect">
+            <a:avLst/>
+          </a:prstGeom>
+          <a:solidFill>
+            <a:schemeClr val="accent6">
+              <a:lumMod val="20000"/>
+              <a:lumOff val="80000"/>
+            </a:schemeClr>
+          </a:solidFill>
+          <a:ln>
+            <a:solidFill>
+              <a:schemeClr val="tx1"/>
+            </a:solidFill>
+          </a:ln>
+        </p:spPr>
+        <p:style>
+          <a:lnRef idx="1">
+            <a:schemeClr val="accent1"/>
+          </a:lnRef>
+          <a:fillRef idx="3">
+            <a:schemeClr val="accent1"/>
+          </a:fillRef>
+          <a:effectRef idx="2">
+            <a:schemeClr val="accent1"/>
+          </a:effectRef>
+          <a:fontRef idx="minor">
+            <a:schemeClr val="lt1"/>
+          </a:fontRef>
+        </p:style>
+        <p:txBody>
+          <a:bodyPr rtlCol="0" anchor="ctr"/>
+          <a:lstStyle/>
+          <a:p>
+            <a:pPr algn="ctr"/>
+            <a:r>
+              <a:rPr lang="en-US" dirty="0">
+                <a:solidFill>
+                  <a:schemeClr val="tx1"/>
+                </a:solidFill>
+              </a:rPr>
+              <a:t>Simulator</a:t>
+            </a:r>
+          </a:p>
+        </p:txBody>
+      </p:sp>
+      <p:sp>
+        <p:nvSpPr>
+          <p:cNvPr id="7" name="Arrow: Down 6">
+            <a:extLst>
+              <a:ext uri="{FF2B5EF4-FFF2-40B4-BE49-F238E27FC236}">
+                <a16:creationId xmlns:a16="http://schemas.microsoft.com/office/drawing/2014/main" id="{A8B22684-553B-64C3-7A5B-197C4AC86731}"/>
+              </a:ext>
+            </a:extLst>
+          </p:cNvPr>
+          <p:cNvSpPr/>
+          <p:nvPr/>
+        </p:nvSpPr>
+        <p:spPr>
+          <a:xfrm rot="16200000">
+            <a:off x="2503040" y="1324579"/>
+            <a:ext cx="304783" cy="440596"/>
+          </a:xfrm>
+          <a:prstGeom prst="downArrow">
+            <a:avLst/>
+          </a:prstGeom>
+          <a:solidFill>
+            <a:schemeClr val="tx1"/>
+          </a:solidFill>
+          <a:ln>
+            <a:solidFill>
+              <a:schemeClr val="tx1"/>
+            </a:solidFill>
+          </a:ln>
+        </p:spPr>
+        <p:style>
+          <a:lnRef idx="1">
+            <a:schemeClr val="accent1"/>
+          </a:lnRef>
+          <a:fillRef idx="3">
+            <a:schemeClr val="accent1"/>
+          </a:fillRef>
+          <a:effectRef idx="2">
+            <a:schemeClr val="accent1"/>
+          </a:effectRef>
+          <a:fontRef idx="minor">
+            <a:schemeClr val="lt1"/>
+          </a:fontRef>
+        </p:style>
+        <p:txBody>
+          <a:bodyPr rtlCol="0" anchor="ctr"/>
+          <a:lstStyle/>
+          <a:p>
+            <a:pPr algn="ctr"/>
+            <a:endParaRPr lang="en-US"/>
+          </a:p>
+        </p:txBody>
+      </p:sp>
+      <mc:AlternateContent xmlns:mc="http://schemas.openxmlformats.org/markup-compatibility/2006">
+        <mc:Choice xmlns:a14="http://schemas.microsoft.com/office/drawing/2010/main" Requires="a14">
+          <p:sp>
+            <p:nvSpPr>
+              <p:cNvPr id="8" name="TextBox 7">
+                <a:extLst>
+                  <a:ext uri="{FF2B5EF4-FFF2-40B4-BE49-F238E27FC236}">
+                    <a16:creationId xmlns:a16="http://schemas.microsoft.com/office/drawing/2014/main" id="{6759AD67-5AC6-AF1D-4C8D-3E7EADF6BB70}"/>
+                  </a:ext>
+                </a:extLst>
+              </p:cNvPr>
+              <p:cNvSpPr txBox="1"/>
+              <p:nvPr/>
+            </p:nvSpPr>
+            <p:spPr>
+              <a:xfrm>
+                <a:off x="825044" y="574207"/>
+                <a:ext cx="925379" cy="307777"/>
+              </a:xfrm>
+              <a:prstGeom prst="rect">
+                <a:avLst/>
+              </a:prstGeom>
+              <a:noFill/>
+              <a:ln>
+                <a:solidFill>
+                  <a:schemeClr val="tx1"/>
+                </a:solidFill>
+              </a:ln>
+            </p:spPr>
+            <p:txBody>
+              <a:bodyPr wrap="square" lIns="0" tIns="0" rIns="0" bIns="0" rtlCol="0">
+                <a:spAutoFit/>
+              </a:bodyPr>
+              <a:lstStyle/>
+              <a:p>
+                <a14:m>
+                  <m:oMathPara xmlns:m="http://schemas.openxmlformats.org/officeDocument/2006/math">
+                    <m:oMathParaPr>
+                      <m:jc m:val="centerGroup"/>
+                    </m:oMathParaPr>
+                    <m:oMath xmlns:m="http://schemas.openxmlformats.org/officeDocument/2006/math">
+                      <m:r>
+                        <a:rPr lang="en-US" sz="2000" b="1" i="1" dirty="0" smtClean="0">
+                          <a:latin typeface="Cambria Math" panose="02040503050406030204" pitchFamily="18" charset="0"/>
+                        </a:rPr>
+                        <m:t>𝑷</m:t>
+                      </m:r>
+                      <m:d>
+                        <m:dPr>
+                          <m:ctrlPr>
+                            <a:rPr lang="en-US" sz="2000" b="1" i="1" dirty="0">
+                              <a:solidFill>
+                                <a:srgbClr val="836967"/>
+                              </a:solidFill>
+                              <a:latin typeface="Cambria Math" panose="02040503050406030204" pitchFamily="18" charset="0"/>
+                            </a:rPr>
+                          </m:ctrlPr>
+                        </m:dPr>
+                        <m:e>
+                          <m:sSub>
+                            <m:sSubPr>
+                              <m:ctrlPr>
+                                <a:rPr lang="en-US" sz="2000" b="1" i="1" dirty="0">
+                                  <a:solidFill>
+                                    <a:srgbClr val="836967"/>
+                                  </a:solidFill>
+                                  <a:latin typeface="Cambria Math" panose="02040503050406030204" pitchFamily="18" charset="0"/>
+                                </a:rPr>
+                              </m:ctrlPr>
+                            </m:sSubPr>
+                            <m:e>
+                              <m:r>
+                                <a:rPr lang="en-US" sz="2000" b="1" i="1" dirty="0">
+                                  <a:latin typeface="Cambria Math" panose="02040503050406030204" pitchFamily="18" charset="0"/>
+                                </a:rPr>
+                                <m:t>𝜽</m:t>
+                              </m:r>
+                            </m:e>
+                            <m:sub>
+                              <m:r>
+                                <a:rPr lang="en-US" sz="2000" b="1" i="1" dirty="0" smtClean="0">
+                                  <a:latin typeface="Cambria Math" panose="02040503050406030204" pitchFamily="18" charset="0"/>
+                                </a:rPr>
+                                <m:t>𝑺</m:t>
+                              </m:r>
+                            </m:sub>
+                          </m:sSub>
+                        </m:e>
+                      </m:d>
+                    </m:oMath>
+                  </m:oMathPara>
+                </a14:m>
+                <a:endParaRPr lang="en-US" sz="2000" b="1" dirty="0"/>
+              </a:p>
+            </p:txBody>
+          </p:sp>
+        </mc:Choice>
+        <mc:Fallback>
+          <p:sp>
+            <p:nvSpPr>
+              <p:cNvPr id="8" name="TextBox 7">
+                <a:extLst>
+                  <a:ext uri="{FF2B5EF4-FFF2-40B4-BE49-F238E27FC236}">
+                    <a16:creationId xmlns:a16="http://schemas.microsoft.com/office/drawing/2014/main" id="{6759AD67-5AC6-AF1D-4C8D-3E7EADF6BB70}"/>
+                  </a:ext>
+                </a:extLst>
+              </p:cNvPr>
+              <p:cNvSpPr txBox="1">
+                <a:spLocks noRot="1" noChangeAspect="1" noMove="1" noResize="1" noEditPoints="1" noAdjustHandles="1" noChangeArrowheads="1" noChangeShapeType="1" noTextEdit="1"/>
+              </p:cNvSpPr>
+              <p:nvPr/>
+            </p:nvSpPr>
+            <p:spPr>
+              <a:xfrm>
+                <a:off x="825044" y="574207"/>
+                <a:ext cx="925379" cy="307777"/>
+              </a:xfrm>
+              <a:prstGeom prst="rect">
+                <a:avLst/>
+              </a:prstGeom>
+              <a:blipFill>
+                <a:blip r:embed="rId2"/>
+                <a:stretch>
+                  <a:fillRect b="-13208"/>
+                </a:stretch>
+              </a:blipFill>
+              <a:ln>
+                <a:solidFill>
+                  <a:schemeClr val="tx1"/>
+                </a:solidFill>
+              </a:ln>
+            </p:spPr>
+            <p:txBody>
+              <a:bodyPr/>
+              <a:lstStyle/>
+              <a:p>
+                <a:r>
+                  <a:rPr lang="en-US">
+                    <a:noFill/>
+                  </a:rPr>
+                  <a:t> </a:t>
+                </a:r>
+              </a:p>
+            </p:txBody>
+          </p:sp>
+        </mc:Fallback>
+      </mc:AlternateContent>
+      <p:sp>
+        <p:nvSpPr>
+          <p:cNvPr id="9" name="Arrow: Down 8">
+            <a:extLst>
+              <a:ext uri="{FF2B5EF4-FFF2-40B4-BE49-F238E27FC236}">
+                <a16:creationId xmlns:a16="http://schemas.microsoft.com/office/drawing/2014/main" id="{ED3FE75C-20EB-6C7A-F7EC-83DDD2C38097}"/>
+              </a:ext>
+            </a:extLst>
+          </p:cNvPr>
+          <p:cNvSpPr/>
+          <p:nvPr/>
+        </p:nvSpPr>
+        <p:spPr>
+          <a:xfrm>
+            <a:off x="1122652" y="927862"/>
+            <a:ext cx="298505" cy="362836"/>
+          </a:xfrm>
+          <a:prstGeom prst="downArrow">
+            <a:avLst/>
+          </a:prstGeom>
+          <a:solidFill>
+            <a:schemeClr val="tx1"/>
+          </a:solidFill>
+          <a:ln>
+            <a:solidFill>
+              <a:schemeClr val="tx1"/>
+            </a:solidFill>
+          </a:ln>
+        </p:spPr>
+        <p:style>
+          <a:lnRef idx="1">
+            <a:schemeClr val="accent1"/>
+          </a:lnRef>
+          <a:fillRef idx="3">
+            <a:schemeClr val="accent1"/>
+          </a:fillRef>
+          <a:effectRef idx="2">
+            <a:schemeClr val="accent1"/>
+          </a:effectRef>
+          <a:fontRef idx="minor">
+            <a:schemeClr val="lt1"/>
+          </a:fontRef>
+        </p:style>
+        <p:txBody>
+          <a:bodyPr rtlCol="0" anchor="ctr"/>
+          <a:lstStyle/>
+          <a:p>
+            <a:pPr algn="ctr"/>
+            <a:endParaRPr lang="en-US" dirty="0"/>
+          </a:p>
+        </p:txBody>
+      </p:sp>
+      <mc:AlternateContent xmlns:mc="http://schemas.openxmlformats.org/markup-compatibility/2006">
+        <mc:Choice xmlns:a14="http://schemas.microsoft.com/office/drawing/2010/main" Requires="a14">
+          <p:sp>
+            <p:nvSpPr>
+              <p:cNvPr id="11" name="TextBox 10">
+                <a:extLst>
+                  <a:ext uri="{FF2B5EF4-FFF2-40B4-BE49-F238E27FC236}">
+                    <a16:creationId xmlns:a16="http://schemas.microsoft.com/office/drawing/2014/main" id="{7B34AECA-4136-8FEA-8030-C5CB9BB20CBE}"/>
+                  </a:ext>
+                </a:extLst>
+              </p:cNvPr>
+              <p:cNvSpPr txBox="1"/>
+              <p:nvPr/>
+            </p:nvSpPr>
+            <p:spPr>
+              <a:xfrm>
+                <a:off x="3194668" y="1372432"/>
+                <a:ext cx="565504" cy="307777"/>
+              </a:xfrm>
+              <a:prstGeom prst="rect">
+                <a:avLst/>
+              </a:prstGeom>
+              <a:noFill/>
+            </p:spPr>
+            <p:txBody>
+              <a:bodyPr wrap="square" lIns="0" tIns="0" rIns="0" bIns="0" rtlCol="0">
+                <a:spAutoFit/>
+              </a:bodyPr>
+              <a:lstStyle/>
+              <a:p>
+                <a14:m>
+                  <m:oMathPara xmlns:m="http://schemas.openxmlformats.org/officeDocument/2006/math">
+                    <m:oMathParaPr>
+                      <m:jc m:val="centerGroup"/>
+                    </m:oMathParaPr>
+                    <m:oMath xmlns:m="http://schemas.openxmlformats.org/officeDocument/2006/math">
+                      <m:sSub>
+                        <m:sSubPr>
+                          <m:ctrlPr>
+                            <a:rPr lang="en-US" sz="2000" b="1" smtClean="0">
+                              <a:solidFill>
+                                <a:srgbClr val="836967"/>
+                              </a:solidFill>
+                              <a:latin typeface="Cambria Math" panose="02040503050406030204" pitchFamily="18" charset="0"/>
+                            </a:rPr>
+                          </m:ctrlPr>
+                        </m:sSubPr>
+                        <m:e>
+                          <m:r>
+                            <a:rPr lang="en-US" sz="2000" b="1" i="1">
+                              <a:latin typeface="Cambria Math" panose="02040503050406030204" pitchFamily="18" charset="0"/>
+                            </a:rPr>
+                            <m:t>𝒚</m:t>
+                          </m:r>
+                        </m:e>
+                        <m:sub>
+                          <m:r>
+                            <a:rPr lang="en-US" sz="2000" b="1" i="1" smtClean="0">
+                              <a:latin typeface="Cambria Math" panose="02040503050406030204" pitchFamily="18" charset="0"/>
+                            </a:rPr>
+                            <m:t>𝒔𝒊𝒎</m:t>
+                          </m:r>
+                        </m:sub>
+                      </m:sSub>
+                    </m:oMath>
+                  </m:oMathPara>
+                </a14:m>
+                <a:endParaRPr lang="en-US" sz="2000" b="1" dirty="0"/>
+              </a:p>
+            </p:txBody>
+          </p:sp>
+        </mc:Choice>
+        <mc:Fallback>
+          <p:sp>
+            <p:nvSpPr>
+              <p:cNvPr id="11" name="TextBox 10">
+                <a:extLst>
+                  <a:ext uri="{FF2B5EF4-FFF2-40B4-BE49-F238E27FC236}">
+                    <a16:creationId xmlns:a16="http://schemas.microsoft.com/office/drawing/2014/main" id="{7B34AECA-4136-8FEA-8030-C5CB9BB20CBE}"/>
+                  </a:ext>
+                </a:extLst>
+              </p:cNvPr>
+              <p:cNvSpPr txBox="1">
+                <a:spLocks noRot="1" noChangeAspect="1" noMove="1" noResize="1" noEditPoints="1" noAdjustHandles="1" noChangeArrowheads="1" noChangeShapeType="1" noTextEdit="1"/>
+              </p:cNvSpPr>
+              <p:nvPr/>
+            </p:nvSpPr>
+            <p:spPr>
+              <a:xfrm>
+                <a:off x="3194668" y="1372432"/>
+                <a:ext cx="565504" cy="307777"/>
+              </a:xfrm>
+              <a:prstGeom prst="rect">
+                <a:avLst/>
+              </a:prstGeom>
+              <a:blipFill>
+                <a:blip r:embed="rId3"/>
+                <a:stretch>
+                  <a:fillRect l="-9677" r="-4301" b="-25490"/>
+                </a:stretch>
+              </a:blipFill>
+            </p:spPr>
+            <p:txBody>
+              <a:bodyPr/>
+              <a:lstStyle/>
+              <a:p>
+                <a:r>
+                  <a:rPr lang="en-US">
+                    <a:noFill/>
+                  </a:rPr>
+                  <a:t> </a:t>
+                </a:r>
+              </a:p>
+            </p:txBody>
+          </p:sp>
+        </mc:Fallback>
+      </mc:AlternateContent>
+      <mc:AlternateContent xmlns:mc="http://schemas.openxmlformats.org/markup-compatibility/2006">
+        <mc:Choice xmlns:a14="http://schemas.microsoft.com/office/drawing/2010/main" Requires="a14">
+          <p:sp>
+            <p:nvSpPr>
+              <p:cNvPr id="12" name="TextBox 11">
+                <a:extLst>
+                  <a:ext uri="{FF2B5EF4-FFF2-40B4-BE49-F238E27FC236}">
+                    <a16:creationId xmlns:a16="http://schemas.microsoft.com/office/drawing/2014/main" id="{C4319342-77FE-5010-F0C3-66892A937462}"/>
+                  </a:ext>
+                </a:extLst>
+              </p:cNvPr>
+              <p:cNvSpPr txBox="1"/>
+              <p:nvPr/>
+            </p:nvSpPr>
+            <p:spPr>
+              <a:xfrm>
+                <a:off x="3010040" y="1950542"/>
+                <a:ext cx="874534" cy="307777"/>
+              </a:xfrm>
+              <a:prstGeom prst="rect">
+                <a:avLst/>
+              </a:prstGeom>
+              <a:noFill/>
+            </p:spPr>
+            <p:txBody>
+              <a:bodyPr wrap="square" lIns="0" tIns="0" rIns="0" bIns="0" rtlCol="0">
+                <a:spAutoFit/>
+              </a:bodyPr>
+              <a:lstStyle/>
+              <a:p>
+                <a14:m>
+                  <m:oMathPara xmlns:m="http://schemas.openxmlformats.org/officeDocument/2006/math">
+                    <m:oMathParaPr>
+                      <m:jc m:val="centerGroup"/>
+                    </m:oMathParaPr>
+                    <m:oMath xmlns:m="http://schemas.openxmlformats.org/officeDocument/2006/math">
+                      <m:d>
+                        <m:dPr>
+                          <m:ctrlPr>
+                            <a:rPr lang="en-US" sz="2000" b="1" smtClean="0">
+                              <a:solidFill>
+                                <a:srgbClr val="836967"/>
+                              </a:solidFill>
+                              <a:latin typeface="Cambria Math" panose="02040503050406030204" pitchFamily="18" charset="0"/>
+                            </a:rPr>
+                          </m:ctrlPr>
+                        </m:dPr>
+                        <m:e>
+                          <m:r>
+                            <a:rPr lang="en-US" sz="2000" b="1" i="1">
+                              <a:latin typeface="Cambria Math" panose="02040503050406030204" pitchFamily="18" charset="0"/>
+                            </a:rPr>
+                            <m:t>𝒏</m:t>
+                          </m:r>
+                          <m:r>
+                            <a:rPr lang="en-US" sz="2000" b="1" i="0">
+                              <a:latin typeface="Cambria Math" panose="02040503050406030204" pitchFamily="18" charset="0"/>
+                            </a:rPr>
+                            <m:t>,</m:t>
+                          </m:r>
+                          <m:r>
+                            <a:rPr lang="en-US" sz="2000" b="1" i="1">
+                              <a:latin typeface="Cambria Math" panose="02040503050406030204" pitchFamily="18" charset="0"/>
+                            </a:rPr>
+                            <m:t>𝒔</m:t>
+                          </m:r>
+                          <m:r>
+                            <a:rPr lang="en-US" sz="2000" b="1" i="0">
+                              <a:latin typeface="Cambria Math" panose="02040503050406030204" pitchFamily="18" charset="0"/>
+                            </a:rPr>
+                            <m:t>,</m:t>
+                          </m:r>
+                          <m:r>
+                            <a:rPr lang="en-US" sz="2000" b="1" i="1">
+                              <a:latin typeface="Cambria Math" panose="02040503050406030204" pitchFamily="18" charset="0"/>
+                            </a:rPr>
+                            <m:t>𝒕</m:t>
+                          </m:r>
+                        </m:e>
+                      </m:d>
+                    </m:oMath>
+                  </m:oMathPara>
+                </a14:m>
+                <a:endParaRPr lang="en-US" sz="2000" b="1" dirty="0"/>
+              </a:p>
+            </p:txBody>
+          </p:sp>
+        </mc:Choice>
+        <mc:Fallback>
+          <p:sp>
+            <p:nvSpPr>
+              <p:cNvPr id="12" name="TextBox 11">
+                <a:extLst>
+                  <a:ext uri="{FF2B5EF4-FFF2-40B4-BE49-F238E27FC236}">
+                    <a16:creationId xmlns:a16="http://schemas.microsoft.com/office/drawing/2014/main" id="{C4319342-77FE-5010-F0C3-66892A937462}"/>
+                  </a:ext>
+                </a:extLst>
+              </p:cNvPr>
+              <p:cNvSpPr txBox="1">
+                <a:spLocks noRot="1" noChangeAspect="1" noMove="1" noResize="1" noEditPoints="1" noAdjustHandles="1" noChangeArrowheads="1" noChangeShapeType="1" noTextEdit="1"/>
+              </p:cNvSpPr>
+              <p:nvPr/>
+            </p:nvSpPr>
+            <p:spPr>
+              <a:xfrm>
+                <a:off x="3010040" y="1950542"/>
+                <a:ext cx="874534" cy="307777"/>
+              </a:xfrm>
+              <a:prstGeom prst="rect">
+                <a:avLst/>
+              </a:prstGeom>
+              <a:blipFill>
+                <a:blip r:embed="rId4"/>
+                <a:stretch>
+                  <a:fillRect b="-4000"/>
+                </a:stretch>
+              </a:blipFill>
+            </p:spPr>
+            <p:txBody>
+              <a:bodyPr/>
+              <a:lstStyle/>
+              <a:p>
+                <a:r>
+                  <a:rPr lang="en-US">
+                    <a:noFill/>
+                  </a:rPr>
+                  <a:t> </a:t>
+                </a:r>
+              </a:p>
+            </p:txBody>
+          </p:sp>
+        </mc:Fallback>
+      </mc:AlternateContent>
+      <p:pic>
+        <p:nvPicPr>
+          <p:cNvPr id="14" name="Picture 13">
+            <a:extLst>
+              <a:ext uri="{FF2B5EF4-FFF2-40B4-BE49-F238E27FC236}">
+                <a16:creationId xmlns:a16="http://schemas.microsoft.com/office/drawing/2014/main" id="{126ECFE3-50B1-A928-8CC6-15B8F9EF5185}"/>
+              </a:ext>
+            </a:extLst>
+          </p:cNvPr>
+          <p:cNvPicPr>
+            <a:picLocks noChangeAspect="1"/>
+          </p:cNvPicPr>
+          <p:nvPr/>
+        </p:nvPicPr>
+        <p:blipFill>
+          <a:blip r:embed="rId5"/>
+          <a:stretch>
+            <a:fillRect/>
+          </a:stretch>
+        </p:blipFill>
+        <p:spPr>
+          <a:xfrm>
+            <a:off x="5240537" y="270829"/>
+            <a:ext cx="3500418" cy="1267286"/>
+          </a:xfrm>
+          <a:prstGeom prst="rect">
+            <a:avLst/>
+          </a:prstGeom>
+        </p:spPr>
+      </p:pic>
+      <p:sp>
+        <p:nvSpPr>
+          <p:cNvPr id="15" name="Arrow: Down 14">
+            <a:extLst>
+              <a:ext uri="{FF2B5EF4-FFF2-40B4-BE49-F238E27FC236}">
+                <a16:creationId xmlns:a16="http://schemas.microsoft.com/office/drawing/2014/main" id="{0092C0B5-A5B1-E6B9-3B17-DBD308B0111D}"/>
+              </a:ext>
+            </a:extLst>
+          </p:cNvPr>
+          <p:cNvSpPr/>
+          <p:nvPr/>
+        </p:nvSpPr>
+        <p:spPr>
+          <a:xfrm rot="14463604">
+            <a:off x="4455362" y="947687"/>
+            <a:ext cx="299693" cy="641823"/>
+          </a:xfrm>
+          <a:prstGeom prst="downArrow">
+            <a:avLst/>
+          </a:prstGeom>
+          <a:solidFill>
+            <a:schemeClr val="tx1"/>
+          </a:solidFill>
+          <a:ln>
+            <a:solidFill>
+              <a:schemeClr val="tx1"/>
+            </a:solidFill>
+          </a:ln>
+        </p:spPr>
+        <p:style>
+          <a:lnRef idx="1">
+            <a:schemeClr val="accent1"/>
+          </a:lnRef>
+          <a:fillRef idx="3">
+            <a:schemeClr val="accent1"/>
+          </a:fillRef>
+          <a:effectRef idx="2">
+            <a:schemeClr val="accent1"/>
+          </a:effectRef>
+          <a:fontRef idx="minor">
+            <a:schemeClr val="lt1"/>
+          </a:fontRef>
+        </p:style>
+        <p:txBody>
+          <a:bodyPr rtlCol="0" anchor="ctr"/>
+          <a:lstStyle/>
+          <a:p>
+            <a:pPr algn="ctr"/>
+            <a:endParaRPr lang="en-US"/>
+          </a:p>
+        </p:txBody>
+      </p:sp>
+      <p:sp>
+        <p:nvSpPr>
+          <p:cNvPr id="16" name="TextBox 15">
+            <a:extLst>
+              <a:ext uri="{FF2B5EF4-FFF2-40B4-BE49-F238E27FC236}">
+                <a16:creationId xmlns:a16="http://schemas.microsoft.com/office/drawing/2014/main" id="{5D5769EF-5A2C-75AE-A617-A421E7D44330}"/>
+              </a:ext>
+            </a:extLst>
+          </p:cNvPr>
+          <p:cNvSpPr txBox="1"/>
+          <p:nvPr/>
+        </p:nvSpPr>
+        <p:spPr>
+          <a:xfrm>
+            <a:off x="6484167" y="184780"/>
+            <a:ext cx="1263750" cy="338554"/>
+          </a:xfrm>
+          <a:prstGeom prst="rect">
+            <a:avLst/>
+          </a:prstGeom>
+          <a:solidFill>
+            <a:schemeClr val="accent2">
+              <a:lumMod val="40000"/>
+              <a:lumOff val="60000"/>
+            </a:schemeClr>
+          </a:solidFill>
+          <a:ln>
+            <a:solidFill>
+              <a:schemeClr val="tx1"/>
+            </a:solidFill>
+          </a:ln>
+        </p:spPr>
+        <p:txBody>
+          <a:bodyPr wrap="square" rtlCol="0">
+            <a:spAutoFit/>
+          </a:bodyPr>
+          <a:lstStyle/>
+          <a:p>
+            <a:pPr algn="ctr"/>
+            <a:r>
+              <a:rPr lang="en-US" sz="1600" dirty="0"/>
+              <a:t>Train Model</a:t>
+            </a:r>
+          </a:p>
+        </p:txBody>
+      </p:sp>
+      <p:sp>
+        <p:nvSpPr>
+          <p:cNvPr id="18" name="TextBox 17">
+            <a:extLst>
+              <a:ext uri="{FF2B5EF4-FFF2-40B4-BE49-F238E27FC236}">
+                <a16:creationId xmlns:a16="http://schemas.microsoft.com/office/drawing/2014/main" id="{A2C3AF7A-7B54-DB85-4A0B-E8015BCB0D64}"/>
+              </a:ext>
+            </a:extLst>
+          </p:cNvPr>
+          <p:cNvSpPr txBox="1"/>
+          <p:nvPr/>
+        </p:nvSpPr>
+        <p:spPr>
+          <a:xfrm>
+            <a:off x="165459" y="64542"/>
+            <a:ext cx="3392596" cy="369332"/>
+          </a:xfrm>
+          <a:prstGeom prst="rect">
+            <a:avLst/>
+          </a:prstGeom>
+          <a:noFill/>
+        </p:spPr>
+        <p:txBody>
+          <a:bodyPr wrap="square" rtlCol="0">
+            <a:spAutoFit/>
+          </a:bodyPr>
+          <a:lstStyle/>
+          <a:p>
+            <a:r>
+              <a:rPr lang="en-US" b="1" dirty="0"/>
+              <a:t>Summary Statistic Generation</a:t>
+            </a:r>
+          </a:p>
+        </p:txBody>
+      </p:sp>
+      <mc:AlternateContent xmlns:mc="http://schemas.openxmlformats.org/markup-compatibility/2006">
+        <mc:Choice xmlns:a14="http://schemas.microsoft.com/office/drawing/2010/main" Requires="a14">
+          <p:sp>
+            <p:nvSpPr>
+              <p:cNvPr id="19" name="TextBox 18">
+                <a:extLst>
+                  <a:ext uri="{FF2B5EF4-FFF2-40B4-BE49-F238E27FC236}">
+                    <a16:creationId xmlns:a16="http://schemas.microsoft.com/office/drawing/2014/main" id="{20D6125F-694E-3926-6B11-954A006B4159}"/>
+                  </a:ext>
+                </a:extLst>
+              </p:cNvPr>
+              <p:cNvSpPr txBox="1"/>
+              <p:nvPr/>
+            </p:nvSpPr>
+            <p:spPr>
+              <a:xfrm>
+                <a:off x="106902" y="3534571"/>
+                <a:ext cx="771971" cy="319807"/>
+              </a:xfrm>
+              <a:prstGeom prst="rect">
+                <a:avLst/>
+              </a:prstGeom>
+              <a:noFill/>
+              <a:ln>
+                <a:solidFill>
+                  <a:schemeClr val="tx1"/>
+                </a:solidFill>
+              </a:ln>
+            </p:spPr>
+            <p:txBody>
+              <a:bodyPr wrap="square" lIns="0" tIns="0" rIns="0" bIns="0" rtlCol="0">
+                <a:spAutoFit/>
+              </a:bodyPr>
+              <a:lstStyle/>
+              <a:p>
+                <a14:m>
+                  <m:oMathPara xmlns:m="http://schemas.openxmlformats.org/officeDocument/2006/math">
+                    <m:oMathParaPr>
+                      <m:jc m:val="centerGroup"/>
+                    </m:oMathParaPr>
+                    <m:oMath xmlns:m="http://schemas.openxmlformats.org/officeDocument/2006/math">
+                      <m:r>
+                        <a:rPr lang="en-US" sz="2000" b="1" i="1" dirty="0" smtClean="0">
+                          <a:latin typeface="Cambria Math" panose="02040503050406030204" pitchFamily="18" charset="0"/>
+                        </a:rPr>
+                        <m:t>𝑷</m:t>
+                      </m:r>
+                      <m:d>
+                        <m:dPr>
+                          <m:ctrlPr>
+                            <a:rPr lang="en-US" sz="2000" b="1" i="1" dirty="0">
+                              <a:solidFill>
+                                <a:srgbClr val="836967"/>
+                              </a:solidFill>
+                              <a:latin typeface="Cambria Math" panose="02040503050406030204" pitchFamily="18" charset="0"/>
+                            </a:rPr>
+                          </m:ctrlPr>
+                        </m:dPr>
+                        <m:e>
+                          <m:sSub>
+                            <m:sSubPr>
+                              <m:ctrlPr>
+                                <a:rPr lang="en-US" sz="2000" b="1" i="1" dirty="0">
+                                  <a:solidFill>
+                                    <a:srgbClr val="836967"/>
+                                  </a:solidFill>
+                                  <a:latin typeface="Cambria Math" panose="02040503050406030204" pitchFamily="18" charset="0"/>
+                                </a:rPr>
+                              </m:ctrlPr>
+                            </m:sSubPr>
+                            <m:e>
+                              <m:r>
+                                <a:rPr lang="en-US" sz="2000" b="1" i="1" dirty="0">
+                                  <a:latin typeface="Cambria Math" panose="02040503050406030204" pitchFamily="18" charset="0"/>
+                                </a:rPr>
+                                <m:t>𝜽</m:t>
+                              </m:r>
+                            </m:e>
+                            <m:sub>
+                              <m:r>
+                                <a:rPr lang="en-US" sz="2000" b="1" i="1" dirty="0" smtClean="0">
+                                  <a:latin typeface="Cambria Math" panose="02040503050406030204" pitchFamily="18" charset="0"/>
+                                </a:rPr>
+                                <m:t>𝑼</m:t>
+                              </m:r>
+                            </m:sub>
+                          </m:sSub>
+                        </m:e>
+                      </m:d>
+                    </m:oMath>
+                  </m:oMathPara>
+                </a14:m>
+                <a:endParaRPr lang="en-US" sz="2000" b="1" dirty="0"/>
+              </a:p>
+            </p:txBody>
+          </p:sp>
+        </mc:Choice>
+        <mc:Fallback>
+          <p:sp>
+            <p:nvSpPr>
+              <p:cNvPr id="19" name="TextBox 18">
+                <a:extLst>
+                  <a:ext uri="{FF2B5EF4-FFF2-40B4-BE49-F238E27FC236}">
+                    <a16:creationId xmlns:a16="http://schemas.microsoft.com/office/drawing/2014/main" id="{20D6125F-694E-3926-6B11-954A006B4159}"/>
+                  </a:ext>
+                </a:extLst>
+              </p:cNvPr>
+              <p:cNvSpPr txBox="1">
+                <a:spLocks noRot="1" noChangeAspect="1" noMove="1" noResize="1" noEditPoints="1" noAdjustHandles="1" noChangeArrowheads="1" noChangeShapeType="1" noTextEdit="1"/>
+              </p:cNvSpPr>
+              <p:nvPr/>
+            </p:nvSpPr>
+            <p:spPr>
+              <a:xfrm>
+                <a:off x="106902" y="3534571"/>
+                <a:ext cx="771971" cy="319807"/>
+              </a:xfrm>
+              <a:prstGeom prst="rect">
+                <a:avLst/>
+              </a:prstGeom>
+              <a:blipFill>
+                <a:blip r:embed="rId6"/>
+                <a:stretch>
+                  <a:fillRect l="-5469" b="-11111"/>
+                </a:stretch>
+              </a:blipFill>
+              <a:ln>
+                <a:solidFill>
+                  <a:schemeClr val="tx1"/>
+                </a:solidFill>
+              </a:ln>
+            </p:spPr>
+            <p:txBody>
+              <a:bodyPr/>
+              <a:lstStyle/>
+              <a:p>
+                <a:r>
+                  <a:rPr lang="en-US">
+                    <a:noFill/>
+                  </a:rPr>
+                  <a:t> </a:t>
+                </a:r>
+              </a:p>
+            </p:txBody>
+          </p:sp>
+        </mc:Fallback>
+      </mc:AlternateContent>
+      <p:sp>
+        <p:nvSpPr>
+          <p:cNvPr id="20" name="Rectangle 19">
+            <a:extLst>
+              <a:ext uri="{FF2B5EF4-FFF2-40B4-BE49-F238E27FC236}">
+                <a16:creationId xmlns:a16="http://schemas.microsoft.com/office/drawing/2014/main" id="{6304C018-DCBF-A2B6-1A1F-C7AFE417E46D}"/>
+              </a:ext>
+            </a:extLst>
+          </p:cNvPr>
+          <p:cNvSpPr/>
+          <p:nvPr/>
+        </p:nvSpPr>
+        <p:spPr>
+          <a:xfrm>
+            <a:off x="1073526" y="3861693"/>
+            <a:ext cx="1537336" cy="430887"/>
+          </a:xfrm>
+          <a:prstGeom prst="rect">
+            <a:avLst/>
+          </a:prstGeom>
+          <a:solidFill>
+            <a:schemeClr val="accent6">
+              <a:lumMod val="20000"/>
+              <a:lumOff val="80000"/>
+            </a:schemeClr>
+          </a:solidFill>
+          <a:ln>
+            <a:solidFill>
+              <a:schemeClr val="tx1"/>
+            </a:solidFill>
+          </a:ln>
+        </p:spPr>
+        <p:style>
+          <a:lnRef idx="1">
+            <a:schemeClr val="accent1"/>
+          </a:lnRef>
+          <a:fillRef idx="3">
+            <a:schemeClr val="accent1"/>
+          </a:fillRef>
+          <a:effectRef idx="2">
+            <a:schemeClr val="accent1"/>
+          </a:effectRef>
+          <a:fontRef idx="minor">
+            <a:schemeClr val="lt1"/>
+          </a:fontRef>
+        </p:style>
+        <p:txBody>
+          <a:bodyPr rtlCol="0" anchor="ctr"/>
+          <a:lstStyle/>
+          <a:p>
+            <a:pPr algn="ctr"/>
+            <a:r>
+              <a:rPr lang="en-US" dirty="0">
+                <a:solidFill>
+                  <a:schemeClr val="tx1"/>
+                </a:solidFill>
+              </a:rPr>
+              <a:t>Simulator</a:t>
+            </a:r>
+          </a:p>
+        </p:txBody>
+      </p:sp>
+      <p:sp>
+        <p:nvSpPr>
+          <p:cNvPr id="21" name="Arrow: Down 20">
+            <a:extLst>
+              <a:ext uri="{FF2B5EF4-FFF2-40B4-BE49-F238E27FC236}">
+                <a16:creationId xmlns:a16="http://schemas.microsoft.com/office/drawing/2014/main" id="{B37C3B30-7736-7B89-9FE7-DAB0CE1C85AC}"/>
+              </a:ext>
+            </a:extLst>
+          </p:cNvPr>
+          <p:cNvSpPr/>
+          <p:nvPr/>
+        </p:nvSpPr>
+        <p:spPr>
+          <a:xfrm rot="16200000">
+            <a:off x="2871120" y="3859421"/>
+            <a:ext cx="235495" cy="435429"/>
+          </a:xfrm>
+          <a:prstGeom prst="downArrow">
+            <a:avLst/>
+          </a:prstGeom>
+          <a:solidFill>
+            <a:schemeClr val="tx1"/>
+          </a:solidFill>
+          <a:ln>
+            <a:solidFill>
+              <a:schemeClr val="tx1"/>
+            </a:solidFill>
+          </a:ln>
+        </p:spPr>
+        <p:style>
+          <a:lnRef idx="1">
+            <a:schemeClr val="accent1"/>
+          </a:lnRef>
+          <a:fillRef idx="3">
+            <a:schemeClr val="accent1"/>
+          </a:fillRef>
+          <a:effectRef idx="2">
+            <a:schemeClr val="accent1"/>
+          </a:effectRef>
+          <a:fontRef idx="minor">
+            <a:schemeClr val="lt1"/>
+          </a:fontRef>
+        </p:style>
+        <p:txBody>
+          <a:bodyPr rtlCol="0" anchor="ctr"/>
+          <a:lstStyle/>
+          <a:p>
+            <a:pPr algn="ctr"/>
+            <a:endParaRPr lang="en-US"/>
+          </a:p>
+        </p:txBody>
+      </p:sp>
+      <p:sp>
+        <p:nvSpPr>
+          <p:cNvPr id="23" name="Rectangle 22">
+            <a:extLst>
+              <a:ext uri="{FF2B5EF4-FFF2-40B4-BE49-F238E27FC236}">
+                <a16:creationId xmlns:a16="http://schemas.microsoft.com/office/drawing/2014/main" id="{5CC03F82-D148-124E-E54F-A33F7E785EC1}"/>
+              </a:ext>
+            </a:extLst>
+          </p:cNvPr>
+          <p:cNvSpPr/>
+          <p:nvPr/>
+        </p:nvSpPr>
+        <p:spPr>
+          <a:xfrm>
+            <a:off x="3356195" y="3897700"/>
+            <a:ext cx="1123158" cy="365760"/>
+          </a:xfrm>
+          <a:prstGeom prst="rect">
+            <a:avLst/>
+          </a:prstGeom>
+          <a:solidFill>
+            <a:schemeClr val="accent2">
+              <a:lumMod val="40000"/>
+              <a:lumOff val="60000"/>
+            </a:schemeClr>
+          </a:solidFill>
+          <a:ln>
+            <a:solidFill>
+              <a:schemeClr val="tx1"/>
+            </a:solidFill>
+          </a:ln>
+        </p:spPr>
+        <p:style>
+          <a:lnRef idx="1">
+            <a:schemeClr val="accent1"/>
+          </a:lnRef>
+          <a:fillRef idx="3">
+            <a:schemeClr val="accent1"/>
+          </a:fillRef>
+          <a:effectRef idx="2">
+            <a:schemeClr val="accent1"/>
+          </a:effectRef>
+          <a:fontRef idx="minor">
+            <a:schemeClr val="lt1"/>
+          </a:fontRef>
+        </p:style>
+        <p:txBody>
+          <a:bodyPr rtlCol="0" anchor="ctr"/>
+          <a:lstStyle/>
+          <a:p>
+            <a:pPr algn="ctr"/>
+            <a:r>
+              <a:rPr lang="en-US" dirty="0">
+                <a:solidFill>
+                  <a:schemeClr val="tx1"/>
+                </a:solidFill>
+              </a:rPr>
+              <a:t>CNN</a:t>
+            </a:r>
+          </a:p>
+        </p:txBody>
+      </p:sp>
+      <p:sp>
+        <p:nvSpPr>
+          <p:cNvPr id="24" name="Rectangle 23">
+            <a:extLst>
+              <a:ext uri="{FF2B5EF4-FFF2-40B4-BE49-F238E27FC236}">
+                <a16:creationId xmlns:a16="http://schemas.microsoft.com/office/drawing/2014/main" id="{E26D680E-B420-2014-3CA7-B9561E0E10C3}"/>
+              </a:ext>
+            </a:extLst>
+          </p:cNvPr>
+          <p:cNvSpPr/>
+          <p:nvPr/>
+        </p:nvSpPr>
+        <p:spPr>
+          <a:xfrm>
+            <a:off x="977190" y="3315387"/>
+            <a:ext cx="3572613" cy="1256256"/>
+          </a:xfrm>
+          <a:prstGeom prst="rect">
+            <a:avLst/>
+          </a:prstGeom>
+          <a:noFill/>
+          <a:ln w="19050"/>
+        </p:spPr>
+        <p:style>
+          <a:lnRef idx="1">
+            <a:schemeClr val="dk1"/>
+          </a:lnRef>
+          <a:fillRef idx="3">
+            <a:schemeClr val="dk1"/>
+          </a:fillRef>
+          <a:effectRef idx="2">
+            <a:schemeClr val="dk1"/>
+          </a:effectRef>
+          <a:fontRef idx="minor">
+            <a:schemeClr val="lt1"/>
+          </a:fontRef>
+        </p:style>
+        <p:txBody>
+          <a:bodyPr rtlCol="0" anchor="ctr"/>
+          <a:lstStyle/>
+          <a:p>
+            <a:pPr algn="ctr"/>
+            <a:endParaRPr lang="en-US"/>
+          </a:p>
+        </p:txBody>
+      </p:sp>
+      <p:sp>
+        <p:nvSpPr>
+          <p:cNvPr id="25" name="TextBox 24">
+            <a:extLst>
+              <a:ext uri="{FF2B5EF4-FFF2-40B4-BE49-F238E27FC236}">
+                <a16:creationId xmlns:a16="http://schemas.microsoft.com/office/drawing/2014/main" id="{94CCD070-3FAB-0FDD-65A0-23CAA771896C}"/>
+              </a:ext>
+            </a:extLst>
+          </p:cNvPr>
+          <p:cNvSpPr txBox="1"/>
+          <p:nvPr/>
+        </p:nvSpPr>
+        <p:spPr>
+          <a:xfrm>
+            <a:off x="1019233" y="3341189"/>
+            <a:ext cx="1468210" cy="369332"/>
+          </a:xfrm>
+          <a:prstGeom prst="rect">
+            <a:avLst/>
+          </a:prstGeom>
+          <a:noFill/>
+        </p:spPr>
+        <p:txBody>
+          <a:bodyPr wrap="square" rtlCol="0">
+            <a:spAutoFit/>
+          </a:bodyPr>
+          <a:lstStyle/>
+          <a:p>
+            <a:r>
+              <a:rPr lang="en-US" dirty="0"/>
+              <a:t>SBI Simulator</a:t>
+            </a:r>
+          </a:p>
+        </p:txBody>
+      </p:sp>
+      <p:sp>
+        <p:nvSpPr>
+          <p:cNvPr id="26" name="Rectangle 25">
+            <a:extLst>
+              <a:ext uri="{FF2B5EF4-FFF2-40B4-BE49-F238E27FC236}">
+                <a16:creationId xmlns:a16="http://schemas.microsoft.com/office/drawing/2014/main" id="{84EF50D1-602F-AA64-3F07-8495308C061E}"/>
+              </a:ext>
+            </a:extLst>
+          </p:cNvPr>
+          <p:cNvSpPr/>
+          <p:nvPr/>
+        </p:nvSpPr>
+        <p:spPr>
+          <a:xfrm>
+            <a:off x="6862711" y="1648485"/>
+            <a:ext cx="669055" cy="676699"/>
+          </a:xfrm>
+          <a:prstGeom prst="rect">
+            <a:avLst/>
+          </a:prstGeom>
+          <a:solidFill>
+            <a:schemeClr val="accent1">
+              <a:lumMod val="40000"/>
+              <a:lumOff val="60000"/>
+            </a:schemeClr>
+          </a:solidFill>
+        </p:spPr>
+        <p:style>
+          <a:lnRef idx="1">
+            <a:schemeClr val="accent1"/>
+          </a:lnRef>
+          <a:fillRef idx="3">
+            <a:schemeClr val="accent1"/>
+          </a:fillRef>
+          <a:effectRef idx="2">
+            <a:schemeClr val="accent1"/>
+          </a:effectRef>
+          <a:fontRef idx="minor">
+            <a:schemeClr val="lt1"/>
+          </a:fontRef>
+        </p:style>
+        <p:txBody>
+          <a:bodyPr rtlCol="0" anchor="ctr"/>
+          <a:lstStyle/>
+          <a:p>
+            <a:pPr algn="ctr"/>
+            <a:endParaRPr lang="en-US"/>
+          </a:p>
+        </p:txBody>
+      </p:sp>
+      <mc:AlternateContent xmlns:mc="http://schemas.openxmlformats.org/markup-compatibility/2006">
+        <mc:Choice xmlns:a14="http://schemas.microsoft.com/office/drawing/2010/main" Requires="a14">
+          <p:sp>
+            <p:nvSpPr>
+              <p:cNvPr id="29" name="TextBox 28">
+                <a:extLst>
+                  <a:ext uri="{FF2B5EF4-FFF2-40B4-BE49-F238E27FC236}">
+                    <a16:creationId xmlns:a16="http://schemas.microsoft.com/office/drawing/2014/main" id="{B27C4B0C-4116-7B1B-3F7B-F5C4BBAD0B2D}"/>
+                  </a:ext>
+                </a:extLst>
+              </p:cNvPr>
+              <p:cNvSpPr txBox="1"/>
+              <p:nvPr/>
+            </p:nvSpPr>
+            <p:spPr>
+              <a:xfrm>
+                <a:off x="6862710" y="2363012"/>
+                <a:ext cx="669055" cy="307777"/>
+              </a:xfrm>
+              <a:prstGeom prst="rect">
+                <a:avLst/>
+              </a:prstGeom>
+              <a:noFill/>
+            </p:spPr>
+            <p:txBody>
+              <a:bodyPr wrap="square" lIns="0" tIns="0" rIns="0" bIns="0" rtlCol="0">
+                <a:spAutoFit/>
+              </a:bodyPr>
+              <a:lstStyle/>
+              <a:p>
+                <a14:m>
+                  <m:oMathPara xmlns:m="http://schemas.openxmlformats.org/officeDocument/2006/math">
+                    <m:oMathParaPr>
+                      <m:jc m:val="centerGroup"/>
+                    </m:oMathParaPr>
+                    <m:oMath xmlns:m="http://schemas.openxmlformats.org/officeDocument/2006/math">
+                      <m:d>
+                        <m:dPr>
+                          <m:ctrlPr>
+                            <a:rPr lang="en-US" sz="2000" b="1" smtClean="0">
+                              <a:solidFill>
+                                <a:srgbClr val="836967"/>
+                              </a:solidFill>
+                              <a:latin typeface="Cambria Math" panose="02040503050406030204" pitchFamily="18" charset="0"/>
+                            </a:rPr>
+                          </m:ctrlPr>
+                        </m:dPr>
+                        <m:e>
+                          <m:r>
+                            <a:rPr lang="en-US" sz="2000" b="1" i="1">
+                              <a:latin typeface="Cambria Math" panose="02040503050406030204" pitchFamily="18" charset="0"/>
+                            </a:rPr>
+                            <m:t>𝒏</m:t>
+                          </m:r>
+                          <m:r>
+                            <a:rPr lang="en-US" sz="2000" b="1" i="0">
+                              <a:latin typeface="Cambria Math" panose="02040503050406030204" pitchFamily="18" charset="0"/>
+                            </a:rPr>
+                            <m:t>,</m:t>
+                          </m:r>
+                          <m:r>
+                            <a:rPr lang="en-US" sz="2000" b="1" i="1" smtClean="0">
+                              <a:latin typeface="Cambria Math" panose="02040503050406030204" pitchFamily="18" charset="0"/>
+                            </a:rPr>
+                            <m:t>𝒔</m:t>
+                          </m:r>
+                        </m:e>
+                      </m:d>
+                    </m:oMath>
+                  </m:oMathPara>
+                </a14:m>
+                <a:endParaRPr lang="en-US" sz="2000" b="1" dirty="0"/>
+              </a:p>
+            </p:txBody>
+          </p:sp>
+        </mc:Choice>
+        <mc:Fallback>
+          <p:sp>
+            <p:nvSpPr>
+              <p:cNvPr id="29" name="TextBox 28">
+                <a:extLst>
+                  <a:ext uri="{FF2B5EF4-FFF2-40B4-BE49-F238E27FC236}">
+                    <a16:creationId xmlns:a16="http://schemas.microsoft.com/office/drawing/2014/main" id="{B27C4B0C-4116-7B1B-3F7B-F5C4BBAD0B2D}"/>
+                  </a:ext>
+                </a:extLst>
+              </p:cNvPr>
+              <p:cNvSpPr txBox="1">
+                <a:spLocks noRot="1" noChangeAspect="1" noMove="1" noResize="1" noEditPoints="1" noAdjustHandles="1" noChangeArrowheads="1" noChangeShapeType="1" noTextEdit="1"/>
+              </p:cNvSpPr>
+              <p:nvPr/>
+            </p:nvSpPr>
+            <p:spPr>
+              <a:xfrm>
+                <a:off x="6862710" y="2363012"/>
+                <a:ext cx="669055" cy="307777"/>
+              </a:xfrm>
+              <a:prstGeom prst="rect">
+                <a:avLst/>
+              </a:prstGeom>
+              <a:blipFill>
+                <a:blip r:embed="rId7"/>
+                <a:stretch>
+                  <a:fillRect/>
+                </a:stretch>
+              </a:blipFill>
+            </p:spPr>
+            <p:txBody>
+              <a:bodyPr/>
+              <a:lstStyle/>
+              <a:p>
+                <a:r>
+                  <a:rPr lang="en-US">
+                    <a:noFill/>
+                  </a:rPr>
+                  <a:t> </a:t>
+                </a:r>
+              </a:p>
+            </p:txBody>
+          </p:sp>
+        </mc:Fallback>
+      </mc:AlternateContent>
+      <p:sp>
+        <p:nvSpPr>
+          <p:cNvPr id="30" name="Arrow: Bent-Up 29">
+            <a:extLst>
+              <a:ext uri="{FF2B5EF4-FFF2-40B4-BE49-F238E27FC236}">
+                <a16:creationId xmlns:a16="http://schemas.microsoft.com/office/drawing/2014/main" id="{B26689F8-18B9-1882-E930-4E8B136E4876}"/>
+              </a:ext>
+            </a:extLst>
+          </p:cNvPr>
+          <p:cNvSpPr/>
+          <p:nvPr/>
+        </p:nvSpPr>
+        <p:spPr>
+          <a:xfrm rot="5400000">
+            <a:off x="6034340" y="1674871"/>
+            <a:ext cx="547553" cy="558230"/>
+          </a:xfrm>
+          <a:prstGeom prst="bentUpArrow">
+            <a:avLst>
+              <a:gd name="adj1" fmla="val 32893"/>
+              <a:gd name="adj2" fmla="val 25000"/>
+              <a:gd name="adj3" fmla="val 25000"/>
+            </a:avLst>
+          </a:prstGeom>
+          <a:solidFill>
+            <a:schemeClr val="tx1"/>
+          </a:solidFill>
+          <a:ln>
+            <a:solidFill>
+              <a:schemeClr val="tx1"/>
+            </a:solidFill>
+          </a:ln>
+        </p:spPr>
+        <p:style>
+          <a:lnRef idx="1">
+            <a:schemeClr val="accent1"/>
+          </a:lnRef>
+          <a:fillRef idx="3">
+            <a:schemeClr val="accent1"/>
+          </a:fillRef>
+          <a:effectRef idx="2">
+            <a:schemeClr val="accent1"/>
+          </a:effectRef>
+          <a:fontRef idx="minor">
+            <a:schemeClr val="lt1"/>
+          </a:fontRef>
+        </p:style>
+        <p:txBody>
+          <a:bodyPr rtlCol="0" anchor="ctr"/>
+          <a:lstStyle/>
+          <a:p>
+            <a:pPr algn="ctr"/>
+            <a:endParaRPr lang="en-US"/>
+          </a:p>
+        </p:txBody>
+      </p:sp>
+      <p:sp>
+        <p:nvSpPr>
+          <p:cNvPr id="31" name="Rectangle 30">
+            <a:extLst>
+              <a:ext uri="{FF2B5EF4-FFF2-40B4-BE49-F238E27FC236}">
+                <a16:creationId xmlns:a16="http://schemas.microsoft.com/office/drawing/2014/main" id="{26CE649D-F03F-7D4B-21FC-ECE5D121FE05}"/>
+              </a:ext>
+            </a:extLst>
+          </p:cNvPr>
+          <p:cNvSpPr/>
+          <p:nvPr/>
+        </p:nvSpPr>
+        <p:spPr>
+          <a:xfrm>
+            <a:off x="5162816" y="135024"/>
+            <a:ext cx="3711217" cy="1419996"/>
+          </a:xfrm>
+          <a:prstGeom prst="rect">
+            <a:avLst/>
+          </a:prstGeom>
+          <a:noFill/>
+          <a:ln w="19050"/>
+        </p:spPr>
+        <p:style>
+          <a:lnRef idx="1">
+            <a:schemeClr val="dk1"/>
+          </a:lnRef>
+          <a:fillRef idx="3">
+            <a:schemeClr val="dk1"/>
+          </a:fillRef>
+          <a:effectRef idx="2">
+            <a:schemeClr val="dk1"/>
+          </a:effectRef>
+          <a:fontRef idx="minor">
+            <a:schemeClr val="lt1"/>
+          </a:fontRef>
+        </p:style>
+        <p:txBody>
+          <a:bodyPr rtlCol="0" anchor="ctr"/>
+          <a:lstStyle/>
+          <a:p>
+            <a:pPr algn="ctr"/>
+            <a:endParaRPr lang="en-US"/>
+          </a:p>
+        </p:txBody>
+      </p:sp>
+      <p:sp>
+        <p:nvSpPr>
+          <p:cNvPr id="32" name="Arrow: Down 31">
+            <a:extLst>
+              <a:ext uri="{FF2B5EF4-FFF2-40B4-BE49-F238E27FC236}">
+                <a16:creationId xmlns:a16="http://schemas.microsoft.com/office/drawing/2014/main" id="{5DB3436A-7045-6D89-51F5-5B98458497C5}"/>
+              </a:ext>
+            </a:extLst>
+          </p:cNvPr>
+          <p:cNvSpPr/>
+          <p:nvPr/>
+        </p:nvSpPr>
+        <p:spPr>
+          <a:xfrm rot="16200000">
+            <a:off x="4689833" y="3733117"/>
+            <a:ext cx="304783" cy="440596"/>
+          </a:xfrm>
+          <a:prstGeom prst="downArrow">
+            <a:avLst/>
+          </a:prstGeom>
+          <a:solidFill>
+            <a:schemeClr val="tx1"/>
+          </a:solidFill>
+          <a:ln>
+            <a:solidFill>
+              <a:schemeClr val="tx1"/>
+            </a:solidFill>
+          </a:ln>
+        </p:spPr>
+        <p:style>
+          <a:lnRef idx="1">
+            <a:schemeClr val="accent1"/>
+          </a:lnRef>
+          <a:fillRef idx="3">
+            <a:schemeClr val="accent1"/>
+          </a:fillRef>
+          <a:effectRef idx="2">
+            <a:schemeClr val="accent1"/>
+          </a:effectRef>
+          <a:fontRef idx="minor">
+            <a:schemeClr val="lt1"/>
+          </a:fontRef>
+        </p:style>
+        <p:txBody>
+          <a:bodyPr rtlCol="0" anchor="ctr"/>
+          <a:lstStyle/>
+          <a:p>
+            <a:pPr algn="ctr"/>
+            <a:endParaRPr lang="en-US"/>
+          </a:p>
+        </p:txBody>
+      </p:sp>
+      <p:sp>
+        <p:nvSpPr>
+          <p:cNvPr id="33" name="Rectangle 32">
+            <a:extLst>
+              <a:ext uri="{FF2B5EF4-FFF2-40B4-BE49-F238E27FC236}">
+                <a16:creationId xmlns:a16="http://schemas.microsoft.com/office/drawing/2014/main" id="{A13D7849-85E5-9D8F-E6E6-7EE242C46B83}"/>
+              </a:ext>
+            </a:extLst>
+          </p:cNvPr>
+          <p:cNvSpPr/>
+          <p:nvPr/>
+        </p:nvSpPr>
+        <p:spPr>
+          <a:xfrm>
+            <a:off x="5167269" y="3605543"/>
+            <a:ext cx="669055" cy="702565"/>
+          </a:xfrm>
+          <a:prstGeom prst="rect">
+            <a:avLst/>
+          </a:prstGeom>
+          <a:solidFill>
+            <a:schemeClr val="accent1">
+              <a:lumMod val="40000"/>
+              <a:lumOff val="60000"/>
+            </a:schemeClr>
+          </a:solidFill>
+        </p:spPr>
+        <p:style>
+          <a:lnRef idx="1">
+            <a:schemeClr val="accent1"/>
+          </a:lnRef>
+          <a:fillRef idx="3">
+            <a:schemeClr val="accent1"/>
+          </a:fillRef>
+          <a:effectRef idx="2">
+            <a:schemeClr val="accent1"/>
+          </a:effectRef>
+          <a:fontRef idx="minor">
+            <a:schemeClr val="lt1"/>
+          </a:fontRef>
+        </p:style>
+        <p:txBody>
+          <a:bodyPr rtlCol="0" anchor="ctr"/>
+          <a:lstStyle/>
+          <a:p>
+            <a:pPr algn="ctr"/>
+            <a:endParaRPr lang="en-US"/>
+          </a:p>
+        </p:txBody>
+      </p:sp>
+      <mc:AlternateContent xmlns:mc="http://schemas.openxmlformats.org/markup-compatibility/2006">
+        <mc:Choice xmlns:a14="http://schemas.microsoft.com/office/drawing/2010/main" Requires="a14">
+          <p:sp>
+            <p:nvSpPr>
+              <p:cNvPr id="37" name="TextBox 36">
+                <a:extLst>
+                  <a:ext uri="{FF2B5EF4-FFF2-40B4-BE49-F238E27FC236}">
+                    <a16:creationId xmlns:a16="http://schemas.microsoft.com/office/drawing/2014/main" id="{594C8BF7-DD84-9635-CA20-723176690331}"/>
+                  </a:ext>
+                </a:extLst>
+              </p:cNvPr>
+              <p:cNvSpPr txBox="1"/>
+              <p:nvPr/>
+            </p:nvSpPr>
+            <p:spPr>
+              <a:xfrm>
+                <a:off x="5178827" y="3749706"/>
+                <a:ext cx="657497" cy="369332"/>
+              </a:xfrm>
+              <a:prstGeom prst="rect">
+                <a:avLst/>
+              </a:prstGeom>
+              <a:noFill/>
+            </p:spPr>
+            <p:txBody>
+              <a:bodyPr wrap="square">
+                <a:spAutoFit/>
+              </a:bodyPr>
+              <a:lstStyle/>
+              <a:p>
+                <a:pPr/>
+                <a14:m>
+                  <m:oMathPara xmlns:m="http://schemas.openxmlformats.org/officeDocument/2006/math">
+                    <m:oMathParaPr>
+                      <m:jc m:val="centerGroup"/>
+                    </m:oMathParaPr>
+                    <m:oMath xmlns:m="http://schemas.openxmlformats.org/officeDocument/2006/math">
+                      <m:sSub>
+                        <m:sSubPr>
+                          <m:ctrlPr>
+                            <a:rPr lang="en-US" sz="1800" b="0" i="1" smtClean="0">
+                              <a:latin typeface="Cambria Math" panose="02040503050406030204" pitchFamily="18" charset="0"/>
+                            </a:rPr>
+                          </m:ctrlPr>
+                        </m:sSubPr>
+                        <m:e>
+                          <m:acc>
+                            <m:accPr>
+                              <m:chr m:val="̂"/>
+                              <m:ctrlPr>
+                                <a:rPr lang="en-US" i="1">
+                                  <a:latin typeface="Cambria Math" panose="02040503050406030204" pitchFamily="18" charset="0"/>
+                                </a:rPr>
+                              </m:ctrlPr>
+                            </m:accPr>
+                            <m:e>
+                              <m:r>
+                                <a:rPr lang="en-US" b="1" i="1">
+                                  <a:latin typeface="Cambria Math" panose="02040503050406030204" pitchFamily="18" charset="0"/>
+                                </a:rPr>
+                                <m:t>𝝁</m:t>
+                              </m:r>
+                            </m:e>
+                          </m:acc>
+                        </m:e>
+                        <m:sub>
+                          <m:r>
+                            <a:rPr lang="en-US" sz="1800" b="1" i="1" smtClean="0">
+                              <a:latin typeface="Cambria Math" panose="02040503050406030204" pitchFamily="18" charset="0"/>
+                            </a:rPr>
+                            <m:t>𝒔𝒃𝒊</m:t>
+                          </m:r>
+                        </m:sub>
+                      </m:sSub>
+                    </m:oMath>
+                  </m:oMathPara>
+                </a14:m>
+                <a:endParaRPr lang="en-US" dirty="0"/>
+              </a:p>
+            </p:txBody>
+          </p:sp>
+        </mc:Choice>
+        <mc:Fallback>
+          <p:sp>
+            <p:nvSpPr>
+              <p:cNvPr id="37" name="TextBox 36">
+                <a:extLst>
+                  <a:ext uri="{FF2B5EF4-FFF2-40B4-BE49-F238E27FC236}">
+                    <a16:creationId xmlns:a16="http://schemas.microsoft.com/office/drawing/2014/main" id="{594C8BF7-DD84-9635-CA20-723176690331}"/>
+                  </a:ext>
+                </a:extLst>
+              </p:cNvPr>
+              <p:cNvSpPr txBox="1">
+                <a:spLocks noRot="1" noChangeAspect="1" noMove="1" noResize="1" noEditPoints="1" noAdjustHandles="1" noChangeArrowheads="1" noChangeShapeType="1" noTextEdit="1"/>
+              </p:cNvSpPr>
+              <p:nvPr/>
+            </p:nvSpPr>
+            <p:spPr>
+              <a:xfrm>
+                <a:off x="5178827" y="3749706"/>
+                <a:ext cx="657497" cy="369332"/>
+              </a:xfrm>
+              <a:prstGeom prst="rect">
+                <a:avLst/>
+              </a:prstGeom>
+              <a:blipFill>
+                <a:blip r:embed="rId8"/>
+                <a:stretch>
+                  <a:fillRect t="-6557" r="-6542" b="-3279"/>
+                </a:stretch>
+              </a:blipFill>
+            </p:spPr>
+            <p:txBody>
+              <a:bodyPr/>
+              <a:lstStyle/>
+              <a:p>
+                <a:r>
+                  <a:rPr lang="en-US">
+                    <a:noFill/>
+                  </a:rPr>
+                  <a:t> </a:t>
+                </a:r>
+              </a:p>
+            </p:txBody>
+          </p:sp>
+        </mc:Fallback>
+      </mc:AlternateContent>
+      <p:sp>
+        <p:nvSpPr>
+          <p:cNvPr id="38" name="Rectangle 37">
+            <a:extLst>
+              <a:ext uri="{FF2B5EF4-FFF2-40B4-BE49-F238E27FC236}">
+                <a16:creationId xmlns:a16="http://schemas.microsoft.com/office/drawing/2014/main" id="{207C35F4-0FD4-4EC3-1522-DC69BF8230A7}"/>
+              </a:ext>
+            </a:extLst>
+          </p:cNvPr>
+          <p:cNvSpPr/>
+          <p:nvPr/>
+        </p:nvSpPr>
+        <p:spPr>
+          <a:xfrm>
+            <a:off x="5940512" y="3605543"/>
+            <a:ext cx="286119" cy="695746"/>
+          </a:xfrm>
+          <a:prstGeom prst="rect">
+            <a:avLst/>
+          </a:prstGeom>
+          <a:solidFill>
+            <a:schemeClr val="accent1">
+              <a:lumMod val="40000"/>
+              <a:lumOff val="60000"/>
+            </a:schemeClr>
+          </a:solidFill>
+        </p:spPr>
+        <p:style>
+          <a:lnRef idx="1">
+            <a:schemeClr val="accent1"/>
+          </a:lnRef>
+          <a:fillRef idx="3">
+            <a:schemeClr val="accent1"/>
+          </a:fillRef>
+          <a:effectRef idx="2">
+            <a:schemeClr val="accent1"/>
+          </a:effectRef>
+          <a:fontRef idx="minor">
+            <a:schemeClr val="lt1"/>
+          </a:fontRef>
+        </p:style>
+        <p:txBody>
+          <a:bodyPr rtlCol="0" anchor="ctr"/>
+          <a:lstStyle/>
+          <a:p>
+            <a:pPr algn="ctr"/>
+            <a:endParaRPr lang="en-US"/>
+          </a:p>
+        </p:txBody>
+      </p:sp>
+      <mc:AlternateContent xmlns:mc="http://schemas.openxmlformats.org/markup-compatibility/2006">
+        <mc:Choice xmlns:a14="http://schemas.microsoft.com/office/drawing/2010/main" Requires="a14">
+          <p:sp>
+            <p:nvSpPr>
+              <p:cNvPr id="40" name="TextBox 39">
+                <a:extLst>
+                  <a:ext uri="{FF2B5EF4-FFF2-40B4-BE49-F238E27FC236}">
+                    <a16:creationId xmlns:a16="http://schemas.microsoft.com/office/drawing/2014/main" id="{F315F2FD-1E10-E80C-6B17-578CBBB0E4E9}"/>
+                  </a:ext>
+                </a:extLst>
+              </p:cNvPr>
+              <p:cNvSpPr txBox="1"/>
+              <p:nvPr/>
+            </p:nvSpPr>
+            <p:spPr>
+              <a:xfrm>
+                <a:off x="5939244" y="3768750"/>
+                <a:ext cx="144955" cy="369332"/>
+              </a:xfrm>
+              <a:prstGeom prst="rect">
+                <a:avLst/>
+              </a:prstGeom>
+              <a:noFill/>
+            </p:spPr>
+            <p:txBody>
+              <a:bodyPr wrap="square">
+                <a:spAutoFit/>
+              </a:bodyPr>
+              <a:lstStyle/>
+              <a:p>
+                <a:pPr/>
+                <a14:m>
+                  <m:oMathPara xmlns:m="http://schemas.openxmlformats.org/officeDocument/2006/math">
+                    <m:oMathParaPr>
+                      <m:jc m:val="centerGroup"/>
+                    </m:oMathParaPr>
+                    <m:oMath xmlns:m="http://schemas.openxmlformats.org/officeDocument/2006/math">
+                      <m:r>
+                        <a:rPr lang="en-US" sz="1800" b="1" i="1" dirty="0" smtClean="0">
+                          <a:latin typeface="Cambria Math" panose="02040503050406030204" pitchFamily="18" charset="0"/>
+                        </a:rPr>
+                        <m:t>𝜽</m:t>
+                      </m:r>
+                    </m:oMath>
+                  </m:oMathPara>
+                </a14:m>
+                <a:endParaRPr lang="en-US" dirty="0"/>
+              </a:p>
+            </p:txBody>
+          </p:sp>
+        </mc:Choice>
+        <mc:Fallback>
+          <p:sp>
+            <p:nvSpPr>
+              <p:cNvPr id="40" name="TextBox 39">
+                <a:extLst>
+                  <a:ext uri="{FF2B5EF4-FFF2-40B4-BE49-F238E27FC236}">
+                    <a16:creationId xmlns:a16="http://schemas.microsoft.com/office/drawing/2014/main" id="{F315F2FD-1E10-E80C-6B17-578CBBB0E4E9}"/>
+                  </a:ext>
+                </a:extLst>
+              </p:cNvPr>
+              <p:cNvSpPr txBox="1">
+                <a:spLocks noRot="1" noChangeAspect="1" noMove="1" noResize="1" noEditPoints="1" noAdjustHandles="1" noChangeArrowheads="1" noChangeShapeType="1" noTextEdit="1"/>
+              </p:cNvSpPr>
+              <p:nvPr/>
+            </p:nvSpPr>
+            <p:spPr>
+              <a:xfrm>
+                <a:off x="5939244" y="3768750"/>
+                <a:ext cx="144955" cy="369332"/>
+              </a:xfrm>
+              <a:prstGeom prst="rect">
+                <a:avLst/>
+              </a:prstGeom>
+              <a:blipFill>
+                <a:blip r:embed="rId9"/>
+                <a:stretch>
+                  <a:fillRect l="-4167" r="-108333"/>
+                </a:stretch>
+              </a:blipFill>
+            </p:spPr>
+            <p:txBody>
+              <a:bodyPr/>
+              <a:lstStyle/>
+              <a:p>
+                <a:r>
+                  <a:rPr lang="en-US">
+                    <a:noFill/>
+                  </a:rPr>
+                  <a:t> </a:t>
+                </a:r>
+              </a:p>
+            </p:txBody>
+          </p:sp>
+        </mc:Fallback>
+      </mc:AlternateContent>
+      <p:sp>
+        <p:nvSpPr>
+          <p:cNvPr id="41" name="Arrow: Down 40">
+            <a:extLst>
+              <a:ext uri="{FF2B5EF4-FFF2-40B4-BE49-F238E27FC236}">
+                <a16:creationId xmlns:a16="http://schemas.microsoft.com/office/drawing/2014/main" id="{ECA89CAE-B39B-3DA5-A11E-1BBF403A1DF5}"/>
+              </a:ext>
+            </a:extLst>
+          </p:cNvPr>
+          <p:cNvSpPr/>
+          <p:nvPr/>
+        </p:nvSpPr>
+        <p:spPr>
+          <a:xfrm rot="16200000">
+            <a:off x="6370560" y="3714073"/>
+            <a:ext cx="304783" cy="440596"/>
+          </a:xfrm>
+          <a:prstGeom prst="downArrow">
+            <a:avLst/>
+          </a:prstGeom>
+          <a:solidFill>
+            <a:schemeClr val="tx1"/>
+          </a:solidFill>
+          <a:ln>
+            <a:solidFill>
+              <a:schemeClr val="tx1"/>
+            </a:solidFill>
+          </a:ln>
+        </p:spPr>
+        <p:style>
+          <a:lnRef idx="1">
+            <a:schemeClr val="accent1"/>
+          </a:lnRef>
+          <a:fillRef idx="3">
+            <a:schemeClr val="accent1"/>
+          </a:fillRef>
+          <a:effectRef idx="2">
+            <a:schemeClr val="accent1"/>
+          </a:effectRef>
+          <a:fontRef idx="minor">
+            <a:schemeClr val="lt1"/>
+          </a:fontRef>
+        </p:style>
+        <p:txBody>
+          <a:bodyPr rtlCol="0" anchor="ctr"/>
+          <a:lstStyle/>
+          <a:p>
+            <a:pPr algn="ctr"/>
+            <a:endParaRPr lang="en-US"/>
+          </a:p>
+        </p:txBody>
+      </p:sp>
+      <p:sp>
+        <p:nvSpPr>
+          <p:cNvPr id="42" name="TextBox 41">
+            <a:extLst>
+              <a:ext uri="{FF2B5EF4-FFF2-40B4-BE49-F238E27FC236}">
+                <a16:creationId xmlns:a16="http://schemas.microsoft.com/office/drawing/2014/main" id="{923BDBD2-DC29-94A2-5F4A-D7872AA74BEE}"/>
+              </a:ext>
+            </a:extLst>
+          </p:cNvPr>
+          <p:cNvSpPr txBox="1"/>
+          <p:nvPr/>
+        </p:nvSpPr>
+        <p:spPr>
+          <a:xfrm>
+            <a:off x="6923316" y="3291401"/>
+            <a:ext cx="2027282" cy="861774"/>
+          </a:xfrm>
+          <a:prstGeom prst="rect">
+            <a:avLst/>
+          </a:prstGeom>
+          <a:noFill/>
+        </p:spPr>
+        <p:txBody>
+          <a:bodyPr wrap="square" rtlCol="0">
+            <a:spAutoFit/>
+          </a:bodyPr>
+          <a:lstStyle/>
+          <a:p>
+            <a:pPr algn="ctr"/>
+            <a:r>
+              <a:rPr lang="en-US" b="1" dirty="0"/>
+              <a:t>SNLE</a:t>
+            </a:r>
+          </a:p>
+          <a:p>
+            <a:pPr algn="ctr"/>
+            <a:r>
+              <a:rPr lang="en-US" sz="1600" dirty="0"/>
+              <a:t>Conditional Neural Density Estimator</a:t>
+            </a:r>
+          </a:p>
+        </p:txBody>
+      </p:sp>
+      <mc:AlternateContent xmlns:mc="http://schemas.openxmlformats.org/markup-compatibility/2006">
+        <mc:Choice xmlns:a14="http://schemas.microsoft.com/office/drawing/2010/main" Requires="a14">
+          <p:sp>
+            <p:nvSpPr>
+              <p:cNvPr id="43" name="TextBox 42">
+                <a:extLst>
+                  <a:ext uri="{FF2B5EF4-FFF2-40B4-BE49-F238E27FC236}">
+                    <a16:creationId xmlns:a16="http://schemas.microsoft.com/office/drawing/2014/main" id="{FD5F86E5-4F46-0538-A2EC-CBCBD91F9680}"/>
+                  </a:ext>
+                </a:extLst>
+              </p:cNvPr>
+              <p:cNvSpPr txBox="1"/>
+              <p:nvPr/>
+            </p:nvSpPr>
+            <p:spPr>
+              <a:xfrm>
+                <a:off x="7412487" y="4164404"/>
+                <a:ext cx="984372" cy="335285"/>
+              </a:xfrm>
+              <a:prstGeom prst="rect">
+                <a:avLst/>
+              </a:prstGeom>
+              <a:noFill/>
+            </p:spPr>
+            <p:txBody>
+              <a:bodyPr wrap="none" lIns="0" tIns="0" rIns="0" bIns="0" rtlCol="0">
+                <a:spAutoFit/>
+              </a:bodyPr>
+              <a:lstStyle/>
+              <a:p>
+                <a14:m>
+                  <m:oMathPara xmlns:m="http://schemas.openxmlformats.org/officeDocument/2006/math">
+                    <m:oMathParaPr>
+                      <m:jc m:val="centerGroup"/>
+                    </m:oMathParaPr>
+                    <m:oMath xmlns:m="http://schemas.openxmlformats.org/officeDocument/2006/math">
+                      <m:sSub>
+                        <m:sSubPr>
+                          <m:ctrlPr>
+                            <a:rPr lang="en-US" sz="2000" b="1" smtClean="0">
+                              <a:solidFill>
+                                <a:srgbClr val="836967"/>
+                              </a:solidFill>
+                              <a:latin typeface="Cambria Math" panose="02040503050406030204" pitchFamily="18" charset="0"/>
+                            </a:rPr>
+                          </m:ctrlPr>
+                        </m:sSubPr>
+                        <m:e>
+                          <m:r>
+                            <a:rPr lang="en-US" sz="2000" b="1" i="1">
+                              <a:latin typeface="Cambria Math" panose="02040503050406030204" pitchFamily="18" charset="0"/>
+                            </a:rPr>
+                            <m:t>𝒒</m:t>
+                          </m:r>
+                        </m:e>
+                        <m:sub>
+                          <m:r>
+                            <a:rPr lang="en-US" sz="2000" b="1" i="1">
+                              <a:latin typeface="Cambria Math" panose="02040503050406030204" pitchFamily="18" charset="0"/>
+                            </a:rPr>
+                            <m:t>𝝓</m:t>
+                          </m:r>
+                        </m:sub>
+                      </m:sSub>
+                      <m:d>
+                        <m:dPr>
+                          <m:ctrlPr>
+                            <a:rPr lang="en-US" sz="2000" b="1" i="1">
+                              <a:solidFill>
+                                <a:srgbClr val="836967"/>
+                              </a:solidFill>
+                              <a:latin typeface="Cambria Math" panose="02040503050406030204" pitchFamily="18" charset="0"/>
+                            </a:rPr>
+                          </m:ctrlPr>
+                        </m:dPr>
+                        <m:e>
+                          <m:d>
+                            <m:dPr>
+                              <m:begChr m:val=""/>
+                              <m:endChr m:val="|"/>
+                              <m:ctrlPr>
+                                <a:rPr lang="en-US" sz="2000" b="1" i="1">
+                                  <a:solidFill>
+                                    <a:srgbClr val="836967"/>
+                                  </a:solidFill>
+                                  <a:latin typeface="Cambria Math" panose="02040503050406030204" pitchFamily="18" charset="0"/>
+                                </a:rPr>
+                              </m:ctrlPr>
+                            </m:dPr>
+                            <m:e>
+                              <m:acc>
+                                <m:accPr>
+                                  <m:chr m:val="̂"/>
+                                  <m:ctrlPr>
+                                    <a:rPr lang="en-US" sz="2000" b="1" i="1">
+                                      <a:latin typeface="Cambria Math" panose="02040503050406030204" pitchFamily="18" charset="0"/>
+                                    </a:rPr>
+                                  </m:ctrlPr>
+                                </m:accPr>
+                                <m:e>
+                                  <m:r>
+                                    <a:rPr lang="en-US" sz="2000" b="1" i="1">
+                                      <a:latin typeface="Cambria Math" panose="02040503050406030204" pitchFamily="18" charset="0"/>
+                                    </a:rPr>
+                                    <m:t>𝝁</m:t>
+                                  </m:r>
+                                </m:e>
+                              </m:acc>
+                            </m:e>
+                          </m:d>
+                          <m:r>
+                            <a:rPr lang="en-US" sz="2000" b="1" i="1">
+                              <a:latin typeface="Cambria Math" panose="02040503050406030204" pitchFamily="18" charset="0"/>
+                            </a:rPr>
+                            <m:t>𝜽</m:t>
+                          </m:r>
+                        </m:e>
+                      </m:d>
+                    </m:oMath>
+                  </m:oMathPara>
+                </a14:m>
+                <a:endParaRPr lang="en-US" sz="2000" b="1" dirty="0"/>
+              </a:p>
+            </p:txBody>
+          </p:sp>
+        </mc:Choice>
+        <mc:Fallback>
+          <p:sp>
+            <p:nvSpPr>
+              <p:cNvPr id="43" name="TextBox 42">
+                <a:extLst>
+                  <a:ext uri="{FF2B5EF4-FFF2-40B4-BE49-F238E27FC236}">
+                    <a16:creationId xmlns:a16="http://schemas.microsoft.com/office/drawing/2014/main" id="{FD5F86E5-4F46-0538-A2EC-CBCBD91F9680}"/>
+                  </a:ext>
+                </a:extLst>
+              </p:cNvPr>
+              <p:cNvSpPr txBox="1">
+                <a:spLocks noRot="1" noChangeAspect="1" noMove="1" noResize="1" noEditPoints="1" noAdjustHandles="1" noChangeArrowheads="1" noChangeShapeType="1" noTextEdit="1"/>
+              </p:cNvSpPr>
+              <p:nvPr/>
+            </p:nvSpPr>
+            <p:spPr>
+              <a:xfrm>
+                <a:off x="7412487" y="4164404"/>
+                <a:ext cx="984372" cy="335285"/>
+              </a:xfrm>
+              <a:prstGeom prst="rect">
+                <a:avLst/>
+              </a:prstGeom>
+              <a:blipFill>
+                <a:blip r:embed="rId10"/>
+                <a:stretch>
+                  <a:fillRect l="-6832" t="-158182" r="-16770" b="-227273"/>
+                </a:stretch>
+              </a:blipFill>
+            </p:spPr>
+            <p:txBody>
+              <a:bodyPr/>
+              <a:lstStyle/>
+              <a:p>
+                <a:r>
+                  <a:rPr lang="en-US">
+                    <a:noFill/>
+                  </a:rPr>
+                  <a:t> </a:t>
+                </a:r>
+              </a:p>
+            </p:txBody>
+          </p:sp>
+        </mc:Fallback>
+      </mc:AlternateContent>
+      <p:sp>
+        <p:nvSpPr>
+          <p:cNvPr id="44" name="Rectangle 43">
+            <a:extLst>
+              <a:ext uri="{FF2B5EF4-FFF2-40B4-BE49-F238E27FC236}">
+                <a16:creationId xmlns:a16="http://schemas.microsoft.com/office/drawing/2014/main" id="{3AD15E57-934F-36E4-506F-E260698DE6DD}"/>
+              </a:ext>
+            </a:extLst>
+          </p:cNvPr>
+          <p:cNvSpPr/>
+          <p:nvPr/>
+        </p:nvSpPr>
+        <p:spPr>
+          <a:xfrm>
+            <a:off x="6882571" y="3220213"/>
+            <a:ext cx="2089701" cy="1467969"/>
+          </a:xfrm>
+          <a:prstGeom prst="rect">
+            <a:avLst/>
+          </a:prstGeom>
+          <a:noFill/>
+          <a:ln w="19050">
+            <a:solidFill>
+              <a:schemeClr val="tx1"/>
+            </a:solidFill>
+          </a:ln>
+        </p:spPr>
+        <p:style>
+          <a:lnRef idx="1">
+            <a:schemeClr val="accent1"/>
+          </a:lnRef>
+          <a:fillRef idx="3">
+            <a:schemeClr val="accent1"/>
+          </a:fillRef>
+          <a:effectRef idx="2">
+            <a:schemeClr val="accent1"/>
+          </a:effectRef>
+          <a:fontRef idx="minor">
+            <a:schemeClr val="lt1"/>
+          </a:fontRef>
+        </p:style>
+        <p:txBody>
+          <a:bodyPr rtlCol="0" anchor="ctr"/>
+          <a:lstStyle/>
+          <a:p>
+            <a:pPr algn="ctr"/>
+            <a:endParaRPr lang="en-US"/>
+          </a:p>
+        </p:txBody>
+      </p:sp>
+      <p:sp>
+        <p:nvSpPr>
+          <p:cNvPr id="45" name="Rectangle 44">
+            <a:extLst>
+              <a:ext uri="{FF2B5EF4-FFF2-40B4-BE49-F238E27FC236}">
+                <a16:creationId xmlns:a16="http://schemas.microsoft.com/office/drawing/2014/main" id="{3D2455E4-AAC4-D89F-1D22-12D594E2B14B}"/>
+              </a:ext>
+            </a:extLst>
+          </p:cNvPr>
+          <p:cNvSpPr/>
+          <p:nvPr/>
+        </p:nvSpPr>
+        <p:spPr>
+          <a:xfrm>
+            <a:off x="495608" y="5024821"/>
+            <a:ext cx="669055" cy="702565"/>
+          </a:xfrm>
+          <a:prstGeom prst="rect">
+            <a:avLst/>
+          </a:prstGeom>
+          <a:solidFill>
+            <a:schemeClr val="accent1">
+              <a:lumMod val="40000"/>
+              <a:lumOff val="60000"/>
+            </a:schemeClr>
+          </a:solidFill>
+        </p:spPr>
+        <p:style>
+          <a:lnRef idx="1">
+            <a:schemeClr val="accent1"/>
+          </a:lnRef>
+          <a:fillRef idx="3">
+            <a:schemeClr val="accent1"/>
+          </a:fillRef>
+          <a:effectRef idx="2">
+            <a:schemeClr val="accent1"/>
+          </a:effectRef>
+          <a:fontRef idx="minor">
+            <a:schemeClr val="lt1"/>
+          </a:fontRef>
+        </p:style>
+        <p:txBody>
+          <a:bodyPr rtlCol="0" anchor="ctr"/>
+          <a:lstStyle/>
+          <a:p>
+            <a:pPr algn="ctr"/>
+            <a:endParaRPr lang="en-US"/>
+          </a:p>
+        </p:txBody>
+      </p:sp>
+      <mc:AlternateContent xmlns:mc="http://schemas.openxmlformats.org/markup-compatibility/2006">
+        <mc:Choice xmlns:a14="http://schemas.microsoft.com/office/drawing/2010/main" Requires="a14">
+          <p:sp>
+            <p:nvSpPr>
+              <p:cNvPr id="46" name="TextBox 45">
+                <a:extLst>
+                  <a:ext uri="{FF2B5EF4-FFF2-40B4-BE49-F238E27FC236}">
+                    <a16:creationId xmlns:a16="http://schemas.microsoft.com/office/drawing/2014/main" id="{36E5528B-B481-A251-F032-0CA3B73BE3B6}"/>
+                  </a:ext>
+                </a:extLst>
+              </p:cNvPr>
+              <p:cNvSpPr txBox="1"/>
+              <p:nvPr/>
+            </p:nvSpPr>
+            <p:spPr>
+              <a:xfrm>
+                <a:off x="563778" y="5175605"/>
+                <a:ext cx="565504" cy="307777"/>
+              </a:xfrm>
+              <a:prstGeom prst="rect">
+                <a:avLst/>
+              </a:prstGeom>
+              <a:noFill/>
+            </p:spPr>
+            <p:txBody>
+              <a:bodyPr wrap="square" lIns="0" tIns="0" rIns="0" bIns="0" rtlCol="0">
+                <a:spAutoFit/>
+              </a:bodyPr>
+              <a:lstStyle/>
+              <a:p>
+                <a14:m>
+                  <m:oMathPara xmlns:m="http://schemas.openxmlformats.org/officeDocument/2006/math">
+                    <m:oMathParaPr>
+                      <m:jc m:val="centerGroup"/>
+                    </m:oMathParaPr>
+                    <m:oMath xmlns:m="http://schemas.openxmlformats.org/officeDocument/2006/math">
+                      <m:sSub>
+                        <m:sSubPr>
+                          <m:ctrlPr>
+                            <a:rPr lang="en-US" sz="2000" b="1" smtClean="0">
+                              <a:solidFill>
+                                <a:srgbClr val="836967"/>
+                              </a:solidFill>
+                              <a:latin typeface="Cambria Math" panose="02040503050406030204" pitchFamily="18" charset="0"/>
+                            </a:rPr>
+                          </m:ctrlPr>
+                        </m:sSubPr>
+                        <m:e>
+                          <m:r>
+                            <a:rPr lang="en-US" sz="2000" b="1" i="1">
+                              <a:latin typeface="Cambria Math" panose="02040503050406030204" pitchFamily="18" charset="0"/>
+                            </a:rPr>
+                            <m:t>𝒚</m:t>
+                          </m:r>
+                        </m:e>
+                        <m:sub>
+                          <m:r>
+                            <a:rPr lang="en-US" sz="2000" b="1" i="1" smtClean="0">
+                              <a:latin typeface="Cambria Math" panose="02040503050406030204" pitchFamily="18" charset="0"/>
+                            </a:rPr>
+                            <m:t>𝒐𝒃𝒔</m:t>
+                          </m:r>
+                        </m:sub>
+                      </m:sSub>
+                    </m:oMath>
+                  </m:oMathPara>
+                </a14:m>
+                <a:endParaRPr lang="en-US" sz="2000" b="1" dirty="0"/>
+              </a:p>
+            </p:txBody>
+          </p:sp>
+        </mc:Choice>
+        <mc:Fallback>
+          <p:sp>
+            <p:nvSpPr>
+              <p:cNvPr id="46" name="TextBox 45">
+                <a:extLst>
+                  <a:ext uri="{FF2B5EF4-FFF2-40B4-BE49-F238E27FC236}">
+                    <a16:creationId xmlns:a16="http://schemas.microsoft.com/office/drawing/2014/main" id="{36E5528B-B481-A251-F032-0CA3B73BE3B6}"/>
+                  </a:ext>
+                </a:extLst>
+              </p:cNvPr>
+              <p:cNvSpPr txBox="1">
+                <a:spLocks noRot="1" noChangeAspect="1" noMove="1" noResize="1" noEditPoints="1" noAdjustHandles="1" noChangeArrowheads="1" noChangeShapeType="1" noTextEdit="1"/>
+              </p:cNvSpPr>
+              <p:nvPr/>
+            </p:nvSpPr>
+            <p:spPr>
+              <a:xfrm>
+                <a:off x="563778" y="5175605"/>
+                <a:ext cx="565504" cy="307777"/>
+              </a:xfrm>
+              <a:prstGeom prst="rect">
+                <a:avLst/>
+              </a:prstGeom>
+              <a:blipFill>
+                <a:blip r:embed="rId11"/>
+                <a:stretch>
+                  <a:fillRect l="-8602" r="-4301" b="-25490"/>
+                </a:stretch>
+              </a:blipFill>
+            </p:spPr>
+            <p:txBody>
+              <a:bodyPr/>
+              <a:lstStyle/>
+              <a:p>
+                <a:r>
+                  <a:rPr lang="en-US">
+                    <a:noFill/>
+                  </a:rPr>
+                  <a:t> </a:t>
+                </a:r>
+              </a:p>
+            </p:txBody>
+          </p:sp>
+        </mc:Fallback>
+      </mc:AlternateContent>
+      <p:sp>
+        <p:nvSpPr>
+          <p:cNvPr id="47" name="Arrow: Down 46">
+            <a:extLst>
+              <a:ext uri="{FF2B5EF4-FFF2-40B4-BE49-F238E27FC236}">
+                <a16:creationId xmlns:a16="http://schemas.microsoft.com/office/drawing/2014/main" id="{F6D156D2-6804-0EEE-7E54-8E91E80AB8B2}"/>
+              </a:ext>
+            </a:extLst>
+          </p:cNvPr>
+          <p:cNvSpPr/>
+          <p:nvPr/>
+        </p:nvSpPr>
+        <p:spPr>
+          <a:xfrm rot="16200000">
+            <a:off x="1378951" y="5156802"/>
+            <a:ext cx="304783" cy="440596"/>
+          </a:xfrm>
+          <a:prstGeom prst="downArrow">
+            <a:avLst/>
+          </a:prstGeom>
+          <a:solidFill>
+            <a:schemeClr val="tx1"/>
+          </a:solidFill>
+          <a:ln>
+            <a:solidFill>
+              <a:schemeClr val="tx1"/>
+            </a:solidFill>
+          </a:ln>
+        </p:spPr>
+        <p:style>
+          <a:lnRef idx="1">
+            <a:schemeClr val="accent1"/>
+          </a:lnRef>
+          <a:fillRef idx="3">
+            <a:schemeClr val="accent1"/>
+          </a:fillRef>
+          <a:effectRef idx="2">
+            <a:schemeClr val="accent1"/>
+          </a:effectRef>
+          <a:fontRef idx="minor">
+            <a:schemeClr val="lt1"/>
+          </a:fontRef>
+        </p:style>
+        <p:txBody>
+          <a:bodyPr rtlCol="0" anchor="ctr"/>
+          <a:lstStyle/>
+          <a:p>
+            <a:pPr algn="ctr"/>
+            <a:endParaRPr lang="en-US"/>
+          </a:p>
+        </p:txBody>
+      </p:sp>
+      <p:sp>
+        <p:nvSpPr>
+          <p:cNvPr id="48" name="Rectangle 47">
+            <a:extLst>
+              <a:ext uri="{FF2B5EF4-FFF2-40B4-BE49-F238E27FC236}">
+                <a16:creationId xmlns:a16="http://schemas.microsoft.com/office/drawing/2014/main" id="{DB88C70C-6956-4B3C-05AC-35B45DB9C098}"/>
+              </a:ext>
+            </a:extLst>
+          </p:cNvPr>
+          <p:cNvSpPr/>
+          <p:nvPr/>
+        </p:nvSpPr>
+        <p:spPr>
+          <a:xfrm>
+            <a:off x="1851212" y="5193223"/>
+            <a:ext cx="1123158" cy="365760"/>
+          </a:xfrm>
+          <a:prstGeom prst="rect">
+            <a:avLst/>
+          </a:prstGeom>
+          <a:solidFill>
+            <a:schemeClr val="accent2">
+              <a:lumMod val="40000"/>
+              <a:lumOff val="60000"/>
+            </a:schemeClr>
+          </a:solidFill>
+          <a:ln>
+            <a:solidFill>
+              <a:schemeClr val="tx1"/>
+            </a:solidFill>
+          </a:ln>
+        </p:spPr>
+        <p:style>
+          <a:lnRef idx="1">
+            <a:schemeClr val="accent1"/>
+          </a:lnRef>
+          <a:fillRef idx="3">
+            <a:schemeClr val="accent1"/>
+          </a:fillRef>
+          <a:effectRef idx="2">
+            <a:schemeClr val="accent1"/>
+          </a:effectRef>
+          <a:fontRef idx="minor">
+            <a:schemeClr val="lt1"/>
+          </a:fontRef>
+        </p:style>
+        <p:txBody>
+          <a:bodyPr rtlCol="0" anchor="ctr"/>
+          <a:lstStyle/>
+          <a:p>
+            <a:pPr algn="ctr"/>
+            <a:r>
+              <a:rPr lang="en-US" dirty="0">
+                <a:solidFill>
+                  <a:schemeClr val="tx1"/>
+                </a:solidFill>
+              </a:rPr>
+              <a:t>CNN</a:t>
+            </a:r>
+          </a:p>
+        </p:txBody>
+      </p:sp>
+      <p:sp>
+        <p:nvSpPr>
+          <p:cNvPr id="49" name="Arrow: Down 48">
+            <a:extLst>
+              <a:ext uri="{FF2B5EF4-FFF2-40B4-BE49-F238E27FC236}">
+                <a16:creationId xmlns:a16="http://schemas.microsoft.com/office/drawing/2014/main" id="{6931A157-C7AD-499F-84DA-43A868B3B271}"/>
+              </a:ext>
+            </a:extLst>
+          </p:cNvPr>
+          <p:cNvSpPr/>
+          <p:nvPr/>
+        </p:nvSpPr>
+        <p:spPr>
+          <a:xfrm rot="16200000">
+            <a:off x="3164478" y="5153363"/>
+            <a:ext cx="304783" cy="440596"/>
+          </a:xfrm>
+          <a:prstGeom prst="downArrow">
+            <a:avLst/>
+          </a:prstGeom>
+          <a:solidFill>
+            <a:schemeClr val="tx1"/>
+          </a:solidFill>
+          <a:ln>
+            <a:solidFill>
+              <a:schemeClr val="tx1"/>
+            </a:solidFill>
+          </a:ln>
+        </p:spPr>
+        <p:style>
+          <a:lnRef idx="1">
+            <a:schemeClr val="accent1"/>
+          </a:lnRef>
+          <a:fillRef idx="3">
+            <a:schemeClr val="accent1"/>
+          </a:fillRef>
+          <a:effectRef idx="2">
+            <a:schemeClr val="accent1"/>
+          </a:effectRef>
+          <a:fontRef idx="minor">
+            <a:schemeClr val="lt1"/>
+          </a:fontRef>
+        </p:style>
+        <p:txBody>
+          <a:bodyPr rtlCol="0" anchor="ctr"/>
+          <a:lstStyle/>
+          <a:p>
+            <a:pPr algn="ctr"/>
+            <a:endParaRPr lang="en-US"/>
+          </a:p>
+        </p:txBody>
+      </p:sp>
+      <p:sp>
+        <p:nvSpPr>
+          <p:cNvPr id="51" name="TextBox 50">
+            <a:extLst>
+              <a:ext uri="{FF2B5EF4-FFF2-40B4-BE49-F238E27FC236}">
+                <a16:creationId xmlns:a16="http://schemas.microsoft.com/office/drawing/2014/main" id="{8F047D85-5833-F9B1-98AC-4E710319A1DB}"/>
+              </a:ext>
+            </a:extLst>
+          </p:cNvPr>
+          <p:cNvSpPr txBox="1"/>
+          <p:nvPr/>
+        </p:nvSpPr>
+        <p:spPr>
+          <a:xfrm>
+            <a:off x="4517697" y="4750852"/>
+            <a:ext cx="2027282" cy="738664"/>
+          </a:xfrm>
+          <a:prstGeom prst="rect">
+            <a:avLst/>
+          </a:prstGeom>
+          <a:noFill/>
+        </p:spPr>
+        <p:txBody>
+          <a:bodyPr wrap="square" rtlCol="0">
+            <a:spAutoFit/>
+          </a:bodyPr>
+          <a:lstStyle/>
+          <a:p>
+            <a:pPr algn="ctr"/>
+            <a:r>
+              <a:rPr lang="en-US" sz="2400" b="1" dirty="0"/>
+              <a:t>MCMC</a:t>
+            </a:r>
+          </a:p>
+          <a:p>
+            <a:pPr algn="ctr"/>
+            <a:endParaRPr lang="en-US" b="1" dirty="0"/>
+          </a:p>
+        </p:txBody>
+      </p:sp>
+      <mc:AlternateContent xmlns:mc="http://schemas.openxmlformats.org/markup-compatibility/2006">
+        <mc:Choice xmlns:a14="http://schemas.microsoft.com/office/drawing/2010/main" Requires="a14">
+          <p:sp>
+            <p:nvSpPr>
+              <p:cNvPr id="52" name="TextBox 51">
+                <a:extLst>
+                  <a:ext uri="{FF2B5EF4-FFF2-40B4-BE49-F238E27FC236}">
+                    <a16:creationId xmlns:a16="http://schemas.microsoft.com/office/drawing/2014/main" id="{B5893C81-0E38-4B50-4ED9-5C9B5617602B}"/>
+                  </a:ext>
+                </a:extLst>
+              </p:cNvPr>
+              <p:cNvSpPr txBox="1"/>
+              <p:nvPr/>
+            </p:nvSpPr>
+            <p:spPr>
+              <a:xfrm>
+                <a:off x="3771253" y="5242322"/>
+                <a:ext cx="3247171" cy="335285"/>
+              </a:xfrm>
+              <a:prstGeom prst="rect">
+                <a:avLst/>
+              </a:prstGeom>
+              <a:noFill/>
+            </p:spPr>
+            <p:txBody>
+              <a:bodyPr wrap="none" lIns="0" tIns="0" rIns="0" bIns="0" rtlCol="0">
+                <a:spAutoFit/>
+              </a:bodyPr>
+              <a:lstStyle/>
+              <a:p>
+                <a14:m>
+                  <m:oMathPara xmlns:m="http://schemas.openxmlformats.org/officeDocument/2006/math">
+                    <m:oMathParaPr>
+                      <m:jc m:val="centerGroup"/>
+                    </m:oMathParaPr>
+                    <m:oMath xmlns:m="http://schemas.openxmlformats.org/officeDocument/2006/math">
+                      <m:acc>
+                        <m:accPr>
+                          <m:chr m:val="̂"/>
+                          <m:ctrlPr>
+                            <a:rPr lang="en-US" sz="2000" b="1" i="1" smtClean="0">
+                              <a:latin typeface="Cambria Math" panose="02040503050406030204" pitchFamily="18" charset="0"/>
+                            </a:rPr>
+                          </m:ctrlPr>
+                        </m:accPr>
+                        <m:e>
+                          <m:r>
+                            <a:rPr lang="en-US" sz="2000" b="1" i="1" smtClean="0">
+                              <a:latin typeface="Cambria Math" panose="02040503050406030204" pitchFamily="18" charset="0"/>
+                            </a:rPr>
+                            <m:t>𝒑</m:t>
+                          </m:r>
+                        </m:e>
+                      </m:acc>
+                      <m:d>
+                        <m:dPr>
+                          <m:ctrlPr>
+                            <a:rPr lang="en-US" sz="2000" b="1" i="1" smtClean="0">
+                              <a:latin typeface="Cambria Math" panose="02040503050406030204" pitchFamily="18" charset="0"/>
+                            </a:rPr>
+                          </m:ctrlPr>
+                        </m:dPr>
+                        <m:e>
+                          <m:r>
+                            <a:rPr lang="en-US" sz="2000" b="1" i="1" smtClean="0">
+                              <a:latin typeface="Cambria Math" panose="02040503050406030204" pitchFamily="18" charset="0"/>
+                            </a:rPr>
+                            <m:t>𝜽</m:t>
+                          </m:r>
+                        </m:e>
+                        <m:e>
+                          <m:sSub>
+                            <m:sSubPr>
+                              <m:ctrlPr>
+                                <a:rPr lang="en-US" sz="2000" b="1" i="1" smtClean="0">
+                                  <a:latin typeface="Cambria Math" panose="02040503050406030204" pitchFamily="18" charset="0"/>
+                                </a:rPr>
+                              </m:ctrlPr>
+                            </m:sSubPr>
+                            <m:e>
+                              <m:acc>
+                                <m:accPr>
+                                  <m:chr m:val="̂"/>
+                                  <m:ctrlPr>
+                                    <a:rPr lang="en-US" sz="2000" b="1" i="1">
+                                      <a:latin typeface="Cambria Math" panose="02040503050406030204" pitchFamily="18" charset="0"/>
+                                    </a:rPr>
+                                  </m:ctrlPr>
+                                </m:accPr>
+                                <m:e>
+                                  <m:r>
+                                    <a:rPr lang="en-US" sz="2000" b="1" i="1">
+                                      <a:latin typeface="Cambria Math" panose="02040503050406030204" pitchFamily="18" charset="0"/>
+                                    </a:rPr>
+                                    <m:t>𝝁</m:t>
+                                  </m:r>
+                                </m:e>
+                              </m:acc>
+                            </m:e>
+                            <m:sub>
+                              <m:r>
+                                <a:rPr lang="en-US" sz="2000" b="1" i="1" smtClean="0">
+                                  <a:latin typeface="Cambria Math" panose="02040503050406030204" pitchFamily="18" charset="0"/>
+                                </a:rPr>
+                                <m:t>𝒐𝒃𝒔</m:t>
+                              </m:r>
+                            </m:sub>
+                          </m:sSub>
+                        </m:e>
+                      </m:d>
+                      <m:r>
+                        <a:rPr lang="en-US" sz="2000" b="1" i="1">
+                          <a:latin typeface="Cambria Math" panose="02040503050406030204" pitchFamily="18" charset="0"/>
+                          <a:ea typeface="Cambria Math" panose="02040503050406030204" pitchFamily="18" charset="0"/>
+                        </a:rPr>
+                        <m:t>∝</m:t>
+                      </m:r>
+                      <m:sSub>
+                        <m:sSubPr>
+                          <m:ctrlPr>
+                            <a:rPr lang="en-US" sz="2000" b="1" i="1" smtClean="0">
+                              <a:latin typeface="Cambria Math" panose="02040503050406030204" pitchFamily="18" charset="0"/>
+                              <a:ea typeface="Cambria Math" panose="02040503050406030204" pitchFamily="18" charset="0"/>
+                            </a:rPr>
+                          </m:ctrlPr>
+                        </m:sSubPr>
+                        <m:e>
+                          <m:r>
+                            <a:rPr lang="en-US" sz="2000" b="1" i="1" smtClean="0">
+                              <a:latin typeface="Cambria Math" panose="02040503050406030204" pitchFamily="18" charset="0"/>
+                              <a:ea typeface="Cambria Math" panose="02040503050406030204" pitchFamily="18" charset="0"/>
+                            </a:rPr>
+                            <m:t>𝒒</m:t>
+                          </m:r>
+                        </m:e>
+                        <m:sub>
+                          <m:r>
+                            <a:rPr lang="en-US" sz="2000" b="1" i="1" smtClean="0">
+                              <a:latin typeface="Cambria Math" panose="02040503050406030204" pitchFamily="18" charset="0"/>
+                              <a:ea typeface="Cambria Math" panose="02040503050406030204" pitchFamily="18" charset="0"/>
+                            </a:rPr>
+                            <m:t>𝝓</m:t>
+                          </m:r>
+                        </m:sub>
+                      </m:sSub>
+                      <m:d>
+                        <m:dPr>
+                          <m:ctrlPr>
+                            <a:rPr lang="en-US" sz="2000" b="1" i="1" smtClean="0">
+                              <a:latin typeface="Cambria Math" panose="02040503050406030204" pitchFamily="18" charset="0"/>
+                              <a:ea typeface="Cambria Math" panose="02040503050406030204" pitchFamily="18" charset="0"/>
+                            </a:rPr>
+                          </m:ctrlPr>
+                        </m:dPr>
+                        <m:e>
+                          <m:sSub>
+                            <m:sSubPr>
+                              <m:ctrlPr>
+                                <a:rPr lang="en-US" sz="2000" b="1" i="1" smtClean="0">
+                                  <a:latin typeface="Cambria Math" panose="02040503050406030204" pitchFamily="18" charset="0"/>
+                                  <a:ea typeface="Cambria Math" panose="02040503050406030204" pitchFamily="18" charset="0"/>
+                                </a:rPr>
+                              </m:ctrlPr>
+                            </m:sSubPr>
+                            <m:e>
+                              <m:acc>
+                                <m:accPr>
+                                  <m:chr m:val="̂"/>
+                                  <m:ctrlPr>
+                                    <a:rPr lang="en-US" sz="2000" b="1" i="1">
+                                      <a:latin typeface="Cambria Math" panose="02040503050406030204" pitchFamily="18" charset="0"/>
+                                    </a:rPr>
+                                  </m:ctrlPr>
+                                </m:accPr>
+                                <m:e>
+                                  <m:r>
+                                    <a:rPr lang="en-US" sz="2000" b="1" i="1">
+                                      <a:latin typeface="Cambria Math" panose="02040503050406030204" pitchFamily="18" charset="0"/>
+                                    </a:rPr>
+                                    <m:t>𝝁</m:t>
+                                  </m:r>
+                                </m:e>
+                              </m:acc>
+                            </m:e>
+                            <m:sub>
+                              <m:r>
+                                <a:rPr lang="en-US" sz="2000" b="1" i="1" smtClean="0">
+                                  <a:latin typeface="Cambria Math" panose="02040503050406030204" pitchFamily="18" charset="0"/>
+                                  <a:ea typeface="Cambria Math" panose="02040503050406030204" pitchFamily="18" charset="0"/>
+                                </a:rPr>
+                                <m:t>𝒐𝒃𝒔</m:t>
+                              </m:r>
+                            </m:sub>
+                          </m:sSub>
+                        </m:e>
+                        <m:e>
+                          <m:r>
+                            <a:rPr lang="en-US" sz="2000" b="1" i="1" smtClean="0">
+                              <a:latin typeface="Cambria Math" panose="02040503050406030204" pitchFamily="18" charset="0"/>
+                              <a:ea typeface="Cambria Math" panose="02040503050406030204" pitchFamily="18" charset="0"/>
+                            </a:rPr>
+                            <m:t>𝜽</m:t>
+                          </m:r>
+                        </m:e>
+                      </m:d>
+                      <m:r>
+                        <a:rPr lang="en-US" sz="2000" b="1" i="1" smtClean="0">
+                          <a:latin typeface="Cambria Math" panose="02040503050406030204" pitchFamily="18" charset="0"/>
+                          <a:ea typeface="Cambria Math" panose="02040503050406030204" pitchFamily="18" charset="0"/>
+                        </a:rPr>
+                        <m:t>𝒑</m:t>
+                      </m:r>
+                      <m:r>
+                        <a:rPr lang="en-US" sz="2000" b="1" i="1" smtClean="0">
+                          <a:latin typeface="Cambria Math" panose="02040503050406030204" pitchFamily="18" charset="0"/>
+                          <a:ea typeface="Cambria Math" panose="02040503050406030204" pitchFamily="18" charset="0"/>
+                        </a:rPr>
+                        <m:t>(</m:t>
+                      </m:r>
+                      <m:r>
+                        <a:rPr lang="en-US" sz="2000" b="1" i="1" smtClean="0">
+                          <a:latin typeface="Cambria Math" panose="02040503050406030204" pitchFamily="18" charset="0"/>
+                          <a:ea typeface="Cambria Math" panose="02040503050406030204" pitchFamily="18" charset="0"/>
+                        </a:rPr>
+                        <m:t>𝜽</m:t>
+                      </m:r>
+                      <m:r>
+                        <a:rPr lang="en-US" sz="2000" b="1" i="1" smtClean="0">
+                          <a:latin typeface="Cambria Math" panose="02040503050406030204" pitchFamily="18" charset="0"/>
+                          <a:ea typeface="Cambria Math" panose="02040503050406030204" pitchFamily="18" charset="0"/>
+                        </a:rPr>
+                        <m:t>)</m:t>
+                      </m:r>
+                    </m:oMath>
+                  </m:oMathPara>
+                </a14:m>
+                <a:endParaRPr lang="en-US" sz="2000" b="1" dirty="0"/>
+              </a:p>
+            </p:txBody>
+          </p:sp>
+        </mc:Choice>
+        <mc:Fallback>
+          <p:sp>
+            <p:nvSpPr>
+              <p:cNvPr id="52" name="TextBox 51">
+                <a:extLst>
+                  <a:ext uri="{FF2B5EF4-FFF2-40B4-BE49-F238E27FC236}">
+                    <a16:creationId xmlns:a16="http://schemas.microsoft.com/office/drawing/2014/main" id="{B5893C81-0E38-4B50-4ED9-5C9B5617602B}"/>
+                  </a:ext>
+                </a:extLst>
+              </p:cNvPr>
+              <p:cNvSpPr txBox="1">
+                <a:spLocks noRot="1" noChangeAspect="1" noMove="1" noResize="1" noEditPoints="1" noAdjustHandles="1" noChangeArrowheads="1" noChangeShapeType="1" noTextEdit="1"/>
+              </p:cNvSpPr>
+              <p:nvPr/>
+            </p:nvSpPr>
+            <p:spPr>
+              <a:xfrm>
+                <a:off x="3771253" y="5242322"/>
+                <a:ext cx="3247171" cy="335285"/>
+              </a:xfrm>
+              <a:prstGeom prst="rect">
+                <a:avLst/>
+              </a:prstGeom>
+              <a:blipFill>
+                <a:blip r:embed="rId12"/>
+                <a:stretch>
+                  <a:fillRect l="-1880" t="-21818" r="-2820" b="-29091"/>
+                </a:stretch>
+              </a:blipFill>
+            </p:spPr>
+            <p:txBody>
+              <a:bodyPr/>
+              <a:lstStyle/>
+              <a:p>
+                <a:r>
+                  <a:rPr lang="en-US">
+                    <a:noFill/>
+                  </a:rPr>
+                  <a:t> </a:t>
+                </a:r>
+              </a:p>
+            </p:txBody>
+          </p:sp>
+        </mc:Fallback>
+      </mc:AlternateContent>
+      <p:sp>
+        <p:nvSpPr>
+          <p:cNvPr id="53" name="Rectangle 52">
+            <a:extLst>
+              <a:ext uri="{FF2B5EF4-FFF2-40B4-BE49-F238E27FC236}">
+                <a16:creationId xmlns:a16="http://schemas.microsoft.com/office/drawing/2014/main" id="{DA6B9AE8-2116-28CF-8624-EFCD10BE7CD8}"/>
+              </a:ext>
+            </a:extLst>
+          </p:cNvPr>
+          <p:cNvSpPr/>
+          <p:nvPr/>
+        </p:nvSpPr>
+        <p:spPr>
+          <a:xfrm>
+            <a:off x="3752961" y="4768444"/>
+            <a:ext cx="3572612" cy="1054896"/>
+          </a:xfrm>
+          <a:prstGeom prst="rect">
+            <a:avLst/>
+          </a:prstGeom>
+          <a:noFill/>
+          <a:ln w="19050">
+            <a:solidFill>
+              <a:schemeClr val="tx1"/>
+            </a:solidFill>
+          </a:ln>
+        </p:spPr>
+        <p:style>
+          <a:lnRef idx="1">
+            <a:schemeClr val="accent1"/>
+          </a:lnRef>
+          <a:fillRef idx="3">
+            <a:schemeClr val="accent1"/>
+          </a:fillRef>
+          <a:effectRef idx="2">
+            <a:schemeClr val="accent1"/>
+          </a:effectRef>
+          <a:fontRef idx="minor">
+            <a:schemeClr val="lt1"/>
+          </a:fontRef>
+        </p:style>
+        <p:txBody>
+          <a:bodyPr rtlCol="0" anchor="ctr"/>
+          <a:lstStyle/>
+          <a:p>
+            <a:pPr algn="ctr"/>
+            <a:endParaRPr lang="en-US"/>
+          </a:p>
+        </p:txBody>
+      </p:sp>
+      <p:sp>
+        <p:nvSpPr>
+          <p:cNvPr id="55" name="Arrow: Bent 54">
+            <a:extLst>
+              <a:ext uri="{FF2B5EF4-FFF2-40B4-BE49-F238E27FC236}">
+                <a16:creationId xmlns:a16="http://schemas.microsoft.com/office/drawing/2014/main" id="{9BA68D70-23F1-FB21-98AA-FC8372BD6467}"/>
+              </a:ext>
+            </a:extLst>
+          </p:cNvPr>
+          <p:cNvSpPr/>
+          <p:nvPr/>
+        </p:nvSpPr>
+        <p:spPr>
+          <a:xfrm rot="10800000">
+            <a:off x="7687807" y="4867953"/>
+            <a:ext cx="543587" cy="615304"/>
+          </a:xfrm>
+          <a:prstGeom prst="bentArrow">
+            <a:avLst/>
+          </a:prstGeom>
+          <a:solidFill>
+            <a:schemeClr val="tx1"/>
+          </a:solidFill>
+          <a:ln>
+            <a:solidFill>
+              <a:schemeClr val="tx1"/>
+            </a:solidFill>
+          </a:ln>
+        </p:spPr>
+        <p:style>
+          <a:lnRef idx="1">
+            <a:schemeClr val="accent1"/>
+          </a:lnRef>
+          <a:fillRef idx="3">
+            <a:schemeClr val="accent1"/>
+          </a:fillRef>
+          <a:effectRef idx="2">
+            <a:schemeClr val="accent1"/>
+          </a:effectRef>
+          <a:fontRef idx="minor">
+            <a:schemeClr val="lt1"/>
+          </a:fontRef>
+        </p:style>
+        <p:txBody>
+          <a:bodyPr rtlCol="0" anchor="ctr"/>
+          <a:lstStyle/>
+          <a:p>
+            <a:pPr algn="ctr"/>
+            <a:endParaRPr lang="en-US">
+              <a:solidFill>
+                <a:schemeClr val="tx1"/>
+              </a:solidFill>
+            </a:endParaRPr>
+          </a:p>
+        </p:txBody>
+      </p:sp>
+      <p:sp>
+        <p:nvSpPr>
+          <p:cNvPr id="56" name="Arrow: Bent-Up 55">
+            <a:extLst>
+              <a:ext uri="{FF2B5EF4-FFF2-40B4-BE49-F238E27FC236}">
+                <a16:creationId xmlns:a16="http://schemas.microsoft.com/office/drawing/2014/main" id="{26E22763-1412-3998-84D0-D4D1632ABAC9}"/>
+              </a:ext>
+            </a:extLst>
+          </p:cNvPr>
+          <p:cNvSpPr/>
+          <p:nvPr/>
+        </p:nvSpPr>
+        <p:spPr>
+          <a:xfrm rot="5400000">
+            <a:off x="462443" y="3874523"/>
+            <a:ext cx="358927" cy="418947"/>
+          </a:xfrm>
+          <a:prstGeom prst="bentUpArrow">
+            <a:avLst>
+              <a:gd name="adj1" fmla="val 32893"/>
+              <a:gd name="adj2" fmla="val 25000"/>
+              <a:gd name="adj3" fmla="val 25000"/>
+            </a:avLst>
+          </a:prstGeom>
+          <a:solidFill>
+            <a:schemeClr val="tx1"/>
+          </a:solidFill>
+          <a:ln>
+            <a:solidFill>
+              <a:schemeClr val="tx1"/>
+            </a:solidFill>
+          </a:ln>
+        </p:spPr>
+        <p:style>
+          <a:lnRef idx="1">
+            <a:schemeClr val="accent1"/>
+          </a:lnRef>
+          <a:fillRef idx="3">
+            <a:schemeClr val="accent1"/>
+          </a:fillRef>
+          <a:effectRef idx="2">
+            <a:schemeClr val="accent1"/>
+          </a:effectRef>
+          <a:fontRef idx="minor">
+            <a:schemeClr val="lt1"/>
+          </a:fontRef>
+        </p:style>
+        <p:txBody>
+          <a:bodyPr rtlCol="0" anchor="ctr"/>
+          <a:lstStyle/>
+          <a:p>
+            <a:pPr algn="ctr"/>
+            <a:endParaRPr lang="en-US"/>
+          </a:p>
+        </p:txBody>
+      </p:sp>
+      <p:sp>
+        <p:nvSpPr>
+          <p:cNvPr id="57" name="Rectangle 56">
+            <a:extLst>
+              <a:ext uri="{FF2B5EF4-FFF2-40B4-BE49-F238E27FC236}">
+                <a16:creationId xmlns:a16="http://schemas.microsoft.com/office/drawing/2014/main" id="{5B08499B-36A3-71DF-B2FF-A8E9F292FC7D}"/>
+              </a:ext>
+            </a:extLst>
+          </p:cNvPr>
+          <p:cNvSpPr/>
+          <p:nvPr/>
+        </p:nvSpPr>
+        <p:spPr>
+          <a:xfrm>
+            <a:off x="0" y="2800373"/>
+            <a:ext cx="9143999" cy="3180960"/>
+          </a:xfrm>
+          <a:prstGeom prst="rect">
+            <a:avLst/>
+          </a:prstGeom>
+          <a:noFill/>
+          <a:ln/>
+        </p:spPr>
+        <p:style>
+          <a:lnRef idx="2">
+            <a:schemeClr val="dk1"/>
+          </a:lnRef>
+          <a:fillRef idx="1">
+            <a:schemeClr val="lt1"/>
+          </a:fillRef>
+          <a:effectRef idx="0">
+            <a:schemeClr val="dk1"/>
+          </a:effectRef>
+          <a:fontRef idx="minor">
+            <a:schemeClr val="dk1"/>
+          </a:fontRef>
+        </p:style>
+        <p:txBody>
+          <a:bodyPr rtlCol="0" anchor="ctr"/>
+          <a:lstStyle/>
+          <a:p>
+            <a:pPr algn="ctr"/>
+            <a:endParaRPr lang="en-US"/>
+          </a:p>
+        </p:txBody>
+      </p:sp>
+      <p:sp>
+        <p:nvSpPr>
+          <p:cNvPr id="58" name="TextBox 57">
+            <a:extLst>
+              <a:ext uri="{FF2B5EF4-FFF2-40B4-BE49-F238E27FC236}">
+                <a16:creationId xmlns:a16="http://schemas.microsoft.com/office/drawing/2014/main" id="{05DB4F53-7607-B0D1-F281-861602B11A4F}"/>
+              </a:ext>
+            </a:extLst>
+          </p:cNvPr>
+          <p:cNvSpPr txBox="1"/>
+          <p:nvPr/>
+        </p:nvSpPr>
+        <p:spPr>
+          <a:xfrm>
+            <a:off x="165459" y="2844496"/>
+            <a:ext cx="3392596" cy="369332"/>
+          </a:xfrm>
+          <a:prstGeom prst="rect">
+            <a:avLst/>
+          </a:prstGeom>
+          <a:noFill/>
+        </p:spPr>
+        <p:txBody>
+          <a:bodyPr wrap="square" rtlCol="0">
+            <a:spAutoFit/>
+          </a:bodyPr>
+          <a:lstStyle/>
+          <a:p>
+            <a:r>
+              <a:rPr lang="en-US" b="1" dirty="0"/>
+              <a:t>SNLE (SNRE/SNPE)</a:t>
+            </a:r>
+          </a:p>
+        </p:txBody>
+      </p:sp>
+      <p:sp>
+        <p:nvSpPr>
+          <p:cNvPr id="59" name="Arrow: Bent-Up 58">
+            <a:extLst>
+              <a:ext uri="{FF2B5EF4-FFF2-40B4-BE49-F238E27FC236}">
+                <a16:creationId xmlns:a16="http://schemas.microsoft.com/office/drawing/2014/main" id="{F46D930D-BD14-7460-00F7-E0D76352D2EE}"/>
+              </a:ext>
+            </a:extLst>
+          </p:cNvPr>
+          <p:cNvSpPr/>
+          <p:nvPr/>
+        </p:nvSpPr>
+        <p:spPr>
+          <a:xfrm rot="5400000">
+            <a:off x="5342748" y="5904731"/>
+            <a:ext cx="458641" cy="818504"/>
+          </a:xfrm>
+          <a:prstGeom prst="bentUpArrow">
+            <a:avLst>
+              <a:gd name="adj1" fmla="val 32893"/>
+              <a:gd name="adj2" fmla="val 25000"/>
+              <a:gd name="adj3" fmla="val 25000"/>
+            </a:avLst>
+          </a:prstGeom>
+          <a:solidFill>
+            <a:schemeClr val="tx1"/>
+          </a:solidFill>
+          <a:ln>
+            <a:solidFill>
+              <a:schemeClr val="tx1"/>
+            </a:solidFill>
+          </a:ln>
+        </p:spPr>
+        <p:style>
+          <a:lnRef idx="1">
+            <a:schemeClr val="accent1"/>
+          </a:lnRef>
+          <a:fillRef idx="3">
+            <a:schemeClr val="accent1"/>
+          </a:fillRef>
+          <a:effectRef idx="2">
+            <a:schemeClr val="accent1"/>
+          </a:effectRef>
+          <a:fontRef idx="minor">
+            <a:schemeClr val="lt1"/>
+          </a:fontRef>
+        </p:style>
+        <p:txBody>
+          <a:bodyPr rtlCol="0" anchor="ctr"/>
+          <a:lstStyle/>
+          <a:p>
+            <a:pPr algn="ctr"/>
+            <a:endParaRPr lang="en-US"/>
+          </a:p>
+        </p:txBody>
+      </p:sp>
+      <p:pic>
+        <p:nvPicPr>
+          <p:cNvPr id="4098" name="Picture 2" descr="data visualization - Python: &quot;Normalizing&quot; kde, so it always lines up with  histogram - Cross Validated">
+            <a:extLst>
+              <a:ext uri="{FF2B5EF4-FFF2-40B4-BE49-F238E27FC236}">
+                <a16:creationId xmlns:a16="http://schemas.microsoft.com/office/drawing/2014/main" id="{80257948-AF34-D357-43FA-8F663CC25D26}"/>
+              </a:ext>
+            </a:extLst>
+          </p:cNvPr>
+          <p:cNvPicPr>
+            <a:picLocks noChangeAspect="1" noChangeArrowheads="1"/>
+          </p:cNvPicPr>
+          <p:nvPr/>
+        </p:nvPicPr>
+        <p:blipFill>
+          <a:blip r:embed="rId13">
+            <a:extLst>
+              <a:ext uri="{28A0092B-C50C-407E-A947-70E740481C1C}">
+                <a14:useLocalDpi xmlns:a14="http://schemas.microsoft.com/office/drawing/2010/main" val="0"/>
+              </a:ext>
+            </a:extLst>
+          </a:blip>
+          <a:srcRect/>
+          <a:stretch>
+            <a:fillRect/>
+          </a:stretch>
+        </p:blipFill>
+        <p:spPr bwMode="auto">
+          <a:xfrm>
+            <a:off x="6151434" y="5981479"/>
+            <a:ext cx="1261053" cy="839388"/>
+          </a:xfrm>
+          <a:prstGeom prst="rect">
+            <a:avLst/>
+          </a:prstGeom>
+          <a:noFill/>
+          <a:extLst>
+            <a:ext uri="{909E8E84-426E-40DD-AFC4-6F175D3DCCD1}">
+              <a14:hiddenFill xmlns:a14="http://schemas.microsoft.com/office/drawing/2010/main">
+                <a:solidFill>
+                  <a:srgbClr val="FFFFFF"/>
+                </a:solidFill>
+              </a14:hiddenFill>
+            </a:ext>
+          </a:extLst>
+        </p:spPr>
+      </p:pic>
+      <mc:AlternateContent xmlns:mc="http://schemas.openxmlformats.org/markup-compatibility/2006">
+        <mc:Choice xmlns:a14="http://schemas.microsoft.com/office/drawing/2010/main" Requires="a14">
+          <p:sp>
+            <p:nvSpPr>
+              <p:cNvPr id="61" name="TextBox 60">
+                <a:extLst>
+                  <a:ext uri="{FF2B5EF4-FFF2-40B4-BE49-F238E27FC236}">
+                    <a16:creationId xmlns:a16="http://schemas.microsoft.com/office/drawing/2014/main" id="{23267B17-5A17-1C25-CB12-668F4ADCC1BB}"/>
+                  </a:ext>
+                </a:extLst>
+              </p:cNvPr>
+              <p:cNvSpPr txBox="1"/>
+              <p:nvPr/>
+            </p:nvSpPr>
+            <p:spPr>
+              <a:xfrm>
+                <a:off x="6882571" y="1791675"/>
+                <a:ext cx="657497" cy="369332"/>
+              </a:xfrm>
+              <a:prstGeom prst="rect">
+                <a:avLst/>
+              </a:prstGeom>
+              <a:noFill/>
+            </p:spPr>
+            <p:txBody>
+              <a:bodyPr wrap="square">
+                <a:spAutoFit/>
+              </a:bodyPr>
+              <a:lstStyle/>
+              <a:p>
+                <a:pPr/>
+                <a14:m>
+                  <m:oMathPara xmlns:m="http://schemas.openxmlformats.org/officeDocument/2006/math">
+                    <m:oMathParaPr>
+                      <m:jc m:val="centerGroup"/>
+                    </m:oMathParaPr>
+                    <m:oMath xmlns:m="http://schemas.openxmlformats.org/officeDocument/2006/math">
+                      <m:sSub>
+                        <m:sSubPr>
+                          <m:ctrlPr>
+                            <a:rPr lang="en-US" sz="1800" b="0" i="1" smtClean="0">
+                              <a:latin typeface="Cambria Math" panose="02040503050406030204" pitchFamily="18" charset="0"/>
+                            </a:rPr>
+                          </m:ctrlPr>
+                        </m:sSubPr>
+                        <m:e>
+                          <m:acc>
+                            <m:accPr>
+                              <m:chr m:val="̂"/>
+                              <m:ctrlPr>
+                                <a:rPr lang="en-US" i="1">
+                                  <a:latin typeface="Cambria Math" panose="02040503050406030204" pitchFamily="18" charset="0"/>
+                                </a:rPr>
+                              </m:ctrlPr>
+                            </m:accPr>
+                            <m:e>
+                              <m:r>
+                                <a:rPr lang="en-US" b="1" i="1">
+                                  <a:latin typeface="Cambria Math" panose="02040503050406030204" pitchFamily="18" charset="0"/>
+                                </a:rPr>
+                                <m:t>𝝁</m:t>
+                              </m:r>
+                            </m:e>
+                          </m:acc>
+                        </m:e>
+                        <m:sub>
+                          <m:r>
+                            <a:rPr lang="en-US" sz="1800" b="1" i="1" smtClean="0">
+                              <a:latin typeface="Cambria Math" panose="02040503050406030204" pitchFamily="18" charset="0"/>
+                            </a:rPr>
+                            <m:t>𝒔𝒊𝒎</m:t>
+                          </m:r>
+                        </m:sub>
+                      </m:sSub>
+                    </m:oMath>
+                  </m:oMathPara>
+                </a14:m>
+                <a:endParaRPr lang="en-US" dirty="0"/>
+              </a:p>
+            </p:txBody>
+          </p:sp>
+        </mc:Choice>
+        <mc:Fallback>
+          <p:sp>
+            <p:nvSpPr>
+              <p:cNvPr id="61" name="TextBox 60">
+                <a:extLst>
+                  <a:ext uri="{FF2B5EF4-FFF2-40B4-BE49-F238E27FC236}">
+                    <a16:creationId xmlns:a16="http://schemas.microsoft.com/office/drawing/2014/main" id="{23267B17-5A17-1C25-CB12-668F4ADCC1BB}"/>
+                  </a:ext>
+                </a:extLst>
+              </p:cNvPr>
+              <p:cNvSpPr txBox="1">
+                <a:spLocks noRot="1" noChangeAspect="1" noMove="1" noResize="1" noEditPoints="1" noAdjustHandles="1" noChangeArrowheads="1" noChangeShapeType="1" noTextEdit="1"/>
+              </p:cNvSpPr>
+              <p:nvPr/>
+            </p:nvSpPr>
+            <p:spPr>
+              <a:xfrm>
+                <a:off x="6882571" y="1791675"/>
+                <a:ext cx="657497" cy="369332"/>
+              </a:xfrm>
+              <a:prstGeom prst="rect">
+                <a:avLst/>
+              </a:prstGeom>
+              <a:blipFill>
+                <a:blip r:embed="rId14"/>
+                <a:stretch>
+                  <a:fillRect t="-6667" r="-1852" b="-5000"/>
+                </a:stretch>
+              </a:blipFill>
+            </p:spPr>
+            <p:txBody>
+              <a:bodyPr/>
+              <a:lstStyle/>
+              <a:p>
+                <a:r>
+                  <a:rPr lang="en-US">
+                    <a:noFill/>
+                  </a:rPr>
+                  <a:t> </a:t>
+                </a:r>
+              </a:p>
+            </p:txBody>
+          </p:sp>
+        </mc:Fallback>
+      </mc:AlternateContent>
+    </p:spTree>
+    <p:extLst>
+      <p:ext uri="{BB962C8B-B14F-4D97-AF65-F5344CB8AC3E}">
+        <p14:creationId xmlns:p14="http://schemas.microsoft.com/office/powerpoint/2010/main" val="3028165488"/>
+      </p:ext>
+    </p:extLst>
+  </p:cSld>
+  <p:clrMapOvr>
+    <a:masterClrMapping/>
+  </p:clrMapOvr>
+</p:sld>
+</file>
+
+<file path=ppt/slides/slide6.xml><?xml version="1.0" encoding="utf-8"?>
+<p:sld xmlns:a="http://schemas.openxmlformats.org/drawingml/2006/main" xmlns:r="http://schemas.openxmlformats.org/officeDocument/2006/relationships" xmlns:p="http://schemas.openxmlformats.org/presentationml/2006/main">
+  <p:cSld>
+    <p:spTree>
+      <p:nvGrpSpPr>
+        <p:cNvPr id="1" name=""/>
+        <p:cNvGrpSpPr/>
+        <p:nvPr/>
+      </p:nvGrpSpPr>
+      <p:grpSpPr>
+        <a:xfrm>
+          <a:off x="0" y="0"/>
+          <a:ext cx="0" cy="0"/>
+          <a:chOff x="0" y="0"/>
+          <a:chExt cx="0" cy="0"/>
+        </a:xfrm>
+      </p:grpSpPr>
+      <p:pic>
+        <p:nvPicPr>
+          <p:cNvPr id="3" name="Picture 2">
+            <a:extLst>
+              <a:ext uri="{FF2B5EF4-FFF2-40B4-BE49-F238E27FC236}">
+                <a16:creationId xmlns:a16="http://schemas.microsoft.com/office/drawing/2014/main" id="{58039CC3-AF48-F3DF-A9BD-4D1132204B4A}"/>
+              </a:ext>
+            </a:extLst>
+          </p:cNvPr>
+          <p:cNvPicPr>
+            <a:picLocks noChangeAspect="1"/>
+          </p:cNvPicPr>
+          <p:nvPr/>
+        </p:nvPicPr>
+        <p:blipFill>
+          <a:blip r:embed="rId2"/>
+          <a:stretch>
+            <a:fillRect/>
+          </a:stretch>
+        </p:blipFill>
+        <p:spPr>
+          <a:xfrm>
+            <a:off x="42862" y="795337"/>
+            <a:ext cx="9058275" cy="5267325"/>
+          </a:xfrm>
+          <a:prstGeom prst="rect">
+            <a:avLst/>
+          </a:prstGeom>
+        </p:spPr>
+      </p:pic>
+      <p:sp>
+        <p:nvSpPr>
+          <p:cNvPr id="4" name="TextBox 3">
+            <a:extLst>
+              <a:ext uri="{FF2B5EF4-FFF2-40B4-BE49-F238E27FC236}">
+                <a16:creationId xmlns:a16="http://schemas.microsoft.com/office/drawing/2014/main" id="{7164A35D-2E86-26C7-F655-C8752ABB868D}"/>
+              </a:ext>
+            </a:extLst>
+          </p:cNvPr>
+          <p:cNvSpPr txBox="1"/>
+          <p:nvPr/>
+        </p:nvSpPr>
+        <p:spPr>
+          <a:xfrm>
+            <a:off x="190500" y="101600"/>
+            <a:ext cx="2755900" cy="584775"/>
+          </a:xfrm>
+          <a:prstGeom prst="rect">
+            <a:avLst/>
+          </a:prstGeom>
+          <a:noFill/>
+        </p:spPr>
+        <p:txBody>
+          <a:bodyPr wrap="square" rtlCol="0">
+            <a:spAutoFit/>
+          </a:bodyPr>
+          <a:lstStyle/>
+          <a:p>
+            <a:r>
+              <a:rPr lang="en-US" sz="3200" b="1" dirty="0" err="1"/>
+              <a:t>Lotka</a:t>
+            </a:r>
+            <a:r>
+              <a:rPr lang="en-US" sz="3200" b="1" dirty="0"/>
+              <a:t> Volterra</a:t>
+            </a:r>
+          </a:p>
+        </p:txBody>
+      </p:sp>
+    </p:spTree>
+    <p:extLst>
+      <p:ext uri="{BB962C8B-B14F-4D97-AF65-F5344CB8AC3E}">
+        <p14:creationId xmlns:p14="http://schemas.microsoft.com/office/powerpoint/2010/main" val="2266283268"/>
       </p:ext>
     </p:extLst>
   </p:cSld>

</xml_diff>

<commit_message>
Added models to background
</commit_message>
<xml_diff>
--- a/main/ptm_fig.pptx
+++ b/main/ptm_fig.pptx
@@ -228,7 +228,7 @@
           <a:p>
             <a:fld id="{80137904-5636-B34C-A9CD-CBEBAD04BF28}" type="datetimeFigureOut">
               <a:rPr lang="en-US" smtClean="0"/>
-              <a:t>6/16/2022</a:t>
+              <a:t>6/23/2022</a:t>
             </a:fld>
             <a:endParaRPr lang="en-US"/>
           </a:p>
@@ -775,7 +775,7 @@
           <a:p>
             <a:fld id="{3C76BF9E-C1DF-AA49-BEDC-5D48F2B93EA3}" type="datetimeFigureOut">
               <a:rPr lang="en-US" smtClean="0"/>
-              <a:t>6/16/2022</a:t>
+              <a:t>6/23/2022</a:t>
             </a:fld>
             <a:endParaRPr lang="en-US"/>
           </a:p>
@@ -943,7 +943,7 @@
           <a:p>
             <a:fld id="{3C76BF9E-C1DF-AA49-BEDC-5D48F2B93EA3}" type="datetimeFigureOut">
               <a:rPr lang="en-US" smtClean="0"/>
-              <a:t>6/16/2022</a:t>
+              <a:t>6/23/2022</a:t>
             </a:fld>
             <a:endParaRPr lang="en-US"/>
           </a:p>
@@ -1121,7 +1121,7 @@
           <a:p>
             <a:fld id="{3C76BF9E-C1DF-AA49-BEDC-5D48F2B93EA3}" type="datetimeFigureOut">
               <a:rPr lang="en-US" smtClean="0"/>
-              <a:t>6/16/2022</a:t>
+              <a:t>6/23/2022</a:t>
             </a:fld>
             <a:endParaRPr lang="en-US"/>
           </a:p>
@@ -1289,7 +1289,7 @@
           <a:p>
             <a:fld id="{3C76BF9E-C1DF-AA49-BEDC-5D48F2B93EA3}" type="datetimeFigureOut">
               <a:rPr lang="en-US" smtClean="0"/>
-              <a:t>6/16/2022</a:t>
+              <a:t>6/23/2022</a:t>
             </a:fld>
             <a:endParaRPr lang="en-US"/>
           </a:p>
@@ -1534,7 +1534,7 @@
           <a:p>
             <a:fld id="{3C76BF9E-C1DF-AA49-BEDC-5D48F2B93EA3}" type="datetimeFigureOut">
               <a:rPr lang="en-US" smtClean="0"/>
-              <a:t>6/16/2022</a:t>
+              <a:t>6/23/2022</a:t>
             </a:fld>
             <a:endParaRPr lang="en-US"/>
           </a:p>
@@ -1819,7 +1819,7 @@
           <a:p>
             <a:fld id="{3C76BF9E-C1DF-AA49-BEDC-5D48F2B93EA3}" type="datetimeFigureOut">
               <a:rPr lang="en-US" smtClean="0"/>
-              <a:t>6/16/2022</a:t>
+              <a:t>6/23/2022</a:t>
             </a:fld>
             <a:endParaRPr lang="en-US"/>
           </a:p>
@@ -2238,7 +2238,7 @@
           <a:p>
             <a:fld id="{3C76BF9E-C1DF-AA49-BEDC-5D48F2B93EA3}" type="datetimeFigureOut">
               <a:rPr lang="en-US" smtClean="0"/>
-              <a:t>6/16/2022</a:t>
+              <a:t>6/23/2022</a:t>
             </a:fld>
             <a:endParaRPr lang="en-US"/>
           </a:p>
@@ -2355,7 +2355,7 @@
           <a:p>
             <a:fld id="{3C76BF9E-C1DF-AA49-BEDC-5D48F2B93EA3}" type="datetimeFigureOut">
               <a:rPr lang="en-US" smtClean="0"/>
-              <a:t>6/16/2022</a:t>
+              <a:t>6/23/2022</a:t>
             </a:fld>
             <a:endParaRPr lang="en-US"/>
           </a:p>
@@ -2450,7 +2450,7 @@
           <a:p>
             <a:fld id="{3C76BF9E-C1DF-AA49-BEDC-5D48F2B93EA3}" type="datetimeFigureOut">
               <a:rPr lang="en-US" smtClean="0"/>
-              <a:t>6/16/2022</a:t>
+              <a:t>6/23/2022</a:t>
             </a:fld>
             <a:endParaRPr lang="en-US"/>
           </a:p>
@@ -2725,7 +2725,7 @@
           <a:p>
             <a:fld id="{3C76BF9E-C1DF-AA49-BEDC-5D48F2B93EA3}" type="datetimeFigureOut">
               <a:rPr lang="en-US" smtClean="0"/>
-              <a:t>6/16/2022</a:t>
+              <a:t>6/23/2022</a:t>
             </a:fld>
             <a:endParaRPr lang="en-US"/>
           </a:p>
@@ -2977,7 +2977,7 @@
           <a:p>
             <a:fld id="{3C76BF9E-C1DF-AA49-BEDC-5D48F2B93EA3}" type="datetimeFigureOut">
               <a:rPr lang="en-US" smtClean="0"/>
-              <a:t>6/16/2022</a:t>
+              <a:t>6/23/2022</a:t>
             </a:fld>
             <a:endParaRPr lang="en-US"/>
           </a:p>
@@ -3188,7 +3188,7 @@
           <a:p>
             <a:fld id="{3C76BF9E-C1DF-AA49-BEDC-5D48F2B93EA3}" type="datetimeFigureOut">
               <a:rPr lang="en-US" smtClean="0"/>
-              <a:t>6/16/2022</a:t>
+              <a:t>6/23/2022</a:t>
             </a:fld>
             <a:endParaRPr lang="en-US"/>
           </a:p>
@@ -3677,7 +3677,7 @@
           <a:effectLst/>
           <a:extLst>
             <a:ext uri="{AF507438-7753-43e0-B8FC-AC1667EBCBE1}">
-              <a14:hiddenEffects xmlns:a14="http://schemas.microsoft.com/office/drawing/2010/main" xmlns="">
+              <a14:hiddenEffects xmlns="" xmlns:a14="http://schemas.microsoft.com/office/drawing/2010/main">
                 <a:effectLst>
                   <a:outerShdw dist="35921" dir="2700000" algn="ctr" rotWithShape="0">
                     <a:schemeClr val="bg2"/>
@@ -3838,12 +3838,12 @@
           <a:effectLst/>
           <a:extLst>
             <a:ext uri="{909E8E84-426E-40dd-AFC4-6F175D3DCCD1}">
-              <a14:hiddenFill xmlns:a14="http://schemas.microsoft.com/office/drawing/2010/main" xmlns="">
+              <a14:hiddenFill xmlns="" xmlns:a14="http://schemas.microsoft.com/office/drawing/2010/main">
                 <a:noFill/>
               </a14:hiddenFill>
             </a:ext>
             <a:ext uri="{AF507438-7753-43e0-B8FC-AC1667EBCBE1}">
-              <a14:hiddenEffects xmlns:a14="http://schemas.microsoft.com/office/drawing/2010/main" xmlns="">
+              <a14:hiddenEffects xmlns="" xmlns:a14="http://schemas.microsoft.com/office/drawing/2010/main">
                 <a:effectLst>
                   <a:outerShdw dist="35921" dir="2700000" algn="ctr" rotWithShape="0">
                     <a:schemeClr val="bg2"/>
@@ -3898,7 +3898,7 @@
           <a:effectLst/>
           <a:extLst>
             <a:ext uri="{AF507438-7753-43e0-B8FC-AC1667EBCBE1}">
-              <a14:hiddenEffects xmlns:a14="http://schemas.microsoft.com/office/drawing/2010/main" xmlns="">
+              <a14:hiddenEffects xmlns="" xmlns:a14="http://schemas.microsoft.com/office/drawing/2010/main">
                 <a:effectLst>
                   <a:outerShdw dist="35921" dir="2700000" algn="ctr" rotWithShape="0">
                     <a:schemeClr val="bg2"/>
@@ -3951,12 +3951,12 @@
           <a:effectLst/>
           <a:extLst>
             <a:ext uri="{909E8E84-426E-40dd-AFC4-6F175D3DCCD1}">
-              <a14:hiddenFill xmlns:a14="http://schemas.microsoft.com/office/drawing/2010/main" xmlns="">
+              <a14:hiddenFill xmlns="" xmlns:a14="http://schemas.microsoft.com/office/drawing/2010/main">
                 <a:noFill/>
               </a14:hiddenFill>
             </a:ext>
             <a:ext uri="{AF507438-7753-43e0-B8FC-AC1667EBCBE1}">
-              <a14:hiddenEffects xmlns:a14="http://schemas.microsoft.com/office/drawing/2010/main" xmlns="">
+              <a14:hiddenEffects xmlns="" xmlns:a14="http://schemas.microsoft.com/office/drawing/2010/main">
                 <a:effectLst>
                   <a:outerShdw dist="35921" dir="2700000" algn="ctr" rotWithShape="0">
                     <a:schemeClr val="bg2"/>
@@ -4009,12 +4009,12 @@
           <a:effectLst/>
           <a:extLst>
             <a:ext uri="{909E8E84-426E-40dd-AFC4-6F175D3DCCD1}">
-              <a14:hiddenFill xmlns:a14="http://schemas.microsoft.com/office/drawing/2010/main" xmlns="">
+              <a14:hiddenFill xmlns="" xmlns:a14="http://schemas.microsoft.com/office/drawing/2010/main">
                 <a:noFill/>
               </a14:hiddenFill>
             </a:ext>
             <a:ext uri="{AF507438-7753-43e0-B8FC-AC1667EBCBE1}">
-              <a14:hiddenEffects xmlns:a14="http://schemas.microsoft.com/office/drawing/2010/main" xmlns="">
+              <a14:hiddenEffects xmlns="" xmlns:a14="http://schemas.microsoft.com/office/drawing/2010/main">
                 <a:effectLst>
                   <a:outerShdw dist="35921" dir="2700000" algn="ctr" rotWithShape="0">
                     <a:schemeClr val="bg2"/>
@@ -4071,7 +4071,7 @@
           <a:effectLst/>
           <a:extLst>
             <a:ext uri="{AF507438-7753-43e0-B8FC-AC1667EBCBE1}">
-              <a14:hiddenEffects xmlns:a14="http://schemas.microsoft.com/office/drawing/2010/main" xmlns="">
+              <a14:hiddenEffects xmlns="" xmlns:a14="http://schemas.microsoft.com/office/drawing/2010/main">
                 <a:effectLst>
                   <a:outerShdw dist="35921" dir="2700000" algn="ctr" rotWithShape="0">
                     <a:schemeClr val="bg2"/>
@@ -4126,7 +4126,7 @@
           <a:effectLst/>
           <a:extLst>
             <a:ext uri="{AF507438-7753-43e0-B8FC-AC1667EBCBE1}">
-              <a14:hiddenEffects xmlns:a14="http://schemas.microsoft.com/office/drawing/2010/main" xmlns="">
+              <a14:hiddenEffects xmlns="" xmlns:a14="http://schemas.microsoft.com/office/drawing/2010/main">
                 <a:effectLst>
                   <a:outerShdw dist="35921" dir="2700000" algn="ctr" rotWithShape="0">
                     <a:schemeClr val="bg2"/>
@@ -4179,12 +4179,12 @@
           <a:effectLst/>
           <a:extLst>
             <a:ext uri="{909E8E84-426E-40dd-AFC4-6F175D3DCCD1}">
-              <a14:hiddenFill xmlns:a14="http://schemas.microsoft.com/office/drawing/2010/main" xmlns="">
+              <a14:hiddenFill xmlns="" xmlns:a14="http://schemas.microsoft.com/office/drawing/2010/main">
                 <a:noFill/>
               </a14:hiddenFill>
             </a:ext>
             <a:ext uri="{AF507438-7753-43e0-B8FC-AC1667EBCBE1}">
-              <a14:hiddenEffects xmlns:a14="http://schemas.microsoft.com/office/drawing/2010/main" xmlns="">
+              <a14:hiddenEffects xmlns="" xmlns:a14="http://schemas.microsoft.com/office/drawing/2010/main">
                 <a:effectLst>
                   <a:outerShdw dist="35921" dir="2700000" algn="ctr" rotWithShape="0">
                     <a:schemeClr val="bg2"/>
@@ -4237,12 +4237,12 @@
           <a:effectLst/>
           <a:extLst>
             <a:ext uri="{909E8E84-426E-40dd-AFC4-6F175D3DCCD1}">
-              <a14:hiddenFill xmlns:a14="http://schemas.microsoft.com/office/drawing/2010/main" xmlns="">
+              <a14:hiddenFill xmlns="" xmlns:a14="http://schemas.microsoft.com/office/drawing/2010/main">
                 <a:noFill/>
               </a14:hiddenFill>
             </a:ext>
             <a:ext uri="{AF507438-7753-43e0-B8FC-AC1667EBCBE1}">
-              <a14:hiddenEffects xmlns:a14="http://schemas.microsoft.com/office/drawing/2010/main" xmlns="">
+              <a14:hiddenEffects xmlns="" xmlns:a14="http://schemas.microsoft.com/office/drawing/2010/main">
                 <a:effectLst>
                   <a:outerShdw dist="35921" dir="2700000" algn="ctr" rotWithShape="0">
                     <a:schemeClr val="bg2"/>
@@ -4299,7 +4299,7 @@
           <a:effectLst/>
           <a:extLst>
             <a:ext uri="{AF507438-7753-43e0-B8FC-AC1667EBCBE1}">
-              <a14:hiddenEffects xmlns:a14="http://schemas.microsoft.com/office/drawing/2010/main" xmlns="">
+              <a14:hiddenEffects xmlns="" xmlns:a14="http://schemas.microsoft.com/office/drawing/2010/main">
                 <a:effectLst>
                   <a:outerShdw dist="35921" dir="2700000" algn="ctr" rotWithShape="0">
                     <a:schemeClr val="bg2"/>
@@ -4354,7 +4354,7 @@
           <a:effectLst/>
           <a:extLst>
             <a:ext uri="{AF507438-7753-43e0-B8FC-AC1667EBCBE1}">
-              <a14:hiddenEffects xmlns:a14="http://schemas.microsoft.com/office/drawing/2010/main" xmlns="">
+              <a14:hiddenEffects xmlns="" xmlns:a14="http://schemas.microsoft.com/office/drawing/2010/main">
                 <a:effectLst>
                   <a:outerShdw dist="35921" dir="2700000" algn="ctr" rotWithShape="0">
                     <a:schemeClr val="bg2"/>
@@ -4407,12 +4407,12 @@
           <a:effectLst/>
           <a:extLst>
             <a:ext uri="{909E8E84-426E-40dd-AFC4-6F175D3DCCD1}">
-              <a14:hiddenFill xmlns:a14="http://schemas.microsoft.com/office/drawing/2010/main" xmlns="">
+              <a14:hiddenFill xmlns="" xmlns:a14="http://schemas.microsoft.com/office/drawing/2010/main">
                 <a:noFill/>
               </a14:hiddenFill>
             </a:ext>
             <a:ext uri="{AF507438-7753-43e0-B8FC-AC1667EBCBE1}">
-              <a14:hiddenEffects xmlns:a14="http://schemas.microsoft.com/office/drawing/2010/main" xmlns="">
+              <a14:hiddenEffects xmlns="" xmlns:a14="http://schemas.microsoft.com/office/drawing/2010/main">
                 <a:effectLst>
                   <a:outerShdw dist="35921" dir="2700000" algn="ctr" rotWithShape="0">
                     <a:schemeClr val="bg2"/>
@@ -4465,12 +4465,12 @@
           <a:effectLst/>
           <a:extLst>
             <a:ext uri="{909E8E84-426E-40dd-AFC4-6F175D3DCCD1}">
-              <a14:hiddenFill xmlns:a14="http://schemas.microsoft.com/office/drawing/2010/main" xmlns="">
+              <a14:hiddenFill xmlns="" xmlns:a14="http://schemas.microsoft.com/office/drawing/2010/main">
                 <a:noFill/>
               </a14:hiddenFill>
             </a:ext>
             <a:ext uri="{AF507438-7753-43e0-B8FC-AC1667EBCBE1}">
-              <a14:hiddenEffects xmlns:a14="http://schemas.microsoft.com/office/drawing/2010/main" xmlns="">
+              <a14:hiddenEffects xmlns="" xmlns:a14="http://schemas.microsoft.com/office/drawing/2010/main">
                 <a:effectLst>
                   <a:outerShdw dist="35921" dir="2700000" algn="ctr" rotWithShape="0">
                     <a:schemeClr val="bg2"/>
@@ -4525,7 +4525,7 @@
           <a:effectLst/>
           <a:extLst>
             <a:ext uri="{AF507438-7753-43e0-B8FC-AC1667EBCBE1}">
-              <a14:hiddenEffects xmlns:a14="http://schemas.microsoft.com/office/drawing/2010/main" xmlns="">
+              <a14:hiddenEffects xmlns="" xmlns:a14="http://schemas.microsoft.com/office/drawing/2010/main">
                 <a:effectLst>
                   <a:outerShdw dist="35921" dir="2700000" algn="ctr" rotWithShape="0">
                     <a:schemeClr val="bg2"/>
@@ -4580,7 +4580,7 @@
           <a:effectLst/>
           <a:extLst>
             <a:ext uri="{AF507438-7753-43e0-B8FC-AC1667EBCBE1}">
-              <a14:hiddenEffects xmlns:a14="http://schemas.microsoft.com/office/drawing/2010/main" xmlns="">
+              <a14:hiddenEffects xmlns="" xmlns:a14="http://schemas.microsoft.com/office/drawing/2010/main">
                 <a:effectLst>
                   <a:outerShdw dist="35921" dir="2700000" algn="ctr" rotWithShape="0">
                     <a:schemeClr val="bg2"/>
@@ -4633,12 +4633,12 @@
           <a:effectLst/>
           <a:extLst>
             <a:ext uri="{909E8E84-426E-40dd-AFC4-6F175D3DCCD1}">
-              <a14:hiddenFill xmlns:a14="http://schemas.microsoft.com/office/drawing/2010/main" xmlns="">
+              <a14:hiddenFill xmlns="" xmlns:a14="http://schemas.microsoft.com/office/drawing/2010/main">
                 <a:noFill/>
               </a14:hiddenFill>
             </a:ext>
             <a:ext uri="{AF507438-7753-43e0-B8FC-AC1667EBCBE1}">
-              <a14:hiddenEffects xmlns:a14="http://schemas.microsoft.com/office/drawing/2010/main" xmlns="">
+              <a14:hiddenEffects xmlns="" xmlns:a14="http://schemas.microsoft.com/office/drawing/2010/main">
                 <a:effectLst>
                   <a:outerShdw dist="35921" dir="2700000" algn="ctr" rotWithShape="0">
                     <a:schemeClr val="bg2"/>
@@ -4691,12 +4691,12 @@
           <a:effectLst/>
           <a:extLst>
             <a:ext uri="{909E8E84-426E-40dd-AFC4-6F175D3DCCD1}">
-              <a14:hiddenFill xmlns:a14="http://schemas.microsoft.com/office/drawing/2010/main" xmlns="">
+              <a14:hiddenFill xmlns="" xmlns:a14="http://schemas.microsoft.com/office/drawing/2010/main">
                 <a:noFill/>
               </a14:hiddenFill>
             </a:ext>
             <a:ext uri="{AF507438-7753-43e0-B8FC-AC1667EBCBE1}">
-              <a14:hiddenEffects xmlns:a14="http://schemas.microsoft.com/office/drawing/2010/main" xmlns="">
+              <a14:hiddenEffects xmlns="" xmlns:a14="http://schemas.microsoft.com/office/drawing/2010/main">
                 <a:effectLst>
                   <a:outerShdw dist="35921" dir="2700000" algn="ctr" rotWithShape="0">
                     <a:schemeClr val="bg2"/>
@@ -4753,7 +4753,7 @@
           <a:effectLst/>
           <a:extLst>
             <a:ext uri="{AF507438-7753-43e0-B8FC-AC1667EBCBE1}">
-              <a14:hiddenEffects xmlns:a14="http://schemas.microsoft.com/office/drawing/2010/main" xmlns="">
+              <a14:hiddenEffects xmlns="" xmlns:a14="http://schemas.microsoft.com/office/drawing/2010/main">
                 <a:effectLst>
                   <a:outerShdw dist="35921" dir="2700000" algn="ctr" rotWithShape="0">
                     <a:schemeClr val="bg2"/>
@@ -4801,14 +4801,14 @@
           <a:effectLst/>
           <a:extLst>
             <a:ext uri="{909E8E84-426E-40dd-AFC4-6F175D3DCCD1}">
-              <a14:hiddenFill xmlns:a14="http://schemas.microsoft.com/office/drawing/2010/main" xmlns="">
+              <a14:hiddenFill xmlns="" xmlns:a14="http://schemas.microsoft.com/office/drawing/2010/main">
                 <a:solidFill>
                   <a:schemeClr val="accent1"/>
                 </a:solidFill>
               </a14:hiddenFill>
             </a:ext>
             <a:ext uri="{91240B29-F687-4f45-9708-019B960494DF}">
-              <a14:hiddenLine xmlns:a14="http://schemas.microsoft.com/office/drawing/2010/main" xmlns="" w="9525">
+              <a14:hiddenLine xmlns="" xmlns:a14="http://schemas.microsoft.com/office/drawing/2010/main" w="9525">
                 <a:solidFill>
                   <a:schemeClr val="tx1"/>
                 </a:solidFill>
@@ -4818,7 +4818,7 @@
               </a14:hiddenLine>
             </a:ext>
             <a:ext uri="{AF507438-7753-43e0-B8FC-AC1667EBCBE1}">
-              <a14:hiddenEffects xmlns:a14="http://schemas.microsoft.com/office/drawing/2010/main" xmlns="">
+              <a14:hiddenEffects xmlns="" xmlns:a14="http://schemas.microsoft.com/office/drawing/2010/main">
                 <a:effectLst>
                   <a:outerShdw dist="35921" dir="2700000" algn="ctr" rotWithShape="0">
                     <a:schemeClr val="bg2"/>
@@ -4976,14 +4976,14 @@
           <a:effectLst/>
           <a:extLst>
             <a:ext uri="{909E8E84-426E-40dd-AFC4-6F175D3DCCD1}">
-              <a14:hiddenFill xmlns:a14="http://schemas.microsoft.com/office/drawing/2010/main" xmlns="">
+              <a14:hiddenFill xmlns="" xmlns:a14="http://schemas.microsoft.com/office/drawing/2010/main">
                 <a:solidFill>
                   <a:schemeClr val="accent1"/>
                 </a:solidFill>
               </a14:hiddenFill>
             </a:ext>
             <a:ext uri="{91240B29-F687-4f45-9708-019B960494DF}">
-              <a14:hiddenLine xmlns:a14="http://schemas.microsoft.com/office/drawing/2010/main" xmlns="" w="9525">
+              <a14:hiddenLine xmlns="" xmlns:a14="http://schemas.microsoft.com/office/drawing/2010/main" w="9525">
                 <a:solidFill>
                   <a:schemeClr val="tx1"/>
                 </a:solidFill>
@@ -4993,7 +4993,7 @@
               </a14:hiddenLine>
             </a:ext>
             <a:ext uri="{AF507438-7753-43e0-B8FC-AC1667EBCBE1}">
-              <a14:hiddenEffects xmlns:a14="http://schemas.microsoft.com/office/drawing/2010/main" xmlns="">
+              <a14:hiddenEffects xmlns="" xmlns:a14="http://schemas.microsoft.com/office/drawing/2010/main">
                 <a:effectLst>
                   <a:outerShdw dist="35921" dir="2700000" algn="ctr" rotWithShape="0">
                     <a:schemeClr val="bg2"/>
@@ -5151,14 +5151,14 @@
           <a:effectLst/>
           <a:extLst>
             <a:ext uri="{909E8E84-426E-40dd-AFC4-6F175D3DCCD1}">
-              <a14:hiddenFill xmlns:a14="http://schemas.microsoft.com/office/drawing/2010/main" xmlns="">
+              <a14:hiddenFill xmlns="" xmlns:a14="http://schemas.microsoft.com/office/drawing/2010/main">
                 <a:solidFill>
                   <a:schemeClr val="accent1"/>
                 </a:solidFill>
               </a14:hiddenFill>
             </a:ext>
             <a:ext uri="{91240B29-F687-4f45-9708-019B960494DF}">
-              <a14:hiddenLine xmlns:a14="http://schemas.microsoft.com/office/drawing/2010/main" xmlns="" w="9525">
+              <a14:hiddenLine xmlns="" xmlns:a14="http://schemas.microsoft.com/office/drawing/2010/main" w="9525">
                 <a:solidFill>
                   <a:schemeClr val="tx1"/>
                 </a:solidFill>
@@ -5168,7 +5168,7 @@
               </a14:hiddenLine>
             </a:ext>
             <a:ext uri="{AF507438-7753-43e0-B8FC-AC1667EBCBE1}">
-              <a14:hiddenEffects xmlns:a14="http://schemas.microsoft.com/office/drawing/2010/main" xmlns="">
+              <a14:hiddenEffects xmlns="" xmlns:a14="http://schemas.microsoft.com/office/drawing/2010/main">
                 <a:effectLst>
                   <a:outerShdw dist="35921" dir="2700000" algn="ctr" rotWithShape="0">
                     <a:schemeClr val="bg2"/>
@@ -5326,14 +5326,14 @@
           <a:effectLst/>
           <a:extLst>
             <a:ext uri="{909E8E84-426E-40dd-AFC4-6F175D3DCCD1}">
-              <a14:hiddenFill xmlns:a14="http://schemas.microsoft.com/office/drawing/2010/main" xmlns="">
+              <a14:hiddenFill xmlns="" xmlns:a14="http://schemas.microsoft.com/office/drawing/2010/main">
                 <a:solidFill>
                   <a:schemeClr val="accent1"/>
                 </a:solidFill>
               </a14:hiddenFill>
             </a:ext>
             <a:ext uri="{91240B29-F687-4f45-9708-019B960494DF}">
-              <a14:hiddenLine xmlns:a14="http://schemas.microsoft.com/office/drawing/2010/main" xmlns="" w="9525">
+              <a14:hiddenLine xmlns="" xmlns:a14="http://schemas.microsoft.com/office/drawing/2010/main" w="9525">
                 <a:solidFill>
                   <a:schemeClr val="tx1"/>
                 </a:solidFill>
@@ -5343,7 +5343,7 @@
               </a14:hiddenLine>
             </a:ext>
             <a:ext uri="{AF507438-7753-43e0-B8FC-AC1667EBCBE1}">
-              <a14:hiddenEffects xmlns:a14="http://schemas.microsoft.com/office/drawing/2010/main" xmlns="">
+              <a14:hiddenEffects xmlns="" xmlns:a14="http://schemas.microsoft.com/office/drawing/2010/main">
                 <a:effectLst>
                   <a:outerShdw dist="35921" dir="2700000" algn="ctr" rotWithShape="0">
                     <a:schemeClr val="bg2"/>
@@ -5506,12 +5506,12 @@
           <a:effectLst/>
           <a:extLst>
             <a:ext uri="{909E8E84-426E-40dd-AFC4-6F175D3DCCD1}">
-              <a14:hiddenFill xmlns:a14="http://schemas.microsoft.com/office/drawing/2010/main" xmlns="">
+              <a14:hiddenFill xmlns="" xmlns:a14="http://schemas.microsoft.com/office/drawing/2010/main">
                 <a:noFill/>
               </a14:hiddenFill>
             </a:ext>
             <a:ext uri="{AF507438-7753-43e0-B8FC-AC1667EBCBE1}">
-              <a14:hiddenEffects xmlns:a14="http://schemas.microsoft.com/office/drawing/2010/main" xmlns="">
+              <a14:hiddenEffects xmlns="" xmlns:a14="http://schemas.microsoft.com/office/drawing/2010/main">
                 <a:effectLst>
                   <a:outerShdw dist="35921" dir="2700000" algn="ctr" rotWithShape="0">
                     <a:schemeClr val="bg2"/>
@@ -5564,12 +5564,12 @@
           <a:effectLst/>
           <a:extLst>
             <a:ext uri="{909E8E84-426E-40dd-AFC4-6F175D3DCCD1}">
-              <a14:hiddenFill xmlns:a14="http://schemas.microsoft.com/office/drawing/2010/main" xmlns="">
+              <a14:hiddenFill xmlns="" xmlns:a14="http://schemas.microsoft.com/office/drawing/2010/main">
                 <a:noFill/>
               </a14:hiddenFill>
             </a:ext>
             <a:ext uri="{AF507438-7753-43e0-B8FC-AC1667EBCBE1}">
-              <a14:hiddenEffects xmlns:a14="http://schemas.microsoft.com/office/drawing/2010/main" xmlns="">
+              <a14:hiddenEffects xmlns="" xmlns:a14="http://schemas.microsoft.com/office/drawing/2010/main">
                 <a:effectLst>
                   <a:outerShdw dist="35921" dir="2700000" algn="ctr" rotWithShape="0">
                     <a:schemeClr val="bg2"/>
@@ -5622,12 +5622,12 @@
           <a:effectLst/>
           <a:extLst>
             <a:ext uri="{909E8E84-426E-40dd-AFC4-6F175D3DCCD1}">
-              <a14:hiddenFill xmlns:a14="http://schemas.microsoft.com/office/drawing/2010/main" xmlns="">
+              <a14:hiddenFill xmlns="" xmlns:a14="http://schemas.microsoft.com/office/drawing/2010/main">
                 <a:noFill/>
               </a14:hiddenFill>
             </a:ext>
             <a:ext uri="{AF507438-7753-43e0-B8FC-AC1667EBCBE1}">
-              <a14:hiddenEffects xmlns:a14="http://schemas.microsoft.com/office/drawing/2010/main" xmlns="">
+              <a14:hiddenEffects xmlns="" xmlns:a14="http://schemas.microsoft.com/office/drawing/2010/main">
                 <a:effectLst>
                   <a:outerShdw dist="35921" dir="2700000" algn="ctr" rotWithShape="0">
                     <a:schemeClr val="bg2"/>
@@ -5680,12 +5680,12 @@
           <a:effectLst/>
           <a:extLst>
             <a:ext uri="{909E8E84-426E-40dd-AFC4-6F175D3DCCD1}">
-              <a14:hiddenFill xmlns:a14="http://schemas.microsoft.com/office/drawing/2010/main" xmlns="">
+              <a14:hiddenFill xmlns="" xmlns:a14="http://schemas.microsoft.com/office/drawing/2010/main">
                 <a:noFill/>
               </a14:hiddenFill>
             </a:ext>
             <a:ext uri="{AF507438-7753-43e0-B8FC-AC1667EBCBE1}">
-              <a14:hiddenEffects xmlns:a14="http://schemas.microsoft.com/office/drawing/2010/main" xmlns="">
+              <a14:hiddenEffects xmlns="" xmlns:a14="http://schemas.microsoft.com/office/drawing/2010/main">
                 <a:effectLst>
                   <a:outerShdw dist="35921" dir="2700000" algn="ctr" rotWithShape="0">
                     <a:schemeClr val="bg2"/>
@@ -5738,12 +5738,12 @@
           <a:effectLst/>
           <a:extLst>
             <a:ext uri="{909E8E84-426E-40dd-AFC4-6F175D3DCCD1}">
-              <a14:hiddenFill xmlns:a14="http://schemas.microsoft.com/office/drawing/2010/main" xmlns="">
+              <a14:hiddenFill xmlns="" xmlns:a14="http://schemas.microsoft.com/office/drawing/2010/main">
                 <a:noFill/>
               </a14:hiddenFill>
             </a:ext>
             <a:ext uri="{AF507438-7753-43e0-B8FC-AC1667EBCBE1}">
-              <a14:hiddenEffects xmlns:a14="http://schemas.microsoft.com/office/drawing/2010/main" xmlns="">
+              <a14:hiddenEffects xmlns="" xmlns:a14="http://schemas.microsoft.com/office/drawing/2010/main">
                 <a:effectLst>
                   <a:outerShdw dist="35921" dir="2700000" algn="ctr" rotWithShape="0">
                     <a:schemeClr val="bg2"/>
@@ -5796,12 +5796,12 @@
           <a:effectLst/>
           <a:extLst>
             <a:ext uri="{909E8E84-426E-40dd-AFC4-6F175D3DCCD1}">
-              <a14:hiddenFill xmlns:a14="http://schemas.microsoft.com/office/drawing/2010/main" xmlns="">
+              <a14:hiddenFill xmlns="" xmlns:a14="http://schemas.microsoft.com/office/drawing/2010/main">
                 <a:noFill/>
               </a14:hiddenFill>
             </a:ext>
             <a:ext uri="{AF507438-7753-43e0-B8FC-AC1667EBCBE1}">
-              <a14:hiddenEffects xmlns:a14="http://schemas.microsoft.com/office/drawing/2010/main" xmlns="">
+              <a14:hiddenEffects xmlns="" xmlns:a14="http://schemas.microsoft.com/office/drawing/2010/main">
                 <a:effectLst>
                   <a:outerShdw dist="35921" dir="2700000" algn="ctr" rotWithShape="0">
                     <a:schemeClr val="bg2"/>
@@ -5854,12 +5854,12 @@
           <a:effectLst/>
           <a:extLst>
             <a:ext uri="{909E8E84-426E-40dd-AFC4-6F175D3DCCD1}">
-              <a14:hiddenFill xmlns:a14="http://schemas.microsoft.com/office/drawing/2010/main" xmlns="">
+              <a14:hiddenFill xmlns="" xmlns:a14="http://schemas.microsoft.com/office/drawing/2010/main">
                 <a:noFill/>
               </a14:hiddenFill>
             </a:ext>
             <a:ext uri="{AF507438-7753-43e0-B8FC-AC1667EBCBE1}">
-              <a14:hiddenEffects xmlns:a14="http://schemas.microsoft.com/office/drawing/2010/main" xmlns="">
+              <a14:hiddenEffects xmlns="" xmlns:a14="http://schemas.microsoft.com/office/drawing/2010/main">
                 <a:effectLst>
                   <a:outerShdw dist="35921" dir="2700000" algn="ctr" rotWithShape="0">
                     <a:schemeClr val="bg2"/>
@@ -5912,12 +5912,12 @@
           <a:effectLst/>
           <a:extLst>
             <a:ext uri="{909E8E84-426E-40dd-AFC4-6F175D3DCCD1}">
-              <a14:hiddenFill xmlns:a14="http://schemas.microsoft.com/office/drawing/2010/main" xmlns="">
+              <a14:hiddenFill xmlns="" xmlns:a14="http://schemas.microsoft.com/office/drawing/2010/main">
                 <a:noFill/>
               </a14:hiddenFill>
             </a:ext>
             <a:ext uri="{AF507438-7753-43e0-B8FC-AC1667EBCBE1}">
-              <a14:hiddenEffects xmlns:a14="http://schemas.microsoft.com/office/drawing/2010/main" xmlns="">
+              <a14:hiddenEffects xmlns="" xmlns:a14="http://schemas.microsoft.com/office/drawing/2010/main">
                 <a:effectLst>
                   <a:outerShdw dist="35921" dir="2700000" algn="ctr" rotWithShape="0">
                     <a:schemeClr val="bg2"/>
@@ -5970,14 +5970,14 @@
           <a:effectLst/>
           <a:extLst>
             <a:ext uri="{909E8E84-426E-40dd-AFC4-6F175D3DCCD1}">
-              <a14:hiddenFill xmlns:a14="http://schemas.microsoft.com/office/drawing/2010/main" xmlns="">
+              <a14:hiddenFill xmlns="" xmlns:a14="http://schemas.microsoft.com/office/drawing/2010/main">
                 <a:solidFill>
                   <a:srgbClr val="FFFFCC"/>
                 </a:solidFill>
               </a14:hiddenFill>
             </a:ext>
             <a:ext uri="{AF507438-7753-43e0-B8FC-AC1667EBCBE1}">
-              <a14:hiddenEffects xmlns:a14="http://schemas.microsoft.com/office/drawing/2010/main" xmlns="">
+              <a14:hiddenEffects xmlns="" xmlns:a14="http://schemas.microsoft.com/office/drawing/2010/main">
                 <a:effectLst>
                   <a:outerShdw dist="35921" dir="2700000" algn="ctr" rotWithShape="0">
                     <a:schemeClr val="bg2"/>
@@ -6138,12 +6138,12 @@
           <a:effectLst/>
           <a:extLst>
             <a:ext uri="{909E8E84-426E-40dd-AFC4-6F175D3DCCD1}">
-              <a14:hiddenFill xmlns:a14="http://schemas.microsoft.com/office/drawing/2010/main" xmlns="">
+              <a14:hiddenFill xmlns="" xmlns:a14="http://schemas.microsoft.com/office/drawing/2010/main">
                 <a:noFill/>
               </a14:hiddenFill>
             </a:ext>
             <a:ext uri="{AF507438-7753-43e0-B8FC-AC1667EBCBE1}">
-              <a14:hiddenEffects xmlns:a14="http://schemas.microsoft.com/office/drawing/2010/main" xmlns="">
+              <a14:hiddenEffects xmlns="" xmlns:a14="http://schemas.microsoft.com/office/drawing/2010/main">
                 <a:effectLst>
                   <a:outerShdw dist="35921" dir="2700000" algn="ctr" rotWithShape="0">
                     <a:schemeClr val="bg2"/>
@@ -6196,12 +6196,12 @@
           <a:effectLst/>
           <a:extLst>
             <a:ext uri="{909E8E84-426E-40dd-AFC4-6F175D3DCCD1}">
-              <a14:hiddenFill xmlns:a14="http://schemas.microsoft.com/office/drawing/2010/main" xmlns="">
+              <a14:hiddenFill xmlns="" xmlns:a14="http://schemas.microsoft.com/office/drawing/2010/main">
                 <a:noFill/>
               </a14:hiddenFill>
             </a:ext>
             <a:ext uri="{AF507438-7753-43e0-B8FC-AC1667EBCBE1}">
-              <a14:hiddenEffects xmlns:a14="http://schemas.microsoft.com/office/drawing/2010/main" xmlns="">
+              <a14:hiddenEffects xmlns="" xmlns:a14="http://schemas.microsoft.com/office/drawing/2010/main">
                 <a:effectLst>
                   <a:outerShdw dist="35921" dir="2700000" algn="ctr" rotWithShape="0">
                     <a:schemeClr val="bg2"/>
@@ -6254,12 +6254,12 @@
           <a:effectLst/>
           <a:extLst>
             <a:ext uri="{909E8E84-426E-40dd-AFC4-6F175D3DCCD1}">
-              <a14:hiddenFill xmlns:a14="http://schemas.microsoft.com/office/drawing/2010/main" xmlns="">
+              <a14:hiddenFill xmlns="" xmlns:a14="http://schemas.microsoft.com/office/drawing/2010/main">
                 <a:noFill/>
               </a14:hiddenFill>
             </a:ext>
             <a:ext uri="{AF507438-7753-43e0-B8FC-AC1667EBCBE1}">
-              <a14:hiddenEffects xmlns:a14="http://schemas.microsoft.com/office/drawing/2010/main" xmlns="">
+              <a14:hiddenEffects xmlns="" xmlns:a14="http://schemas.microsoft.com/office/drawing/2010/main">
                 <a:effectLst>
                   <a:outerShdw dist="35921" dir="2700000" algn="ctr" rotWithShape="0">
                     <a:schemeClr val="bg2"/>
@@ -6312,12 +6312,12 @@
           <a:effectLst/>
           <a:extLst>
             <a:ext uri="{909E8E84-426E-40dd-AFC4-6F175D3DCCD1}">
-              <a14:hiddenFill xmlns:a14="http://schemas.microsoft.com/office/drawing/2010/main" xmlns="">
+              <a14:hiddenFill xmlns="" xmlns:a14="http://schemas.microsoft.com/office/drawing/2010/main">
                 <a:noFill/>
               </a14:hiddenFill>
             </a:ext>
             <a:ext uri="{AF507438-7753-43e0-B8FC-AC1667EBCBE1}">
-              <a14:hiddenEffects xmlns:a14="http://schemas.microsoft.com/office/drawing/2010/main" xmlns="">
+              <a14:hiddenEffects xmlns="" xmlns:a14="http://schemas.microsoft.com/office/drawing/2010/main">
                 <a:effectLst>
                   <a:outerShdw dist="35921" dir="2700000" algn="ctr" rotWithShape="0">
                     <a:schemeClr val="bg2"/>
@@ -6372,7 +6372,7 @@
           <a:effectLst/>
           <a:extLst>
             <a:ext uri="{AF507438-7753-43e0-B8FC-AC1667EBCBE1}">
-              <a14:hiddenEffects xmlns:a14="http://schemas.microsoft.com/office/drawing/2010/main" xmlns="">
+              <a14:hiddenEffects xmlns="" xmlns:a14="http://schemas.microsoft.com/office/drawing/2010/main">
                 <a:effectLst>
                   <a:outerShdw dist="35921" dir="2700000" algn="ctr" rotWithShape="0">
                     <a:schemeClr val="bg2"/>
@@ -6544,7 +6544,7 @@
           <a:effectLst/>
           <a:extLst>
             <a:ext uri="{AF507438-7753-43e0-B8FC-AC1667EBCBE1}">
-              <a14:hiddenEffects xmlns:a14="http://schemas.microsoft.com/office/drawing/2010/main" xmlns="">
+              <a14:hiddenEffects xmlns="" xmlns:a14="http://schemas.microsoft.com/office/drawing/2010/main">
                 <a:effectLst>
                   <a:outerShdw dist="35921" dir="2700000" algn="ctr" rotWithShape="0">
                     <a:schemeClr val="bg2"/>
@@ -6700,12 +6700,12 @@
           <a:effectLst/>
           <a:extLst>
             <a:ext uri="{909E8E84-426E-40dd-AFC4-6F175D3DCCD1}">
-              <a14:hiddenFill xmlns:a14="http://schemas.microsoft.com/office/drawing/2010/main" xmlns="">
+              <a14:hiddenFill xmlns="" xmlns:a14="http://schemas.microsoft.com/office/drawing/2010/main">
                 <a:noFill/>
               </a14:hiddenFill>
             </a:ext>
             <a:ext uri="{91240B29-F687-4f45-9708-019B960494DF}">
-              <a14:hiddenLine xmlns:a14="http://schemas.microsoft.com/office/drawing/2010/main" xmlns="" w="38100">
+              <a14:hiddenLine xmlns="" xmlns:a14="http://schemas.microsoft.com/office/drawing/2010/main" w="38100">
                 <a:solidFill>
                   <a:srgbClr val="000000"/>
                 </a:solidFill>
@@ -6715,7 +6715,7 @@
               </a14:hiddenLine>
             </a:ext>
             <a:ext uri="{AF507438-7753-43e0-B8FC-AC1667EBCBE1}">
-              <a14:hiddenEffects xmlns:a14="http://schemas.microsoft.com/office/drawing/2010/main" xmlns="">
+              <a14:hiddenEffects xmlns="" xmlns:a14="http://schemas.microsoft.com/office/drawing/2010/main">
                 <a:effectLst>
                   <a:outerShdw dist="35921" dir="2700000" algn="ctr" rotWithShape="0">
                     <a:schemeClr val="bg2"/>
@@ -15131,103 +15131,6 @@
       </p:grpSpPr>
       <p:sp>
         <p:nvSpPr>
-          <p:cNvPr id="419" name="Rectangle 418"/>
-          <p:cNvSpPr/>
-          <p:nvPr/>
-        </p:nvSpPr>
-        <p:spPr>
-          <a:xfrm>
-            <a:off x="7693381" y="4711816"/>
-            <a:ext cx="278586" cy="283209"/>
-          </a:xfrm>
-          <a:prstGeom prst="rect">
-            <a:avLst/>
-          </a:prstGeom>
-          <a:solidFill>
-            <a:schemeClr val="accent2">
-              <a:lumMod val="40000"/>
-              <a:lumOff val="60000"/>
-            </a:schemeClr>
-          </a:solidFill>
-          <a:ln>
-            <a:solidFill>
-              <a:srgbClr val="FFFFFF"/>
-            </a:solidFill>
-          </a:ln>
-          <a:effectLst/>
-        </p:spPr>
-        <p:style>
-          <a:lnRef idx="1">
-            <a:schemeClr val="accent1"/>
-          </a:lnRef>
-          <a:fillRef idx="3">
-            <a:schemeClr val="accent1"/>
-          </a:fillRef>
-          <a:effectRef idx="2">
-            <a:schemeClr val="accent1"/>
-          </a:effectRef>
-          <a:fontRef idx="minor">
-            <a:schemeClr val="lt1"/>
-          </a:fontRef>
-        </p:style>
-        <p:txBody>
-          <a:bodyPr rtlCol="0" anchor="ctr"/>
-          <a:lstStyle/>
-          <a:p>
-            <a:pPr algn="ctr"/>
-            <a:endParaRPr lang="en-US"/>
-          </a:p>
-        </p:txBody>
-      </p:sp>
-      <p:sp>
-        <p:nvSpPr>
-          <p:cNvPr id="420" name="Rectangle 419"/>
-          <p:cNvSpPr/>
-          <p:nvPr/>
-        </p:nvSpPr>
-        <p:spPr>
-          <a:xfrm>
-            <a:off x="8149652" y="4720525"/>
-            <a:ext cx="261908" cy="283209"/>
-          </a:xfrm>
-          <a:prstGeom prst="rect">
-            <a:avLst/>
-          </a:prstGeom>
-          <a:solidFill>
-            <a:srgbClr val="95B3D7"/>
-          </a:solidFill>
-          <a:ln>
-            <a:solidFill>
-              <a:srgbClr val="FFFFFF"/>
-            </a:solidFill>
-          </a:ln>
-          <a:effectLst/>
-        </p:spPr>
-        <p:style>
-          <a:lnRef idx="1">
-            <a:schemeClr val="accent1"/>
-          </a:lnRef>
-          <a:fillRef idx="3">
-            <a:schemeClr val="accent1"/>
-          </a:fillRef>
-          <a:effectRef idx="2">
-            <a:schemeClr val="accent1"/>
-          </a:effectRef>
-          <a:fontRef idx="minor">
-            <a:schemeClr val="lt1"/>
-          </a:fontRef>
-        </p:style>
-        <p:txBody>
-          <a:bodyPr rtlCol="0" anchor="ctr"/>
-          <a:lstStyle/>
-          <a:p>
-            <a:pPr algn="ctr"/>
-            <a:endParaRPr lang="en-US"/>
-          </a:p>
-        </p:txBody>
-      </p:sp>
-      <p:sp>
-        <p:nvSpPr>
           <p:cNvPr id="507" name="Rectangle 506"/>
           <p:cNvSpPr/>
           <p:nvPr/>
@@ -16244,103 +16147,6 @@
           </a:graphicData>
         </a:graphic>
       </p:graphicFrame>
-      <p:sp>
-        <p:nvSpPr>
-          <p:cNvPr id="249" name="Rectangle 248"/>
-          <p:cNvSpPr/>
-          <p:nvPr/>
-        </p:nvSpPr>
-        <p:spPr>
-          <a:xfrm>
-            <a:off x="6589013" y="4711816"/>
-            <a:ext cx="278586" cy="283209"/>
-          </a:xfrm>
-          <a:prstGeom prst="rect">
-            <a:avLst/>
-          </a:prstGeom>
-          <a:solidFill>
-            <a:schemeClr val="accent2">
-              <a:lumMod val="40000"/>
-              <a:lumOff val="60000"/>
-            </a:schemeClr>
-          </a:solidFill>
-          <a:ln>
-            <a:solidFill>
-              <a:srgbClr val="FFFFFF"/>
-            </a:solidFill>
-          </a:ln>
-          <a:effectLst/>
-        </p:spPr>
-        <p:style>
-          <a:lnRef idx="1">
-            <a:schemeClr val="accent1"/>
-          </a:lnRef>
-          <a:fillRef idx="3">
-            <a:schemeClr val="accent1"/>
-          </a:fillRef>
-          <a:effectRef idx="2">
-            <a:schemeClr val="accent1"/>
-          </a:effectRef>
-          <a:fontRef idx="minor">
-            <a:schemeClr val="lt1"/>
-          </a:fontRef>
-        </p:style>
-        <p:txBody>
-          <a:bodyPr rtlCol="0" anchor="ctr"/>
-          <a:lstStyle/>
-          <a:p>
-            <a:pPr algn="ctr"/>
-            <a:endParaRPr lang="en-US"/>
-          </a:p>
-        </p:txBody>
-      </p:sp>
-      <p:sp>
-        <p:nvSpPr>
-          <p:cNvPr id="253" name="Rectangle 252"/>
-          <p:cNvSpPr/>
-          <p:nvPr/>
-        </p:nvSpPr>
-        <p:spPr>
-          <a:xfrm>
-            <a:off x="7113419" y="4711816"/>
-            <a:ext cx="261908" cy="283209"/>
-          </a:xfrm>
-          <a:prstGeom prst="rect">
-            <a:avLst/>
-          </a:prstGeom>
-          <a:solidFill>
-            <a:srgbClr val="95B3D7"/>
-          </a:solidFill>
-          <a:ln>
-            <a:solidFill>
-              <a:srgbClr val="FFFFFF"/>
-            </a:solidFill>
-          </a:ln>
-          <a:effectLst/>
-        </p:spPr>
-        <p:style>
-          <a:lnRef idx="1">
-            <a:schemeClr val="accent1"/>
-          </a:lnRef>
-          <a:fillRef idx="3">
-            <a:schemeClr val="accent1"/>
-          </a:fillRef>
-          <a:effectRef idx="2">
-            <a:schemeClr val="accent1"/>
-          </a:effectRef>
-          <a:fontRef idx="minor">
-            <a:schemeClr val="lt1"/>
-          </a:fontRef>
-        </p:style>
-        <p:txBody>
-          <a:bodyPr rtlCol="0" anchor="ctr"/>
-          <a:lstStyle/>
-          <a:p>
-            <a:pPr algn="ctr"/>
-            <a:endParaRPr lang="en-US"/>
-          </a:p>
-        </p:txBody>
-      </p:sp>
       <p:pic>
         <p:nvPicPr>
           <p:cNvPr id="145" name="Picture 144"/>
@@ -16542,188 +16348,6 @@
           </a:p>
         </p:txBody>
       </p:sp>
-      <p:sp>
-        <p:nvSpPr>
-          <p:cNvPr id="418" name="TextBox 417"/>
-          <p:cNvSpPr txBox="1"/>
-          <p:nvPr/>
-        </p:nvSpPr>
-        <p:spPr>
-          <a:xfrm>
-            <a:off x="6141253" y="4166805"/>
-            <a:ext cx="2676899" cy="369332"/>
-          </a:xfrm>
-          <a:prstGeom prst="rect">
-            <a:avLst/>
-          </a:prstGeom>
-          <a:noFill/>
-        </p:spPr>
-        <p:txBody>
-          <a:bodyPr wrap="square" rtlCol="0">
-            <a:spAutoFit/>
-          </a:bodyPr>
-          <a:lstStyle/>
-          <a:p>
-            <a:r>
-              <a:rPr lang="en-US" b="1" dirty="0">
-                <a:latin typeface="Arial"/>
-                <a:cs typeface="Arial"/>
-              </a:rPr>
-              <a:t>b</a:t>
-            </a:r>
-            <a:r>
-              <a:rPr lang="en-US" sz="1400" b="1" dirty="0">
-                <a:latin typeface="Arial"/>
-                <a:cs typeface="Arial"/>
-              </a:rPr>
-              <a:t>  </a:t>
-            </a:r>
-            <a:r>
-              <a:rPr lang="en-US" sz="1400" dirty="0">
-                <a:latin typeface="Arial"/>
-                <a:cs typeface="Arial"/>
-              </a:rPr>
-              <a:t>PTM significance analysis</a:t>
-            </a:r>
-          </a:p>
-        </p:txBody>
-      </p:sp>
-      <p:sp>
-        <p:nvSpPr>
-          <p:cNvPr id="421" name="TextBox 420"/>
-          <p:cNvSpPr txBox="1"/>
-          <p:nvPr/>
-        </p:nvSpPr>
-        <p:spPr>
-          <a:xfrm>
-            <a:off x="6412471" y="5318402"/>
-            <a:ext cx="2408288" cy="523220"/>
-          </a:xfrm>
-          <a:prstGeom prst="rect">
-            <a:avLst/>
-          </a:prstGeom>
-          <a:noFill/>
-          <a:ln w="19050" cmpd="sng">
-            <a:solidFill>
-              <a:srgbClr val="376092"/>
-            </a:solidFill>
-          </a:ln>
-        </p:spPr>
-        <p:txBody>
-          <a:bodyPr wrap="square" rtlCol="0">
-            <a:spAutoFit/>
-          </a:bodyPr>
-          <a:lstStyle/>
-          <a:p>
-            <a:pPr marL="285750" indent="-285750">
-              <a:buFont typeface="Arial"/>
-              <a:buChar char="•"/>
-            </a:pPr>
-            <a:r>
-              <a:rPr lang="en-US" sz="1400" dirty="0">
-                <a:latin typeface="Arial"/>
-                <a:cs typeface="Arial"/>
-              </a:rPr>
-              <a:t>Protein-level adjustment</a:t>
-            </a:r>
-          </a:p>
-          <a:p>
-            <a:pPr marL="285750" indent="-285750">
-              <a:buFont typeface="Arial"/>
-              <a:buChar char="•"/>
-            </a:pPr>
-            <a:r>
-              <a:rPr lang="en-US" sz="1400" dirty="0">
-                <a:latin typeface="Arial"/>
-                <a:cs typeface="Arial"/>
-              </a:rPr>
-              <a:t>Increase uncertainty</a:t>
-            </a:r>
-          </a:p>
-        </p:txBody>
-      </p:sp>
-      <p:cxnSp>
-        <p:nvCxnSpPr>
-          <p:cNvPr id="424" name="Straight Arrow Connector 423"/>
-          <p:cNvCxnSpPr/>
-          <p:nvPr/>
-        </p:nvCxnSpPr>
-        <p:spPr>
-          <a:xfrm flipH="1" flipV="1">
-            <a:off x="7302871" y="5021145"/>
-            <a:ext cx="344604" cy="288548"/>
-          </a:xfrm>
-          <a:prstGeom prst="straightConnector1">
-            <a:avLst/>
-          </a:prstGeom>
-          <a:ln w="19050" cmpd="sng">
-            <a:solidFill>
-              <a:schemeClr val="accent1">
-                <a:lumMod val="75000"/>
-              </a:schemeClr>
-            </a:solidFill>
-            <a:prstDash val="sysDash"/>
-            <a:tailEnd type="stealth" w="med" len="med"/>
-          </a:ln>
-          <a:effectLst/>
-        </p:spPr>
-        <p:style>
-          <a:lnRef idx="2">
-            <a:schemeClr val="accent1"/>
-          </a:lnRef>
-          <a:fillRef idx="0">
-            <a:schemeClr val="accent1"/>
-          </a:fillRef>
-          <a:effectRef idx="1">
-            <a:schemeClr val="accent1"/>
-          </a:effectRef>
-          <a:fontRef idx="minor">
-            <a:schemeClr val="tx1"/>
-          </a:fontRef>
-        </p:style>
-      </p:cxnSp>
-      <p:cxnSp>
-        <p:nvCxnSpPr>
-          <p:cNvPr id="432" name="Straight Arrow Connector 431"/>
-          <p:cNvCxnSpPr>
-            <a:cxnSpLocks/>
-          </p:cNvCxnSpPr>
-          <p:nvPr/>
-        </p:nvCxnSpPr>
-        <p:spPr>
-          <a:xfrm flipV="1">
-            <a:off x="7768063" y="5029854"/>
-            <a:ext cx="377747" cy="288548"/>
-          </a:xfrm>
-          <a:prstGeom prst="straightConnector1">
-            <a:avLst/>
-          </a:prstGeom>
-          <a:ln w="19050" cmpd="sng">
-            <a:solidFill>
-              <a:schemeClr val="accent1">
-                <a:lumMod val="75000"/>
-              </a:schemeClr>
-            </a:solidFill>
-            <a:prstDash val="sysDash"/>
-            <a:tailEnd type="stealth" w="med" len="med"/>
-          </a:ln>
-          <a:effectLst/>
-        </p:spPr>
-        <p:style>
-          <a:lnRef idx="2">
-            <a:schemeClr val="accent1"/>
-          </a:lnRef>
-          <a:fillRef idx="0">
-            <a:schemeClr val="accent1"/>
-          </a:fillRef>
-          <a:effectRef idx="1">
-            <a:schemeClr val="accent1"/>
-          </a:effectRef>
-          <a:fontRef idx="minor">
-            <a:schemeClr val="tx1"/>
-          </a:fontRef>
-        </p:style>
-      </p:cxnSp>
       <p:sp>
         <p:nvSpPr>
           <p:cNvPr id="175" name="Rectangle 174"/>
@@ -22260,113 +21884,6 @@
               <a:t>*</a:t>
             </a:r>
             <a:endParaRPr lang="en-US" sz="1100" dirty="0"/>
-          </a:p>
-        </p:txBody>
-      </p:sp>
-      <p:graphicFrame>
-        <p:nvGraphicFramePr>
-          <p:cNvPr id="258" name="Object 257"/>
-          <p:cNvGraphicFramePr>
-            <a:graphicFrameLocks noChangeAspect="1"/>
-          </p:cNvGraphicFramePr>
-          <p:nvPr>
-            <p:extLst>
-              <p:ext uri="{D42A27DB-BD31-4B8C-83A1-F6EECF244321}">
-                <p14:modId xmlns:p14="http://schemas.microsoft.com/office/powerpoint/2010/main" val="426572635"/>
-              </p:ext>
-            </p:extLst>
-          </p:nvPr>
-        </p:nvGraphicFramePr>
-        <p:xfrm>
-          <a:off x="6140297" y="4676363"/>
-          <a:ext cx="2724150" cy="361950"/>
-        </p:xfrm>
-        <a:graphic>
-          <a:graphicData uri="http://schemas.openxmlformats.org/presentationml/2006/ole">
-            <mc:AlternateContent xmlns:mc="http://schemas.openxmlformats.org/markup-compatibility/2006">
-              <mc:Choice xmlns:v="urn:schemas-microsoft-com:vml" Requires="v">
-                <p:oleObj name="Equation" r:id="rId18" imgW="1815840" imgH="241200" progId="Equation.3">
-                  <p:embed/>
-                </p:oleObj>
-              </mc:Choice>
-              <mc:Fallback>
-                <p:oleObj name="Equation" r:id="rId18" imgW="1815840" imgH="241200" progId="Equation.3">
-                  <p:embed/>
-                  <p:pic>
-                    <p:nvPicPr>
-                      <p:cNvPr id="258" name="Object 257"/>
-                      <p:cNvPicPr/>
-                      <p:nvPr/>
-                    </p:nvPicPr>
-                    <p:blipFill>
-                      <a:blip r:embed="rId19"/>
-                      <a:stretch>
-                        <a:fillRect/>
-                      </a:stretch>
-                    </p:blipFill>
-                    <p:spPr>
-                      <a:xfrm>
-                        <a:off x="6140297" y="4676363"/>
-                        <a:ext cx="2724150" cy="361950"/>
-                      </a:xfrm>
-                      <a:prstGeom prst="rect">
-                        <a:avLst/>
-                      </a:prstGeom>
-                      <a:noFill/>
-                      <a:ln>
-                        <a:noFill/>
-                      </a:ln>
-                    </p:spPr>
-                  </p:pic>
-                </p:oleObj>
-              </mc:Fallback>
-            </mc:AlternateContent>
-          </a:graphicData>
-        </a:graphic>
-      </p:graphicFrame>
-      <p:sp>
-        <p:nvSpPr>
-          <p:cNvPr id="5" name="Rectangle 4">
-            <a:extLst>
-              <a:ext uri="{FF2B5EF4-FFF2-40B4-BE49-F238E27FC236}">
-                <a16:creationId xmlns:a16="http://schemas.microsoft.com/office/drawing/2014/main" id="{0A1986C7-EC1C-9C77-5AD8-60533F3E3ACC}"/>
-              </a:ext>
-            </a:extLst>
-          </p:cNvPr>
-          <p:cNvSpPr/>
-          <p:nvPr/>
-        </p:nvSpPr>
-        <p:spPr>
-          <a:xfrm>
-            <a:off x="5980001" y="4148349"/>
-            <a:ext cx="3044145" cy="1825732"/>
-          </a:xfrm>
-          <a:prstGeom prst="rect">
-            <a:avLst/>
-          </a:prstGeom>
-          <a:noFill/>
-          <a:ln w="9525"/>
-        </p:spPr>
-        <p:style>
-          <a:lnRef idx="2">
-            <a:schemeClr val="dk1"/>
-          </a:lnRef>
-          <a:fillRef idx="1">
-            <a:schemeClr val="lt1"/>
-          </a:fillRef>
-          <a:effectRef idx="0">
-            <a:schemeClr val="dk1"/>
-          </a:effectRef>
-          <a:fontRef idx="minor">
-            <a:schemeClr val="dk1"/>
-          </a:fontRef>
-        </p:style>
-        <p:txBody>
-          <a:bodyPr rtlCol="0" anchor="ctr"/>
-          <a:lstStyle/>
-          <a:p>
-            <a:pPr algn="ctr"/>
-            <a:endParaRPr lang="en-US"/>
           </a:p>
         </p:txBody>
       </p:sp>

</xml_diff>